<commit_message>
Some pptx and some fin diff changes
</commit_message>
<xml_diff>
--- a/Final Research Presentation/Final_LongPres_Davis_Matern.pptx
+++ b/Final Research Presentation/Final_LongPres_Davis_Matern.pptx
@@ -5,7 +5,7 @@
     <p:sldMasterId id="2147483660" r:id="rId1"/>
   </p:sldMasterIdLst>
   <p:notesMasterIdLst>
-    <p:notesMasterId r:id="rId24"/>
+    <p:notesMasterId r:id="rId25"/>
   </p:notesMasterIdLst>
   <p:sldIdLst>
     <p:sldId id="278" r:id="rId2"/>
@@ -13,23 +13,24 @@
     <p:sldId id="258" r:id="rId4"/>
     <p:sldId id="259" r:id="rId5"/>
     <p:sldId id="260" r:id="rId6"/>
-    <p:sldId id="261" r:id="rId7"/>
-    <p:sldId id="262" r:id="rId8"/>
+    <p:sldId id="262" r:id="rId7"/>
+    <p:sldId id="283" r:id="rId8"/>
     <p:sldId id="263" r:id="rId9"/>
     <p:sldId id="264" r:id="rId10"/>
-    <p:sldId id="265" r:id="rId11"/>
-    <p:sldId id="266" r:id="rId12"/>
-    <p:sldId id="280" r:id="rId13"/>
-    <p:sldId id="268" r:id="rId14"/>
-    <p:sldId id="269" r:id="rId15"/>
-    <p:sldId id="270" r:id="rId16"/>
-    <p:sldId id="271" r:id="rId17"/>
-    <p:sldId id="272" r:id="rId18"/>
-    <p:sldId id="273" r:id="rId19"/>
-    <p:sldId id="274" r:id="rId20"/>
-    <p:sldId id="275" r:id="rId21"/>
-    <p:sldId id="276" r:id="rId22"/>
-    <p:sldId id="277" r:id="rId23"/>
+    <p:sldId id="282" r:id="rId11"/>
+    <p:sldId id="265" r:id="rId12"/>
+    <p:sldId id="266" r:id="rId13"/>
+    <p:sldId id="280" r:id="rId14"/>
+    <p:sldId id="268" r:id="rId15"/>
+    <p:sldId id="269" r:id="rId16"/>
+    <p:sldId id="270" r:id="rId17"/>
+    <p:sldId id="271" r:id="rId18"/>
+    <p:sldId id="272" r:id="rId19"/>
+    <p:sldId id="273" r:id="rId20"/>
+    <p:sldId id="281" r:id="rId21"/>
+    <p:sldId id="275" r:id="rId22"/>
+    <p:sldId id="276" r:id="rId23"/>
+    <p:sldId id="277" r:id="rId24"/>
   </p:sldIdLst>
   <p:sldSz cx="9144000" cy="6858000" type="screen4x3"/>
   <p:notesSz cx="6858000" cy="9144000"/>
@@ -213,7 +214,8 @@
           <a:p>
             <a:fld id="{D454FE15-F6B3-874B-B378-F652C1F4788C}" type="datetimeFigureOut">
               <a:rPr lang="en-US" smtClean="0"/>
-              <a:t>8/13/12</a:t>
+              <a:pPr/>
+              <a:t>8/14/12</a:t>
             </a:fld>
             <a:endParaRPr lang="en-US"/>
           </a:p>
@@ -374,6 +376,7 @@
           <a:p>
             <a:fld id="{0A180F3D-82C6-1B48-9FBF-2DBFC87DC5F9}" type="slidenum">
               <a:rPr lang="en-US" smtClean="0"/>
+              <a:pPr/>
               <a:t>‹#›</a:t>
             </a:fld>
             <a:endParaRPr lang="en-US"/>
@@ -650,7 +653,97 @@
               <a:pPr>
                 <a:defRPr/>
               </a:pPr>
-              <a:t>12</a:t>
+              <a:t>13</a:t>
+            </a:fld>
+            <a:endParaRPr lang="en-US"/>
+          </a:p>
+        </p:txBody>
+      </p:sp>
+    </p:spTree>
+  </p:cSld>
+  <p:clrMapOvr>
+    <a:masterClrMapping/>
+  </p:clrMapOvr>
+</p:notes>
+</file>
+
+<file path=ppt/notesSlides/notesSlide3.xml><?xml version="1.0" encoding="utf-8"?>
+<p:notes xmlns:a="http://schemas.openxmlformats.org/drawingml/2006/main" xmlns:r="http://schemas.openxmlformats.org/officeDocument/2006/relationships" xmlns:mc="http://schemas.openxmlformats.org/markup-compatibility/2006" xmlns:mv="urn:schemas-microsoft-com:mac:vml" xmlns:p="http://schemas.openxmlformats.org/presentationml/2006/main" mc:Ignorable="mv" mc:PreserveAttributes="mv:*">
+  <p:cSld>
+    <p:spTree>
+      <p:nvGrpSpPr>
+        <p:cNvPr id="1" name=""/>
+        <p:cNvGrpSpPr/>
+        <p:nvPr/>
+      </p:nvGrpSpPr>
+      <p:grpSpPr>
+        <a:xfrm>
+          <a:off x="0" y="0"/>
+          <a:ext cx="0" cy="0"/>
+          <a:chOff x="0" y="0"/>
+          <a:chExt cx="0" cy="0"/>
+        </a:xfrm>
+      </p:grpSpPr>
+      <p:sp>
+        <p:nvSpPr>
+          <p:cNvPr id="2" name="Slide Image Placeholder 1"/>
+          <p:cNvSpPr>
+            <a:spLocks noGrp="1" noRot="1" noChangeAspect="1"/>
+          </p:cNvSpPr>
+          <p:nvPr>
+            <p:ph type="sldImg"/>
+          </p:nvPr>
+        </p:nvSpPr>
+        <p:spPr/>
+      </p:sp>
+      <p:sp>
+        <p:nvSpPr>
+          <p:cNvPr id="3" name="Notes Placeholder 2"/>
+          <p:cNvSpPr>
+            <a:spLocks noGrp="1"/>
+          </p:cNvSpPr>
+          <p:nvPr>
+            <p:ph type="body" idx="1"/>
+          </p:nvPr>
+        </p:nvSpPr>
+        <p:spPr/>
+        <p:txBody>
+          <a:bodyPr>
+            <a:normAutofit/>
+          </a:bodyPr>
+          <a:lstStyle/>
+          <a:p>
+            <a:r>
+              <a:rPr lang="en-US" dirty="0" smtClean="0"/>
+              <a:t>Talk about the simplifications and that the tracer equation is simply an</a:t>
+            </a:r>
+            <a:r>
+              <a:rPr lang="en-US" baseline="0" dirty="0" smtClean="0"/>
+              <a:t> advection equation.</a:t>
+            </a:r>
+            <a:endParaRPr lang="en-US" dirty="0"/>
+          </a:p>
+        </p:txBody>
+      </p:sp>
+      <p:sp>
+        <p:nvSpPr>
+          <p:cNvPr id="4" name="Slide Number Placeholder 3"/>
+          <p:cNvSpPr>
+            <a:spLocks noGrp="1"/>
+          </p:cNvSpPr>
+          <p:nvPr>
+            <p:ph type="sldNum" sz="quarter" idx="10"/>
+          </p:nvPr>
+        </p:nvSpPr>
+        <p:spPr/>
+        <p:txBody>
+          <a:bodyPr/>
+          <a:lstStyle/>
+          <a:p>
+            <a:fld id="{0A180F3D-82C6-1B48-9FBF-2DBFC87DC5F9}" type="slidenum">
+              <a:rPr lang="en-US" smtClean="0"/>
+              <a:pPr/>
+              <a:t>20</a:t>
             </a:fld>
             <a:endParaRPr lang="en-US"/>
           </a:p>
@@ -794,7 +887,8 @@
           <a:p>
             <a:fld id="{4BDB84C0-9A3A-884B-883E-F7760F12E0B8}" type="datetimeFigureOut">
               <a:rPr lang="en-US" smtClean="0"/>
-              <a:t>8/13/12</a:t>
+              <a:pPr/>
+              <a:t>8/14/12</a:t>
             </a:fld>
             <a:endParaRPr lang="en-US"/>
           </a:p>
@@ -836,6 +930,7 @@
           <a:p>
             <a:fld id="{68DA931A-D29B-E241-BA20-9F648099B32E}" type="slidenum">
               <a:rPr lang="en-US" smtClean="0"/>
+              <a:pPr/>
               <a:t>‹#›</a:t>
             </a:fld>
             <a:endParaRPr lang="en-US"/>
@@ -1093,7 +1188,8 @@
           <a:p>
             <a:fld id="{4BDB84C0-9A3A-884B-883E-F7760F12E0B8}" type="datetimeFigureOut">
               <a:rPr lang="en-US" smtClean="0"/>
-              <a:t>8/13/12</a:t>
+              <a:pPr/>
+              <a:t>8/14/12</a:t>
             </a:fld>
             <a:endParaRPr lang="en-US"/>
           </a:p>
@@ -1135,6 +1231,7 @@
           <a:p>
             <a:fld id="{68DA931A-D29B-E241-BA20-9F648099B32E}" type="slidenum">
               <a:rPr lang="en-US" smtClean="0"/>
+              <a:pPr/>
               <a:t>‹#›</a:t>
             </a:fld>
             <a:endParaRPr lang="en-US"/>
@@ -1268,7 +1365,8 @@
           <a:p>
             <a:fld id="{4BDB84C0-9A3A-884B-883E-F7760F12E0B8}" type="datetimeFigureOut">
               <a:rPr lang="en-US" smtClean="0"/>
-              <a:t>8/13/12</a:t>
+              <a:pPr/>
+              <a:t>8/14/12</a:t>
             </a:fld>
             <a:endParaRPr lang="en-US"/>
           </a:p>
@@ -1310,6 +1408,7 @@
           <a:p>
             <a:fld id="{68DA931A-D29B-E241-BA20-9F648099B32E}" type="slidenum">
               <a:rPr lang="en-US" smtClean="0"/>
+              <a:pPr/>
               <a:t>‹#›</a:t>
             </a:fld>
             <a:endParaRPr lang="en-US"/>
@@ -1433,7 +1532,8 @@
           <a:p>
             <a:fld id="{4BDB84C0-9A3A-884B-883E-F7760F12E0B8}" type="datetimeFigureOut">
               <a:rPr lang="en-US" smtClean="0"/>
-              <a:t>8/13/12</a:t>
+              <a:pPr/>
+              <a:t>8/14/12</a:t>
             </a:fld>
             <a:endParaRPr lang="en-US"/>
           </a:p>
@@ -1475,6 +1575,7 @@
           <a:p>
             <a:fld id="{68DA931A-D29B-E241-BA20-9F648099B32E}" type="slidenum">
               <a:rPr lang="en-US" smtClean="0"/>
+              <a:pPr/>
               <a:t>‹#›</a:t>
             </a:fld>
             <a:endParaRPr lang="en-US"/>
@@ -1691,7 +1792,8 @@
           <a:p>
             <a:fld id="{4BDB84C0-9A3A-884B-883E-F7760F12E0B8}" type="datetimeFigureOut">
               <a:rPr lang="en-US" smtClean="0"/>
-              <a:t>8/13/12</a:t>
+              <a:pPr/>
+              <a:t>8/14/12</a:t>
             </a:fld>
             <a:endParaRPr lang="en-US"/>
           </a:p>
@@ -1733,6 +1835,7 @@
           <a:p>
             <a:fld id="{68DA931A-D29B-E241-BA20-9F648099B32E}" type="slidenum">
               <a:rPr lang="en-US" smtClean="0"/>
+              <a:pPr/>
               <a:t>‹#›</a:t>
             </a:fld>
             <a:endParaRPr lang="en-US"/>
@@ -2143,7 +2246,8 @@
           <a:p>
             <a:fld id="{4BDB84C0-9A3A-884B-883E-F7760F12E0B8}" type="datetimeFigureOut">
               <a:rPr lang="en-US" smtClean="0"/>
-              <a:t>8/13/12</a:t>
+              <a:pPr/>
+              <a:t>8/14/12</a:t>
             </a:fld>
             <a:endParaRPr lang="en-US"/>
           </a:p>
@@ -2185,6 +2289,7 @@
           <a:p>
             <a:fld id="{68DA931A-D29B-E241-BA20-9F648099B32E}" type="slidenum">
               <a:rPr lang="en-US" smtClean="0"/>
+              <a:pPr/>
               <a:t>‹#›</a:t>
             </a:fld>
             <a:endParaRPr lang="en-US"/>
@@ -2621,7 +2726,8 @@
           <a:p>
             <a:fld id="{4BDB84C0-9A3A-884B-883E-F7760F12E0B8}" type="datetimeFigureOut">
               <a:rPr lang="en-US" smtClean="0"/>
-              <a:t>8/13/12</a:t>
+              <a:pPr/>
+              <a:t>8/14/12</a:t>
             </a:fld>
             <a:endParaRPr lang="en-US"/>
           </a:p>
@@ -2663,6 +2769,7 @@
           <a:p>
             <a:fld id="{68DA931A-D29B-E241-BA20-9F648099B32E}" type="slidenum">
               <a:rPr lang="en-US" smtClean="0"/>
+              <a:pPr/>
               <a:t>‹#›</a:t>
             </a:fld>
             <a:endParaRPr lang="en-US"/>
@@ -2739,7 +2846,8 @@
           <a:p>
             <a:fld id="{4BDB84C0-9A3A-884B-883E-F7760F12E0B8}" type="datetimeFigureOut">
               <a:rPr lang="en-US" smtClean="0"/>
-              <a:t>8/13/12</a:t>
+              <a:pPr/>
+              <a:t>8/14/12</a:t>
             </a:fld>
             <a:endParaRPr lang="en-US"/>
           </a:p>
@@ -2781,6 +2889,7 @@
           <a:p>
             <a:fld id="{68DA931A-D29B-E241-BA20-9F648099B32E}" type="slidenum">
               <a:rPr lang="en-US" smtClean="0"/>
+              <a:pPr/>
               <a:t>‹#›</a:t>
             </a:fld>
             <a:endParaRPr lang="en-US"/>
@@ -2875,7 +2984,8 @@
           <a:p>
             <a:fld id="{4BDB84C0-9A3A-884B-883E-F7760F12E0B8}" type="datetimeFigureOut">
               <a:rPr lang="en-US" smtClean="0"/>
-              <a:t>8/13/12</a:t>
+              <a:pPr/>
+              <a:t>8/14/12</a:t>
             </a:fld>
             <a:endParaRPr lang="en-US"/>
           </a:p>
@@ -2917,6 +3027,7 @@
           <a:p>
             <a:fld id="{68DA931A-D29B-E241-BA20-9F648099B32E}" type="slidenum">
               <a:rPr lang="en-US" smtClean="0"/>
+              <a:pPr/>
               <a:t>‹#›</a:t>
             </a:fld>
             <a:endParaRPr lang="en-US"/>
@@ -3186,7 +3297,8 @@
           <a:p>
             <a:fld id="{4BDB84C0-9A3A-884B-883E-F7760F12E0B8}" type="datetimeFigureOut">
               <a:rPr lang="en-US" smtClean="0"/>
-              <a:t>8/13/12</a:t>
+              <a:pPr/>
+              <a:t>8/14/12</a:t>
             </a:fld>
             <a:endParaRPr lang="en-US"/>
           </a:p>
@@ -3228,6 +3340,7 @@
           <a:p>
             <a:fld id="{68DA931A-D29B-E241-BA20-9F648099B32E}" type="slidenum">
               <a:rPr lang="en-US" smtClean="0"/>
+              <a:pPr/>
               <a:t>‹#›</a:t>
             </a:fld>
             <a:endParaRPr lang="en-US"/>
@@ -3313,7 +3426,8 @@
           <a:p>
             <a:fld id="{4BDB84C0-9A3A-884B-883E-F7760F12E0B8}" type="datetimeFigureOut">
               <a:rPr lang="en-US" smtClean="0"/>
-              <a:t>8/13/12</a:t>
+              <a:pPr/>
+              <a:t>8/14/12</a:t>
             </a:fld>
             <a:endParaRPr lang="en-US"/>
           </a:p>
@@ -3355,6 +3469,7 @@
           <a:p>
             <a:fld id="{68DA931A-D29B-E241-BA20-9F648099B32E}" type="slidenum">
               <a:rPr lang="en-US" smtClean="0"/>
+              <a:pPr/>
               <a:t>‹#›</a:t>
             </a:fld>
             <a:endParaRPr lang="en-US"/>
@@ -4069,7 +4184,8 @@
           <a:p>
             <a:fld id="{4BDB84C0-9A3A-884B-883E-F7760F12E0B8}" type="datetimeFigureOut">
               <a:rPr lang="en-US" smtClean="0"/>
-              <a:t>8/13/12</a:t>
+              <a:pPr/>
+              <a:t>8/14/12</a:t>
             </a:fld>
             <a:endParaRPr lang="en-US"/>
           </a:p>
@@ -4151,6 +4267,7 @@
           <a:p>
             <a:fld id="{68DA931A-D29B-E241-BA20-9F648099B32E}" type="slidenum">
               <a:rPr lang="en-US" smtClean="0"/>
+              <a:pPr/>
               <a:t>‹#›</a:t>
             </a:fld>
             <a:endParaRPr lang="en-US"/>
@@ -4618,13 +4735,7 @@
               <a:rPr lang="en-US" dirty="0" smtClean="0">
                 <a:ea typeface="ＭＳ Ｐゴシック" pitchFamily="-108" charset="-128"/>
               </a:rPr>
-              <a:t>Sean </a:t>
-            </a:r>
-            <a:r>
-              <a:rPr lang="en-US" dirty="0" smtClean="0">
-                <a:ea typeface="ＭＳ Ｐゴシック" pitchFamily="-108" charset="-128"/>
-              </a:rPr>
-              <a:t>Davis and Will </a:t>
+              <a:t>Sean Davis and Will </a:t>
             </a:r>
             <a:r>
               <a:rPr lang="en-US" dirty="0" err="1" smtClean="0">
@@ -4750,6 +4861,235 @@
       </p:grpSpPr>
       <p:sp>
         <p:nvSpPr>
+          <p:cNvPr id="24578" name="Title 1"/>
+          <p:cNvSpPr>
+            <a:spLocks noGrp="1"/>
+          </p:cNvSpPr>
+          <p:nvPr>
+            <p:ph type="title"/>
+          </p:nvPr>
+        </p:nvSpPr>
+        <p:spPr/>
+        <p:txBody>
+          <a:bodyPr>
+            <a:normAutofit fontScale="90000"/>
+          </a:bodyPr>
+          <a:lstStyle/>
+          <a:p>
+            <a:r>
+              <a:rPr lang="en-US">
+                <a:ea typeface="ＭＳ Ｐゴシック" pitchFamily="-108" charset="-128"/>
+              </a:rPr>
+              <a:t>Theory of the Streamline Upwind Petrov-Galerkin (SUPG)</a:t>
+            </a:r>
+          </a:p>
+        </p:txBody>
+      </p:sp>
+      <p:sp>
+        <p:nvSpPr>
+          <p:cNvPr id="24579" name="Content Placeholder 2"/>
+          <p:cNvSpPr>
+            <a:spLocks noGrp="1"/>
+          </p:cNvSpPr>
+          <p:nvPr>
+            <p:ph idx="1"/>
+          </p:nvPr>
+        </p:nvSpPr>
+        <p:spPr/>
+        <p:txBody>
+          <a:bodyPr>
+            <a:normAutofit fontScale="77500" lnSpcReduction="20000"/>
+          </a:bodyPr>
+          <a:lstStyle/>
+          <a:p>
+            <a:r>
+              <a:rPr lang="en-US" u="sng">
+                <a:ea typeface="ＭＳ Ｐゴシック" pitchFamily="-108" charset="-128"/>
+              </a:rPr>
+              <a:t>Trial functions </a:t>
+            </a:r>
+            <a:r>
+              <a:rPr lang="en-US">
+                <a:ea typeface="ＭＳ Ｐゴシック" pitchFamily="-108" charset="-128"/>
+              </a:rPr>
+              <a:t>– a set of functions assumed to approximate the underlying solution. The trial functions have degrees of freedom that must be solved for.</a:t>
+            </a:r>
+          </a:p>
+          <a:p>
+            <a:r>
+              <a:rPr lang="en-US" u="sng">
+                <a:ea typeface="ＭＳ Ｐゴシック" pitchFamily="-108" charset="-128"/>
+              </a:rPr>
+              <a:t>Test functions </a:t>
+            </a:r>
+            <a:r>
+              <a:rPr lang="en-US">
+                <a:ea typeface="ＭＳ Ｐゴシック" pitchFamily="-108" charset="-128"/>
+              </a:rPr>
+              <a:t>– a set of functions used to solve for the degrees of freedom of the trial functions.  Uses the weak formulation of the governing equation.</a:t>
+            </a:r>
+          </a:p>
+          <a:p>
+            <a:r>
+              <a:rPr lang="en-US" u="sng">
+                <a:ea typeface="ＭＳ Ｐゴシック" pitchFamily="-108" charset="-128"/>
+              </a:rPr>
+              <a:t>Petrov-Galerkin</a:t>
+            </a:r>
+            <a:r>
+              <a:rPr lang="en-US">
+                <a:ea typeface="ＭＳ Ｐゴシック" pitchFamily="-108" charset="-128"/>
+              </a:rPr>
+              <a:t> – Test functions </a:t>
+            </a:r>
+            <a:r>
+              <a:rPr lang="en-US">
+                <a:ea typeface="Arial" pitchFamily="-108" charset="0"/>
+                <a:cs typeface="Arial" pitchFamily="-108" charset="0"/>
+              </a:rPr>
+              <a:t>≠ Trial functions</a:t>
+            </a:r>
+            <a:r>
+              <a:rPr lang="en-US">
+                <a:ea typeface="ＭＳ Ｐゴシック" pitchFamily="-108" charset="-128"/>
+              </a:rPr>
+              <a:t> </a:t>
+            </a:r>
+          </a:p>
+          <a:p>
+            <a:r>
+              <a:rPr lang="en-US" u="sng">
+                <a:ea typeface="ＭＳ Ｐゴシック" pitchFamily="-108" charset="-128"/>
+              </a:rPr>
+              <a:t>SUPG</a:t>
+            </a:r>
+            <a:r>
+              <a:rPr lang="en-US">
+                <a:ea typeface="ＭＳ Ｐゴシック" pitchFamily="-108" charset="-128"/>
+              </a:rPr>
+              <a:t> – Choose test functions to be:</a:t>
+            </a:r>
+          </a:p>
+          <a:p>
+            <a:endParaRPr lang="en-US">
+              <a:ea typeface="ＭＳ Ｐゴシック" pitchFamily="-108" charset="-128"/>
+            </a:endParaRPr>
+          </a:p>
+          <a:p>
+            <a:pPr>
+              <a:buFont typeface="Wingdings" pitchFamily="-108" charset="2"/>
+              <a:buNone/>
+            </a:pPr>
+            <a:r>
+              <a:rPr lang="en-US">
+                <a:ea typeface="ＭＳ Ｐゴシック" pitchFamily="-108" charset="-128"/>
+              </a:rPr>
+              <a:t>	</a:t>
+            </a:r>
+          </a:p>
+          <a:p>
+            <a:pPr>
+              <a:buFont typeface="Wingdings" pitchFamily="-108" charset="2"/>
+              <a:buNone/>
+            </a:pPr>
+            <a:r>
+              <a:rPr lang="en-US">
+                <a:ea typeface="ＭＳ Ｐゴシック" pitchFamily="-108" charset="-128"/>
+              </a:rPr>
+              <a:t>				where N is a trial function</a:t>
+            </a:r>
+          </a:p>
+        </p:txBody>
+      </p:sp>
+      <p:sp>
+        <p:nvSpPr>
+          <p:cNvPr id="24580" name="Slide Number Placeholder 3"/>
+          <p:cNvSpPr>
+            <a:spLocks noGrp="1"/>
+          </p:cNvSpPr>
+          <p:nvPr>
+            <p:ph type="sldNum" sz="quarter" idx="12"/>
+          </p:nvPr>
+        </p:nvSpPr>
+        <p:spPr>
+          <a:noFill/>
+        </p:spPr>
+        <p:txBody>
+          <a:bodyPr/>
+          <a:lstStyle/>
+          <a:p>
+            <a:r>
+              <a:rPr lang="en-US"/>
+              <a:t>Slide </a:t>
+            </a:r>
+            <a:fld id="{9C0C6800-C07A-B840-9F81-62616F777194}" type="slidenum">
+              <a:rPr lang="en-US"/>
+              <a:pPr/>
+              <a:t>10</a:t>
+            </a:fld>
+            <a:endParaRPr lang="en-US"/>
+          </a:p>
+        </p:txBody>
+      </p:sp>
+      <p:pic>
+        <p:nvPicPr>
+          <p:cNvPr id="24581" name="Picture 47"/>
+          <p:cNvPicPr>
+            <a:picLocks noChangeAspect="1" noChangeArrowheads="1"/>
+          </p:cNvPicPr>
+          <p:nvPr/>
+        </p:nvPicPr>
+        <p:blipFill>
+          <a:blip r:embed="rId2"/>
+          <a:srcRect/>
+          <a:stretch>
+            <a:fillRect/>
+          </a:stretch>
+        </p:blipFill>
+        <p:spPr bwMode="auto">
+          <a:xfrm>
+            <a:off x="2743200" y="4191000"/>
+            <a:ext cx="3960813" cy="919163"/>
+          </a:xfrm>
+          <a:prstGeom prst="rect">
+            <a:avLst/>
+          </a:prstGeom>
+          <a:noFill/>
+          <a:ln w="9525">
+            <a:noFill/>
+            <a:miter lim="800000"/>
+            <a:headEnd/>
+            <a:tailEnd/>
+          </a:ln>
+        </p:spPr>
+      </p:pic>
+    </p:spTree>
+  </p:cSld>
+  <p:clrMapOvr>
+    <a:masterClrMapping/>
+  </p:clrMapOvr>
+</p:sld>
+</file>
+
+<file path=ppt/slides/slide11.xml><?xml version="1.0" encoding="utf-8"?>
+<p:sld xmlns:a="http://schemas.openxmlformats.org/drawingml/2006/main" xmlns:r="http://schemas.openxmlformats.org/officeDocument/2006/relationships" xmlns:mc="http://schemas.openxmlformats.org/markup-compatibility/2006" xmlns:mv="urn:schemas-microsoft-com:mac:vml" xmlns:p="http://schemas.openxmlformats.org/presentationml/2006/main" mc:Ignorable="mv" mc:PreserveAttributes="mv:*">
+  <p:cSld>
+    <p:spTree>
+      <p:nvGrpSpPr>
+        <p:cNvPr id="1" name=""/>
+        <p:cNvGrpSpPr/>
+        <p:nvPr/>
+      </p:nvGrpSpPr>
+      <p:grpSpPr>
+        <a:xfrm>
+          <a:off x="0" y="0"/>
+          <a:ext cx="0" cy="0"/>
+          <a:chOff x="0" y="0"/>
+          <a:chExt cx="0" cy="0"/>
+        </a:xfrm>
+      </p:grpSpPr>
+      <p:sp>
+        <p:nvSpPr>
           <p:cNvPr id="23554" name="Title 1"/>
           <p:cNvSpPr>
             <a:spLocks noGrp="1"/>
@@ -4909,7 +5249,7 @@
             <a:fld id="{450779B1-243C-204F-A46C-531D5C821050}" type="slidenum">
               <a:rPr lang="en-US"/>
               <a:pPr/>
-              <a:t>10</a:t>
+              <a:t>11</a:t>
             </a:fld>
             <a:endParaRPr lang="en-US"/>
           </a:p>
@@ -4934,7 +5274,7 @@
         </p:blipFill>
         <p:spPr bwMode="auto">
           <a:xfrm>
-            <a:off x="3124200" y="3352800"/>
+            <a:off x="2870200" y="3352800"/>
             <a:ext cx="4064000" cy="3048000"/>
           </a:xfrm>
           <a:prstGeom prst="rect">
@@ -5107,7 +5447,7 @@
 </p:sld>
 </file>
 
-<file path=ppt/slides/slide11.xml><?xml version="1.0" encoding="utf-8"?>
+<file path=ppt/slides/slide12.xml><?xml version="1.0" encoding="utf-8"?>
 <p:sld xmlns:a="http://schemas.openxmlformats.org/drawingml/2006/main" xmlns:r="http://schemas.openxmlformats.org/officeDocument/2006/relationships" xmlns:mc="http://schemas.openxmlformats.org/markup-compatibility/2006" xmlns:mv="urn:schemas-microsoft-com:mac:vml" xmlns:p="http://schemas.openxmlformats.org/presentationml/2006/main" mc:Ignorable="mv" mc:PreserveAttributes="mv:*">
   <p:cSld>
     <p:spTree>
@@ -5290,7 +5630,7 @@
             <a:fld id="{9C0C6800-C07A-B840-9F81-62616F777194}" type="slidenum">
               <a:rPr lang="en-US"/>
               <a:pPr/>
-              <a:t>11</a:t>
+              <a:t>12</a:t>
             </a:fld>
             <a:endParaRPr lang="en-US"/>
           </a:p>
@@ -5336,7 +5676,7 @@
 </p:sld>
 </file>
 
-<file path=ppt/slides/slide12.xml><?xml version="1.0" encoding="utf-8"?>
+<file path=ppt/slides/slide13.xml><?xml version="1.0" encoding="utf-8"?>
 <p:sld xmlns:a="http://schemas.openxmlformats.org/drawingml/2006/main" xmlns:r="http://schemas.openxmlformats.org/officeDocument/2006/relationships" xmlns:mc="http://schemas.openxmlformats.org/markup-compatibility/2006" xmlns:mv="urn:schemas-microsoft-com:mac:vml" xmlns:p="http://schemas.openxmlformats.org/presentationml/2006/main" mc:Ignorable="mv" mc:PreserveAttributes="mv:*">
   <p:cSld>
     <p:spTree>
@@ -5508,7 +5848,7 @@
             <a:fld id="{2E8154CE-D821-A54C-9083-D8860CAA5A2D}" type="slidenum">
               <a:rPr lang="en-US"/>
               <a:pPr/>
-              <a:t>12</a:t>
+              <a:t>13</a:t>
             </a:fld>
             <a:endParaRPr lang="en-US"/>
           </a:p>
@@ -5711,199 +6051,6 @@
               <a:rPr lang="en-US" sz="1900" dirty="0"/>
               <a:t>SUPG:</a:t>
             </a:r>
-          </a:p>
-        </p:txBody>
-      </p:sp>
-    </p:spTree>
-  </p:cSld>
-  <p:clrMapOvr>
-    <a:masterClrMapping/>
-  </p:clrMapOvr>
-  <p:timing>
-    <p:tnLst>
-      <p:par>
-        <p:cTn id="1" dur="indefinite" restart="never" nodeType="tmRoot"/>
-      </p:par>
-    </p:tnLst>
-  </p:timing>
-</p:sld>
-</file>
-
-<file path=ppt/slides/slide13.xml><?xml version="1.0" encoding="utf-8"?>
-<p:sld xmlns:a="http://schemas.openxmlformats.org/drawingml/2006/main" xmlns:r="http://schemas.openxmlformats.org/officeDocument/2006/relationships" xmlns:mc="http://schemas.openxmlformats.org/markup-compatibility/2006" xmlns:mv="urn:schemas-microsoft-com:mac:vml" xmlns:p="http://schemas.openxmlformats.org/presentationml/2006/main" mc:Ignorable="mv" mc:PreserveAttributes="mv:*">
-  <p:cSld>
-    <p:spTree>
-      <p:nvGrpSpPr>
-        <p:cNvPr id="1" name=""/>
-        <p:cNvGrpSpPr/>
-        <p:nvPr/>
-      </p:nvGrpSpPr>
-      <p:grpSpPr>
-        <a:xfrm>
-          <a:off x="0" y="0"/>
-          <a:ext cx="0" cy="0"/>
-          <a:chOff x="0" y="0"/>
-          <a:chExt cx="0" cy="0"/>
-        </a:xfrm>
-      </p:grpSpPr>
-      <p:sp>
-        <p:nvSpPr>
-          <p:cNvPr id="26626" name="Title 1"/>
-          <p:cNvSpPr>
-            <a:spLocks noGrp="1"/>
-          </p:cNvSpPr>
-          <p:nvPr>
-            <p:ph type="title"/>
-          </p:nvPr>
-        </p:nvSpPr>
-        <p:spPr/>
-        <p:txBody>
-          <a:bodyPr>
-            <a:normAutofit fontScale="90000"/>
-          </a:bodyPr>
-          <a:lstStyle/>
-          <a:p>
-            <a:r>
-              <a:rPr lang="en-US">
-                <a:ea typeface="ＭＳ Ｐゴシック" pitchFamily="-108" charset="-128"/>
-              </a:rPr>
-              <a:t>2D Wave Advection Test Conclusions</a:t>
-            </a:r>
-          </a:p>
-        </p:txBody>
-      </p:sp>
-      <p:sp>
-        <p:nvSpPr>
-          <p:cNvPr id="26627" name="Content Placeholder 2"/>
-          <p:cNvSpPr>
-            <a:spLocks noGrp="1"/>
-          </p:cNvSpPr>
-          <p:nvPr>
-            <p:ph idx="1"/>
-          </p:nvPr>
-        </p:nvSpPr>
-        <p:spPr/>
-        <p:txBody>
-          <a:bodyPr>
-            <a:normAutofit fontScale="77500" lnSpcReduction="20000"/>
-          </a:bodyPr>
-          <a:lstStyle/>
-          <a:p>
-            <a:r>
-              <a:rPr lang="en-US" b="0">
-                <a:ea typeface="ＭＳ Ｐゴシック" pitchFamily="-108" charset="-128"/>
-              </a:rPr>
-              <a:t>Lax-Wendroff with slope limiters</a:t>
-            </a:r>
-          </a:p>
-          <a:p>
-            <a:pPr lvl="1"/>
-            <a:r>
-              <a:rPr lang="en-US"/>
-              <a:t>Effective for sharp discontinuities</a:t>
-            </a:r>
-          </a:p>
-          <a:p>
-            <a:pPr lvl="1"/>
-            <a:r>
-              <a:rPr lang="en-US"/>
-              <a:t>Overly dissipative for thin waves (cuts off the top of the triangular/gaussian waves)</a:t>
-            </a:r>
-          </a:p>
-          <a:p>
-            <a:pPr lvl="1"/>
-            <a:r>
-              <a:rPr lang="en-US"/>
-              <a:t>more dissipative than other methods</a:t>
-            </a:r>
-          </a:p>
-          <a:p>
-            <a:r>
-              <a:rPr lang="en-US" b="0">
-                <a:ea typeface="ＭＳ Ｐゴシック" pitchFamily="-108" charset="-128"/>
-              </a:rPr>
-              <a:t>MUSCL with ACM</a:t>
-            </a:r>
-          </a:p>
-          <a:p>
-            <a:pPr lvl="1"/>
-            <a:r>
-              <a:rPr lang="en-US"/>
-              <a:t>most effective for problems with discontinuities</a:t>
-            </a:r>
-          </a:p>
-          <a:p>
-            <a:pPr lvl="1"/>
-            <a:r>
-              <a:rPr lang="en-US"/>
-              <a:t>Unnaturally sharpens the solution</a:t>
-            </a:r>
-          </a:p>
-          <a:p>
-            <a:r>
-              <a:rPr lang="en-US" b="0">
-                <a:ea typeface="ＭＳ Ｐゴシック" pitchFamily="-108" charset="-128"/>
-              </a:rPr>
-              <a:t>SUPG</a:t>
-            </a:r>
-          </a:p>
-          <a:p>
-            <a:pPr lvl="1"/>
-            <a:r>
-              <a:rPr lang="en-US"/>
-              <a:t>Balances well between diffusion and discontinuity sharpness </a:t>
-            </a:r>
-          </a:p>
-          <a:p>
-            <a:pPr lvl="1"/>
-            <a:r>
-              <a:rPr lang="en-US"/>
-              <a:t>Doesn’t introduce unnatural sharpening</a:t>
-            </a:r>
-          </a:p>
-          <a:p>
-            <a:pPr lvl="1"/>
-            <a:r>
-              <a:rPr lang="en-US"/>
-              <a:t>Requires matrix operations</a:t>
-            </a:r>
-          </a:p>
-          <a:p>
-            <a:pPr lvl="1"/>
-            <a:r>
-              <a:rPr lang="en-US"/>
-              <a:t>Non-conservative</a:t>
-            </a:r>
-          </a:p>
-        </p:txBody>
-      </p:sp>
-      <p:sp>
-        <p:nvSpPr>
-          <p:cNvPr id="26628" name="Slide Number Placeholder 3"/>
-          <p:cNvSpPr>
-            <a:spLocks noGrp="1"/>
-          </p:cNvSpPr>
-          <p:nvPr>
-            <p:ph type="sldNum" sz="quarter" idx="12"/>
-          </p:nvPr>
-        </p:nvSpPr>
-        <p:spPr>
-          <a:noFill/>
-        </p:spPr>
-        <p:txBody>
-          <a:bodyPr/>
-          <a:lstStyle/>
-          <a:p>
-            <a:r>
-              <a:rPr lang="en-US"/>
-              <a:t>Slide </a:t>
-            </a:r>
-            <a:fld id="{E0B04660-0E7D-5547-AF9D-4047ABAD6874}" type="slidenum">
-              <a:rPr lang="en-US"/>
-              <a:pPr/>
-              <a:t>13</a:t>
-            </a:fld>
-            <a:endParaRPr lang="en-US"/>
           </a:p>
         </p:txBody>
       </p:sp>
@@ -5941,7 +6088,7 @@
       </p:grpSpPr>
       <p:sp>
         <p:nvSpPr>
-          <p:cNvPr id="27650" name="Title 1"/>
+          <p:cNvPr id="26626" name="Title 1"/>
           <p:cNvSpPr>
             <a:spLocks noGrp="1"/>
           </p:cNvSpPr>
@@ -5960,14 +6107,14 @@
               <a:rPr lang="en-US">
                 <a:ea typeface="ＭＳ Ｐゴシック" pitchFamily="-108" charset="-128"/>
               </a:rPr>
-              <a:t>Derivation of Lax-Wendroff for advection equation</a:t>
-            </a:r>
-          </a:p>
-        </p:txBody>
-      </p:sp>
-      <p:sp>
-        <p:nvSpPr>
-          <p:cNvPr id="27651" name="Content Placeholder 2"/>
+              <a:t>2D Wave Advection Test Conclusions</a:t>
+            </a:r>
+          </a:p>
+        </p:txBody>
+      </p:sp>
+      <p:sp>
+        <p:nvSpPr>
+          <p:cNvPr id="26627" name="Content Placeholder 2"/>
           <p:cNvSpPr>
             <a:spLocks noGrp="1"/>
           </p:cNvSpPr>
@@ -5978,93 +6125,101 @@
         <p:spPr/>
         <p:txBody>
           <a:bodyPr>
-            <a:normAutofit fontScale="92500" lnSpcReduction="10000"/>
+            <a:normAutofit fontScale="77500" lnSpcReduction="20000"/>
           </a:bodyPr>
           <a:lstStyle/>
           <a:p>
             <a:r>
-              <a:rPr lang="en-US">
+              <a:rPr lang="en-US" b="0">
                 <a:ea typeface="ＭＳ Ｐゴシック" pitchFamily="-108" charset="-128"/>
               </a:rPr>
-              <a:t>Advection Equation:</a:t>
-            </a:r>
-          </a:p>
-          <a:p>
-            <a:endParaRPr lang="en-US">
-              <a:ea typeface="ＭＳ Ｐゴシック" pitchFamily="-108" charset="-128"/>
-            </a:endParaRPr>
-          </a:p>
-          <a:p>
-            <a:r>
-              <a:rPr lang="en-US">
+              <a:t>Lax-Wendroff with slope limiters</a:t>
+            </a:r>
+          </a:p>
+          <a:p>
+            <a:pPr lvl="1"/>
+            <a:r>
+              <a:rPr lang="en-US"/>
+              <a:t>Effective for sharp discontinuities</a:t>
+            </a:r>
+          </a:p>
+          <a:p>
+            <a:pPr lvl="1"/>
+            <a:r>
+              <a:rPr lang="en-US"/>
+              <a:t>Overly dissipative for thin waves (cuts off the top of the triangular/gaussian waves)</a:t>
+            </a:r>
+          </a:p>
+          <a:p>
+            <a:pPr lvl="1"/>
+            <a:r>
+              <a:rPr lang="en-US"/>
+              <a:t>more dissipative than other methods</a:t>
+            </a:r>
+          </a:p>
+          <a:p>
+            <a:r>
+              <a:rPr lang="en-US" b="0">
                 <a:ea typeface="ＭＳ Ｐゴシック" pitchFamily="-108" charset="-128"/>
               </a:rPr>
-              <a:t>Note that:</a:t>
-            </a:r>
-          </a:p>
-          <a:p>
-            <a:endParaRPr lang="en-US">
-              <a:ea typeface="ＭＳ Ｐゴシック" pitchFamily="-108" charset="-128"/>
-            </a:endParaRPr>
-          </a:p>
-          <a:p>
-            <a:r>
-              <a:rPr lang="en-US">
+              <a:t>MUSCL with ACM</a:t>
+            </a:r>
+          </a:p>
+          <a:p>
+            <a:pPr lvl="1"/>
+            <a:r>
+              <a:rPr lang="en-US"/>
+              <a:t>most effective for problems with discontinuities</a:t>
+            </a:r>
+          </a:p>
+          <a:p>
+            <a:pPr lvl="1"/>
+            <a:r>
+              <a:rPr lang="en-US"/>
+              <a:t>Unnaturally sharpens the solution</a:t>
+            </a:r>
+          </a:p>
+          <a:p>
+            <a:r>
+              <a:rPr lang="en-US" b="0">
                 <a:ea typeface="ＭＳ Ｐゴシック" pitchFamily="-108" charset="-128"/>
               </a:rPr>
-              <a:t>Replace the first two time derivatives with spatial derivatives</a:t>
-            </a:r>
-          </a:p>
-          <a:p>
-            <a:endParaRPr lang="en-US">
-              <a:ea typeface="ＭＳ Ｐゴシック" pitchFamily="-108" charset="-128"/>
-            </a:endParaRPr>
-          </a:p>
-          <a:p>
-            <a:endParaRPr lang="en-US">
-              <a:ea typeface="ＭＳ Ｐゴシック" pitchFamily="-108" charset="-128"/>
-            </a:endParaRPr>
-          </a:p>
-          <a:p>
-            <a:r>
-              <a:rPr lang="en-US">
-                <a:ea typeface="ＭＳ Ｐゴシック" pitchFamily="-108" charset="-128"/>
-              </a:rPr>
-              <a:t>Remove 3</a:t>
-            </a:r>
-            <a:r>
-              <a:rPr lang="en-US" baseline="30000">
-                <a:ea typeface="ＭＳ Ｐゴシック" pitchFamily="-108" charset="-128"/>
-              </a:rPr>
-              <a:t>rd</a:t>
-            </a:r>
-            <a:r>
-              <a:rPr lang="en-US">
-                <a:ea typeface="ＭＳ Ｐゴシック" pitchFamily="-108" charset="-128"/>
-              </a:rPr>
-              <a:t> order terms and above, and use central difference formulas:</a:t>
-            </a:r>
-          </a:p>
-          <a:p>
-            <a:endParaRPr lang="en-US">
-              <a:ea typeface="ＭＳ Ｐゴシック" pitchFamily="-108" charset="-128"/>
-            </a:endParaRPr>
-          </a:p>
-          <a:p>
-            <a:endParaRPr lang="en-US">
-              <a:ea typeface="ＭＳ Ｐゴシック" pitchFamily="-108" charset="-128"/>
-            </a:endParaRPr>
-          </a:p>
-          <a:p>
-            <a:endParaRPr lang="en-US">
-              <a:ea typeface="ＭＳ Ｐゴシック" pitchFamily="-108" charset="-128"/>
-            </a:endParaRPr>
-          </a:p>
-        </p:txBody>
-      </p:sp>
-      <p:sp>
-        <p:nvSpPr>
-          <p:cNvPr id="27652" name="Slide Number Placeholder 3"/>
+              <a:t>SUPG</a:t>
+            </a:r>
+          </a:p>
+          <a:p>
+            <a:pPr lvl="1"/>
+            <a:r>
+              <a:rPr lang="en-US"/>
+              <a:t>Balances well between diffusion and discontinuity sharpness </a:t>
+            </a:r>
+          </a:p>
+          <a:p>
+            <a:pPr lvl="1"/>
+            <a:r>
+              <a:rPr lang="en-US"/>
+              <a:t>Doesn’t introduce unnatural sharpening</a:t>
+            </a:r>
+          </a:p>
+          <a:p>
+            <a:pPr lvl="1"/>
+            <a:r>
+              <a:rPr lang="en-US"/>
+              <a:t>Requires matrix operations</a:t>
+            </a:r>
+          </a:p>
+          <a:p>
+            <a:pPr lvl="1"/>
+            <a:r>
+              <a:rPr lang="en-US"/>
+              <a:t>Non-conservative</a:t>
+            </a:r>
+          </a:p>
+        </p:txBody>
+      </p:sp>
+      <p:sp>
+        <p:nvSpPr>
+          <p:cNvPr id="26628" name="Slide Number Placeholder 3"/>
           <p:cNvSpPr>
             <a:spLocks noGrp="1"/>
           </p:cNvSpPr>
@@ -6083,7 +6238,7 @@
               <a:rPr lang="en-US"/>
               <a:t>Slide </a:t>
             </a:r>
-            <a:fld id="{7F840725-C1B0-BC4F-91C5-548B59C832A8}" type="slidenum">
+            <a:fld id="{E0B04660-0E7D-5547-AF9D-4047ABAD6874}" type="slidenum">
               <a:rPr lang="en-US"/>
               <a:pPr/>
               <a:t>14</a:t>
@@ -6092,134 +6247,6 @@
           </a:p>
         </p:txBody>
       </p:sp>
-      <p:pic>
-        <p:nvPicPr>
-          <p:cNvPr id="27653" name="Picture 7"/>
-          <p:cNvPicPr>
-            <a:picLocks noChangeAspect="1" noChangeArrowheads="1"/>
-          </p:cNvPicPr>
-          <p:nvPr/>
-        </p:nvPicPr>
-        <p:blipFill>
-          <a:blip r:embed="rId2"/>
-          <a:srcRect/>
-          <a:stretch>
-            <a:fillRect/>
-          </a:stretch>
-        </p:blipFill>
-        <p:spPr bwMode="auto">
-          <a:xfrm>
-            <a:off x="3124200" y="2514600"/>
-            <a:ext cx="2686050" cy="523875"/>
-          </a:xfrm>
-          <a:prstGeom prst="rect">
-            <a:avLst/>
-          </a:prstGeom>
-          <a:noFill/>
-          <a:ln w="9525">
-            <a:noFill/>
-            <a:miter lim="800000"/>
-            <a:headEnd/>
-            <a:tailEnd/>
-          </a:ln>
-        </p:spPr>
-      </p:pic>
-      <p:pic>
-        <p:nvPicPr>
-          <p:cNvPr id="27654" name="Picture 10"/>
-          <p:cNvPicPr>
-            <a:picLocks noChangeAspect="1" noChangeArrowheads="1"/>
-          </p:cNvPicPr>
-          <p:nvPr/>
-        </p:nvPicPr>
-        <p:blipFill>
-          <a:blip r:embed="rId3"/>
-          <a:srcRect/>
-          <a:stretch>
-            <a:fillRect/>
-          </a:stretch>
-        </p:blipFill>
-        <p:spPr bwMode="auto">
-          <a:xfrm>
-            <a:off x="838200" y="4876800"/>
-            <a:ext cx="7696200" cy="785813"/>
-          </a:xfrm>
-          <a:prstGeom prst="rect">
-            <a:avLst/>
-          </a:prstGeom>
-          <a:noFill/>
-          <a:ln w="9525">
-            <a:noFill/>
-            <a:miter lim="800000"/>
-            <a:headEnd/>
-            <a:tailEnd/>
-          </a:ln>
-        </p:spPr>
-      </p:pic>
-      <p:pic>
-        <p:nvPicPr>
-          <p:cNvPr id="27655" name="Picture 11"/>
-          <p:cNvPicPr>
-            <a:picLocks noChangeAspect="1" noChangeArrowheads="1"/>
-          </p:cNvPicPr>
-          <p:nvPr/>
-        </p:nvPicPr>
-        <p:blipFill>
-          <a:blip r:embed="rId4"/>
-          <a:srcRect/>
-          <a:stretch>
-            <a:fillRect/>
-          </a:stretch>
-        </p:blipFill>
-        <p:spPr bwMode="auto">
-          <a:xfrm>
-            <a:off x="500063" y="3429000"/>
-            <a:ext cx="8143875" cy="714375"/>
-          </a:xfrm>
-          <a:prstGeom prst="rect">
-            <a:avLst/>
-          </a:prstGeom>
-          <a:noFill/>
-          <a:ln w="9525">
-            <a:noFill/>
-            <a:miter lim="800000"/>
-            <a:headEnd/>
-            <a:tailEnd/>
-          </a:ln>
-        </p:spPr>
-      </p:pic>
-      <p:pic>
-        <p:nvPicPr>
-          <p:cNvPr id="27656" name="Picture 12"/>
-          <p:cNvPicPr>
-            <a:picLocks noChangeAspect="1" noChangeArrowheads="1"/>
-          </p:cNvPicPr>
-          <p:nvPr/>
-        </p:nvPicPr>
-        <p:blipFill>
-          <a:blip r:embed="rId5"/>
-          <a:srcRect/>
-          <a:stretch>
-            <a:fillRect/>
-          </a:stretch>
-        </p:blipFill>
-        <p:spPr bwMode="auto">
-          <a:xfrm>
-            <a:off x="3581400" y="1828800"/>
-            <a:ext cx="1876425" cy="381000"/>
-          </a:xfrm>
-          <a:prstGeom prst="rect">
-            <a:avLst/>
-          </a:prstGeom>
-          <a:noFill/>
-          <a:ln w="9525">
-            <a:noFill/>
-            <a:miter lim="800000"/>
-            <a:headEnd/>
-            <a:tailEnd/>
-          </a:ln>
-        </p:spPr>
-      </p:pic>
     </p:spTree>
   </p:cSld>
   <p:clrMapOvr>
@@ -6254,7 +6281,7 @@
       </p:grpSpPr>
       <p:sp>
         <p:nvSpPr>
-          <p:cNvPr id="28674" name="Title 1"/>
+          <p:cNvPr id="27650" name="Title 1"/>
           <p:cNvSpPr>
             <a:spLocks noGrp="1"/>
           </p:cNvSpPr>
@@ -6264,21 +6291,23 @@
         </p:nvSpPr>
         <p:spPr/>
         <p:txBody>
-          <a:bodyPr/>
+          <a:bodyPr>
+            <a:normAutofit fontScale="90000"/>
+          </a:bodyPr>
           <a:lstStyle/>
           <a:p>
             <a:r>
               <a:rPr lang="en-US">
                 <a:ea typeface="ＭＳ Ｐゴシック" pitchFamily="-108" charset="-128"/>
               </a:rPr>
-              <a:t>MPDATA - Derivation</a:t>
-            </a:r>
-          </a:p>
-        </p:txBody>
-      </p:sp>
-      <p:sp>
-        <p:nvSpPr>
-          <p:cNvPr id="28675" name="Content Placeholder 2"/>
+              <a:t>Derivation of Lax-Wendroff for advection equation</a:t>
+            </a:r>
+          </a:p>
+        </p:txBody>
+      </p:sp>
+      <p:sp>
+        <p:nvSpPr>
+          <p:cNvPr id="27651" name="Content Placeholder 2"/>
           <p:cNvSpPr>
             <a:spLocks noGrp="1"/>
           </p:cNvSpPr>
@@ -6288,42 +6317,94 @@
         </p:nvSpPr>
         <p:spPr/>
         <p:txBody>
-          <a:bodyPr/>
+          <a:bodyPr>
+            <a:normAutofit fontScale="92500" lnSpcReduction="10000"/>
+          </a:bodyPr>
           <a:lstStyle/>
           <a:p>
             <a:r>
               <a:rPr lang="en-US">
                 <a:ea typeface="ＭＳ Ｐゴシック" pitchFamily="-108" charset="-128"/>
               </a:rPr>
-              <a:t>MPDATA</a:t>
-            </a:r>
-          </a:p>
-          <a:p>
-            <a:pPr lvl="1"/>
-            <a:r>
-              <a:rPr lang="en-US"/>
-              <a:t>One-sided bias donor cell approach</a:t>
-            </a:r>
-          </a:p>
-          <a:p>
-            <a:pPr lvl="1"/>
-            <a:r>
-              <a:rPr lang="en-US"/>
-              <a:t>Using a modified equation analysis, find an extra diffusive term</a:t>
-            </a:r>
-          </a:p>
-          <a:p>
-            <a:pPr lvl="1"/>
-            <a:r>
-              <a:rPr lang="en-US"/>
-              <a:t>Subtract out diffusive error using an anti-diffusive velocity</a:t>
-            </a:r>
-          </a:p>
-        </p:txBody>
-      </p:sp>
-      <p:sp>
-        <p:nvSpPr>
-          <p:cNvPr id="28676" name="Slide Number Placeholder 3"/>
+              <a:t>Advection Equation:</a:t>
+            </a:r>
+          </a:p>
+          <a:p>
+            <a:endParaRPr lang="en-US">
+              <a:ea typeface="ＭＳ Ｐゴシック" pitchFamily="-108" charset="-128"/>
+            </a:endParaRPr>
+          </a:p>
+          <a:p>
+            <a:r>
+              <a:rPr lang="en-US">
+                <a:ea typeface="ＭＳ Ｐゴシック" pitchFamily="-108" charset="-128"/>
+              </a:rPr>
+              <a:t>Note that:</a:t>
+            </a:r>
+          </a:p>
+          <a:p>
+            <a:endParaRPr lang="en-US">
+              <a:ea typeface="ＭＳ Ｐゴシック" pitchFamily="-108" charset="-128"/>
+            </a:endParaRPr>
+          </a:p>
+          <a:p>
+            <a:r>
+              <a:rPr lang="en-US">
+                <a:ea typeface="ＭＳ Ｐゴシック" pitchFamily="-108" charset="-128"/>
+              </a:rPr>
+              <a:t>Replace the first two time derivatives with spatial derivatives</a:t>
+            </a:r>
+          </a:p>
+          <a:p>
+            <a:endParaRPr lang="en-US">
+              <a:ea typeface="ＭＳ Ｐゴシック" pitchFamily="-108" charset="-128"/>
+            </a:endParaRPr>
+          </a:p>
+          <a:p>
+            <a:endParaRPr lang="en-US">
+              <a:ea typeface="ＭＳ Ｐゴシック" pitchFamily="-108" charset="-128"/>
+            </a:endParaRPr>
+          </a:p>
+          <a:p>
+            <a:r>
+              <a:rPr lang="en-US">
+                <a:ea typeface="ＭＳ Ｐゴシック" pitchFamily="-108" charset="-128"/>
+              </a:rPr>
+              <a:t>Remove 3</a:t>
+            </a:r>
+            <a:r>
+              <a:rPr lang="en-US" baseline="30000">
+                <a:ea typeface="ＭＳ Ｐゴシック" pitchFamily="-108" charset="-128"/>
+              </a:rPr>
+              <a:t>rd</a:t>
+            </a:r>
+            <a:r>
+              <a:rPr lang="en-US">
+                <a:ea typeface="ＭＳ Ｐゴシック" pitchFamily="-108" charset="-128"/>
+              </a:rPr>
+              <a:t> order terms and above, and use central difference formulas:</a:t>
+            </a:r>
+          </a:p>
+          <a:p>
+            <a:endParaRPr lang="en-US">
+              <a:ea typeface="ＭＳ Ｐゴシック" pitchFamily="-108" charset="-128"/>
+            </a:endParaRPr>
+          </a:p>
+          <a:p>
+            <a:endParaRPr lang="en-US">
+              <a:ea typeface="ＭＳ Ｐゴシック" pitchFamily="-108" charset="-128"/>
+            </a:endParaRPr>
+          </a:p>
+          <a:p>
+            <a:endParaRPr lang="en-US">
+              <a:ea typeface="ＭＳ Ｐゴシック" pitchFamily="-108" charset="-128"/>
+            </a:endParaRPr>
+          </a:p>
+        </p:txBody>
+      </p:sp>
+      <p:sp>
+        <p:nvSpPr>
+          <p:cNvPr id="27652" name="Slide Number Placeholder 3"/>
           <p:cNvSpPr>
             <a:spLocks noGrp="1"/>
           </p:cNvSpPr>
@@ -6342,7 +6423,7 @@
               <a:rPr lang="en-US"/>
               <a:t>Slide </a:t>
             </a:r>
-            <a:fld id="{93743CEC-D1E8-B549-A67D-414696CA6C77}" type="slidenum">
+            <a:fld id="{7F840725-C1B0-BC4F-91C5-548B59C832A8}" type="slidenum">
               <a:rPr lang="en-US"/>
               <a:pPr/>
               <a:t>15</a:t>
@@ -6351,6 +6432,134 @@
           </a:p>
         </p:txBody>
       </p:sp>
+      <p:pic>
+        <p:nvPicPr>
+          <p:cNvPr id="27653" name="Picture 7"/>
+          <p:cNvPicPr>
+            <a:picLocks noChangeAspect="1" noChangeArrowheads="1"/>
+          </p:cNvPicPr>
+          <p:nvPr/>
+        </p:nvPicPr>
+        <p:blipFill>
+          <a:blip r:embed="rId2"/>
+          <a:srcRect/>
+          <a:stretch>
+            <a:fillRect/>
+          </a:stretch>
+        </p:blipFill>
+        <p:spPr bwMode="auto">
+          <a:xfrm>
+            <a:off x="3124200" y="2514600"/>
+            <a:ext cx="2686050" cy="523875"/>
+          </a:xfrm>
+          <a:prstGeom prst="rect">
+            <a:avLst/>
+          </a:prstGeom>
+          <a:noFill/>
+          <a:ln w="9525">
+            <a:noFill/>
+            <a:miter lim="800000"/>
+            <a:headEnd/>
+            <a:tailEnd/>
+          </a:ln>
+        </p:spPr>
+      </p:pic>
+      <p:pic>
+        <p:nvPicPr>
+          <p:cNvPr id="27654" name="Picture 10"/>
+          <p:cNvPicPr>
+            <a:picLocks noChangeAspect="1" noChangeArrowheads="1"/>
+          </p:cNvPicPr>
+          <p:nvPr/>
+        </p:nvPicPr>
+        <p:blipFill>
+          <a:blip r:embed="rId3"/>
+          <a:srcRect/>
+          <a:stretch>
+            <a:fillRect/>
+          </a:stretch>
+        </p:blipFill>
+        <p:spPr bwMode="auto">
+          <a:xfrm>
+            <a:off x="838200" y="4876800"/>
+            <a:ext cx="7696200" cy="785813"/>
+          </a:xfrm>
+          <a:prstGeom prst="rect">
+            <a:avLst/>
+          </a:prstGeom>
+          <a:noFill/>
+          <a:ln w="9525">
+            <a:noFill/>
+            <a:miter lim="800000"/>
+            <a:headEnd/>
+            <a:tailEnd/>
+          </a:ln>
+        </p:spPr>
+      </p:pic>
+      <p:pic>
+        <p:nvPicPr>
+          <p:cNvPr id="27655" name="Picture 11"/>
+          <p:cNvPicPr>
+            <a:picLocks noChangeAspect="1" noChangeArrowheads="1"/>
+          </p:cNvPicPr>
+          <p:nvPr/>
+        </p:nvPicPr>
+        <p:blipFill>
+          <a:blip r:embed="rId4"/>
+          <a:srcRect/>
+          <a:stretch>
+            <a:fillRect/>
+          </a:stretch>
+        </p:blipFill>
+        <p:spPr bwMode="auto">
+          <a:xfrm>
+            <a:off x="500063" y="3429000"/>
+            <a:ext cx="8143875" cy="714375"/>
+          </a:xfrm>
+          <a:prstGeom prst="rect">
+            <a:avLst/>
+          </a:prstGeom>
+          <a:noFill/>
+          <a:ln w="9525">
+            <a:noFill/>
+            <a:miter lim="800000"/>
+            <a:headEnd/>
+            <a:tailEnd/>
+          </a:ln>
+        </p:spPr>
+      </p:pic>
+      <p:pic>
+        <p:nvPicPr>
+          <p:cNvPr id="27656" name="Picture 12"/>
+          <p:cNvPicPr>
+            <a:picLocks noChangeAspect="1" noChangeArrowheads="1"/>
+          </p:cNvPicPr>
+          <p:nvPr/>
+        </p:nvPicPr>
+        <p:blipFill>
+          <a:blip r:embed="rId5"/>
+          <a:srcRect/>
+          <a:stretch>
+            <a:fillRect/>
+          </a:stretch>
+        </p:blipFill>
+        <p:spPr bwMode="auto">
+          <a:xfrm>
+            <a:off x="3581400" y="1828800"/>
+            <a:ext cx="1876425" cy="381000"/>
+          </a:xfrm>
+          <a:prstGeom prst="rect">
+            <a:avLst/>
+          </a:prstGeom>
+          <a:noFill/>
+          <a:ln w="9525">
+            <a:noFill/>
+            <a:miter lim="800000"/>
+            <a:headEnd/>
+            <a:tailEnd/>
+          </a:ln>
+        </p:spPr>
+      </p:pic>
     </p:spTree>
   </p:cSld>
   <p:clrMapOvr>
@@ -6385,7 +6594,7 @@
       </p:grpSpPr>
       <p:sp>
         <p:nvSpPr>
-          <p:cNvPr id="29698" name="Title 1"/>
+          <p:cNvPr id="28674" name="Title 1"/>
           <p:cNvSpPr>
             <a:spLocks noGrp="1"/>
           </p:cNvSpPr>
@@ -6402,14 +6611,14 @@
               <a:rPr lang="en-US">
                 <a:ea typeface="ＭＳ Ｐゴシック" pitchFamily="-108" charset="-128"/>
               </a:rPr>
-              <a:t>MPDATA - Conclusions</a:t>
-            </a:r>
-          </a:p>
-        </p:txBody>
-      </p:sp>
-      <p:sp>
-        <p:nvSpPr>
-          <p:cNvPr id="29699" name="Content Placeholder 2"/>
+              <a:t>MPDATA - Derivation</a:t>
+            </a:r>
+          </a:p>
+        </p:txBody>
+      </p:sp>
+      <p:sp>
+        <p:nvSpPr>
+          <p:cNvPr id="28675" name="Content Placeholder 2"/>
           <p:cNvSpPr>
             <a:spLocks noGrp="1"/>
           </p:cNvSpPr>
@@ -6423,7 +6632,7 @@
           <a:lstStyle/>
           <a:p>
             <a:r>
-              <a:rPr lang="en-US" b="0">
+              <a:rPr lang="en-US">
                 <a:ea typeface="ＭＳ Ｐゴシック" pitchFamily="-108" charset="-128"/>
               </a:rPr>
               <a:t>MPDATA</a:t>
@@ -6433,14 +6642,28 @@
             <a:pPr lvl="1"/>
             <a:r>
               <a:rPr lang="en-US"/>
-              <a:t>Options to control total variation (FCT) and </a:t>
-            </a:r>
-          </a:p>
-        </p:txBody>
-      </p:sp>
-      <p:sp>
-        <p:nvSpPr>
-          <p:cNvPr id="29700" name="Slide Number Placeholder 3"/>
+              <a:t>One-sided bias donor cell approach</a:t>
+            </a:r>
+          </a:p>
+          <a:p>
+            <a:pPr lvl="1"/>
+            <a:r>
+              <a:rPr lang="en-US"/>
+              <a:t>Using a modified equation analysis, find an extra diffusive term</a:t>
+            </a:r>
+          </a:p>
+          <a:p>
+            <a:pPr lvl="1"/>
+            <a:r>
+              <a:rPr lang="en-US"/>
+              <a:t>Subtract out diffusive error using an anti-diffusive velocity</a:t>
+            </a:r>
+          </a:p>
+        </p:txBody>
+      </p:sp>
+      <p:sp>
+        <p:nvSpPr>
+          <p:cNvPr id="28676" name="Slide Number Placeholder 3"/>
           <p:cNvSpPr>
             <a:spLocks noGrp="1"/>
           </p:cNvSpPr>
@@ -6459,7 +6682,7 @@
               <a:rPr lang="en-US"/>
               <a:t>Slide </a:t>
             </a:r>
-            <a:fld id="{C283E170-554A-B642-8E58-DE38E4115297}" type="slidenum">
+            <a:fld id="{93743CEC-D1E8-B549-A67D-414696CA6C77}" type="slidenum">
               <a:rPr lang="en-US"/>
               <a:pPr/>
               <a:t>16</a:t>
@@ -6502,7 +6725,7 @@
       </p:grpSpPr>
       <p:sp>
         <p:nvSpPr>
-          <p:cNvPr id="30722" name="Title 1"/>
+          <p:cNvPr id="29698" name="Title 1"/>
           <p:cNvSpPr>
             <a:spLocks noGrp="1"/>
           </p:cNvSpPr>
@@ -6519,14 +6742,14 @@
               <a:rPr lang="en-US">
                 <a:ea typeface="ＭＳ Ｐゴシック" pitchFamily="-108" charset="-128"/>
               </a:rPr>
-              <a:t>GPUs at a glance</a:t>
-            </a:r>
-          </a:p>
-        </p:txBody>
-      </p:sp>
-      <p:sp>
-        <p:nvSpPr>
-          <p:cNvPr id="30723" name="Content Placeholder 2"/>
+              <a:t>MPDATA - Conclusions</a:t>
+            </a:r>
+          </a:p>
+        </p:txBody>
+      </p:sp>
+      <p:sp>
+        <p:nvSpPr>
+          <p:cNvPr id="29699" name="Content Placeholder 2"/>
           <p:cNvSpPr>
             <a:spLocks noGrp="1"/>
           </p:cNvSpPr>
@@ -6536,79 +6759,28 @@
         </p:nvSpPr>
         <p:spPr/>
         <p:txBody>
-          <a:bodyPr>
-            <a:normAutofit fontScale="92500" lnSpcReduction="20000"/>
-          </a:bodyPr>
-          <a:lstStyle/>
-          <a:p>
-            <a:r>
-              <a:rPr lang="en-US">
+          <a:bodyPr/>
+          <a:lstStyle/>
+          <a:p>
+            <a:r>
+              <a:rPr lang="en-US" b="0">
                 <a:ea typeface="ＭＳ Ｐゴシック" pitchFamily="-108" charset="-128"/>
               </a:rPr>
-              <a:t>Different architecture from a CPU.</a:t>
+              <a:t>MPDATA</a:t>
             </a:r>
           </a:p>
           <a:p>
             <a:pPr lvl="1"/>
             <a:r>
               <a:rPr lang="en-US"/>
-              <a:t>Many low throughput processing units</a:t>
-            </a:r>
-          </a:p>
-          <a:p>
-            <a:pPr lvl="1"/>
-            <a:r>
-              <a:rPr lang="en-US"/>
-              <a:t>Cores all share memory</a:t>
-            </a:r>
-          </a:p>
-          <a:p>
-            <a:pPr lvl="1"/>
-            <a:r>
-              <a:rPr lang="en-US"/>
-              <a:t>Workgroups</a:t>
-            </a:r>
-          </a:p>
-          <a:p>
-            <a:r>
-              <a:rPr lang="en-US">
-                <a:ea typeface="ＭＳ Ｐゴシック" pitchFamily="-108" charset="-128"/>
-              </a:rPr>
-              <a:t>Higher FLOPS (floating points operations per second) per dollar than CPUs.</a:t>
-            </a:r>
-          </a:p>
-          <a:p>
-            <a:r>
-              <a:rPr lang="en-US">
-                <a:ea typeface="ＭＳ Ｐゴシック" pitchFamily="-108" charset="-128"/>
-              </a:rPr>
-              <a:t>Must use a language compiled for GPU</a:t>
-            </a:r>
-          </a:p>
-          <a:p>
-            <a:pPr lvl="1"/>
-            <a:r>
-              <a:rPr lang="en-US"/>
-              <a:t>OpenCL – Open programming language that can make use of multiple CPUs (on the same node) and a GPU. Can combine with MPI for multiple nodes.</a:t>
-            </a:r>
-          </a:p>
-          <a:p>
-            <a:pPr lvl="1"/>
-            <a:r>
-              <a:rPr lang="en-US"/>
-              <a:t>CUDA – Nvidia only.</a:t>
-            </a:r>
-          </a:p>
-          <a:p>
-            <a:endParaRPr lang="en-US">
-              <a:ea typeface="ＭＳ Ｐゴシック" pitchFamily="-108" charset="-128"/>
-            </a:endParaRPr>
-          </a:p>
-        </p:txBody>
-      </p:sp>
-      <p:sp>
-        <p:nvSpPr>
-          <p:cNvPr id="30724" name="Slide Number Placeholder 3"/>
+              <a:t>Options to control total variation (FCT) and </a:t>
+            </a:r>
+          </a:p>
+        </p:txBody>
+      </p:sp>
+      <p:sp>
+        <p:nvSpPr>
+          <p:cNvPr id="29700" name="Slide Number Placeholder 3"/>
           <p:cNvSpPr>
             <a:spLocks noGrp="1"/>
           </p:cNvSpPr>
@@ -6627,7 +6799,7 @@
               <a:rPr lang="en-US"/>
               <a:t>Slide </a:t>
             </a:r>
-            <a:fld id="{C0B27578-E324-3D4A-8A83-77F3CC1E892B}" type="slidenum">
+            <a:fld id="{C283E170-554A-B642-8E58-DE38E4115297}" type="slidenum">
               <a:rPr lang="en-US"/>
               <a:pPr/>
               <a:t>17</a:t>
@@ -6670,7 +6842,7 @@
       </p:grpSpPr>
       <p:sp>
         <p:nvSpPr>
-          <p:cNvPr id="31746" name="Title 1"/>
+          <p:cNvPr id="30722" name="Title 1"/>
           <p:cNvSpPr>
             <a:spLocks noGrp="1"/>
           </p:cNvSpPr>
@@ -6687,14 +6859,14 @@
               <a:rPr lang="en-US">
                 <a:ea typeface="ＭＳ Ｐゴシック" pitchFamily="-108" charset="-128"/>
               </a:rPr>
-              <a:t>GPU architecture</a:t>
-            </a:r>
-          </a:p>
-        </p:txBody>
-      </p:sp>
-      <p:sp>
-        <p:nvSpPr>
-          <p:cNvPr id="31747" name="Content Placeholder 2"/>
+              <a:t>GPUs at a glance</a:t>
+            </a:r>
+          </a:p>
+        </p:txBody>
+      </p:sp>
+      <p:sp>
+        <p:nvSpPr>
+          <p:cNvPr id="30723" name="Content Placeholder 2"/>
           <p:cNvSpPr>
             <a:spLocks noGrp="1"/>
           </p:cNvSpPr>
@@ -6705,7 +6877,7 @@
         <p:spPr/>
         <p:txBody>
           <a:bodyPr>
-            <a:normAutofit fontScale="70000" lnSpcReduction="20000"/>
+            <a:normAutofit fontScale="92500" lnSpcReduction="20000"/>
           </a:bodyPr>
           <a:lstStyle/>
           <a:p>
@@ -6713,14 +6885,28 @@
               <a:rPr lang="en-US">
                 <a:ea typeface="ＭＳ Ｐゴシック" pitchFamily="-108" charset="-128"/>
               </a:rPr>
-              <a:t>Global Memory</a:t>
+              <a:t>Different architecture from a CPU.</a:t>
             </a:r>
           </a:p>
           <a:p>
             <a:pPr lvl="1"/>
             <a:r>
               <a:rPr lang="en-US"/>
-              <a:t>Available to entire device</a:t>
+              <a:t>Many low throughput processing units</a:t>
+            </a:r>
+          </a:p>
+          <a:p>
+            <a:pPr lvl="1"/>
+            <a:r>
+              <a:rPr lang="en-US"/>
+              <a:t>Cores all share memory</a:t>
+            </a:r>
+          </a:p>
+          <a:p>
+            <a:pPr lvl="1"/>
+            <a:r>
+              <a:rPr lang="en-US"/>
+              <a:t>Workgroups</a:t>
             </a:r>
           </a:p>
           <a:p>
@@ -6728,21 +6914,7 @@
               <a:rPr lang="en-US">
                 <a:ea typeface="ＭＳ Ｐゴシック" pitchFamily="-108" charset="-128"/>
               </a:rPr>
-              <a:t>Local Memory</a:t>
-            </a:r>
-          </a:p>
-          <a:p>
-            <a:pPr lvl="1"/>
-            <a:r>
-              <a:rPr lang="en-US"/>
-              <a:t>Available to the work group only</a:t>
-            </a:r>
-          </a:p>
-          <a:p>
-            <a:pPr lvl="1"/>
-            <a:r>
-              <a:rPr lang="en-US"/>
-              <a:t>***I think this isn’t well defined in OpenCL and can spill over to Global without warning</a:t>
+              <a:t>Higher FLOPS (floating points operations per second) per dollar than CPUs.</a:t>
             </a:r>
           </a:p>
           <a:p>
@@ -6750,65 +6922,33 @@
               <a:rPr lang="en-US">
                 <a:ea typeface="ＭＳ Ｐゴシック" pitchFamily="-108" charset="-128"/>
               </a:rPr>
-              <a:t>Private Memory</a:t>
+              <a:t>Must use a language compiled for GPU</a:t>
             </a:r>
           </a:p>
           <a:p>
             <a:pPr lvl="1"/>
             <a:r>
               <a:rPr lang="en-US"/>
-              <a:t>Available to work item only</a:t>
-            </a:r>
-          </a:p>
-          <a:p>
-            <a:r>
-              <a:rPr lang="en-US">
-                <a:ea typeface="ＭＳ Ｐゴシック" pitchFamily="-108" charset="-128"/>
-              </a:rPr>
-              <a:t>Constant Memory</a:t>
+              <a:t>OpenCL – Open programming language that can make use of multiple CPUs (on the same node) and a GPU. Can combine with MPI for multiple nodes.</a:t>
             </a:r>
           </a:p>
           <a:p>
             <a:pPr lvl="1"/>
             <a:r>
               <a:rPr lang="en-US"/>
-              <a:t>Read only, can be faster than global</a:t>
-            </a:r>
-          </a:p>
-          <a:p>
-            <a:r>
-              <a:rPr lang="en-US">
-                <a:ea typeface="ＭＳ Ｐゴシック" pitchFamily="-108" charset="-128"/>
-              </a:rPr>
-              <a:t>SIMD group size – efficient code is a multiple of this</a:t>
-            </a:r>
-          </a:p>
-          <a:p>
-            <a:pPr lvl="1"/>
-            <a:r>
-              <a:rPr lang="en-US"/>
-              <a:t>Nvidia – Warp size is 32</a:t>
-            </a:r>
-          </a:p>
-          <a:p>
-            <a:pPr lvl="1"/>
-            <a:r>
-              <a:rPr lang="en-US"/>
-              <a:t>ATI – Workgroup size is 64</a:t>
-            </a:r>
-          </a:p>
-          <a:p>
-            <a:pPr lvl="1"/>
-            <a:r>
-              <a:rPr lang="en-US"/>
-              <a:t>http://stackoverflow.com/questions/7093488/opencl-how-to-i-query-for-a-devices-simd-width</a:t>
-            </a:r>
-          </a:p>
-        </p:txBody>
-      </p:sp>
-      <p:sp>
-        <p:nvSpPr>
-          <p:cNvPr id="31748" name="Slide Number Placeholder 3"/>
+              <a:t>CUDA – Nvidia only.</a:t>
+            </a:r>
+          </a:p>
+          <a:p>
+            <a:endParaRPr lang="en-US">
+              <a:ea typeface="ＭＳ Ｐゴシック" pitchFamily="-108" charset="-128"/>
+            </a:endParaRPr>
+          </a:p>
+        </p:txBody>
+      </p:sp>
+      <p:sp>
+        <p:nvSpPr>
+          <p:cNvPr id="30724" name="Slide Number Placeholder 3"/>
           <p:cNvSpPr>
             <a:spLocks noGrp="1"/>
           </p:cNvSpPr>
@@ -6827,7 +6967,7 @@
               <a:rPr lang="en-US"/>
               <a:t>Slide </a:t>
             </a:r>
-            <a:fld id="{0032BADB-F48D-AE49-BA14-9EC1C0190D97}" type="slidenum">
+            <a:fld id="{C0B27578-E324-3D4A-8A83-77F3CC1E892B}" type="slidenum">
               <a:rPr lang="en-US"/>
               <a:pPr/>
               <a:t>18</a:t>
@@ -6870,7 +7010,7 @@
       </p:grpSpPr>
       <p:sp>
         <p:nvSpPr>
-          <p:cNvPr id="32770" name="Title 1"/>
+          <p:cNvPr id="31746" name="Title 1"/>
           <p:cNvSpPr>
             <a:spLocks noGrp="1"/>
           </p:cNvSpPr>
@@ -6887,14 +7027,14 @@
               <a:rPr lang="en-US">
                 <a:ea typeface="ＭＳ Ｐゴシック" pitchFamily="-108" charset="-128"/>
               </a:rPr>
-              <a:t>Shallow Water Equations</a:t>
-            </a:r>
-          </a:p>
-        </p:txBody>
-      </p:sp>
-      <p:sp>
-        <p:nvSpPr>
-          <p:cNvPr id="32771" name="Content Placeholder 2"/>
+              <a:t>GPU architecture</a:t>
+            </a:r>
+          </a:p>
+        </p:txBody>
+      </p:sp>
+      <p:sp>
+        <p:nvSpPr>
+          <p:cNvPr id="31747" name="Content Placeholder 2"/>
           <p:cNvSpPr>
             <a:spLocks noGrp="1"/>
           </p:cNvSpPr>
@@ -6905,75 +7045,110 @@
         <p:spPr/>
         <p:txBody>
           <a:bodyPr>
-            <a:normAutofit fontScale="92500" lnSpcReduction="20000"/>
+            <a:normAutofit fontScale="70000" lnSpcReduction="20000"/>
           </a:bodyPr>
           <a:lstStyle/>
           <a:p>
             <a:r>
-              <a:rPr lang="en-US" b="0">
+              <a:rPr lang="en-US">
                 <a:ea typeface="ＭＳ Ｐゴシック" pitchFamily="-108" charset="-128"/>
               </a:rPr>
-              <a:t>Simplification of the Euler Equations</a:t>
+              <a:t>Global Memory</a:t>
             </a:r>
           </a:p>
           <a:p>
             <a:pPr lvl="1"/>
             <a:r>
               <a:rPr lang="en-US"/>
-              <a:t>Uniform Fluid Density</a:t>
+              <a:t>Available to entire device</a:t>
+            </a:r>
+          </a:p>
+          <a:p>
+            <a:r>
+              <a:rPr lang="en-US">
+                <a:ea typeface="ＭＳ Ｐゴシック" pitchFamily="-108" charset="-128"/>
+              </a:rPr>
+              <a:t>Local Memory</a:t>
             </a:r>
           </a:p>
           <a:p>
             <a:pPr lvl="1"/>
             <a:r>
               <a:rPr lang="en-US"/>
-              <a:t>Wavelengths are much longer than fluid depth</a:t>
+              <a:t>Available to the work group only</a:t>
             </a:r>
           </a:p>
           <a:p>
             <a:pPr lvl="1"/>
-            <a:endParaRPr lang="en-US"/>
+            <a:r>
+              <a:rPr lang="en-US"/>
+              <a:t>***I think this isn’t well defined in OpenCL and can spill over to Global without warning</a:t>
+            </a:r>
+          </a:p>
+          <a:p>
+            <a:r>
+              <a:rPr lang="en-US">
+                <a:ea typeface="ＭＳ Ｐゴシック" pitchFamily="-108" charset="-128"/>
+              </a:rPr>
+              <a:t>Private Memory</a:t>
+            </a:r>
           </a:p>
           <a:p>
             <a:pPr lvl="1"/>
-            <a:endParaRPr lang="en-US"/>
+            <a:r>
+              <a:rPr lang="en-US"/>
+              <a:t>Available to work item only</a:t>
+            </a:r>
+          </a:p>
+          <a:p>
+            <a:r>
+              <a:rPr lang="en-US">
+                <a:ea typeface="ＭＳ Ｐゴシック" pitchFamily="-108" charset="-128"/>
+              </a:rPr>
+              <a:t>Constant Memory</a:t>
+            </a:r>
           </a:p>
           <a:p>
             <a:pPr lvl="1"/>
-            <a:endParaRPr lang="en-US"/>
+            <a:r>
+              <a:rPr lang="en-US"/>
+              <a:t>Read only, can be faster than global</a:t>
+            </a:r>
+          </a:p>
+          <a:p>
+            <a:r>
+              <a:rPr lang="en-US">
+                <a:ea typeface="ＭＳ Ｐゴシック" pitchFamily="-108" charset="-128"/>
+              </a:rPr>
+              <a:t>SIMD group size – efficient code is a multiple of this</a:t>
+            </a:r>
           </a:p>
           <a:p>
             <a:pPr lvl="1"/>
-            <a:endParaRPr lang="en-US"/>
+            <a:r>
+              <a:rPr lang="en-US"/>
+              <a:t>Nvidia – Warp size is 32</a:t>
+            </a:r>
           </a:p>
           <a:p>
             <a:pPr lvl="1"/>
-            <a:endParaRPr lang="en-US"/>
+            <a:r>
+              <a:rPr lang="en-US"/>
+              <a:t>ATI – Workgroup size is 64</a:t>
+            </a:r>
           </a:p>
           <a:p>
             <a:pPr lvl="1"/>
-            <a:endParaRPr lang="en-US"/>
-          </a:p>
-          <a:p>
-            <a:pPr lvl="1"/>
-            <a:endParaRPr lang="en-US"/>
-          </a:p>
-          <a:p>
-            <a:pPr lvl="1"/>
-            <a:endParaRPr lang="en-US"/>
-          </a:p>
-          <a:p>
-            <a:pPr lvl="1"/>
             <a:r>
               <a:rPr lang="en-US"/>
-              <a:t>Inert Tracer Equation</a:t>
-            </a:r>
-          </a:p>
-        </p:txBody>
-      </p:sp>
-      <p:sp>
-        <p:nvSpPr>
-          <p:cNvPr id="32772" name="Slide Number Placeholder 3"/>
+              <a:t>http://stackoverflow.com/questions/7093488/opencl-how-to-i-query-for-a-devices-simd-width</a:t>
+            </a:r>
+          </a:p>
+        </p:txBody>
+      </p:sp>
+      <p:sp>
+        <p:nvSpPr>
+          <p:cNvPr id="31748" name="Slide Number Placeholder 3"/>
           <p:cNvSpPr>
             <a:spLocks noGrp="1"/>
           </p:cNvSpPr>
@@ -6992,7 +7167,7 @@
               <a:rPr lang="en-US"/>
               <a:t>Slide </a:t>
             </a:r>
-            <a:fld id="{DC1526B5-889A-3640-A8B5-3DF29F19965A}" type="slidenum">
+            <a:fld id="{0032BADB-F48D-AE49-BA14-9EC1C0190D97}" type="slidenum">
               <a:rPr lang="en-US"/>
               <a:pPr/>
               <a:t>19</a:t>
@@ -7001,70 +7176,6 @@
           </a:p>
         </p:txBody>
       </p:sp>
-      <p:pic>
-        <p:nvPicPr>
-          <p:cNvPr id="32773" name="Content Placeholder 4" descr="Shallow_Water_Eqns.pdf"/>
-          <p:cNvPicPr>
-            <a:picLocks noChangeAspect="1"/>
-          </p:cNvPicPr>
-          <p:nvPr/>
-        </p:nvPicPr>
-        <p:blipFill>
-          <a:blip r:embed="rId2"/>
-          <a:srcRect t="-2097" b="-2097"/>
-          <a:stretch>
-            <a:fillRect/>
-          </a:stretch>
-        </p:blipFill>
-        <p:spPr bwMode="auto">
-          <a:xfrm>
-            <a:off x="1600200" y="2438400"/>
-            <a:ext cx="4440238" cy="2209800"/>
-          </a:xfrm>
-          <a:prstGeom prst="rect">
-            <a:avLst/>
-          </a:prstGeom>
-          <a:noFill/>
-          <a:ln w="9525">
-            <a:noFill/>
-            <a:miter lim="800000"/>
-            <a:headEnd/>
-            <a:tailEnd/>
-          </a:ln>
-        </p:spPr>
-      </p:pic>
-      <p:pic>
-        <p:nvPicPr>
-          <p:cNvPr id="32774" name="Picture 5" descr="Concentration_Eqn.pdf"/>
-          <p:cNvPicPr>
-            <a:picLocks noChangeAspect="1"/>
-          </p:cNvPicPr>
-          <p:nvPr/>
-        </p:nvPicPr>
-        <p:blipFill>
-          <a:blip r:embed="rId3"/>
-          <a:srcRect/>
-          <a:stretch>
-            <a:fillRect/>
-          </a:stretch>
-        </p:blipFill>
-        <p:spPr bwMode="auto">
-          <a:xfrm>
-            <a:off x="2652713" y="5029200"/>
-            <a:ext cx="2528887" cy="685800"/>
-          </a:xfrm>
-          <a:prstGeom prst="rect">
-            <a:avLst/>
-          </a:prstGeom>
-          <a:noFill/>
-          <a:ln w="9525">
-            <a:noFill/>
-            <a:miter lim="800000"/>
-            <a:headEnd/>
-            <a:tailEnd/>
-          </a:ln>
-        </p:spPr>
-      </p:pic>
     </p:spTree>
   </p:cSld>
   <p:clrMapOvr>
@@ -7150,7 +7261,6 @@
               <a:rPr lang="en-US" dirty="0" smtClean="0"/>
               <a:t>Workshop Coordinator: Dr. Scott Runnels</a:t>
             </a:r>
-            <a:endParaRPr lang="en-US" dirty="0" smtClean="0"/>
           </a:p>
           <a:p>
             <a:r>
@@ -7266,6 +7376,236 @@
       </p:grpSpPr>
       <p:sp>
         <p:nvSpPr>
+          <p:cNvPr id="32770" name="Title 1"/>
+          <p:cNvSpPr>
+            <a:spLocks noGrp="1"/>
+          </p:cNvSpPr>
+          <p:nvPr>
+            <p:ph type="title"/>
+          </p:nvPr>
+        </p:nvSpPr>
+        <p:spPr/>
+        <p:txBody>
+          <a:bodyPr/>
+          <a:lstStyle/>
+          <a:p>
+            <a:r>
+              <a:rPr lang="en-US">
+                <a:ea typeface="ＭＳ Ｐゴシック" pitchFamily="-108" charset="-128"/>
+              </a:rPr>
+              <a:t>Shallow Water Equations</a:t>
+            </a:r>
+          </a:p>
+        </p:txBody>
+      </p:sp>
+      <p:sp>
+        <p:nvSpPr>
+          <p:cNvPr id="32771" name="Content Placeholder 2"/>
+          <p:cNvSpPr>
+            <a:spLocks noGrp="1"/>
+          </p:cNvSpPr>
+          <p:nvPr>
+            <p:ph idx="1"/>
+          </p:nvPr>
+        </p:nvSpPr>
+        <p:spPr>
+          <a:xfrm>
+            <a:off x="1435608" y="1447800"/>
+            <a:ext cx="7498080" cy="3886200"/>
+          </a:xfrm>
+        </p:spPr>
+        <p:txBody>
+          <a:bodyPr>
+            <a:normAutofit fontScale="85000" lnSpcReduction="20000"/>
+          </a:bodyPr>
+          <a:lstStyle/>
+          <a:p>
+            <a:r>
+              <a:rPr lang="en-US" b="0" dirty="0">
+                <a:ea typeface="ＭＳ Ｐゴシック" pitchFamily="-108" charset="-128"/>
+              </a:rPr>
+              <a:t>Simplification of the Euler Equations</a:t>
+            </a:r>
+          </a:p>
+          <a:p>
+            <a:pPr lvl="1"/>
+            <a:r>
+              <a:rPr lang="en-US" dirty="0"/>
+              <a:t>Uniform Fluid Density</a:t>
+            </a:r>
+          </a:p>
+          <a:p>
+            <a:pPr lvl="1"/>
+            <a:r>
+              <a:rPr lang="en-US" dirty="0"/>
+              <a:t>Wavelengths are much longer than fluid depth</a:t>
+            </a:r>
+          </a:p>
+          <a:p>
+            <a:pPr lvl="1"/>
+            <a:endParaRPr lang="en-US" dirty="0"/>
+          </a:p>
+          <a:p>
+            <a:pPr lvl="1"/>
+            <a:endParaRPr lang="en-US" dirty="0"/>
+          </a:p>
+          <a:p>
+            <a:pPr lvl="1"/>
+            <a:endParaRPr lang="en-US" dirty="0"/>
+          </a:p>
+          <a:p>
+            <a:pPr lvl="1"/>
+            <a:endParaRPr lang="en-US" dirty="0" smtClean="0"/>
+          </a:p>
+          <a:p>
+            <a:pPr lvl="1">
+              <a:buNone/>
+            </a:pPr>
+            <a:endParaRPr lang="en-US" dirty="0" smtClean="0"/>
+          </a:p>
+          <a:p>
+            <a:pPr lvl="1">
+              <a:buNone/>
+            </a:pPr>
+            <a:endParaRPr lang="en-US" dirty="0" smtClean="0"/>
+          </a:p>
+          <a:p>
+            <a:pPr lvl="1"/>
+            <a:r>
+              <a:rPr lang="en-US" dirty="0"/>
+              <a:t>Inert Tracer Equation</a:t>
+            </a:r>
+          </a:p>
+        </p:txBody>
+      </p:sp>
+      <p:sp>
+        <p:nvSpPr>
+          <p:cNvPr id="32772" name="Slide Number Placeholder 3"/>
+          <p:cNvSpPr>
+            <a:spLocks noGrp="1"/>
+          </p:cNvSpPr>
+          <p:nvPr>
+            <p:ph type="sldNum" sz="quarter" idx="12"/>
+          </p:nvPr>
+        </p:nvSpPr>
+        <p:spPr>
+          <a:noFill/>
+        </p:spPr>
+        <p:txBody>
+          <a:bodyPr/>
+          <a:lstStyle/>
+          <a:p>
+            <a:r>
+              <a:rPr lang="en-US"/>
+              <a:t>Slide </a:t>
+            </a:r>
+            <a:fld id="{DC1526B5-889A-3640-A8B5-3DF29F19965A}" type="slidenum">
+              <a:rPr lang="en-US"/>
+              <a:pPr/>
+              <a:t>20</a:t>
+            </a:fld>
+            <a:endParaRPr lang="en-US"/>
+          </a:p>
+        </p:txBody>
+      </p:sp>
+      <p:pic>
+        <p:nvPicPr>
+          <p:cNvPr id="32773" name="Content Placeholder 4" descr="Shallow_Water_Eqns.pdf"/>
+          <p:cNvPicPr>
+            <a:picLocks noChangeAspect="1"/>
+          </p:cNvPicPr>
+          <p:nvPr/>
+        </p:nvPicPr>
+        <p:blipFill>
+          <a:blip r:embed="rId3"/>
+          <a:srcRect t="-2097" b="-2097"/>
+          <a:stretch>
+            <a:fillRect/>
+          </a:stretch>
+        </p:blipFill>
+        <p:spPr bwMode="auto">
+          <a:xfrm>
+            <a:off x="3048000" y="2590800"/>
+            <a:ext cx="4440238" cy="2209800"/>
+          </a:xfrm>
+          <a:prstGeom prst="rect">
+            <a:avLst/>
+          </a:prstGeom>
+          <a:noFill/>
+          <a:ln w="9525">
+            <a:noFill/>
+            <a:miter lim="800000"/>
+            <a:headEnd/>
+            <a:tailEnd/>
+          </a:ln>
+        </p:spPr>
+      </p:pic>
+      <p:pic>
+        <p:nvPicPr>
+          <p:cNvPr id="32774" name="Picture 5" descr="Concentration_Eqn.pdf"/>
+          <p:cNvPicPr>
+            <a:picLocks noChangeAspect="1"/>
+          </p:cNvPicPr>
+          <p:nvPr/>
+        </p:nvPicPr>
+        <p:blipFill>
+          <a:blip r:embed="rId4"/>
+          <a:srcRect/>
+          <a:stretch>
+            <a:fillRect/>
+          </a:stretch>
+        </p:blipFill>
+        <p:spPr bwMode="auto">
+          <a:xfrm>
+            <a:off x="3886200" y="5257800"/>
+            <a:ext cx="2528887" cy="685800"/>
+          </a:xfrm>
+          <a:prstGeom prst="rect">
+            <a:avLst/>
+          </a:prstGeom>
+          <a:noFill/>
+          <a:ln w="9525">
+            <a:noFill/>
+            <a:miter lim="800000"/>
+            <a:headEnd/>
+            <a:tailEnd/>
+          </a:ln>
+        </p:spPr>
+      </p:pic>
+    </p:spTree>
+  </p:cSld>
+  <p:clrMapOvr>
+    <a:masterClrMapping/>
+  </p:clrMapOvr>
+  <p:timing>
+    <p:tnLst>
+      <p:par>
+        <p:cTn id="1" dur="indefinite" restart="never" nodeType="tmRoot"/>
+      </p:par>
+    </p:tnLst>
+  </p:timing>
+</p:sld>
+</file>
+
+<file path=ppt/slides/slide21.xml><?xml version="1.0" encoding="utf-8"?>
+<p:sld xmlns:a="http://schemas.openxmlformats.org/drawingml/2006/main" xmlns:r="http://schemas.openxmlformats.org/officeDocument/2006/relationships" xmlns:mc="http://schemas.openxmlformats.org/markup-compatibility/2006" xmlns:mv="urn:schemas-microsoft-com:mac:vml" xmlns:p="http://schemas.openxmlformats.org/presentationml/2006/main" mc:Ignorable="mv" mc:PreserveAttributes="mv:*">
+  <p:cSld>
+    <p:spTree>
+      <p:nvGrpSpPr>
+        <p:cNvPr id="1" name=""/>
+        <p:cNvGrpSpPr/>
+        <p:nvPr/>
+      </p:nvGrpSpPr>
+      <p:grpSpPr>
+        <a:xfrm>
+          <a:off x="0" y="0"/>
+          <a:ext cx="0" cy="0"/>
+          <a:chOff x="0" y="0"/>
+          <a:chExt cx="0" cy="0"/>
+        </a:xfrm>
+      </p:grpSpPr>
+      <p:sp>
+        <p:nvSpPr>
           <p:cNvPr id="33794" name="Title 1"/>
           <p:cNvSpPr>
             <a:spLocks noGrp="1"/>
@@ -7339,7 +7679,7 @@
             <a:fld id="{8408E1E3-6392-834E-A657-F96134CD74C6}" type="slidenum">
               <a:rPr lang="en-US"/>
               <a:pPr/>
-              <a:t>20</a:t>
+              <a:t>21</a:t>
             </a:fld>
             <a:endParaRPr lang="en-US"/>
           </a:p>
@@ -7759,145 +8099,6 @@
 </p:sld>
 </file>
 
-<file path=ppt/slides/slide21.xml><?xml version="1.0" encoding="utf-8"?>
-<p:sld xmlns:a="http://schemas.openxmlformats.org/drawingml/2006/main" xmlns:r="http://schemas.openxmlformats.org/officeDocument/2006/relationships" xmlns:mc="http://schemas.openxmlformats.org/markup-compatibility/2006" xmlns:mv="urn:schemas-microsoft-com:mac:vml" xmlns:p="http://schemas.openxmlformats.org/presentationml/2006/main" mc:Ignorable="mv" mc:PreserveAttributes="mv:*">
-  <p:cSld>
-    <p:spTree>
-      <p:nvGrpSpPr>
-        <p:cNvPr id="1" name=""/>
-        <p:cNvGrpSpPr/>
-        <p:nvPr/>
-      </p:nvGrpSpPr>
-      <p:grpSpPr>
-        <a:xfrm>
-          <a:off x="0" y="0"/>
-          <a:ext cx="0" cy="0"/>
-          <a:chOff x="0" y="0"/>
-          <a:chExt cx="0" cy="0"/>
-        </a:xfrm>
-      </p:grpSpPr>
-      <p:sp>
-        <p:nvSpPr>
-          <p:cNvPr id="34818" name="Title 1"/>
-          <p:cNvSpPr>
-            <a:spLocks noGrp="1"/>
-          </p:cNvSpPr>
-          <p:nvPr>
-            <p:ph type="title"/>
-          </p:nvPr>
-        </p:nvSpPr>
-        <p:spPr/>
-        <p:txBody>
-          <a:bodyPr/>
-          <a:lstStyle/>
-          <a:p>
-            <a:r>
-              <a:rPr lang="en-US">
-                <a:ea typeface="ＭＳ Ｐゴシック" pitchFamily="-108" charset="-128"/>
-              </a:rPr>
-              <a:t>Future Directions</a:t>
-            </a:r>
-          </a:p>
-        </p:txBody>
-      </p:sp>
-      <p:sp>
-        <p:nvSpPr>
-          <p:cNvPr id="34819" name="Content Placeholder 2"/>
-          <p:cNvSpPr>
-            <a:spLocks noGrp="1"/>
-          </p:cNvSpPr>
-          <p:nvPr>
-            <p:ph idx="1"/>
-          </p:nvPr>
-        </p:nvSpPr>
-        <p:spPr/>
-        <p:txBody>
-          <a:bodyPr/>
-          <a:lstStyle/>
-          <a:p>
-            <a:r>
-              <a:rPr lang="en-US">
-                <a:ea typeface="ＭＳ Ｐゴシック" pitchFamily="-108" charset="-128"/>
-              </a:rPr>
-              <a:t>FEM approach for full Euler equations</a:t>
-            </a:r>
-          </a:p>
-          <a:p>
-            <a:r>
-              <a:rPr lang="en-US">
-                <a:ea typeface="ＭＳ Ｐゴシック" pitchFamily="-108" charset="-128"/>
-              </a:rPr>
-              <a:t>Implement schemes for advection on the GPU (include in CLAMR)</a:t>
-            </a:r>
-          </a:p>
-          <a:p>
-            <a:r>
-              <a:rPr lang="en-US">
-                <a:ea typeface="ＭＳ Ｐゴシック" pitchFamily="-108" charset="-128"/>
-              </a:rPr>
-              <a:t>Implement these schemes to solve the full Euler Equations</a:t>
-            </a:r>
-          </a:p>
-          <a:p>
-            <a:r>
-              <a:rPr lang="en-US">
-                <a:ea typeface="ＭＳ Ｐゴシック" pitchFamily="-108" charset="-128"/>
-              </a:rPr>
-              <a:t>Alternative numerical methods</a:t>
-            </a:r>
-          </a:p>
-          <a:p>
-            <a:endParaRPr lang="en-US">
-              <a:ea typeface="ＭＳ Ｐゴシック" pitchFamily="-108" charset="-128"/>
-            </a:endParaRPr>
-          </a:p>
-        </p:txBody>
-      </p:sp>
-      <p:sp>
-        <p:nvSpPr>
-          <p:cNvPr id="34820" name="Slide Number Placeholder 3"/>
-          <p:cNvSpPr>
-            <a:spLocks noGrp="1"/>
-          </p:cNvSpPr>
-          <p:nvPr>
-            <p:ph type="sldNum" sz="quarter" idx="12"/>
-          </p:nvPr>
-        </p:nvSpPr>
-        <p:spPr>
-          <a:noFill/>
-        </p:spPr>
-        <p:txBody>
-          <a:bodyPr/>
-          <a:lstStyle/>
-          <a:p>
-            <a:r>
-              <a:rPr lang="en-US"/>
-              <a:t>Slide </a:t>
-            </a:r>
-            <a:fld id="{642E7553-A61F-9A41-A7A2-954D1F757C3A}" type="slidenum">
-              <a:rPr lang="en-US"/>
-              <a:pPr/>
-              <a:t>21</a:t>
-            </a:fld>
-            <a:endParaRPr lang="en-US"/>
-          </a:p>
-        </p:txBody>
-      </p:sp>
-    </p:spTree>
-  </p:cSld>
-  <p:clrMapOvr>
-    <a:masterClrMapping/>
-  </p:clrMapOvr>
-  <p:timing>
-    <p:tnLst>
-      <p:par>
-        <p:cTn id="1" dur="indefinite" restart="never" nodeType="tmRoot"/>
-      </p:par>
-    </p:tnLst>
-  </p:timing>
-</p:sld>
-</file>
-
 <file path=ppt/slides/slide22.xml><?xml version="1.0" encoding="utf-8"?>
 <p:sld xmlns:a="http://schemas.openxmlformats.org/drawingml/2006/main" xmlns:r="http://schemas.openxmlformats.org/officeDocument/2006/relationships" xmlns:mc="http://schemas.openxmlformats.org/markup-compatibility/2006" xmlns:mv="urn:schemas-microsoft-com:mac:vml" xmlns:p="http://schemas.openxmlformats.org/presentationml/2006/main" mc:Ignorable="mv" mc:PreserveAttributes="mv:*">
   <p:cSld>
@@ -7917,6 +8118,145 @@
       </p:grpSpPr>
       <p:sp>
         <p:nvSpPr>
+          <p:cNvPr id="34818" name="Title 1"/>
+          <p:cNvSpPr>
+            <a:spLocks noGrp="1"/>
+          </p:cNvSpPr>
+          <p:nvPr>
+            <p:ph type="title"/>
+          </p:nvPr>
+        </p:nvSpPr>
+        <p:spPr/>
+        <p:txBody>
+          <a:bodyPr/>
+          <a:lstStyle/>
+          <a:p>
+            <a:r>
+              <a:rPr lang="en-US">
+                <a:ea typeface="ＭＳ Ｐゴシック" pitchFamily="-108" charset="-128"/>
+              </a:rPr>
+              <a:t>Future Directions</a:t>
+            </a:r>
+          </a:p>
+        </p:txBody>
+      </p:sp>
+      <p:sp>
+        <p:nvSpPr>
+          <p:cNvPr id="34819" name="Content Placeholder 2"/>
+          <p:cNvSpPr>
+            <a:spLocks noGrp="1"/>
+          </p:cNvSpPr>
+          <p:nvPr>
+            <p:ph idx="1"/>
+          </p:nvPr>
+        </p:nvSpPr>
+        <p:spPr/>
+        <p:txBody>
+          <a:bodyPr/>
+          <a:lstStyle/>
+          <a:p>
+            <a:r>
+              <a:rPr lang="en-US">
+                <a:ea typeface="ＭＳ Ｐゴシック" pitchFamily="-108" charset="-128"/>
+              </a:rPr>
+              <a:t>FEM approach for full Euler equations</a:t>
+            </a:r>
+          </a:p>
+          <a:p>
+            <a:r>
+              <a:rPr lang="en-US">
+                <a:ea typeface="ＭＳ Ｐゴシック" pitchFamily="-108" charset="-128"/>
+              </a:rPr>
+              <a:t>Implement schemes for advection on the GPU (include in CLAMR)</a:t>
+            </a:r>
+          </a:p>
+          <a:p>
+            <a:r>
+              <a:rPr lang="en-US">
+                <a:ea typeface="ＭＳ Ｐゴシック" pitchFamily="-108" charset="-128"/>
+              </a:rPr>
+              <a:t>Implement these schemes to solve the full Euler Equations</a:t>
+            </a:r>
+          </a:p>
+          <a:p>
+            <a:r>
+              <a:rPr lang="en-US">
+                <a:ea typeface="ＭＳ Ｐゴシック" pitchFamily="-108" charset="-128"/>
+              </a:rPr>
+              <a:t>Alternative numerical methods</a:t>
+            </a:r>
+          </a:p>
+          <a:p>
+            <a:endParaRPr lang="en-US">
+              <a:ea typeface="ＭＳ Ｐゴシック" pitchFamily="-108" charset="-128"/>
+            </a:endParaRPr>
+          </a:p>
+        </p:txBody>
+      </p:sp>
+      <p:sp>
+        <p:nvSpPr>
+          <p:cNvPr id="34820" name="Slide Number Placeholder 3"/>
+          <p:cNvSpPr>
+            <a:spLocks noGrp="1"/>
+          </p:cNvSpPr>
+          <p:nvPr>
+            <p:ph type="sldNum" sz="quarter" idx="12"/>
+          </p:nvPr>
+        </p:nvSpPr>
+        <p:spPr>
+          <a:noFill/>
+        </p:spPr>
+        <p:txBody>
+          <a:bodyPr/>
+          <a:lstStyle/>
+          <a:p>
+            <a:r>
+              <a:rPr lang="en-US"/>
+              <a:t>Slide </a:t>
+            </a:r>
+            <a:fld id="{642E7553-A61F-9A41-A7A2-954D1F757C3A}" type="slidenum">
+              <a:rPr lang="en-US"/>
+              <a:pPr/>
+              <a:t>22</a:t>
+            </a:fld>
+            <a:endParaRPr lang="en-US"/>
+          </a:p>
+        </p:txBody>
+      </p:sp>
+    </p:spTree>
+  </p:cSld>
+  <p:clrMapOvr>
+    <a:masterClrMapping/>
+  </p:clrMapOvr>
+  <p:timing>
+    <p:tnLst>
+      <p:par>
+        <p:cTn id="1" dur="indefinite" restart="never" nodeType="tmRoot"/>
+      </p:par>
+    </p:tnLst>
+  </p:timing>
+</p:sld>
+</file>
+
+<file path=ppt/slides/slide23.xml><?xml version="1.0" encoding="utf-8"?>
+<p:sld xmlns:a="http://schemas.openxmlformats.org/drawingml/2006/main" xmlns:r="http://schemas.openxmlformats.org/officeDocument/2006/relationships" xmlns:mc="http://schemas.openxmlformats.org/markup-compatibility/2006" xmlns:mv="urn:schemas-microsoft-com:mac:vml" xmlns:p="http://schemas.openxmlformats.org/presentationml/2006/main" mc:Ignorable="mv" mc:PreserveAttributes="mv:*">
+  <p:cSld>
+    <p:spTree>
+      <p:nvGrpSpPr>
+        <p:cNvPr id="1" name=""/>
+        <p:cNvGrpSpPr/>
+        <p:nvPr/>
+      </p:nvGrpSpPr>
+      <p:grpSpPr>
+        <a:xfrm>
+          <a:off x="0" y="0"/>
+          <a:ext cx="0" cy="0"/>
+          <a:chOff x="0" y="0"/>
+          <a:chExt cx="0" cy="0"/>
+        </a:xfrm>
+      </p:grpSpPr>
+      <p:sp>
+        <p:nvSpPr>
           <p:cNvPr id="35842" name="Title 1"/>
           <p:cNvSpPr>
             <a:spLocks noGrp="1"/>
@@ -7970,7 +8310,7 @@
             <a:fld id="{C819D0DE-97A2-C142-9B93-516E0974BCDA}" type="slidenum">
               <a:rPr lang="en-US"/>
               <a:pPr/>
-              <a:t>22</a:t>
+              <a:t>23</a:t>
             </a:fld>
             <a:endParaRPr lang="en-US"/>
           </a:p>
@@ -8046,13 +8386,13 @@
         <p:spPr/>
         <p:txBody>
           <a:bodyPr>
-            <a:normAutofit fontScale="85000" lnSpcReduction="20000"/>
+            <a:normAutofit fontScale="92500" lnSpcReduction="20000"/>
           </a:bodyPr>
           <a:lstStyle/>
           <a:p>
             <a:pPr eaLnBrk="1" hangingPunct="1"/>
             <a:r>
-              <a:rPr lang="en-US">
+              <a:rPr lang="en-US" dirty="0">
                 <a:ea typeface="ＭＳ Ｐゴシック" pitchFamily="-108" charset="-128"/>
               </a:rPr>
               <a:t>Motivation</a:t>
@@ -8061,7 +8401,7 @@
           <a:p>
             <a:pPr eaLnBrk="1" hangingPunct="1"/>
             <a:r>
-              <a:rPr lang="en-US">
+              <a:rPr lang="en-US" dirty="0">
                 <a:ea typeface="ＭＳ Ｐゴシック" pitchFamily="-108" charset="-128"/>
               </a:rPr>
               <a:t>Discontinuities</a:t>
@@ -8070,7 +8410,7 @@
           <a:p>
             <a:pPr eaLnBrk="1" hangingPunct="1"/>
             <a:r>
-              <a:rPr lang="en-US">
+              <a:rPr lang="en-US" dirty="0">
                 <a:ea typeface="ＭＳ Ｐゴシック" pitchFamily="-108" charset="-128"/>
               </a:rPr>
               <a:t>Problems observed in numerical methods</a:t>
@@ -8079,7 +8419,7 @@
           <a:p>
             <a:pPr eaLnBrk="1" hangingPunct="1"/>
             <a:r>
-              <a:rPr lang="en-US">
+              <a:rPr lang="en-US" dirty="0">
                 <a:ea typeface="ＭＳ Ｐゴシック" pitchFamily="-108" charset="-128"/>
               </a:rPr>
               <a:t>Description of methods reviewed</a:t>
@@ -8088,51 +8428,69 @@
           <a:p>
             <a:pPr lvl="1" eaLnBrk="1" hangingPunct="1"/>
             <a:r>
-              <a:rPr lang="en-US"/>
-              <a:t>Lax-Wendroff with limiters</a:t>
-            </a:r>
+              <a:rPr lang="en-US" dirty="0"/>
+              <a:t>Lax-</a:t>
+            </a:r>
+            <a:r>
+              <a:rPr lang="en-US" dirty="0" err="1"/>
+              <a:t>Wendroff</a:t>
+            </a:r>
+            <a:r>
+              <a:rPr lang="en-US" dirty="0"/>
+              <a:t> with limiters</a:t>
+            </a:r>
+            <a:endParaRPr lang="en-US" dirty="0" smtClean="0"/>
           </a:p>
           <a:p>
             <a:pPr lvl="1" eaLnBrk="1" hangingPunct="1"/>
             <a:r>
-              <a:rPr lang="en-US"/>
-              <a:t>MPDATA</a:t>
-            </a:r>
+              <a:rPr lang="en-US" dirty="0" smtClean="0"/>
+              <a:t>MUSCL</a:t>
+            </a:r>
+            <a:endParaRPr lang="en-US" dirty="0"/>
           </a:p>
           <a:p>
             <a:pPr lvl="1" eaLnBrk="1" hangingPunct="1"/>
             <a:r>
-              <a:rPr lang="en-US"/>
-              <a:t>MUSCL</a:t>
-            </a:r>
-          </a:p>
-          <a:p>
-            <a:pPr lvl="1" eaLnBrk="1" hangingPunct="1"/>
-            <a:r>
-              <a:rPr lang="en-US"/>
+              <a:rPr lang="en-US" dirty="0"/>
               <a:t>SUPG</a:t>
             </a:r>
           </a:p>
           <a:p>
             <a:pPr eaLnBrk="1" hangingPunct="1"/>
             <a:r>
-              <a:rPr lang="en-US">
+              <a:rPr lang="en-US" dirty="0">
                 <a:ea typeface="ＭＳ Ｐゴシック" pitchFamily="-108" charset="-128"/>
               </a:rPr>
               <a:t>Results</a:t>
             </a:r>
+            <a:endParaRPr lang="en-US" dirty="0" smtClean="0">
+              <a:ea typeface="ＭＳ Ｐゴシック" pitchFamily="-108" charset="-128"/>
+            </a:endParaRPr>
           </a:p>
           <a:p>
             <a:pPr lvl="1" eaLnBrk="1" hangingPunct="1"/>
             <a:r>
-              <a:rPr lang="en-US"/>
-              <a:t>2D Advection Equations</a:t>
+              <a:rPr lang="en-US" dirty="0"/>
+              <a:t>1</a:t>
+            </a:r>
+            <a:r>
+              <a:rPr lang="en-US" dirty="0" smtClean="0"/>
+              <a:t>D </a:t>
+            </a:r>
+            <a:r>
+              <a:rPr lang="en-US" dirty="0"/>
+              <a:t>Advection </a:t>
+            </a:r>
+            <a:r>
+              <a:rPr lang="en-US" dirty="0" smtClean="0"/>
+              <a:t>Equations in 2D Code</a:t>
             </a:r>
           </a:p>
           <a:p>
             <a:pPr eaLnBrk="1" hangingPunct="1"/>
             <a:r>
-              <a:rPr lang="en-US">
+              <a:rPr lang="en-US" dirty="0">
                 <a:ea typeface="ＭＳ Ｐゴシック" pitchFamily="-108" charset="-128"/>
               </a:rPr>
               <a:t>GPU Programming</a:t>
@@ -8141,7 +8499,7 @@
           <a:p>
             <a:pPr eaLnBrk="1" hangingPunct="1"/>
             <a:r>
-              <a:rPr lang="en-US">
+              <a:rPr lang="en-US" dirty="0">
                 <a:ea typeface="ＭＳ Ｐゴシック" pitchFamily="-108" charset="-128"/>
               </a:rPr>
               <a:t>Conclusions</a:t>
@@ -8149,7 +8507,7 @@
           </a:p>
           <a:p>
             <a:pPr eaLnBrk="1" hangingPunct="1"/>
-            <a:endParaRPr lang="en-US">
+            <a:endParaRPr lang="en-US" dirty="0">
               <a:ea typeface="ＭＳ Ｐゴシック" pitchFamily="-108" charset="-128"/>
             </a:endParaRPr>
           </a:p>
@@ -8305,8 +8663,8 @@
         </p:nvSpPr>
         <p:spPr bwMode="auto">
           <a:xfrm>
-            <a:off x="457200" y="5037138"/>
-            <a:ext cx="8229600" cy="338554"/>
+            <a:off x="1143000" y="5663624"/>
+            <a:ext cx="7696200" cy="584776"/>
           </a:xfrm>
           <a:prstGeom prst="rect">
             <a:avLst/>
@@ -8320,7 +8678,7 @@
           </a:ln>
         </p:spPr>
         <p:txBody>
-          <a:bodyPr>
+          <a:bodyPr wrap="square">
             <a:prstTxWarp prst="textNoShape">
               <a:avLst/>
             </a:prstTxWarp>
@@ -8343,20 +8701,52 @@
               <a:buNone/>
             </a:pPr>
             <a:r>
-              <a:rPr lang="en-US" sz="1600" smtClean="0">
-                <a:solidFill>
-                  <a:srgbClr val="000000"/>
-                </a:solidFill>
-              </a:rPr>
-              <a:t>A simple model </a:t>
-            </a:r>
-            <a:r>
               <a:rPr lang="en-US" sz="1600" dirty="0" smtClean="0">
                 <a:solidFill>
                   <a:srgbClr val="000000"/>
                 </a:solidFill>
               </a:rPr>
-              <a:t>problem showing the advection of radioactive</a:t>
+              <a:t>A simple model problem showing the advection of </a:t>
+            </a:r>
+            <a:r>
+              <a:rPr lang="en-US" sz="1600" dirty="0" smtClean="0">
+                <a:solidFill>
+                  <a:srgbClr val="000000"/>
+                </a:solidFill>
+              </a:rPr>
+              <a:t>radioactive water dumped into the ocean and carried by </a:t>
+            </a:r>
+            <a:r>
+              <a:rPr lang="en-US" sz="1600" dirty="0" smtClean="0">
+                <a:solidFill>
+                  <a:srgbClr val="000000"/>
+                </a:solidFill>
+              </a:rPr>
+              <a:t>a rotational current</a:t>
+            </a:r>
+            <a:r>
+              <a:rPr lang="en-US" sz="1600" dirty="0" smtClean="0">
+                <a:solidFill>
+                  <a:srgbClr val="000000"/>
+                </a:solidFill>
+              </a:rPr>
+              <a:t> across the </a:t>
+            </a:r>
+            <a:r>
+              <a:rPr lang="en-US" sz="1600" dirty="0" smtClean="0">
+                <a:solidFill>
+                  <a:srgbClr val="000000"/>
+                </a:solidFill>
+              </a:rPr>
+              <a:t>P</a:t>
+            </a:r>
+            <a:r>
+              <a:rPr lang="en-US" sz="1600" dirty="0" smtClean="0">
+                <a:solidFill>
+                  <a:srgbClr val="000000"/>
+                </a:solidFill>
+              </a:rPr>
+              <a:t>acific.</a:t>
             </a:r>
             <a:endParaRPr lang="en-US" sz="1600" dirty="0"/>
           </a:p>
@@ -8521,8 +8911,8 @@
         </p:nvSpPr>
         <p:spPr bwMode="auto">
           <a:xfrm>
-            <a:off x="4038600" y="4648200"/>
-            <a:ext cx="2743200" cy="584200"/>
+            <a:off x="1435608" y="6172200"/>
+            <a:ext cx="7022592" cy="338554"/>
           </a:xfrm>
           <a:prstGeom prst="rect">
             <a:avLst/>
@@ -8536,7 +8926,7 @@
           </a:ln>
         </p:spPr>
         <p:txBody>
-          <a:bodyPr>
+          <a:bodyPr wrap="square">
             <a:prstTxWarp prst="textNoShape">
               <a:avLst/>
             </a:prstTxWarp>
@@ -8555,15 +8945,27 @@
                 <a:srgbClr val="004080"/>
               </a:buClr>
               <a:buSzPct val="65000"/>
-              <a:buFont typeface="Wingdings" pitchFamily="-108" charset="2"/>
-              <a:buChar char="§"/>
             </a:pPr>
             <a:r>
-              <a:rPr lang="en-US" sz="1600">
+              <a:rPr lang="en-US" sz="1600" dirty="0">
                 <a:ea typeface="ＭＳ Ｐゴシック" pitchFamily="-108" charset="-128"/>
                 <a:cs typeface="ＭＳ Ｐゴシック" pitchFamily="-108" charset="-128"/>
               </a:rPr>
-              <a:t>From Harlow and Amsden - “Fluid Dynamics”</a:t>
+              <a:t>From Harlow and </a:t>
+            </a:r>
+            <a:r>
+              <a:rPr lang="en-US" sz="1600" dirty="0" err="1">
+                <a:ea typeface="ＭＳ Ｐゴシック" pitchFamily="-108" charset="-128"/>
+                <a:cs typeface="ＭＳ Ｐゴシック" pitchFamily="-108" charset="-128"/>
+              </a:rPr>
+              <a:t>Amsden</a:t>
+            </a:r>
+            <a:r>
+              <a:rPr lang="en-US" sz="1600" dirty="0">
+                <a:ea typeface="ＭＳ Ｐゴシック" pitchFamily="-108" charset="-128"/>
+                <a:cs typeface="ＭＳ Ｐゴシック" pitchFamily="-108" charset="-128"/>
+              </a:rPr>
+              <a:t> - “Fluid Dynamics”</a:t>
             </a:r>
           </a:p>
         </p:txBody>
@@ -8602,7 +9004,7 @@
       </p:grpSpPr>
       <p:sp>
         <p:nvSpPr>
-          <p:cNvPr id="19459" name="Title 1"/>
+          <p:cNvPr id="20482" name="Title 1"/>
           <p:cNvSpPr>
             <a:spLocks noGrp="1"/>
           </p:cNvSpPr>
@@ -8621,14 +9023,14 @@
               <a:rPr lang="en-US">
                 <a:ea typeface="ＭＳ Ｐゴシック" pitchFamily="-108" charset="-128"/>
               </a:rPr>
-              <a:t>Problems observed in numerical methods for equations with discontinuities</a:t>
-            </a:r>
-          </a:p>
-        </p:txBody>
-      </p:sp>
-      <p:sp>
-        <p:nvSpPr>
-          <p:cNvPr id="19458" name="Content Placeholder 2"/>
+              <a:t>Descriptions of methods reviewed</a:t>
+            </a:r>
+          </a:p>
+        </p:txBody>
+      </p:sp>
+      <p:sp>
+        <p:nvSpPr>
+          <p:cNvPr id="20483" name="Content Placeholder 2"/>
           <p:cNvSpPr>
             <a:spLocks noGrp="1"/>
           </p:cNvSpPr>
@@ -8638,73 +9040,66 @@
         </p:nvSpPr>
         <p:spPr>
           <a:xfrm>
-            <a:off x="533400" y="1447800"/>
-            <a:ext cx="8343900" cy="4495800"/>
+            <a:off x="1435608" y="1447800"/>
+            <a:ext cx="7498080" cy="1600200"/>
           </a:xfrm>
         </p:spPr>
         <p:txBody>
-          <a:bodyPr/>
-          <a:lstStyle/>
-          <a:p>
-            <a:r>
-              <a:rPr lang="en-US">
+          <a:bodyPr>
+            <a:normAutofit fontScale="92500" lnSpcReduction="20000"/>
+          </a:bodyPr>
+          <a:lstStyle/>
+          <a:p>
+            <a:r>
+              <a:rPr lang="en-US" dirty="0">
                 <a:ea typeface="ＭＳ Ｐゴシック" pitchFamily="-108" charset="-128"/>
               </a:rPr>
-              <a:t>Oscillations – High Order schemes</a:t>
-            </a:r>
-          </a:p>
-          <a:p>
-            <a:pPr lvl="1"/>
-            <a:r>
-              <a:rPr lang="en-US"/>
-              <a:t>Ex) Lax-Wendroff</a:t>
-            </a:r>
-          </a:p>
-          <a:p>
-            <a:endParaRPr lang="en-US">
-              <a:ea typeface="ＭＳ Ｐゴシック" pitchFamily="-108" charset="-128"/>
-            </a:endParaRPr>
-          </a:p>
-          <a:p>
-            <a:pPr>
-              <a:buFont typeface="Wingdings" pitchFamily="-108" charset="2"/>
-              <a:buNone/>
-            </a:pPr>
-            <a:endParaRPr lang="en-US">
-              <a:ea typeface="ＭＳ Ｐゴシック" pitchFamily="-108" charset="-128"/>
-            </a:endParaRPr>
-          </a:p>
-          <a:p>
-            <a:pPr>
-              <a:buFont typeface="Wingdings" pitchFamily="-108" charset="2"/>
-              <a:buNone/>
-            </a:pPr>
-            <a:endParaRPr lang="en-US">
-              <a:ea typeface="ＭＳ Ｐゴシック" pitchFamily="-108" charset="-128"/>
-            </a:endParaRPr>
-          </a:p>
-          <a:p>
-            <a:pPr>
-              <a:buFont typeface="Wingdings" pitchFamily="-108" charset="2"/>
-              <a:buNone/>
-            </a:pPr>
-            <a:endParaRPr lang="en-US">
-              <a:ea typeface="ＭＳ Ｐゴシック" pitchFamily="-108" charset="-128"/>
-            </a:endParaRPr>
-          </a:p>
-          <a:p>
-            <a:r>
-              <a:rPr lang="en-US">
+              <a:t>Lax-</a:t>
+            </a:r>
+            <a:r>
+              <a:rPr lang="en-US" dirty="0" err="1">
                 <a:ea typeface="ＭＳ Ｐゴシック" pitchFamily="-108" charset="-128"/>
               </a:rPr>
-              <a:t>Large dissipation – First Order Schemes</a:t>
-            </a:r>
-          </a:p>
-        </p:txBody>
-      </p:sp>
-      <p:sp>
-        <p:nvSpPr>
-          <p:cNvPr id="19460" name="Slide Number Placeholder 3"/>
+              <a:t>Wendroff</a:t>
+            </a:r>
+            <a:r>
+              <a:rPr lang="en-US" dirty="0">
+                <a:ea typeface="ＭＳ Ｐゴシック" pitchFamily="-108" charset="-128"/>
+              </a:rPr>
+              <a:t> w/o Limiters</a:t>
+            </a:r>
+          </a:p>
+          <a:p>
+            <a:pPr lvl="1"/>
+            <a:r>
+              <a:rPr lang="en-US" dirty="0"/>
+              <a:t>Conservative 2</a:t>
+            </a:r>
+            <a:r>
+              <a:rPr lang="en-US" baseline="30000" dirty="0"/>
+              <a:t>nd</a:t>
+            </a:r>
+            <a:r>
+              <a:rPr lang="en-US" dirty="0"/>
+              <a:t> order scheme</a:t>
+            </a:r>
+          </a:p>
+          <a:p>
+            <a:pPr lvl="1"/>
+            <a:r>
+              <a:rPr lang="en-US" dirty="0"/>
+              <a:t>Approximate solution has oscillations around sharp gradients</a:t>
+            </a:r>
+          </a:p>
+          <a:p>
+            <a:pPr lvl="1"/>
+            <a:endParaRPr lang="en-US" dirty="0"/>
+          </a:p>
+        </p:txBody>
+      </p:sp>
+      <p:sp>
+        <p:nvSpPr>
+          <p:cNvPr id="20484" name="Slide Number Placeholder 3"/>
           <p:cNvSpPr>
             <a:spLocks noGrp="1"/>
           </p:cNvSpPr>
@@ -8723,7 +9118,7 @@
               <a:rPr lang="en-US"/>
               <a:t>Slide </a:t>
             </a:r>
-            <a:fld id="{134DCAB5-275C-0B47-B0A7-7CF862727573}" type="slidenum">
+            <a:fld id="{D2F573F5-8635-F946-99FF-73D55A1DF9E7}" type="slidenum">
               <a:rPr lang="en-US"/>
               <a:pPr/>
               <a:t>6</a:t>
@@ -8734,43 +9129,13 @@
       </p:sp>
       <p:pic>
         <p:nvPicPr>
-          <p:cNvPr id="19461" name="Picture 59" descr="Statistics_Lax.png"/>
-          <p:cNvPicPr>
-            <a:picLocks noChangeAspect="1"/>
-          </p:cNvPicPr>
-          <p:nvPr/>
-        </p:nvPicPr>
-        <p:blipFill>
-          <a:blip r:embed="rId2"/>
-          <a:srcRect/>
-          <a:stretch>
-            <a:fillRect/>
-          </a:stretch>
-        </p:blipFill>
-        <p:spPr bwMode="auto">
-          <a:xfrm>
-            <a:off x="977900" y="2133600"/>
-            <a:ext cx="7023100" cy="1758950"/>
-          </a:xfrm>
-          <a:prstGeom prst="rect">
-            <a:avLst/>
-          </a:prstGeom>
-          <a:noFill/>
-          <a:ln w="9525">
-            <a:noFill/>
-            <a:miter lim="800000"/>
-            <a:headEnd/>
-            <a:tailEnd/>
-          </a:ln>
-        </p:spPr>
-      </p:pic>
-      <p:pic>
-        <p:nvPicPr>
-          <p:cNvPr id="19462" name="Picture 59" descr="Statistics_Lax.png"/>
-          <p:cNvPicPr>
-            <a:picLocks noChangeAspect="1"/>
-          </p:cNvPicPr>
-          <p:nvPr/>
+          <p:cNvPr id="20485" name="Picture 5" descr="/Users/Sean/Movies/Any Video Converter Ultimate/Common Used Video Formats/Lax_movie_noTVD.avi">
+            <a:hlinkClick r:id="" action="ppaction://media"/>
+          </p:cNvPr>
+          <p:cNvPicPr/>
+          <p:nvPr>
+            <a:videoFile r:link="rId1"/>
+          </p:nvPr>
         </p:nvPicPr>
         <p:blipFill>
           <a:blip r:embed="rId3"/>
@@ -8781,198 +9146,7 @@
         </p:blipFill>
         <p:spPr bwMode="auto">
           <a:xfrm>
-            <a:off x="1012825" y="4260850"/>
-            <a:ext cx="6978650" cy="1758950"/>
-          </a:xfrm>
-          <a:prstGeom prst="rect">
-            <a:avLst/>
-          </a:prstGeom>
-          <a:noFill/>
-          <a:ln w="9525">
-            <a:noFill/>
-            <a:miter lim="800000"/>
-            <a:headEnd/>
-            <a:tailEnd/>
-          </a:ln>
-        </p:spPr>
-      </p:pic>
-    </p:spTree>
-  </p:cSld>
-  <p:clrMapOvr>
-    <a:masterClrMapping/>
-  </p:clrMapOvr>
-  <p:timing>
-    <p:tnLst>
-      <p:par>
-        <p:cTn id="1" dur="indefinite" restart="never" nodeType="tmRoot"/>
-      </p:par>
-    </p:tnLst>
-  </p:timing>
-</p:sld>
-</file>
-
-<file path=ppt/slides/slide7.xml><?xml version="1.0" encoding="utf-8"?>
-<p:sld xmlns:a="http://schemas.openxmlformats.org/drawingml/2006/main" xmlns:r="http://schemas.openxmlformats.org/officeDocument/2006/relationships" xmlns:mc="http://schemas.openxmlformats.org/markup-compatibility/2006" xmlns:mv="urn:schemas-microsoft-com:mac:vml" xmlns:p="http://schemas.openxmlformats.org/presentationml/2006/main" mc:Ignorable="mv" mc:PreserveAttributes="mv:*">
-  <p:cSld>
-    <p:spTree>
-      <p:nvGrpSpPr>
-        <p:cNvPr id="1" name=""/>
-        <p:cNvGrpSpPr/>
-        <p:nvPr/>
-      </p:nvGrpSpPr>
-      <p:grpSpPr>
-        <a:xfrm>
-          <a:off x="0" y="0"/>
-          <a:ext cx="0" cy="0"/>
-          <a:chOff x="0" y="0"/>
-          <a:chExt cx="0" cy="0"/>
-        </a:xfrm>
-      </p:grpSpPr>
-      <p:sp>
-        <p:nvSpPr>
-          <p:cNvPr id="20482" name="Title 1"/>
-          <p:cNvSpPr>
-            <a:spLocks noGrp="1"/>
-          </p:cNvSpPr>
-          <p:nvPr>
-            <p:ph type="title"/>
-          </p:nvPr>
-        </p:nvSpPr>
-        <p:spPr/>
-        <p:txBody>
-          <a:bodyPr>
-            <a:normAutofit fontScale="90000"/>
-          </a:bodyPr>
-          <a:lstStyle/>
-          <a:p>
-            <a:r>
-              <a:rPr lang="en-US">
-                <a:ea typeface="ＭＳ Ｐゴシック" pitchFamily="-108" charset="-128"/>
-              </a:rPr>
-              <a:t>Descriptions of methods reviewed</a:t>
-            </a:r>
-          </a:p>
-        </p:txBody>
-      </p:sp>
-      <p:sp>
-        <p:nvSpPr>
-          <p:cNvPr id="20483" name="Content Placeholder 2"/>
-          <p:cNvSpPr>
-            <a:spLocks noGrp="1"/>
-          </p:cNvSpPr>
-          <p:nvPr>
-            <p:ph idx="1"/>
-          </p:nvPr>
-        </p:nvSpPr>
-        <p:spPr>
-          <a:xfrm>
-            <a:off x="1435608" y="1447800"/>
-            <a:ext cx="7498080" cy="1600200"/>
-          </a:xfrm>
-        </p:spPr>
-        <p:txBody>
-          <a:bodyPr>
-            <a:normAutofit fontScale="92500" lnSpcReduction="20000"/>
-          </a:bodyPr>
-          <a:lstStyle/>
-          <a:p>
-            <a:r>
-              <a:rPr lang="en-US" dirty="0">
-                <a:ea typeface="ＭＳ Ｐゴシック" pitchFamily="-108" charset="-128"/>
-              </a:rPr>
-              <a:t>Lax-</a:t>
-            </a:r>
-            <a:r>
-              <a:rPr lang="en-US" dirty="0" err="1">
-                <a:ea typeface="ＭＳ Ｐゴシック" pitchFamily="-108" charset="-128"/>
-              </a:rPr>
-              <a:t>Wendroff</a:t>
-            </a:r>
-            <a:r>
-              <a:rPr lang="en-US" dirty="0">
-                <a:ea typeface="ＭＳ Ｐゴシック" pitchFamily="-108" charset="-128"/>
-              </a:rPr>
-              <a:t> w/o Limiters</a:t>
-            </a:r>
-          </a:p>
-          <a:p>
-            <a:pPr lvl="1"/>
-            <a:r>
-              <a:rPr lang="en-US" dirty="0"/>
-              <a:t>Conservative 2</a:t>
-            </a:r>
-            <a:r>
-              <a:rPr lang="en-US" baseline="30000" dirty="0"/>
-              <a:t>nd</a:t>
-            </a:r>
-            <a:r>
-              <a:rPr lang="en-US" dirty="0"/>
-              <a:t> order scheme</a:t>
-            </a:r>
-          </a:p>
-          <a:p>
-            <a:pPr lvl="1"/>
-            <a:r>
-              <a:rPr lang="en-US" dirty="0"/>
-              <a:t>Approximate solution has oscillations around sharp gradients</a:t>
-            </a:r>
-          </a:p>
-          <a:p>
-            <a:pPr lvl="1"/>
-            <a:endParaRPr lang="en-US" dirty="0"/>
-          </a:p>
-        </p:txBody>
-      </p:sp>
-      <p:sp>
-        <p:nvSpPr>
-          <p:cNvPr id="20484" name="Slide Number Placeholder 3"/>
-          <p:cNvSpPr>
-            <a:spLocks noGrp="1"/>
-          </p:cNvSpPr>
-          <p:nvPr>
-            <p:ph type="sldNum" sz="quarter" idx="12"/>
-          </p:nvPr>
-        </p:nvSpPr>
-        <p:spPr>
-          <a:noFill/>
-        </p:spPr>
-        <p:txBody>
-          <a:bodyPr/>
-          <a:lstStyle/>
-          <a:p>
-            <a:r>
-              <a:rPr lang="en-US"/>
-              <a:t>Slide </a:t>
-            </a:r>
-            <a:fld id="{D2F573F5-8635-F946-99FF-73D55A1DF9E7}" type="slidenum">
-              <a:rPr lang="en-US"/>
-              <a:pPr/>
-              <a:t>7</a:t>
-            </a:fld>
-            <a:endParaRPr lang="en-US"/>
-          </a:p>
-        </p:txBody>
-      </p:sp>
-      <p:pic>
-        <p:nvPicPr>
-          <p:cNvPr id="20485" name="Picture 5" descr="/Users/Sean/Movies/Any Video Converter Ultimate/Common Used Video Formats/Lax_movie_noTVD.avi">
-            <a:hlinkClick r:id="" action="ppaction://media"/>
-          </p:cNvPr>
-          <p:cNvPicPr/>
-          <p:nvPr>
-            <a:videoFile r:link="rId1"/>
-          </p:nvPr>
-        </p:nvPicPr>
-        <p:blipFill>
-          <a:blip r:embed="rId3"/>
-          <a:srcRect/>
-          <a:stretch>
-            <a:fillRect/>
-          </a:stretch>
-        </p:blipFill>
-        <p:spPr bwMode="auto">
-          <a:xfrm>
-            <a:off x="2540000" y="3048000"/>
+            <a:off x="2895600" y="3352800"/>
             <a:ext cx="4064000" cy="3048000"/>
           </a:xfrm>
           <a:prstGeom prst="rect">
@@ -9145,6 +9319,205 @@
 </p:sld>
 </file>
 
+<file path=ppt/slides/slide7.xml><?xml version="1.0" encoding="utf-8"?>
+<p:sld xmlns:a="http://schemas.openxmlformats.org/drawingml/2006/main" xmlns:r="http://schemas.openxmlformats.org/officeDocument/2006/relationships" xmlns:mc="http://schemas.openxmlformats.org/markup-compatibility/2006" xmlns:mv="urn:schemas-microsoft-com:mac:vml" xmlns:p="http://schemas.openxmlformats.org/presentationml/2006/main" mc:Ignorable="mv" mc:PreserveAttributes="mv:*">
+  <p:cSld>
+    <p:spTree>
+      <p:nvGrpSpPr>
+        <p:cNvPr id="1" name=""/>
+        <p:cNvGrpSpPr/>
+        <p:nvPr/>
+      </p:nvGrpSpPr>
+      <p:grpSpPr>
+        <a:xfrm>
+          <a:off x="0" y="0"/>
+          <a:ext cx="0" cy="0"/>
+          <a:chOff x="0" y="0"/>
+          <a:chExt cx="0" cy="0"/>
+        </a:xfrm>
+      </p:grpSpPr>
+      <p:pic>
+        <p:nvPicPr>
+          <p:cNvPr id="5" name="Picture 4" descr="Overshoot.png"/>
+          <p:cNvPicPr>
+            <a:picLocks noChangeAspect="1"/>
+          </p:cNvPicPr>
+          <p:nvPr/>
+        </p:nvPicPr>
+        <p:blipFill>
+          <a:blip r:embed="rId2"/>
+          <a:srcRect b="16394"/>
+          <a:stretch>
+            <a:fillRect/>
+          </a:stretch>
+        </p:blipFill>
+        <p:spPr>
+          <a:xfrm>
+            <a:off x="2057400" y="2667000"/>
+            <a:ext cx="2895600" cy="3023550"/>
+          </a:xfrm>
+          <a:prstGeom prst="rect">
+            <a:avLst/>
+          </a:prstGeom>
+        </p:spPr>
+      </p:pic>
+      <p:sp>
+        <p:nvSpPr>
+          <p:cNvPr id="2" name="Title 1"/>
+          <p:cNvSpPr>
+            <a:spLocks noGrp="1"/>
+          </p:cNvSpPr>
+          <p:nvPr>
+            <p:ph type="title"/>
+          </p:nvPr>
+        </p:nvSpPr>
+        <p:spPr/>
+        <p:txBody>
+          <a:bodyPr/>
+          <a:lstStyle/>
+          <a:p>
+            <a:r>
+              <a:rPr lang="en-US" dirty="0" smtClean="0"/>
+              <a:t>Limiters</a:t>
+            </a:r>
+            <a:endParaRPr lang="en-US" dirty="0"/>
+          </a:p>
+        </p:txBody>
+      </p:sp>
+      <p:sp>
+        <p:nvSpPr>
+          <p:cNvPr id="3" name="Content Placeholder 2"/>
+          <p:cNvSpPr>
+            <a:spLocks noGrp="1"/>
+          </p:cNvSpPr>
+          <p:nvPr>
+            <p:ph idx="1"/>
+          </p:nvPr>
+        </p:nvSpPr>
+        <p:spPr>
+          <a:xfrm>
+            <a:off x="1435608" y="1219200"/>
+            <a:ext cx="7498080" cy="5029200"/>
+          </a:xfrm>
+        </p:spPr>
+        <p:txBody>
+          <a:bodyPr>
+            <a:normAutofit/>
+          </a:bodyPr>
+          <a:lstStyle/>
+          <a:p>
+            <a:r>
+              <a:rPr lang="en-US" dirty="0" smtClean="0"/>
+              <a:t>Godunov’s Theorem – Any linear scheme above first order accurate (space) cannot be Total Variation Diminishing (TVD).</a:t>
+            </a:r>
+          </a:p>
+          <a:p>
+            <a:endParaRPr lang="en-US" dirty="0" smtClean="0"/>
+          </a:p>
+          <a:p>
+            <a:endParaRPr lang="en-US" dirty="0" smtClean="0"/>
+          </a:p>
+          <a:p>
+            <a:endParaRPr lang="en-US" dirty="0" smtClean="0"/>
+          </a:p>
+          <a:p>
+            <a:endParaRPr lang="en-US" dirty="0" smtClean="0"/>
+          </a:p>
+          <a:p>
+            <a:endParaRPr lang="en-US" dirty="0" smtClean="0"/>
+          </a:p>
+          <a:p>
+            <a:r>
+              <a:rPr lang="en-US" dirty="0" smtClean="0"/>
+              <a:t>Solution: Limiters (a nonlinear scheme)</a:t>
+            </a:r>
+          </a:p>
+          <a:p>
+            <a:endParaRPr lang="en-US" dirty="0" smtClean="0"/>
+          </a:p>
+        </p:txBody>
+      </p:sp>
+      <p:sp>
+        <p:nvSpPr>
+          <p:cNvPr id="6" name="TextBox 5"/>
+          <p:cNvSpPr txBox="1"/>
+          <p:nvPr/>
+        </p:nvSpPr>
+        <p:spPr>
+          <a:xfrm>
+            <a:off x="5334000" y="3352800"/>
+            <a:ext cx="2514600" cy="646331"/>
+          </a:xfrm>
+          <a:prstGeom prst="rect">
+            <a:avLst/>
+          </a:prstGeom>
+          <a:noFill/>
+          <a:ln w="6350" cap="flat" cmpd="sng" algn="ctr">
+            <a:solidFill>
+              <a:schemeClr val="tx1"/>
+            </a:solidFill>
+            <a:prstDash val="solid"/>
+            <a:round/>
+            <a:headEnd type="none" w="med" len="med"/>
+            <a:tailEnd type="none" w="med" len="med"/>
+          </a:ln>
+        </p:spPr>
+        <p:txBody>
+          <a:bodyPr wrap="square" rtlCol="0">
+            <a:spAutoFit/>
+          </a:bodyPr>
+          <a:lstStyle/>
+          <a:p>
+            <a:r>
+              <a:rPr lang="en-US" strike="sngStrike" dirty="0" smtClean="0">
+                <a:solidFill>
+                  <a:srgbClr val="FF0000"/>
+                </a:solidFill>
+              </a:rPr>
+              <a:t>     </a:t>
+            </a:r>
+            <a:r>
+              <a:rPr lang="en-US" dirty="0" smtClean="0">
+                <a:solidFill>
+                  <a:srgbClr val="FF0000"/>
+                </a:solidFill>
+              </a:rPr>
+              <a:t> Exact Solution</a:t>
+            </a:r>
+          </a:p>
+          <a:p>
+            <a:r>
+              <a:rPr lang="en-US" strike="sngStrike" dirty="0" smtClean="0">
+                <a:solidFill>
+                  <a:srgbClr val="3366FF"/>
+                </a:solidFill>
+              </a:rPr>
+              <a:t>     </a:t>
+            </a:r>
+            <a:r>
+              <a:rPr lang="en-US" dirty="0" smtClean="0">
+                <a:solidFill>
+                  <a:srgbClr val="3366FF"/>
+                </a:solidFill>
+              </a:rPr>
+              <a:t> Non-TVD Solution</a:t>
+            </a:r>
+            <a:endParaRPr lang="en-US" dirty="0">
+              <a:solidFill>
+                <a:srgbClr val="3366FF"/>
+              </a:solidFill>
+            </a:endParaRPr>
+          </a:p>
+        </p:txBody>
+      </p:sp>
+    </p:spTree>
+  </p:cSld>
+  <p:clrMapOvr>
+    <a:masterClrMapping/>
+  </p:clrMapOvr>
+</p:sld>
+</file>
+
 <file path=ppt/slides/slide8.xml><?xml version="1.0" encoding="utf-8"?>
 <p:sld xmlns:a="http://schemas.openxmlformats.org/drawingml/2006/main" xmlns:r="http://schemas.openxmlformats.org/officeDocument/2006/relationships" xmlns:mc="http://schemas.openxmlformats.org/markup-compatibility/2006" xmlns:mv="urn:schemas-microsoft-com:mac:vml" xmlns:p="http://schemas.openxmlformats.org/presentationml/2006/main" mc:Ignorable="mv" mc:PreserveAttributes="mv:*">
   <p:cSld>
@@ -9322,7 +9695,7 @@
         </p:blipFill>
         <p:spPr bwMode="auto">
           <a:xfrm>
-            <a:off x="2540000" y="3048000"/>
+            <a:off x="2895600" y="3352800"/>
             <a:ext cx="4064000" cy="3048000"/>
           </a:xfrm>
           <a:prstGeom prst="rect">
@@ -9623,7 +9996,7 @@
         </p:blipFill>
         <p:spPr bwMode="auto">
           <a:xfrm>
-            <a:off x="2540000" y="3048000"/>
+            <a:off x="2895600" y="3352800"/>
             <a:ext cx="4064000" cy="3048000"/>
           </a:xfrm>
           <a:prstGeom prst="rect">

</xml_diff>

<commit_message>
Converted the videos and changed the pptx
</commit_message>
<xml_diff>
--- a/Final Research Presentation/Final_LongPres_Davis_Matern.pptx
+++ b/Final Research Presentation/Final_LongPres_Davis_Matern.pptx
@@ -5,32 +5,31 @@
     <p:sldMasterId id="2147483660" r:id="rId1"/>
   </p:sldMasterIdLst>
   <p:notesMasterIdLst>
-    <p:notesMasterId r:id="rId25"/>
+    <p:notesMasterId r:id="rId24"/>
   </p:notesMasterIdLst>
   <p:sldIdLst>
     <p:sldId id="278" r:id="rId2"/>
     <p:sldId id="279" r:id="rId3"/>
     <p:sldId id="258" r:id="rId4"/>
     <p:sldId id="259" r:id="rId5"/>
-    <p:sldId id="260" r:id="rId6"/>
-    <p:sldId id="262" r:id="rId7"/>
-    <p:sldId id="283" r:id="rId8"/>
-    <p:sldId id="263" r:id="rId9"/>
-    <p:sldId id="264" r:id="rId10"/>
-    <p:sldId id="282" r:id="rId11"/>
-    <p:sldId id="265" r:id="rId12"/>
-    <p:sldId id="266" r:id="rId13"/>
-    <p:sldId id="280" r:id="rId14"/>
-    <p:sldId id="268" r:id="rId15"/>
-    <p:sldId id="269" r:id="rId16"/>
-    <p:sldId id="270" r:id="rId17"/>
-    <p:sldId id="271" r:id="rId18"/>
-    <p:sldId id="272" r:id="rId19"/>
-    <p:sldId id="273" r:id="rId20"/>
-    <p:sldId id="281" r:id="rId21"/>
-    <p:sldId id="275" r:id="rId22"/>
-    <p:sldId id="276" r:id="rId23"/>
-    <p:sldId id="277" r:id="rId24"/>
+    <p:sldId id="262" r:id="rId6"/>
+    <p:sldId id="283" r:id="rId7"/>
+    <p:sldId id="263" r:id="rId8"/>
+    <p:sldId id="264" r:id="rId9"/>
+    <p:sldId id="282" r:id="rId10"/>
+    <p:sldId id="265" r:id="rId11"/>
+    <p:sldId id="266" r:id="rId12"/>
+    <p:sldId id="280" r:id="rId13"/>
+    <p:sldId id="268" r:id="rId14"/>
+    <p:sldId id="269" r:id="rId15"/>
+    <p:sldId id="270" r:id="rId16"/>
+    <p:sldId id="271" r:id="rId17"/>
+    <p:sldId id="272" r:id="rId18"/>
+    <p:sldId id="273" r:id="rId19"/>
+    <p:sldId id="281" r:id="rId20"/>
+    <p:sldId id="275" r:id="rId21"/>
+    <p:sldId id="276" r:id="rId22"/>
+    <p:sldId id="277" r:id="rId23"/>
   </p:sldIdLst>
   <p:sldSz cx="9144000" cy="6858000" type="screen4x3"/>
   <p:notesSz cx="6858000" cy="9144000"/>
@@ -653,7 +652,7 @@
               <a:pPr>
                 <a:defRPr/>
               </a:pPr>
-              <a:t>13</a:t>
+              <a:t>12</a:t>
             </a:fld>
             <a:endParaRPr lang="en-US"/>
           </a:p>
@@ -743,7 +742,7 @@
             <a:fld id="{0A180F3D-82C6-1B48-9FBF-2DBFC87DC5F9}" type="slidenum">
               <a:rPr lang="en-US" smtClean="0"/>
               <a:pPr/>
-              <a:t>20</a:t>
+              <a:t>19</a:t>
             </a:fld>
             <a:endParaRPr lang="en-US"/>
           </a:p>
@@ -4861,235 +4860,6 @@
       </p:grpSpPr>
       <p:sp>
         <p:nvSpPr>
-          <p:cNvPr id="24578" name="Title 1"/>
-          <p:cNvSpPr>
-            <a:spLocks noGrp="1"/>
-          </p:cNvSpPr>
-          <p:nvPr>
-            <p:ph type="title"/>
-          </p:nvPr>
-        </p:nvSpPr>
-        <p:spPr/>
-        <p:txBody>
-          <a:bodyPr>
-            <a:normAutofit fontScale="90000"/>
-          </a:bodyPr>
-          <a:lstStyle/>
-          <a:p>
-            <a:r>
-              <a:rPr lang="en-US">
-                <a:ea typeface="ＭＳ Ｐゴシック" pitchFamily="-108" charset="-128"/>
-              </a:rPr>
-              <a:t>Theory of the Streamline Upwind Petrov-Galerkin (SUPG)</a:t>
-            </a:r>
-          </a:p>
-        </p:txBody>
-      </p:sp>
-      <p:sp>
-        <p:nvSpPr>
-          <p:cNvPr id="24579" name="Content Placeholder 2"/>
-          <p:cNvSpPr>
-            <a:spLocks noGrp="1"/>
-          </p:cNvSpPr>
-          <p:nvPr>
-            <p:ph idx="1"/>
-          </p:nvPr>
-        </p:nvSpPr>
-        <p:spPr/>
-        <p:txBody>
-          <a:bodyPr>
-            <a:normAutofit fontScale="77500" lnSpcReduction="20000"/>
-          </a:bodyPr>
-          <a:lstStyle/>
-          <a:p>
-            <a:r>
-              <a:rPr lang="en-US" u="sng">
-                <a:ea typeface="ＭＳ Ｐゴシック" pitchFamily="-108" charset="-128"/>
-              </a:rPr>
-              <a:t>Trial functions </a:t>
-            </a:r>
-            <a:r>
-              <a:rPr lang="en-US">
-                <a:ea typeface="ＭＳ Ｐゴシック" pitchFamily="-108" charset="-128"/>
-              </a:rPr>
-              <a:t>– a set of functions assumed to approximate the underlying solution. The trial functions have degrees of freedom that must be solved for.</a:t>
-            </a:r>
-          </a:p>
-          <a:p>
-            <a:r>
-              <a:rPr lang="en-US" u="sng">
-                <a:ea typeface="ＭＳ Ｐゴシック" pitchFamily="-108" charset="-128"/>
-              </a:rPr>
-              <a:t>Test functions </a:t>
-            </a:r>
-            <a:r>
-              <a:rPr lang="en-US">
-                <a:ea typeface="ＭＳ Ｐゴシック" pitchFamily="-108" charset="-128"/>
-              </a:rPr>
-              <a:t>– a set of functions used to solve for the degrees of freedom of the trial functions.  Uses the weak formulation of the governing equation.</a:t>
-            </a:r>
-          </a:p>
-          <a:p>
-            <a:r>
-              <a:rPr lang="en-US" u="sng">
-                <a:ea typeface="ＭＳ Ｐゴシック" pitchFamily="-108" charset="-128"/>
-              </a:rPr>
-              <a:t>Petrov-Galerkin</a:t>
-            </a:r>
-            <a:r>
-              <a:rPr lang="en-US">
-                <a:ea typeface="ＭＳ Ｐゴシック" pitchFamily="-108" charset="-128"/>
-              </a:rPr>
-              <a:t> – Test functions </a:t>
-            </a:r>
-            <a:r>
-              <a:rPr lang="en-US">
-                <a:ea typeface="Arial" pitchFamily="-108" charset="0"/>
-                <a:cs typeface="Arial" pitchFamily="-108" charset="0"/>
-              </a:rPr>
-              <a:t>≠ Trial functions</a:t>
-            </a:r>
-            <a:r>
-              <a:rPr lang="en-US">
-                <a:ea typeface="ＭＳ Ｐゴシック" pitchFamily="-108" charset="-128"/>
-              </a:rPr>
-              <a:t> </a:t>
-            </a:r>
-          </a:p>
-          <a:p>
-            <a:r>
-              <a:rPr lang="en-US" u="sng">
-                <a:ea typeface="ＭＳ Ｐゴシック" pitchFamily="-108" charset="-128"/>
-              </a:rPr>
-              <a:t>SUPG</a:t>
-            </a:r>
-            <a:r>
-              <a:rPr lang="en-US">
-                <a:ea typeface="ＭＳ Ｐゴシック" pitchFamily="-108" charset="-128"/>
-              </a:rPr>
-              <a:t> – Choose test functions to be:</a:t>
-            </a:r>
-          </a:p>
-          <a:p>
-            <a:endParaRPr lang="en-US">
-              <a:ea typeface="ＭＳ Ｐゴシック" pitchFamily="-108" charset="-128"/>
-            </a:endParaRPr>
-          </a:p>
-          <a:p>
-            <a:pPr>
-              <a:buFont typeface="Wingdings" pitchFamily="-108" charset="2"/>
-              <a:buNone/>
-            </a:pPr>
-            <a:r>
-              <a:rPr lang="en-US">
-                <a:ea typeface="ＭＳ Ｐゴシック" pitchFamily="-108" charset="-128"/>
-              </a:rPr>
-              <a:t>	</a:t>
-            </a:r>
-          </a:p>
-          <a:p>
-            <a:pPr>
-              <a:buFont typeface="Wingdings" pitchFamily="-108" charset="2"/>
-              <a:buNone/>
-            </a:pPr>
-            <a:r>
-              <a:rPr lang="en-US">
-                <a:ea typeface="ＭＳ Ｐゴシック" pitchFamily="-108" charset="-128"/>
-              </a:rPr>
-              <a:t>				where N is a trial function</a:t>
-            </a:r>
-          </a:p>
-        </p:txBody>
-      </p:sp>
-      <p:sp>
-        <p:nvSpPr>
-          <p:cNvPr id="24580" name="Slide Number Placeholder 3"/>
-          <p:cNvSpPr>
-            <a:spLocks noGrp="1"/>
-          </p:cNvSpPr>
-          <p:nvPr>
-            <p:ph type="sldNum" sz="quarter" idx="12"/>
-          </p:nvPr>
-        </p:nvSpPr>
-        <p:spPr>
-          <a:noFill/>
-        </p:spPr>
-        <p:txBody>
-          <a:bodyPr/>
-          <a:lstStyle/>
-          <a:p>
-            <a:r>
-              <a:rPr lang="en-US"/>
-              <a:t>Slide </a:t>
-            </a:r>
-            <a:fld id="{9C0C6800-C07A-B840-9F81-62616F777194}" type="slidenum">
-              <a:rPr lang="en-US"/>
-              <a:pPr/>
-              <a:t>10</a:t>
-            </a:fld>
-            <a:endParaRPr lang="en-US"/>
-          </a:p>
-        </p:txBody>
-      </p:sp>
-      <p:pic>
-        <p:nvPicPr>
-          <p:cNvPr id="24581" name="Picture 47"/>
-          <p:cNvPicPr>
-            <a:picLocks noChangeAspect="1" noChangeArrowheads="1"/>
-          </p:cNvPicPr>
-          <p:nvPr/>
-        </p:nvPicPr>
-        <p:blipFill>
-          <a:blip r:embed="rId2"/>
-          <a:srcRect/>
-          <a:stretch>
-            <a:fillRect/>
-          </a:stretch>
-        </p:blipFill>
-        <p:spPr bwMode="auto">
-          <a:xfrm>
-            <a:off x="2743200" y="4191000"/>
-            <a:ext cx="3960813" cy="919163"/>
-          </a:xfrm>
-          <a:prstGeom prst="rect">
-            <a:avLst/>
-          </a:prstGeom>
-          <a:noFill/>
-          <a:ln w="9525">
-            <a:noFill/>
-            <a:miter lim="800000"/>
-            <a:headEnd/>
-            <a:tailEnd/>
-          </a:ln>
-        </p:spPr>
-      </p:pic>
-    </p:spTree>
-  </p:cSld>
-  <p:clrMapOvr>
-    <a:masterClrMapping/>
-  </p:clrMapOvr>
-</p:sld>
-</file>
-
-<file path=ppt/slides/slide11.xml><?xml version="1.0" encoding="utf-8"?>
-<p:sld xmlns:a="http://schemas.openxmlformats.org/drawingml/2006/main" xmlns:r="http://schemas.openxmlformats.org/officeDocument/2006/relationships" xmlns:mc="http://schemas.openxmlformats.org/markup-compatibility/2006" xmlns:mv="urn:schemas-microsoft-com:mac:vml" xmlns:p="http://schemas.openxmlformats.org/presentationml/2006/main" mc:Ignorable="mv" mc:PreserveAttributes="mv:*">
-  <p:cSld>
-    <p:spTree>
-      <p:nvGrpSpPr>
-        <p:cNvPr id="1" name=""/>
-        <p:cNvGrpSpPr/>
-        <p:nvPr/>
-      </p:nvGrpSpPr>
-      <p:grpSpPr>
-        <a:xfrm>
-          <a:off x="0" y="0"/>
-          <a:ext cx="0" cy="0"/>
-          <a:chOff x="0" y="0"/>
-          <a:chExt cx="0" cy="0"/>
-        </a:xfrm>
-      </p:grpSpPr>
-      <p:sp>
-        <p:nvSpPr>
           <p:cNvPr id="23554" name="Title 1"/>
           <p:cNvSpPr>
             <a:spLocks noGrp="1"/>
@@ -5249,7 +5019,7 @@
             <a:fld id="{450779B1-243C-204F-A46C-531D5C821050}" type="slidenum">
               <a:rPr lang="en-US"/>
               <a:pPr/>
-              <a:t>11</a:t>
+              <a:t>10</a:t>
             </a:fld>
             <a:endParaRPr lang="en-US"/>
           </a:p>
@@ -5447,7 +5217,7 @@
 </p:sld>
 </file>
 
-<file path=ppt/slides/slide12.xml><?xml version="1.0" encoding="utf-8"?>
+<file path=ppt/slides/slide11.xml><?xml version="1.0" encoding="utf-8"?>
 <p:sld xmlns:a="http://schemas.openxmlformats.org/drawingml/2006/main" xmlns:r="http://schemas.openxmlformats.org/officeDocument/2006/relationships" xmlns:mc="http://schemas.openxmlformats.org/markup-compatibility/2006" xmlns:mv="urn:schemas-microsoft-com:mac:vml" xmlns:p="http://schemas.openxmlformats.org/presentationml/2006/main" mc:Ignorable="mv" mc:PreserveAttributes="mv:*">
   <p:cSld>
     <p:spTree>
@@ -5630,7 +5400,7 @@
             <a:fld id="{9C0C6800-C07A-B840-9F81-62616F777194}" type="slidenum">
               <a:rPr lang="en-US"/>
               <a:pPr/>
-              <a:t>12</a:t>
+              <a:t>11</a:t>
             </a:fld>
             <a:endParaRPr lang="en-US"/>
           </a:p>
@@ -5676,7 +5446,7 @@
 </p:sld>
 </file>
 
-<file path=ppt/slides/slide13.xml><?xml version="1.0" encoding="utf-8"?>
+<file path=ppt/slides/slide12.xml><?xml version="1.0" encoding="utf-8"?>
 <p:sld xmlns:a="http://schemas.openxmlformats.org/drawingml/2006/main" xmlns:r="http://schemas.openxmlformats.org/officeDocument/2006/relationships" xmlns:mc="http://schemas.openxmlformats.org/markup-compatibility/2006" xmlns:mv="urn:schemas-microsoft-com:mac:vml" xmlns:p="http://schemas.openxmlformats.org/presentationml/2006/main" mc:Ignorable="mv" mc:PreserveAttributes="mv:*">
   <p:cSld>
     <p:spTree>
@@ -5848,7 +5618,7 @@
             <a:fld id="{2E8154CE-D821-A54C-9083-D8860CAA5A2D}" type="slidenum">
               <a:rPr lang="en-US"/>
               <a:pPr/>
-              <a:t>13</a:t>
+              <a:t>12</a:t>
             </a:fld>
             <a:endParaRPr lang="en-US"/>
           </a:p>
@@ -6051,6 +5821,199 @@
               <a:rPr lang="en-US" sz="1900" dirty="0"/>
               <a:t>SUPG:</a:t>
             </a:r>
+          </a:p>
+        </p:txBody>
+      </p:sp>
+    </p:spTree>
+  </p:cSld>
+  <p:clrMapOvr>
+    <a:masterClrMapping/>
+  </p:clrMapOvr>
+  <p:timing>
+    <p:tnLst>
+      <p:par>
+        <p:cTn id="1" dur="indefinite" restart="never" nodeType="tmRoot"/>
+      </p:par>
+    </p:tnLst>
+  </p:timing>
+</p:sld>
+</file>
+
+<file path=ppt/slides/slide13.xml><?xml version="1.0" encoding="utf-8"?>
+<p:sld xmlns:a="http://schemas.openxmlformats.org/drawingml/2006/main" xmlns:r="http://schemas.openxmlformats.org/officeDocument/2006/relationships" xmlns:mc="http://schemas.openxmlformats.org/markup-compatibility/2006" xmlns:mv="urn:schemas-microsoft-com:mac:vml" xmlns:p="http://schemas.openxmlformats.org/presentationml/2006/main" mc:Ignorable="mv" mc:PreserveAttributes="mv:*">
+  <p:cSld>
+    <p:spTree>
+      <p:nvGrpSpPr>
+        <p:cNvPr id="1" name=""/>
+        <p:cNvGrpSpPr/>
+        <p:nvPr/>
+      </p:nvGrpSpPr>
+      <p:grpSpPr>
+        <a:xfrm>
+          <a:off x="0" y="0"/>
+          <a:ext cx="0" cy="0"/>
+          <a:chOff x="0" y="0"/>
+          <a:chExt cx="0" cy="0"/>
+        </a:xfrm>
+      </p:grpSpPr>
+      <p:sp>
+        <p:nvSpPr>
+          <p:cNvPr id="26626" name="Title 1"/>
+          <p:cNvSpPr>
+            <a:spLocks noGrp="1"/>
+          </p:cNvSpPr>
+          <p:nvPr>
+            <p:ph type="title"/>
+          </p:nvPr>
+        </p:nvSpPr>
+        <p:spPr/>
+        <p:txBody>
+          <a:bodyPr>
+            <a:normAutofit fontScale="90000"/>
+          </a:bodyPr>
+          <a:lstStyle/>
+          <a:p>
+            <a:r>
+              <a:rPr lang="en-US">
+                <a:ea typeface="ＭＳ Ｐゴシック" pitchFamily="-108" charset="-128"/>
+              </a:rPr>
+              <a:t>2D Wave Advection Test Conclusions</a:t>
+            </a:r>
+          </a:p>
+        </p:txBody>
+      </p:sp>
+      <p:sp>
+        <p:nvSpPr>
+          <p:cNvPr id="26627" name="Content Placeholder 2"/>
+          <p:cNvSpPr>
+            <a:spLocks noGrp="1"/>
+          </p:cNvSpPr>
+          <p:nvPr>
+            <p:ph idx="1"/>
+          </p:nvPr>
+        </p:nvSpPr>
+        <p:spPr/>
+        <p:txBody>
+          <a:bodyPr>
+            <a:normAutofit fontScale="77500" lnSpcReduction="20000"/>
+          </a:bodyPr>
+          <a:lstStyle/>
+          <a:p>
+            <a:r>
+              <a:rPr lang="en-US" b="0">
+                <a:ea typeface="ＭＳ Ｐゴシック" pitchFamily="-108" charset="-128"/>
+              </a:rPr>
+              <a:t>Lax-Wendroff with slope limiters</a:t>
+            </a:r>
+          </a:p>
+          <a:p>
+            <a:pPr lvl="1"/>
+            <a:r>
+              <a:rPr lang="en-US"/>
+              <a:t>Effective for sharp discontinuities</a:t>
+            </a:r>
+          </a:p>
+          <a:p>
+            <a:pPr lvl="1"/>
+            <a:r>
+              <a:rPr lang="en-US"/>
+              <a:t>Overly dissipative for thin waves (cuts off the top of the triangular/gaussian waves)</a:t>
+            </a:r>
+          </a:p>
+          <a:p>
+            <a:pPr lvl="1"/>
+            <a:r>
+              <a:rPr lang="en-US"/>
+              <a:t>more dissipative than other methods</a:t>
+            </a:r>
+          </a:p>
+          <a:p>
+            <a:r>
+              <a:rPr lang="en-US" b="0">
+                <a:ea typeface="ＭＳ Ｐゴシック" pitchFamily="-108" charset="-128"/>
+              </a:rPr>
+              <a:t>MUSCL with ACM</a:t>
+            </a:r>
+          </a:p>
+          <a:p>
+            <a:pPr lvl="1"/>
+            <a:r>
+              <a:rPr lang="en-US"/>
+              <a:t>most effective for problems with discontinuities</a:t>
+            </a:r>
+          </a:p>
+          <a:p>
+            <a:pPr lvl="1"/>
+            <a:r>
+              <a:rPr lang="en-US"/>
+              <a:t>Unnaturally sharpens the solution</a:t>
+            </a:r>
+          </a:p>
+          <a:p>
+            <a:r>
+              <a:rPr lang="en-US" b="0">
+                <a:ea typeface="ＭＳ Ｐゴシック" pitchFamily="-108" charset="-128"/>
+              </a:rPr>
+              <a:t>SUPG</a:t>
+            </a:r>
+          </a:p>
+          <a:p>
+            <a:pPr lvl="1"/>
+            <a:r>
+              <a:rPr lang="en-US"/>
+              <a:t>Balances well between diffusion and discontinuity sharpness </a:t>
+            </a:r>
+          </a:p>
+          <a:p>
+            <a:pPr lvl="1"/>
+            <a:r>
+              <a:rPr lang="en-US"/>
+              <a:t>Doesn’t introduce unnatural sharpening</a:t>
+            </a:r>
+          </a:p>
+          <a:p>
+            <a:pPr lvl="1"/>
+            <a:r>
+              <a:rPr lang="en-US"/>
+              <a:t>Requires matrix operations</a:t>
+            </a:r>
+          </a:p>
+          <a:p>
+            <a:pPr lvl="1"/>
+            <a:r>
+              <a:rPr lang="en-US"/>
+              <a:t>Non-conservative</a:t>
+            </a:r>
+          </a:p>
+        </p:txBody>
+      </p:sp>
+      <p:sp>
+        <p:nvSpPr>
+          <p:cNvPr id="26628" name="Slide Number Placeholder 3"/>
+          <p:cNvSpPr>
+            <a:spLocks noGrp="1"/>
+          </p:cNvSpPr>
+          <p:nvPr>
+            <p:ph type="sldNum" sz="quarter" idx="12"/>
+          </p:nvPr>
+        </p:nvSpPr>
+        <p:spPr>
+          <a:noFill/>
+        </p:spPr>
+        <p:txBody>
+          <a:bodyPr/>
+          <a:lstStyle/>
+          <a:p>
+            <a:r>
+              <a:rPr lang="en-US"/>
+              <a:t>Slide </a:t>
+            </a:r>
+            <a:fld id="{E0B04660-0E7D-5547-AF9D-4047ABAD6874}" type="slidenum">
+              <a:rPr lang="en-US"/>
+              <a:pPr/>
+              <a:t>13</a:t>
+            </a:fld>
+            <a:endParaRPr lang="en-US"/>
           </a:p>
         </p:txBody>
       </p:sp>
@@ -6088,7 +6051,7 @@
       </p:grpSpPr>
       <p:sp>
         <p:nvSpPr>
-          <p:cNvPr id="26626" name="Title 1"/>
+          <p:cNvPr id="27650" name="Title 1"/>
           <p:cNvSpPr>
             <a:spLocks noGrp="1"/>
           </p:cNvSpPr>
@@ -6107,14 +6070,14 @@
               <a:rPr lang="en-US">
                 <a:ea typeface="ＭＳ Ｐゴシック" pitchFamily="-108" charset="-128"/>
               </a:rPr>
-              <a:t>2D Wave Advection Test Conclusions</a:t>
-            </a:r>
-          </a:p>
-        </p:txBody>
-      </p:sp>
-      <p:sp>
-        <p:nvSpPr>
-          <p:cNvPr id="26627" name="Content Placeholder 2"/>
+              <a:t>Derivation of Lax-Wendroff for advection equation</a:t>
+            </a:r>
+          </a:p>
+        </p:txBody>
+      </p:sp>
+      <p:sp>
+        <p:nvSpPr>
+          <p:cNvPr id="27651" name="Content Placeholder 2"/>
           <p:cNvSpPr>
             <a:spLocks noGrp="1"/>
           </p:cNvSpPr>
@@ -6125,101 +6088,93 @@
         <p:spPr/>
         <p:txBody>
           <a:bodyPr>
-            <a:normAutofit fontScale="77500" lnSpcReduction="20000"/>
+            <a:normAutofit fontScale="92500" lnSpcReduction="10000"/>
           </a:bodyPr>
           <a:lstStyle/>
           <a:p>
             <a:r>
-              <a:rPr lang="en-US" b="0">
+              <a:rPr lang="en-US">
                 <a:ea typeface="ＭＳ Ｐゴシック" pitchFamily="-108" charset="-128"/>
               </a:rPr>
-              <a:t>Lax-Wendroff with slope limiters</a:t>
-            </a:r>
-          </a:p>
-          <a:p>
-            <a:pPr lvl="1"/>
-            <a:r>
-              <a:rPr lang="en-US"/>
-              <a:t>Effective for sharp discontinuities</a:t>
-            </a:r>
-          </a:p>
-          <a:p>
-            <a:pPr lvl="1"/>
-            <a:r>
-              <a:rPr lang="en-US"/>
-              <a:t>Overly dissipative for thin waves (cuts off the top of the triangular/gaussian waves)</a:t>
-            </a:r>
-          </a:p>
-          <a:p>
-            <a:pPr lvl="1"/>
-            <a:r>
-              <a:rPr lang="en-US"/>
-              <a:t>more dissipative than other methods</a:t>
-            </a:r>
-          </a:p>
-          <a:p>
-            <a:r>
-              <a:rPr lang="en-US" b="0">
+              <a:t>Advection Equation:</a:t>
+            </a:r>
+          </a:p>
+          <a:p>
+            <a:endParaRPr lang="en-US">
+              <a:ea typeface="ＭＳ Ｐゴシック" pitchFamily="-108" charset="-128"/>
+            </a:endParaRPr>
+          </a:p>
+          <a:p>
+            <a:r>
+              <a:rPr lang="en-US">
                 <a:ea typeface="ＭＳ Ｐゴシック" pitchFamily="-108" charset="-128"/>
               </a:rPr>
-              <a:t>MUSCL with ACM</a:t>
-            </a:r>
-          </a:p>
-          <a:p>
-            <a:pPr lvl="1"/>
-            <a:r>
-              <a:rPr lang="en-US"/>
-              <a:t>most effective for problems with discontinuities</a:t>
-            </a:r>
-          </a:p>
-          <a:p>
-            <a:pPr lvl="1"/>
-            <a:r>
-              <a:rPr lang="en-US"/>
-              <a:t>Unnaturally sharpens the solution</a:t>
-            </a:r>
-          </a:p>
-          <a:p>
-            <a:r>
-              <a:rPr lang="en-US" b="0">
+              <a:t>Note that:</a:t>
+            </a:r>
+          </a:p>
+          <a:p>
+            <a:endParaRPr lang="en-US">
+              <a:ea typeface="ＭＳ Ｐゴシック" pitchFamily="-108" charset="-128"/>
+            </a:endParaRPr>
+          </a:p>
+          <a:p>
+            <a:r>
+              <a:rPr lang="en-US">
                 <a:ea typeface="ＭＳ Ｐゴシック" pitchFamily="-108" charset="-128"/>
               </a:rPr>
-              <a:t>SUPG</a:t>
-            </a:r>
-          </a:p>
-          <a:p>
-            <a:pPr lvl="1"/>
-            <a:r>
-              <a:rPr lang="en-US"/>
-              <a:t>Balances well between diffusion and discontinuity sharpness </a:t>
-            </a:r>
-          </a:p>
-          <a:p>
-            <a:pPr lvl="1"/>
-            <a:r>
-              <a:rPr lang="en-US"/>
-              <a:t>Doesn’t introduce unnatural sharpening</a:t>
-            </a:r>
-          </a:p>
-          <a:p>
-            <a:pPr lvl="1"/>
-            <a:r>
-              <a:rPr lang="en-US"/>
-              <a:t>Requires matrix operations</a:t>
-            </a:r>
-          </a:p>
-          <a:p>
-            <a:pPr lvl="1"/>
-            <a:r>
-              <a:rPr lang="en-US"/>
-              <a:t>Non-conservative</a:t>
-            </a:r>
-          </a:p>
-        </p:txBody>
-      </p:sp>
-      <p:sp>
-        <p:nvSpPr>
-          <p:cNvPr id="26628" name="Slide Number Placeholder 3"/>
+              <a:t>Replace the first two time derivatives with spatial derivatives</a:t>
+            </a:r>
+          </a:p>
+          <a:p>
+            <a:endParaRPr lang="en-US">
+              <a:ea typeface="ＭＳ Ｐゴシック" pitchFamily="-108" charset="-128"/>
+            </a:endParaRPr>
+          </a:p>
+          <a:p>
+            <a:endParaRPr lang="en-US">
+              <a:ea typeface="ＭＳ Ｐゴシック" pitchFamily="-108" charset="-128"/>
+            </a:endParaRPr>
+          </a:p>
+          <a:p>
+            <a:r>
+              <a:rPr lang="en-US">
+                <a:ea typeface="ＭＳ Ｐゴシック" pitchFamily="-108" charset="-128"/>
+              </a:rPr>
+              <a:t>Remove 3</a:t>
+            </a:r>
+            <a:r>
+              <a:rPr lang="en-US" baseline="30000">
+                <a:ea typeface="ＭＳ Ｐゴシック" pitchFamily="-108" charset="-128"/>
+              </a:rPr>
+              <a:t>rd</a:t>
+            </a:r>
+            <a:r>
+              <a:rPr lang="en-US">
+                <a:ea typeface="ＭＳ Ｐゴシック" pitchFamily="-108" charset="-128"/>
+              </a:rPr>
+              <a:t> order terms and above, and use central difference formulas:</a:t>
+            </a:r>
+          </a:p>
+          <a:p>
+            <a:endParaRPr lang="en-US">
+              <a:ea typeface="ＭＳ Ｐゴシック" pitchFamily="-108" charset="-128"/>
+            </a:endParaRPr>
+          </a:p>
+          <a:p>
+            <a:endParaRPr lang="en-US">
+              <a:ea typeface="ＭＳ Ｐゴシック" pitchFamily="-108" charset="-128"/>
+            </a:endParaRPr>
+          </a:p>
+          <a:p>
+            <a:endParaRPr lang="en-US">
+              <a:ea typeface="ＭＳ Ｐゴシック" pitchFamily="-108" charset="-128"/>
+            </a:endParaRPr>
+          </a:p>
+        </p:txBody>
+      </p:sp>
+      <p:sp>
+        <p:nvSpPr>
+          <p:cNvPr id="27652" name="Slide Number Placeholder 3"/>
           <p:cNvSpPr>
             <a:spLocks noGrp="1"/>
           </p:cNvSpPr>
@@ -6238,7 +6193,7 @@
               <a:rPr lang="en-US"/>
               <a:t>Slide </a:t>
             </a:r>
-            <a:fld id="{E0B04660-0E7D-5547-AF9D-4047ABAD6874}" type="slidenum">
+            <a:fld id="{7F840725-C1B0-BC4F-91C5-548B59C832A8}" type="slidenum">
               <a:rPr lang="en-US"/>
               <a:pPr/>
               <a:t>14</a:t>
@@ -6247,6 +6202,134 @@
           </a:p>
         </p:txBody>
       </p:sp>
+      <p:pic>
+        <p:nvPicPr>
+          <p:cNvPr id="27653" name="Picture 7"/>
+          <p:cNvPicPr>
+            <a:picLocks noChangeAspect="1" noChangeArrowheads="1"/>
+          </p:cNvPicPr>
+          <p:nvPr/>
+        </p:nvPicPr>
+        <p:blipFill>
+          <a:blip r:embed="rId2"/>
+          <a:srcRect/>
+          <a:stretch>
+            <a:fillRect/>
+          </a:stretch>
+        </p:blipFill>
+        <p:spPr bwMode="auto">
+          <a:xfrm>
+            <a:off x="3124200" y="2514600"/>
+            <a:ext cx="2686050" cy="523875"/>
+          </a:xfrm>
+          <a:prstGeom prst="rect">
+            <a:avLst/>
+          </a:prstGeom>
+          <a:noFill/>
+          <a:ln w="9525">
+            <a:noFill/>
+            <a:miter lim="800000"/>
+            <a:headEnd/>
+            <a:tailEnd/>
+          </a:ln>
+        </p:spPr>
+      </p:pic>
+      <p:pic>
+        <p:nvPicPr>
+          <p:cNvPr id="27654" name="Picture 10"/>
+          <p:cNvPicPr>
+            <a:picLocks noChangeAspect="1" noChangeArrowheads="1"/>
+          </p:cNvPicPr>
+          <p:nvPr/>
+        </p:nvPicPr>
+        <p:blipFill>
+          <a:blip r:embed="rId3"/>
+          <a:srcRect/>
+          <a:stretch>
+            <a:fillRect/>
+          </a:stretch>
+        </p:blipFill>
+        <p:spPr bwMode="auto">
+          <a:xfrm>
+            <a:off x="838200" y="4876800"/>
+            <a:ext cx="7696200" cy="785813"/>
+          </a:xfrm>
+          <a:prstGeom prst="rect">
+            <a:avLst/>
+          </a:prstGeom>
+          <a:noFill/>
+          <a:ln w="9525">
+            <a:noFill/>
+            <a:miter lim="800000"/>
+            <a:headEnd/>
+            <a:tailEnd/>
+          </a:ln>
+        </p:spPr>
+      </p:pic>
+      <p:pic>
+        <p:nvPicPr>
+          <p:cNvPr id="27655" name="Picture 11"/>
+          <p:cNvPicPr>
+            <a:picLocks noChangeAspect="1" noChangeArrowheads="1"/>
+          </p:cNvPicPr>
+          <p:nvPr/>
+        </p:nvPicPr>
+        <p:blipFill>
+          <a:blip r:embed="rId4"/>
+          <a:srcRect/>
+          <a:stretch>
+            <a:fillRect/>
+          </a:stretch>
+        </p:blipFill>
+        <p:spPr bwMode="auto">
+          <a:xfrm>
+            <a:off x="500063" y="3429000"/>
+            <a:ext cx="8143875" cy="714375"/>
+          </a:xfrm>
+          <a:prstGeom prst="rect">
+            <a:avLst/>
+          </a:prstGeom>
+          <a:noFill/>
+          <a:ln w="9525">
+            <a:noFill/>
+            <a:miter lim="800000"/>
+            <a:headEnd/>
+            <a:tailEnd/>
+          </a:ln>
+        </p:spPr>
+      </p:pic>
+      <p:pic>
+        <p:nvPicPr>
+          <p:cNvPr id="27656" name="Picture 12"/>
+          <p:cNvPicPr>
+            <a:picLocks noChangeAspect="1" noChangeArrowheads="1"/>
+          </p:cNvPicPr>
+          <p:nvPr/>
+        </p:nvPicPr>
+        <p:blipFill>
+          <a:blip r:embed="rId5"/>
+          <a:srcRect/>
+          <a:stretch>
+            <a:fillRect/>
+          </a:stretch>
+        </p:blipFill>
+        <p:spPr bwMode="auto">
+          <a:xfrm>
+            <a:off x="3581400" y="1828800"/>
+            <a:ext cx="1876425" cy="381000"/>
+          </a:xfrm>
+          <a:prstGeom prst="rect">
+            <a:avLst/>
+          </a:prstGeom>
+          <a:noFill/>
+          <a:ln w="9525">
+            <a:noFill/>
+            <a:miter lim="800000"/>
+            <a:headEnd/>
+            <a:tailEnd/>
+          </a:ln>
+        </p:spPr>
+      </p:pic>
     </p:spTree>
   </p:cSld>
   <p:clrMapOvr>
@@ -6281,7 +6364,7 @@
       </p:grpSpPr>
       <p:sp>
         <p:nvSpPr>
-          <p:cNvPr id="27650" name="Title 1"/>
+          <p:cNvPr id="28674" name="Title 1"/>
           <p:cNvSpPr>
             <a:spLocks noGrp="1"/>
           </p:cNvSpPr>
@@ -6291,23 +6374,21 @@
         </p:nvSpPr>
         <p:spPr/>
         <p:txBody>
-          <a:bodyPr>
-            <a:normAutofit fontScale="90000"/>
-          </a:bodyPr>
+          <a:bodyPr/>
           <a:lstStyle/>
           <a:p>
             <a:r>
               <a:rPr lang="en-US">
                 <a:ea typeface="ＭＳ Ｐゴシック" pitchFamily="-108" charset="-128"/>
               </a:rPr>
-              <a:t>Derivation of Lax-Wendroff for advection equation</a:t>
-            </a:r>
-          </a:p>
-        </p:txBody>
-      </p:sp>
-      <p:sp>
-        <p:nvSpPr>
-          <p:cNvPr id="27651" name="Content Placeholder 2"/>
+              <a:t>MPDATA - Derivation</a:t>
+            </a:r>
+          </a:p>
+        </p:txBody>
+      </p:sp>
+      <p:sp>
+        <p:nvSpPr>
+          <p:cNvPr id="28675" name="Content Placeholder 2"/>
           <p:cNvSpPr>
             <a:spLocks noGrp="1"/>
           </p:cNvSpPr>
@@ -6317,94 +6398,42 @@
         </p:nvSpPr>
         <p:spPr/>
         <p:txBody>
-          <a:bodyPr>
-            <a:normAutofit fontScale="92500" lnSpcReduction="10000"/>
-          </a:bodyPr>
+          <a:bodyPr/>
           <a:lstStyle/>
           <a:p>
             <a:r>
               <a:rPr lang="en-US">
                 <a:ea typeface="ＭＳ Ｐゴシック" pitchFamily="-108" charset="-128"/>
               </a:rPr>
-              <a:t>Advection Equation:</a:t>
-            </a:r>
-          </a:p>
-          <a:p>
-            <a:endParaRPr lang="en-US">
-              <a:ea typeface="ＭＳ Ｐゴシック" pitchFamily="-108" charset="-128"/>
-            </a:endParaRPr>
-          </a:p>
-          <a:p>
-            <a:r>
-              <a:rPr lang="en-US">
-                <a:ea typeface="ＭＳ Ｐゴシック" pitchFamily="-108" charset="-128"/>
-              </a:rPr>
-              <a:t>Note that:</a:t>
-            </a:r>
-          </a:p>
-          <a:p>
-            <a:endParaRPr lang="en-US">
-              <a:ea typeface="ＭＳ Ｐゴシック" pitchFamily="-108" charset="-128"/>
-            </a:endParaRPr>
-          </a:p>
-          <a:p>
-            <a:r>
-              <a:rPr lang="en-US">
-                <a:ea typeface="ＭＳ Ｐゴシック" pitchFamily="-108" charset="-128"/>
-              </a:rPr>
-              <a:t>Replace the first two time derivatives with spatial derivatives</a:t>
-            </a:r>
-          </a:p>
-          <a:p>
-            <a:endParaRPr lang="en-US">
-              <a:ea typeface="ＭＳ Ｐゴシック" pitchFamily="-108" charset="-128"/>
-            </a:endParaRPr>
-          </a:p>
-          <a:p>
-            <a:endParaRPr lang="en-US">
-              <a:ea typeface="ＭＳ Ｐゴシック" pitchFamily="-108" charset="-128"/>
-            </a:endParaRPr>
-          </a:p>
-          <a:p>
-            <a:r>
-              <a:rPr lang="en-US">
-                <a:ea typeface="ＭＳ Ｐゴシック" pitchFamily="-108" charset="-128"/>
-              </a:rPr>
-              <a:t>Remove 3</a:t>
-            </a:r>
-            <a:r>
-              <a:rPr lang="en-US" baseline="30000">
-                <a:ea typeface="ＭＳ Ｐゴシック" pitchFamily="-108" charset="-128"/>
-              </a:rPr>
-              <a:t>rd</a:t>
-            </a:r>
-            <a:r>
-              <a:rPr lang="en-US">
-                <a:ea typeface="ＭＳ Ｐゴシック" pitchFamily="-108" charset="-128"/>
-              </a:rPr>
-              <a:t> order terms and above, and use central difference formulas:</a:t>
-            </a:r>
-          </a:p>
-          <a:p>
-            <a:endParaRPr lang="en-US">
-              <a:ea typeface="ＭＳ Ｐゴシック" pitchFamily="-108" charset="-128"/>
-            </a:endParaRPr>
-          </a:p>
-          <a:p>
-            <a:endParaRPr lang="en-US">
-              <a:ea typeface="ＭＳ Ｐゴシック" pitchFamily="-108" charset="-128"/>
-            </a:endParaRPr>
-          </a:p>
-          <a:p>
-            <a:endParaRPr lang="en-US">
-              <a:ea typeface="ＭＳ Ｐゴシック" pitchFamily="-108" charset="-128"/>
-            </a:endParaRPr>
-          </a:p>
-        </p:txBody>
-      </p:sp>
-      <p:sp>
-        <p:nvSpPr>
-          <p:cNvPr id="27652" name="Slide Number Placeholder 3"/>
+              <a:t>MPDATA</a:t>
+            </a:r>
+          </a:p>
+          <a:p>
+            <a:pPr lvl="1"/>
+            <a:r>
+              <a:rPr lang="en-US"/>
+              <a:t>One-sided bias donor cell approach</a:t>
+            </a:r>
+          </a:p>
+          <a:p>
+            <a:pPr lvl="1"/>
+            <a:r>
+              <a:rPr lang="en-US"/>
+              <a:t>Using a modified equation analysis, find an extra diffusive term</a:t>
+            </a:r>
+          </a:p>
+          <a:p>
+            <a:pPr lvl="1"/>
+            <a:r>
+              <a:rPr lang="en-US"/>
+              <a:t>Subtract out diffusive error using an anti-diffusive velocity</a:t>
+            </a:r>
+          </a:p>
+        </p:txBody>
+      </p:sp>
+      <p:sp>
+        <p:nvSpPr>
+          <p:cNvPr id="28676" name="Slide Number Placeholder 3"/>
           <p:cNvSpPr>
             <a:spLocks noGrp="1"/>
           </p:cNvSpPr>
@@ -6423,7 +6452,7 @@
               <a:rPr lang="en-US"/>
               <a:t>Slide </a:t>
             </a:r>
-            <a:fld id="{7F840725-C1B0-BC4F-91C5-548B59C832A8}" type="slidenum">
+            <a:fld id="{93743CEC-D1E8-B549-A67D-414696CA6C77}" type="slidenum">
               <a:rPr lang="en-US"/>
               <a:pPr/>
               <a:t>15</a:t>
@@ -6432,134 +6461,6 @@
           </a:p>
         </p:txBody>
       </p:sp>
-      <p:pic>
-        <p:nvPicPr>
-          <p:cNvPr id="27653" name="Picture 7"/>
-          <p:cNvPicPr>
-            <a:picLocks noChangeAspect="1" noChangeArrowheads="1"/>
-          </p:cNvPicPr>
-          <p:nvPr/>
-        </p:nvPicPr>
-        <p:blipFill>
-          <a:blip r:embed="rId2"/>
-          <a:srcRect/>
-          <a:stretch>
-            <a:fillRect/>
-          </a:stretch>
-        </p:blipFill>
-        <p:spPr bwMode="auto">
-          <a:xfrm>
-            <a:off x="3124200" y="2514600"/>
-            <a:ext cx="2686050" cy="523875"/>
-          </a:xfrm>
-          <a:prstGeom prst="rect">
-            <a:avLst/>
-          </a:prstGeom>
-          <a:noFill/>
-          <a:ln w="9525">
-            <a:noFill/>
-            <a:miter lim="800000"/>
-            <a:headEnd/>
-            <a:tailEnd/>
-          </a:ln>
-        </p:spPr>
-      </p:pic>
-      <p:pic>
-        <p:nvPicPr>
-          <p:cNvPr id="27654" name="Picture 10"/>
-          <p:cNvPicPr>
-            <a:picLocks noChangeAspect="1" noChangeArrowheads="1"/>
-          </p:cNvPicPr>
-          <p:nvPr/>
-        </p:nvPicPr>
-        <p:blipFill>
-          <a:blip r:embed="rId3"/>
-          <a:srcRect/>
-          <a:stretch>
-            <a:fillRect/>
-          </a:stretch>
-        </p:blipFill>
-        <p:spPr bwMode="auto">
-          <a:xfrm>
-            <a:off x="838200" y="4876800"/>
-            <a:ext cx="7696200" cy="785813"/>
-          </a:xfrm>
-          <a:prstGeom prst="rect">
-            <a:avLst/>
-          </a:prstGeom>
-          <a:noFill/>
-          <a:ln w="9525">
-            <a:noFill/>
-            <a:miter lim="800000"/>
-            <a:headEnd/>
-            <a:tailEnd/>
-          </a:ln>
-        </p:spPr>
-      </p:pic>
-      <p:pic>
-        <p:nvPicPr>
-          <p:cNvPr id="27655" name="Picture 11"/>
-          <p:cNvPicPr>
-            <a:picLocks noChangeAspect="1" noChangeArrowheads="1"/>
-          </p:cNvPicPr>
-          <p:nvPr/>
-        </p:nvPicPr>
-        <p:blipFill>
-          <a:blip r:embed="rId4"/>
-          <a:srcRect/>
-          <a:stretch>
-            <a:fillRect/>
-          </a:stretch>
-        </p:blipFill>
-        <p:spPr bwMode="auto">
-          <a:xfrm>
-            <a:off x="500063" y="3429000"/>
-            <a:ext cx="8143875" cy="714375"/>
-          </a:xfrm>
-          <a:prstGeom prst="rect">
-            <a:avLst/>
-          </a:prstGeom>
-          <a:noFill/>
-          <a:ln w="9525">
-            <a:noFill/>
-            <a:miter lim="800000"/>
-            <a:headEnd/>
-            <a:tailEnd/>
-          </a:ln>
-        </p:spPr>
-      </p:pic>
-      <p:pic>
-        <p:nvPicPr>
-          <p:cNvPr id="27656" name="Picture 12"/>
-          <p:cNvPicPr>
-            <a:picLocks noChangeAspect="1" noChangeArrowheads="1"/>
-          </p:cNvPicPr>
-          <p:nvPr/>
-        </p:nvPicPr>
-        <p:blipFill>
-          <a:blip r:embed="rId5"/>
-          <a:srcRect/>
-          <a:stretch>
-            <a:fillRect/>
-          </a:stretch>
-        </p:blipFill>
-        <p:spPr bwMode="auto">
-          <a:xfrm>
-            <a:off x="3581400" y="1828800"/>
-            <a:ext cx="1876425" cy="381000"/>
-          </a:xfrm>
-          <a:prstGeom prst="rect">
-            <a:avLst/>
-          </a:prstGeom>
-          <a:noFill/>
-          <a:ln w="9525">
-            <a:noFill/>
-            <a:miter lim="800000"/>
-            <a:headEnd/>
-            <a:tailEnd/>
-          </a:ln>
-        </p:spPr>
-      </p:pic>
     </p:spTree>
   </p:cSld>
   <p:clrMapOvr>
@@ -6594,7 +6495,7 @@
       </p:grpSpPr>
       <p:sp>
         <p:nvSpPr>
-          <p:cNvPr id="28674" name="Title 1"/>
+          <p:cNvPr id="29698" name="Title 1"/>
           <p:cNvSpPr>
             <a:spLocks noGrp="1"/>
           </p:cNvSpPr>
@@ -6611,14 +6512,14 @@
               <a:rPr lang="en-US">
                 <a:ea typeface="ＭＳ Ｐゴシック" pitchFamily="-108" charset="-128"/>
               </a:rPr>
-              <a:t>MPDATA - Derivation</a:t>
-            </a:r>
-          </a:p>
-        </p:txBody>
-      </p:sp>
-      <p:sp>
-        <p:nvSpPr>
-          <p:cNvPr id="28675" name="Content Placeholder 2"/>
+              <a:t>MPDATA - Conclusions</a:t>
+            </a:r>
+          </a:p>
+        </p:txBody>
+      </p:sp>
+      <p:sp>
+        <p:nvSpPr>
+          <p:cNvPr id="29699" name="Content Placeholder 2"/>
           <p:cNvSpPr>
             <a:spLocks noGrp="1"/>
           </p:cNvSpPr>
@@ -6632,7 +6533,7 @@
           <a:lstStyle/>
           <a:p>
             <a:r>
-              <a:rPr lang="en-US">
+              <a:rPr lang="en-US" b="0">
                 <a:ea typeface="ＭＳ Ｐゴシック" pitchFamily="-108" charset="-128"/>
               </a:rPr>
               <a:t>MPDATA</a:t>
@@ -6642,28 +6543,14 @@
             <a:pPr lvl="1"/>
             <a:r>
               <a:rPr lang="en-US"/>
-              <a:t>One-sided bias donor cell approach</a:t>
-            </a:r>
-          </a:p>
-          <a:p>
-            <a:pPr lvl="1"/>
-            <a:r>
-              <a:rPr lang="en-US"/>
-              <a:t>Using a modified equation analysis, find an extra diffusive term</a:t>
-            </a:r>
-          </a:p>
-          <a:p>
-            <a:pPr lvl="1"/>
-            <a:r>
-              <a:rPr lang="en-US"/>
-              <a:t>Subtract out diffusive error using an anti-diffusive velocity</a:t>
-            </a:r>
-          </a:p>
-        </p:txBody>
-      </p:sp>
-      <p:sp>
-        <p:nvSpPr>
-          <p:cNvPr id="28676" name="Slide Number Placeholder 3"/>
+              <a:t>Options to control total variation (FCT) and </a:t>
+            </a:r>
+          </a:p>
+        </p:txBody>
+      </p:sp>
+      <p:sp>
+        <p:nvSpPr>
+          <p:cNvPr id="29700" name="Slide Number Placeholder 3"/>
           <p:cNvSpPr>
             <a:spLocks noGrp="1"/>
           </p:cNvSpPr>
@@ -6682,7 +6569,7 @@
               <a:rPr lang="en-US"/>
               <a:t>Slide </a:t>
             </a:r>
-            <a:fld id="{93743CEC-D1E8-B549-A67D-414696CA6C77}" type="slidenum">
+            <a:fld id="{C283E170-554A-B642-8E58-DE38E4115297}" type="slidenum">
               <a:rPr lang="en-US"/>
               <a:pPr/>
               <a:t>16</a:t>
@@ -6725,7 +6612,7 @@
       </p:grpSpPr>
       <p:sp>
         <p:nvSpPr>
-          <p:cNvPr id="29698" name="Title 1"/>
+          <p:cNvPr id="30722" name="Title 1"/>
           <p:cNvSpPr>
             <a:spLocks noGrp="1"/>
           </p:cNvSpPr>
@@ -6742,14 +6629,14 @@
               <a:rPr lang="en-US">
                 <a:ea typeface="ＭＳ Ｐゴシック" pitchFamily="-108" charset="-128"/>
               </a:rPr>
-              <a:t>MPDATA - Conclusions</a:t>
-            </a:r>
-          </a:p>
-        </p:txBody>
-      </p:sp>
-      <p:sp>
-        <p:nvSpPr>
-          <p:cNvPr id="29699" name="Content Placeholder 2"/>
+              <a:t>GPUs at a glance</a:t>
+            </a:r>
+          </a:p>
+        </p:txBody>
+      </p:sp>
+      <p:sp>
+        <p:nvSpPr>
+          <p:cNvPr id="30723" name="Content Placeholder 2"/>
           <p:cNvSpPr>
             <a:spLocks noGrp="1"/>
           </p:cNvSpPr>
@@ -6759,28 +6646,79 @@
         </p:nvSpPr>
         <p:spPr/>
         <p:txBody>
-          <a:bodyPr/>
-          <a:lstStyle/>
-          <a:p>
-            <a:r>
-              <a:rPr lang="en-US" b="0">
+          <a:bodyPr>
+            <a:normAutofit fontScale="92500" lnSpcReduction="20000"/>
+          </a:bodyPr>
+          <a:lstStyle/>
+          <a:p>
+            <a:r>
+              <a:rPr lang="en-US">
                 <a:ea typeface="ＭＳ Ｐゴシック" pitchFamily="-108" charset="-128"/>
               </a:rPr>
-              <a:t>MPDATA</a:t>
+              <a:t>Different architecture from a CPU.</a:t>
             </a:r>
           </a:p>
           <a:p>
             <a:pPr lvl="1"/>
             <a:r>
               <a:rPr lang="en-US"/>
-              <a:t>Options to control total variation (FCT) and </a:t>
-            </a:r>
-          </a:p>
-        </p:txBody>
-      </p:sp>
-      <p:sp>
-        <p:nvSpPr>
-          <p:cNvPr id="29700" name="Slide Number Placeholder 3"/>
+              <a:t>Many low throughput processing units</a:t>
+            </a:r>
+          </a:p>
+          <a:p>
+            <a:pPr lvl="1"/>
+            <a:r>
+              <a:rPr lang="en-US"/>
+              <a:t>Cores all share memory</a:t>
+            </a:r>
+          </a:p>
+          <a:p>
+            <a:pPr lvl="1"/>
+            <a:r>
+              <a:rPr lang="en-US"/>
+              <a:t>Workgroups</a:t>
+            </a:r>
+          </a:p>
+          <a:p>
+            <a:r>
+              <a:rPr lang="en-US">
+                <a:ea typeface="ＭＳ Ｐゴシック" pitchFamily="-108" charset="-128"/>
+              </a:rPr>
+              <a:t>Higher FLOPS (floating points operations per second) per dollar than CPUs.</a:t>
+            </a:r>
+          </a:p>
+          <a:p>
+            <a:r>
+              <a:rPr lang="en-US">
+                <a:ea typeface="ＭＳ Ｐゴシック" pitchFamily="-108" charset="-128"/>
+              </a:rPr>
+              <a:t>Must use a language compiled for GPU</a:t>
+            </a:r>
+          </a:p>
+          <a:p>
+            <a:pPr lvl="1"/>
+            <a:r>
+              <a:rPr lang="en-US"/>
+              <a:t>OpenCL – Open programming language that can make use of multiple CPUs (on the same node) and a GPU. Can combine with MPI for multiple nodes.</a:t>
+            </a:r>
+          </a:p>
+          <a:p>
+            <a:pPr lvl="1"/>
+            <a:r>
+              <a:rPr lang="en-US"/>
+              <a:t>CUDA – Nvidia only.</a:t>
+            </a:r>
+          </a:p>
+          <a:p>
+            <a:endParaRPr lang="en-US">
+              <a:ea typeface="ＭＳ Ｐゴシック" pitchFamily="-108" charset="-128"/>
+            </a:endParaRPr>
+          </a:p>
+        </p:txBody>
+      </p:sp>
+      <p:sp>
+        <p:nvSpPr>
+          <p:cNvPr id="30724" name="Slide Number Placeholder 3"/>
           <p:cNvSpPr>
             <a:spLocks noGrp="1"/>
           </p:cNvSpPr>
@@ -6799,7 +6737,7 @@
               <a:rPr lang="en-US"/>
               <a:t>Slide </a:t>
             </a:r>
-            <a:fld id="{C283E170-554A-B642-8E58-DE38E4115297}" type="slidenum">
+            <a:fld id="{C0B27578-E324-3D4A-8A83-77F3CC1E892B}" type="slidenum">
               <a:rPr lang="en-US"/>
               <a:pPr/>
               <a:t>17</a:t>
@@ -6842,7 +6780,7 @@
       </p:grpSpPr>
       <p:sp>
         <p:nvSpPr>
-          <p:cNvPr id="30722" name="Title 1"/>
+          <p:cNvPr id="31746" name="Title 1"/>
           <p:cNvSpPr>
             <a:spLocks noGrp="1"/>
           </p:cNvSpPr>
@@ -6859,14 +6797,14 @@
               <a:rPr lang="en-US">
                 <a:ea typeface="ＭＳ Ｐゴシック" pitchFamily="-108" charset="-128"/>
               </a:rPr>
-              <a:t>GPUs at a glance</a:t>
-            </a:r>
-          </a:p>
-        </p:txBody>
-      </p:sp>
-      <p:sp>
-        <p:nvSpPr>
-          <p:cNvPr id="30723" name="Content Placeholder 2"/>
+              <a:t>GPU architecture</a:t>
+            </a:r>
+          </a:p>
+        </p:txBody>
+      </p:sp>
+      <p:sp>
+        <p:nvSpPr>
+          <p:cNvPr id="31747" name="Content Placeholder 2"/>
           <p:cNvSpPr>
             <a:spLocks noGrp="1"/>
           </p:cNvSpPr>
@@ -6877,7 +6815,7 @@
         <p:spPr/>
         <p:txBody>
           <a:bodyPr>
-            <a:normAutofit fontScale="92500" lnSpcReduction="20000"/>
+            <a:normAutofit fontScale="70000" lnSpcReduction="20000"/>
           </a:bodyPr>
           <a:lstStyle/>
           <a:p>
@@ -6885,28 +6823,14 @@
               <a:rPr lang="en-US">
                 <a:ea typeface="ＭＳ Ｐゴシック" pitchFamily="-108" charset="-128"/>
               </a:rPr>
-              <a:t>Different architecture from a CPU.</a:t>
+              <a:t>Global Memory</a:t>
             </a:r>
           </a:p>
           <a:p>
             <a:pPr lvl="1"/>
             <a:r>
               <a:rPr lang="en-US"/>
-              <a:t>Many low throughput processing units</a:t>
-            </a:r>
-          </a:p>
-          <a:p>
-            <a:pPr lvl="1"/>
-            <a:r>
-              <a:rPr lang="en-US"/>
-              <a:t>Cores all share memory</a:t>
-            </a:r>
-          </a:p>
-          <a:p>
-            <a:pPr lvl="1"/>
-            <a:r>
-              <a:rPr lang="en-US"/>
-              <a:t>Workgroups</a:t>
+              <a:t>Available to entire device</a:t>
             </a:r>
           </a:p>
           <a:p>
@@ -6914,7 +6838,21 @@
               <a:rPr lang="en-US">
                 <a:ea typeface="ＭＳ Ｐゴシック" pitchFamily="-108" charset="-128"/>
               </a:rPr>
-              <a:t>Higher FLOPS (floating points operations per second) per dollar than CPUs.</a:t>
+              <a:t>Local Memory</a:t>
+            </a:r>
+          </a:p>
+          <a:p>
+            <a:pPr lvl="1"/>
+            <a:r>
+              <a:rPr lang="en-US"/>
+              <a:t>Available to the work group only</a:t>
+            </a:r>
+          </a:p>
+          <a:p>
+            <a:pPr lvl="1"/>
+            <a:r>
+              <a:rPr lang="en-US"/>
+              <a:t>***I think this isn’t well defined in OpenCL and can spill over to Global without warning</a:t>
             </a:r>
           </a:p>
           <a:p>
@@ -6922,33 +6860,65 @@
               <a:rPr lang="en-US">
                 <a:ea typeface="ＭＳ Ｐゴシック" pitchFamily="-108" charset="-128"/>
               </a:rPr>
-              <a:t>Must use a language compiled for GPU</a:t>
+              <a:t>Private Memory</a:t>
             </a:r>
           </a:p>
           <a:p>
             <a:pPr lvl="1"/>
             <a:r>
               <a:rPr lang="en-US"/>
-              <a:t>OpenCL – Open programming language that can make use of multiple CPUs (on the same node) and a GPU. Can combine with MPI for multiple nodes.</a:t>
+              <a:t>Available to work item only</a:t>
+            </a:r>
+          </a:p>
+          <a:p>
+            <a:r>
+              <a:rPr lang="en-US">
+                <a:ea typeface="ＭＳ Ｐゴシック" pitchFamily="-108" charset="-128"/>
+              </a:rPr>
+              <a:t>Constant Memory</a:t>
             </a:r>
           </a:p>
           <a:p>
             <a:pPr lvl="1"/>
             <a:r>
               <a:rPr lang="en-US"/>
-              <a:t>CUDA – Nvidia only.</a:t>
-            </a:r>
-          </a:p>
-          <a:p>
-            <a:endParaRPr lang="en-US">
-              <a:ea typeface="ＭＳ Ｐゴシック" pitchFamily="-108" charset="-128"/>
-            </a:endParaRPr>
-          </a:p>
-        </p:txBody>
-      </p:sp>
-      <p:sp>
-        <p:nvSpPr>
-          <p:cNvPr id="30724" name="Slide Number Placeholder 3"/>
+              <a:t>Read only, can be faster than global</a:t>
+            </a:r>
+          </a:p>
+          <a:p>
+            <a:r>
+              <a:rPr lang="en-US">
+                <a:ea typeface="ＭＳ Ｐゴシック" pitchFamily="-108" charset="-128"/>
+              </a:rPr>
+              <a:t>SIMD group size – efficient code is a multiple of this</a:t>
+            </a:r>
+          </a:p>
+          <a:p>
+            <a:pPr lvl="1"/>
+            <a:r>
+              <a:rPr lang="en-US"/>
+              <a:t>Nvidia – Warp size is 32</a:t>
+            </a:r>
+          </a:p>
+          <a:p>
+            <a:pPr lvl="1"/>
+            <a:r>
+              <a:rPr lang="en-US"/>
+              <a:t>ATI – Workgroup size is 64</a:t>
+            </a:r>
+          </a:p>
+          <a:p>
+            <a:pPr lvl="1"/>
+            <a:r>
+              <a:rPr lang="en-US"/>
+              <a:t>http://stackoverflow.com/questions/7093488/opencl-how-to-i-query-for-a-devices-simd-width</a:t>
+            </a:r>
+          </a:p>
+        </p:txBody>
+      </p:sp>
+      <p:sp>
+        <p:nvSpPr>
+          <p:cNvPr id="31748" name="Slide Number Placeholder 3"/>
           <p:cNvSpPr>
             <a:spLocks noGrp="1"/>
           </p:cNvSpPr>
@@ -6967,7 +6937,7 @@
               <a:rPr lang="en-US"/>
               <a:t>Slide </a:t>
             </a:r>
-            <a:fld id="{C0B27578-E324-3D4A-8A83-77F3CC1E892B}" type="slidenum">
+            <a:fld id="{0032BADB-F48D-AE49-BA14-9EC1C0190D97}" type="slidenum">
               <a:rPr lang="en-US"/>
               <a:pPr/>
               <a:t>18</a:t>
@@ -7010,7 +6980,7 @@
       </p:grpSpPr>
       <p:sp>
         <p:nvSpPr>
-          <p:cNvPr id="31746" name="Title 1"/>
+          <p:cNvPr id="32770" name="Title 1"/>
           <p:cNvSpPr>
             <a:spLocks noGrp="1"/>
           </p:cNvSpPr>
@@ -7027,14 +6997,14 @@
               <a:rPr lang="en-US">
                 <a:ea typeface="ＭＳ Ｐゴシック" pitchFamily="-108" charset="-128"/>
               </a:rPr>
-              <a:t>GPU architecture</a:t>
-            </a:r>
-          </a:p>
-        </p:txBody>
-      </p:sp>
-      <p:sp>
-        <p:nvSpPr>
-          <p:cNvPr id="31747" name="Content Placeholder 2"/>
+              <a:t>Shallow Water Equations</a:t>
+            </a:r>
+          </a:p>
+        </p:txBody>
+      </p:sp>
+      <p:sp>
+        <p:nvSpPr>
+          <p:cNvPr id="32771" name="Content Placeholder 2"/>
           <p:cNvSpPr>
             <a:spLocks noGrp="1"/>
           </p:cNvSpPr>
@@ -7042,113 +7012,79 @@
             <p:ph idx="1"/>
           </p:nvPr>
         </p:nvSpPr>
-        <p:spPr/>
+        <p:spPr>
+          <a:xfrm>
+            <a:off x="1435608" y="1447800"/>
+            <a:ext cx="7498080" cy="3886200"/>
+          </a:xfrm>
+        </p:spPr>
         <p:txBody>
           <a:bodyPr>
-            <a:normAutofit fontScale="70000" lnSpcReduction="20000"/>
+            <a:normAutofit fontScale="85000" lnSpcReduction="20000"/>
           </a:bodyPr>
           <a:lstStyle/>
           <a:p>
             <a:r>
-              <a:rPr lang="en-US">
+              <a:rPr lang="en-US" b="0" dirty="0">
                 <a:ea typeface="ＭＳ Ｐゴシック" pitchFamily="-108" charset="-128"/>
               </a:rPr>
-              <a:t>Global Memory</a:t>
+              <a:t>Simplification of the Euler Equations</a:t>
             </a:r>
           </a:p>
           <a:p>
             <a:pPr lvl="1"/>
             <a:r>
-              <a:rPr lang="en-US"/>
-              <a:t>Available to entire device</a:t>
-            </a:r>
-          </a:p>
-          <a:p>
-            <a:r>
-              <a:rPr lang="en-US">
-                <a:ea typeface="ＭＳ Ｐゴシック" pitchFamily="-108" charset="-128"/>
-              </a:rPr>
-              <a:t>Local Memory</a:t>
+              <a:rPr lang="en-US" dirty="0"/>
+              <a:t>Uniform Fluid Density</a:t>
             </a:r>
           </a:p>
           <a:p>
             <a:pPr lvl="1"/>
             <a:r>
-              <a:rPr lang="en-US"/>
-              <a:t>Available to the work group only</a:t>
+              <a:rPr lang="en-US" dirty="0"/>
+              <a:t>Wavelengths are much longer than fluid depth</a:t>
             </a:r>
           </a:p>
           <a:p>
             <a:pPr lvl="1"/>
-            <a:r>
-              <a:rPr lang="en-US"/>
-              <a:t>***I think this isn’t well defined in OpenCL and can spill over to Global without warning</a:t>
-            </a:r>
-          </a:p>
-          <a:p>
-            <a:r>
-              <a:rPr lang="en-US">
-                <a:ea typeface="ＭＳ Ｐゴシック" pitchFamily="-108" charset="-128"/>
-              </a:rPr>
-              <a:t>Private Memory</a:t>
-            </a:r>
+            <a:endParaRPr lang="en-US" dirty="0"/>
           </a:p>
           <a:p>
             <a:pPr lvl="1"/>
-            <a:r>
-              <a:rPr lang="en-US"/>
-              <a:t>Available to work item only</a:t>
-            </a:r>
-          </a:p>
-          <a:p>
-            <a:r>
-              <a:rPr lang="en-US">
-                <a:ea typeface="ＭＳ Ｐゴシック" pitchFamily="-108" charset="-128"/>
-              </a:rPr>
-              <a:t>Constant Memory</a:t>
-            </a:r>
+            <a:endParaRPr lang="en-US" dirty="0"/>
           </a:p>
           <a:p>
             <a:pPr lvl="1"/>
-            <a:r>
-              <a:rPr lang="en-US"/>
-              <a:t>Read only, can be faster than global</a:t>
-            </a:r>
-          </a:p>
-          <a:p>
-            <a:r>
-              <a:rPr lang="en-US">
-                <a:ea typeface="ＭＳ Ｐゴシック" pitchFamily="-108" charset="-128"/>
-              </a:rPr>
-              <a:t>SIMD group size – efficient code is a multiple of this</a:t>
-            </a:r>
+            <a:endParaRPr lang="en-US" dirty="0"/>
           </a:p>
           <a:p>
             <a:pPr lvl="1"/>
-            <a:r>
-              <a:rPr lang="en-US"/>
-              <a:t>Nvidia – Warp size is 32</a:t>
-            </a:r>
+            <a:endParaRPr lang="en-US" dirty="0" smtClean="0"/>
+          </a:p>
+          <a:p>
+            <a:pPr lvl="1">
+              <a:buNone/>
+            </a:pPr>
+            <a:endParaRPr lang="en-US" dirty="0" smtClean="0"/>
+          </a:p>
+          <a:p>
+            <a:pPr lvl="1">
+              <a:buNone/>
+            </a:pPr>
+            <a:endParaRPr lang="en-US" dirty="0" smtClean="0"/>
           </a:p>
           <a:p>
             <a:pPr lvl="1"/>
             <a:r>
-              <a:rPr lang="en-US"/>
-              <a:t>ATI – Workgroup size is 64</a:t>
-            </a:r>
-          </a:p>
-          <a:p>
-            <a:pPr lvl="1"/>
-            <a:r>
-              <a:rPr lang="en-US"/>
-              <a:t>http://stackoverflow.com/questions/7093488/opencl-how-to-i-query-for-a-devices-simd-width</a:t>
-            </a:r>
-          </a:p>
-        </p:txBody>
-      </p:sp>
-      <p:sp>
-        <p:nvSpPr>
-          <p:cNvPr id="31748" name="Slide Number Placeholder 3"/>
+              <a:rPr lang="en-US" dirty="0"/>
+              <a:t>Inert Tracer Equation</a:t>
+            </a:r>
+          </a:p>
+        </p:txBody>
+      </p:sp>
+      <p:sp>
+        <p:nvSpPr>
+          <p:cNvPr id="32772" name="Slide Number Placeholder 3"/>
           <p:cNvSpPr>
             <a:spLocks noGrp="1"/>
           </p:cNvSpPr>
@@ -7167,7 +7103,7 @@
               <a:rPr lang="en-US"/>
               <a:t>Slide </a:t>
             </a:r>
-            <a:fld id="{0032BADB-F48D-AE49-BA14-9EC1C0190D97}" type="slidenum">
+            <a:fld id="{DC1526B5-889A-3640-A8B5-3DF29F19965A}" type="slidenum">
               <a:rPr lang="en-US"/>
               <a:pPr/>
               <a:t>19</a:t>
@@ -7176,6 +7112,70 @@
           </a:p>
         </p:txBody>
       </p:sp>
+      <p:pic>
+        <p:nvPicPr>
+          <p:cNvPr id="32773" name="Content Placeholder 4" descr="Shallow_Water_Eqns.pdf"/>
+          <p:cNvPicPr>
+            <a:picLocks noChangeAspect="1"/>
+          </p:cNvPicPr>
+          <p:nvPr/>
+        </p:nvPicPr>
+        <p:blipFill>
+          <a:blip r:embed="rId3"/>
+          <a:srcRect t="-2097" b="-2097"/>
+          <a:stretch>
+            <a:fillRect/>
+          </a:stretch>
+        </p:blipFill>
+        <p:spPr bwMode="auto">
+          <a:xfrm>
+            <a:off x="3048000" y="2590800"/>
+            <a:ext cx="4440238" cy="2209800"/>
+          </a:xfrm>
+          <a:prstGeom prst="rect">
+            <a:avLst/>
+          </a:prstGeom>
+          <a:noFill/>
+          <a:ln w="9525">
+            <a:noFill/>
+            <a:miter lim="800000"/>
+            <a:headEnd/>
+            <a:tailEnd/>
+          </a:ln>
+        </p:spPr>
+      </p:pic>
+      <p:pic>
+        <p:nvPicPr>
+          <p:cNvPr id="32774" name="Picture 5" descr="Concentration_Eqn.pdf"/>
+          <p:cNvPicPr>
+            <a:picLocks noChangeAspect="1"/>
+          </p:cNvPicPr>
+          <p:nvPr/>
+        </p:nvPicPr>
+        <p:blipFill>
+          <a:blip r:embed="rId4"/>
+          <a:srcRect/>
+          <a:stretch>
+            <a:fillRect/>
+          </a:stretch>
+        </p:blipFill>
+        <p:spPr bwMode="auto">
+          <a:xfrm>
+            <a:off x="3886200" y="5257800"/>
+            <a:ext cx="2528887" cy="685800"/>
+          </a:xfrm>
+          <a:prstGeom prst="rect">
+            <a:avLst/>
+          </a:prstGeom>
+          <a:noFill/>
+          <a:ln w="9525">
+            <a:noFill/>
+            <a:miter lim="800000"/>
+            <a:headEnd/>
+            <a:tailEnd/>
+          </a:ln>
+        </p:spPr>
+      </p:pic>
     </p:spTree>
   </p:cSld>
   <p:clrMapOvr>
@@ -7376,236 +7376,6 @@
       </p:grpSpPr>
       <p:sp>
         <p:nvSpPr>
-          <p:cNvPr id="32770" name="Title 1"/>
-          <p:cNvSpPr>
-            <a:spLocks noGrp="1"/>
-          </p:cNvSpPr>
-          <p:nvPr>
-            <p:ph type="title"/>
-          </p:nvPr>
-        </p:nvSpPr>
-        <p:spPr/>
-        <p:txBody>
-          <a:bodyPr/>
-          <a:lstStyle/>
-          <a:p>
-            <a:r>
-              <a:rPr lang="en-US">
-                <a:ea typeface="ＭＳ Ｐゴシック" pitchFamily="-108" charset="-128"/>
-              </a:rPr>
-              <a:t>Shallow Water Equations</a:t>
-            </a:r>
-          </a:p>
-        </p:txBody>
-      </p:sp>
-      <p:sp>
-        <p:nvSpPr>
-          <p:cNvPr id="32771" name="Content Placeholder 2"/>
-          <p:cNvSpPr>
-            <a:spLocks noGrp="1"/>
-          </p:cNvSpPr>
-          <p:nvPr>
-            <p:ph idx="1"/>
-          </p:nvPr>
-        </p:nvSpPr>
-        <p:spPr>
-          <a:xfrm>
-            <a:off x="1435608" y="1447800"/>
-            <a:ext cx="7498080" cy="3886200"/>
-          </a:xfrm>
-        </p:spPr>
-        <p:txBody>
-          <a:bodyPr>
-            <a:normAutofit fontScale="85000" lnSpcReduction="20000"/>
-          </a:bodyPr>
-          <a:lstStyle/>
-          <a:p>
-            <a:r>
-              <a:rPr lang="en-US" b="0" dirty="0">
-                <a:ea typeface="ＭＳ Ｐゴシック" pitchFamily="-108" charset="-128"/>
-              </a:rPr>
-              <a:t>Simplification of the Euler Equations</a:t>
-            </a:r>
-          </a:p>
-          <a:p>
-            <a:pPr lvl="1"/>
-            <a:r>
-              <a:rPr lang="en-US" dirty="0"/>
-              <a:t>Uniform Fluid Density</a:t>
-            </a:r>
-          </a:p>
-          <a:p>
-            <a:pPr lvl="1"/>
-            <a:r>
-              <a:rPr lang="en-US" dirty="0"/>
-              <a:t>Wavelengths are much longer than fluid depth</a:t>
-            </a:r>
-          </a:p>
-          <a:p>
-            <a:pPr lvl="1"/>
-            <a:endParaRPr lang="en-US" dirty="0"/>
-          </a:p>
-          <a:p>
-            <a:pPr lvl="1"/>
-            <a:endParaRPr lang="en-US" dirty="0"/>
-          </a:p>
-          <a:p>
-            <a:pPr lvl="1"/>
-            <a:endParaRPr lang="en-US" dirty="0"/>
-          </a:p>
-          <a:p>
-            <a:pPr lvl="1"/>
-            <a:endParaRPr lang="en-US" dirty="0" smtClean="0"/>
-          </a:p>
-          <a:p>
-            <a:pPr lvl="1">
-              <a:buNone/>
-            </a:pPr>
-            <a:endParaRPr lang="en-US" dirty="0" smtClean="0"/>
-          </a:p>
-          <a:p>
-            <a:pPr lvl="1">
-              <a:buNone/>
-            </a:pPr>
-            <a:endParaRPr lang="en-US" dirty="0" smtClean="0"/>
-          </a:p>
-          <a:p>
-            <a:pPr lvl="1"/>
-            <a:r>
-              <a:rPr lang="en-US" dirty="0"/>
-              <a:t>Inert Tracer Equation</a:t>
-            </a:r>
-          </a:p>
-        </p:txBody>
-      </p:sp>
-      <p:sp>
-        <p:nvSpPr>
-          <p:cNvPr id="32772" name="Slide Number Placeholder 3"/>
-          <p:cNvSpPr>
-            <a:spLocks noGrp="1"/>
-          </p:cNvSpPr>
-          <p:nvPr>
-            <p:ph type="sldNum" sz="quarter" idx="12"/>
-          </p:nvPr>
-        </p:nvSpPr>
-        <p:spPr>
-          <a:noFill/>
-        </p:spPr>
-        <p:txBody>
-          <a:bodyPr/>
-          <a:lstStyle/>
-          <a:p>
-            <a:r>
-              <a:rPr lang="en-US"/>
-              <a:t>Slide </a:t>
-            </a:r>
-            <a:fld id="{DC1526B5-889A-3640-A8B5-3DF29F19965A}" type="slidenum">
-              <a:rPr lang="en-US"/>
-              <a:pPr/>
-              <a:t>20</a:t>
-            </a:fld>
-            <a:endParaRPr lang="en-US"/>
-          </a:p>
-        </p:txBody>
-      </p:sp>
-      <p:pic>
-        <p:nvPicPr>
-          <p:cNvPr id="32773" name="Content Placeholder 4" descr="Shallow_Water_Eqns.pdf"/>
-          <p:cNvPicPr>
-            <a:picLocks noChangeAspect="1"/>
-          </p:cNvPicPr>
-          <p:nvPr/>
-        </p:nvPicPr>
-        <p:blipFill>
-          <a:blip r:embed="rId3"/>
-          <a:srcRect t="-2097" b="-2097"/>
-          <a:stretch>
-            <a:fillRect/>
-          </a:stretch>
-        </p:blipFill>
-        <p:spPr bwMode="auto">
-          <a:xfrm>
-            <a:off x="3048000" y="2590800"/>
-            <a:ext cx="4440238" cy="2209800"/>
-          </a:xfrm>
-          <a:prstGeom prst="rect">
-            <a:avLst/>
-          </a:prstGeom>
-          <a:noFill/>
-          <a:ln w="9525">
-            <a:noFill/>
-            <a:miter lim="800000"/>
-            <a:headEnd/>
-            <a:tailEnd/>
-          </a:ln>
-        </p:spPr>
-      </p:pic>
-      <p:pic>
-        <p:nvPicPr>
-          <p:cNvPr id="32774" name="Picture 5" descr="Concentration_Eqn.pdf"/>
-          <p:cNvPicPr>
-            <a:picLocks noChangeAspect="1"/>
-          </p:cNvPicPr>
-          <p:nvPr/>
-        </p:nvPicPr>
-        <p:blipFill>
-          <a:blip r:embed="rId4"/>
-          <a:srcRect/>
-          <a:stretch>
-            <a:fillRect/>
-          </a:stretch>
-        </p:blipFill>
-        <p:spPr bwMode="auto">
-          <a:xfrm>
-            <a:off x="3886200" y="5257800"/>
-            <a:ext cx="2528887" cy="685800"/>
-          </a:xfrm>
-          <a:prstGeom prst="rect">
-            <a:avLst/>
-          </a:prstGeom>
-          <a:noFill/>
-          <a:ln w="9525">
-            <a:noFill/>
-            <a:miter lim="800000"/>
-            <a:headEnd/>
-            <a:tailEnd/>
-          </a:ln>
-        </p:spPr>
-      </p:pic>
-    </p:spTree>
-  </p:cSld>
-  <p:clrMapOvr>
-    <a:masterClrMapping/>
-  </p:clrMapOvr>
-  <p:timing>
-    <p:tnLst>
-      <p:par>
-        <p:cTn id="1" dur="indefinite" restart="never" nodeType="tmRoot"/>
-      </p:par>
-    </p:tnLst>
-  </p:timing>
-</p:sld>
-</file>
-
-<file path=ppt/slides/slide21.xml><?xml version="1.0" encoding="utf-8"?>
-<p:sld xmlns:a="http://schemas.openxmlformats.org/drawingml/2006/main" xmlns:r="http://schemas.openxmlformats.org/officeDocument/2006/relationships" xmlns:mc="http://schemas.openxmlformats.org/markup-compatibility/2006" xmlns:mv="urn:schemas-microsoft-com:mac:vml" xmlns:p="http://schemas.openxmlformats.org/presentationml/2006/main" mc:Ignorable="mv" mc:PreserveAttributes="mv:*">
-  <p:cSld>
-    <p:spTree>
-      <p:nvGrpSpPr>
-        <p:cNvPr id="1" name=""/>
-        <p:cNvGrpSpPr/>
-        <p:nvPr/>
-      </p:nvGrpSpPr>
-      <p:grpSpPr>
-        <a:xfrm>
-          <a:off x="0" y="0"/>
-          <a:ext cx="0" cy="0"/>
-          <a:chOff x="0" y="0"/>
-          <a:chExt cx="0" cy="0"/>
-        </a:xfrm>
-      </p:grpSpPr>
-      <p:sp>
-        <p:nvSpPr>
           <p:cNvPr id="33794" name="Title 1"/>
           <p:cNvSpPr>
             <a:spLocks noGrp="1"/>
@@ -7679,7 +7449,7 @@
             <a:fld id="{8408E1E3-6392-834E-A657-F96134CD74C6}" type="slidenum">
               <a:rPr lang="en-US"/>
               <a:pPr/>
-              <a:t>21</a:t>
+              <a:t>20</a:t>
             </a:fld>
             <a:endParaRPr lang="en-US"/>
           </a:p>
@@ -8099,6 +7869,145 @@
 </p:sld>
 </file>
 
+<file path=ppt/slides/slide21.xml><?xml version="1.0" encoding="utf-8"?>
+<p:sld xmlns:a="http://schemas.openxmlformats.org/drawingml/2006/main" xmlns:r="http://schemas.openxmlformats.org/officeDocument/2006/relationships" xmlns:mc="http://schemas.openxmlformats.org/markup-compatibility/2006" xmlns:mv="urn:schemas-microsoft-com:mac:vml" xmlns:p="http://schemas.openxmlformats.org/presentationml/2006/main" mc:Ignorable="mv" mc:PreserveAttributes="mv:*">
+  <p:cSld>
+    <p:spTree>
+      <p:nvGrpSpPr>
+        <p:cNvPr id="1" name=""/>
+        <p:cNvGrpSpPr/>
+        <p:nvPr/>
+      </p:nvGrpSpPr>
+      <p:grpSpPr>
+        <a:xfrm>
+          <a:off x="0" y="0"/>
+          <a:ext cx="0" cy="0"/>
+          <a:chOff x="0" y="0"/>
+          <a:chExt cx="0" cy="0"/>
+        </a:xfrm>
+      </p:grpSpPr>
+      <p:sp>
+        <p:nvSpPr>
+          <p:cNvPr id="34818" name="Title 1"/>
+          <p:cNvSpPr>
+            <a:spLocks noGrp="1"/>
+          </p:cNvSpPr>
+          <p:nvPr>
+            <p:ph type="title"/>
+          </p:nvPr>
+        </p:nvSpPr>
+        <p:spPr/>
+        <p:txBody>
+          <a:bodyPr/>
+          <a:lstStyle/>
+          <a:p>
+            <a:r>
+              <a:rPr lang="en-US">
+                <a:ea typeface="ＭＳ Ｐゴシック" pitchFamily="-108" charset="-128"/>
+              </a:rPr>
+              <a:t>Future Directions</a:t>
+            </a:r>
+          </a:p>
+        </p:txBody>
+      </p:sp>
+      <p:sp>
+        <p:nvSpPr>
+          <p:cNvPr id="34819" name="Content Placeholder 2"/>
+          <p:cNvSpPr>
+            <a:spLocks noGrp="1"/>
+          </p:cNvSpPr>
+          <p:nvPr>
+            <p:ph idx="1"/>
+          </p:nvPr>
+        </p:nvSpPr>
+        <p:spPr/>
+        <p:txBody>
+          <a:bodyPr/>
+          <a:lstStyle/>
+          <a:p>
+            <a:r>
+              <a:rPr lang="en-US">
+                <a:ea typeface="ＭＳ Ｐゴシック" pitchFamily="-108" charset="-128"/>
+              </a:rPr>
+              <a:t>FEM approach for full Euler equations</a:t>
+            </a:r>
+          </a:p>
+          <a:p>
+            <a:r>
+              <a:rPr lang="en-US">
+                <a:ea typeface="ＭＳ Ｐゴシック" pitchFamily="-108" charset="-128"/>
+              </a:rPr>
+              <a:t>Implement schemes for advection on the GPU (include in CLAMR)</a:t>
+            </a:r>
+          </a:p>
+          <a:p>
+            <a:r>
+              <a:rPr lang="en-US">
+                <a:ea typeface="ＭＳ Ｐゴシック" pitchFamily="-108" charset="-128"/>
+              </a:rPr>
+              <a:t>Implement these schemes to solve the full Euler Equations</a:t>
+            </a:r>
+          </a:p>
+          <a:p>
+            <a:r>
+              <a:rPr lang="en-US">
+                <a:ea typeface="ＭＳ Ｐゴシック" pitchFamily="-108" charset="-128"/>
+              </a:rPr>
+              <a:t>Alternative numerical methods</a:t>
+            </a:r>
+          </a:p>
+          <a:p>
+            <a:endParaRPr lang="en-US">
+              <a:ea typeface="ＭＳ Ｐゴシック" pitchFamily="-108" charset="-128"/>
+            </a:endParaRPr>
+          </a:p>
+        </p:txBody>
+      </p:sp>
+      <p:sp>
+        <p:nvSpPr>
+          <p:cNvPr id="34820" name="Slide Number Placeholder 3"/>
+          <p:cNvSpPr>
+            <a:spLocks noGrp="1"/>
+          </p:cNvSpPr>
+          <p:nvPr>
+            <p:ph type="sldNum" sz="quarter" idx="12"/>
+          </p:nvPr>
+        </p:nvSpPr>
+        <p:spPr>
+          <a:noFill/>
+        </p:spPr>
+        <p:txBody>
+          <a:bodyPr/>
+          <a:lstStyle/>
+          <a:p>
+            <a:r>
+              <a:rPr lang="en-US"/>
+              <a:t>Slide </a:t>
+            </a:r>
+            <a:fld id="{642E7553-A61F-9A41-A7A2-954D1F757C3A}" type="slidenum">
+              <a:rPr lang="en-US"/>
+              <a:pPr/>
+              <a:t>21</a:t>
+            </a:fld>
+            <a:endParaRPr lang="en-US"/>
+          </a:p>
+        </p:txBody>
+      </p:sp>
+    </p:spTree>
+  </p:cSld>
+  <p:clrMapOvr>
+    <a:masterClrMapping/>
+  </p:clrMapOvr>
+  <p:timing>
+    <p:tnLst>
+      <p:par>
+        <p:cTn id="1" dur="indefinite" restart="never" nodeType="tmRoot"/>
+      </p:par>
+    </p:tnLst>
+  </p:timing>
+</p:sld>
+</file>
+
 <file path=ppt/slides/slide22.xml><?xml version="1.0" encoding="utf-8"?>
 <p:sld xmlns:a="http://schemas.openxmlformats.org/drawingml/2006/main" xmlns:r="http://schemas.openxmlformats.org/officeDocument/2006/relationships" xmlns:mc="http://schemas.openxmlformats.org/markup-compatibility/2006" xmlns:mv="urn:schemas-microsoft-com:mac:vml" xmlns:p="http://schemas.openxmlformats.org/presentationml/2006/main" mc:Ignorable="mv" mc:PreserveAttributes="mv:*">
   <p:cSld>
@@ -8118,145 +8027,6 @@
       </p:grpSpPr>
       <p:sp>
         <p:nvSpPr>
-          <p:cNvPr id="34818" name="Title 1"/>
-          <p:cNvSpPr>
-            <a:spLocks noGrp="1"/>
-          </p:cNvSpPr>
-          <p:nvPr>
-            <p:ph type="title"/>
-          </p:nvPr>
-        </p:nvSpPr>
-        <p:spPr/>
-        <p:txBody>
-          <a:bodyPr/>
-          <a:lstStyle/>
-          <a:p>
-            <a:r>
-              <a:rPr lang="en-US">
-                <a:ea typeface="ＭＳ Ｐゴシック" pitchFamily="-108" charset="-128"/>
-              </a:rPr>
-              <a:t>Future Directions</a:t>
-            </a:r>
-          </a:p>
-        </p:txBody>
-      </p:sp>
-      <p:sp>
-        <p:nvSpPr>
-          <p:cNvPr id="34819" name="Content Placeholder 2"/>
-          <p:cNvSpPr>
-            <a:spLocks noGrp="1"/>
-          </p:cNvSpPr>
-          <p:nvPr>
-            <p:ph idx="1"/>
-          </p:nvPr>
-        </p:nvSpPr>
-        <p:spPr/>
-        <p:txBody>
-          <a:bodyPr/>
-          <a:lstStyle/>
-          <a:p>
-            <a:r>
-              <a:rPr lang="en-US">
-                <a:ea typeface="ＭＳ Ｐゴシック" pitchFamily="-108" charset="-128"/>
-              </a:rPr>
-              <a:t>FEM approach for full Euler equations</a:t>
-            </a:r>
-          </a:p>
-          <a:p>
-            <a:r>
-              <a:rPr lang="en-US">
-                <a:ea typeface="ＭＳ Ｐゴシック" pitchFamily="-108" charset="-128"/>
-              </a:rPr>
-              <a:t>Implement schemes for advection on the GPU (include in CLAMR)</a:t>
-            </a:r>
-          </a:p>
-          <a:p>
-            <a:r>
-              <a:rPr lang="en-US">
-                <a:ea typeface="ＭＳ Ｐゴシック" pitchFamily="-108" charset="-128"/>
-              </a:rPr>
-              <a:t>Implement these schemes to solve the full Euler Equations</a:t>
-            </a:r>
-          </a:p>
-          <a:p>
-            <a:r>
-              <a:rPr lang="en-US">
-                <a:ea typeface="ＭＳ Ｐゴシック" pitchFamily="-108" charset="-128"/>
-              </a:rPr>
-              <a:t>Alternative numerical methods</a:t>
-            </a:r>
-          </a:p>
-          <a:p>
-            <a:endParaRPr lang="en-US">
-              <a:ea typeface="ＭＳ Ｐゴシック" pitchFamily="-108" charset="-128"/>
-            </a:endParaRPr>
-          </a:p>
-        </p:txBody>
-      </p:sp>
-      <p:sp>
-        <p:nvSpPr>
-          <p:cNvPr id="34820" name="Slide Number Placeholder 3"/>
-          <p:cNvSpPr>
-            <a:spLocks noGrp="1"/>
-          </p:cNvSpPr>
-          <p:nvPr>
-            <p:ph type="sldNum" sz="quarter" idx="12"/>
-          </p:nvPr>
-        </p:nvSpPr>
-        <p:spPr>
-          <a:noFill/>
-        </p:spPr>
-        <p:txBody>
-          <a:bodyPr/>
-          <a:lstStyle/>
-          <a:p>
-            <a:r>
-              <a:rPr lang="en-US"/>
-              <a:t>Slide </a:t>
-            </a:r>
-            <a:fld id="{642E7553-A61F-9A41-A7A2-954D1F757C3A}" type="slidenum">
-              <a:rPr lang="en-US"/>
-              <a:pPr/>
-              <a:t>22</a:t>
-            </a:fld>
-            <a:endParaRPr lang="en-US"/>
-          </a:p>
-        </p:txBody>
-      </p:sp>
-    </p:spTree>
-  </p:cSld>
-  <p:clrMapOvr>
-    <a:masterClrMapping/>
-  </p:clrMapOvr>
-  <p:timing>
-    <p:tnLst>
-      <p:par>
-        <p:cTn id="1" dur="indefinite" restart="never" nodeType="tmRoot"/>
-      </p:par>
-    </p:tnLst>
-  </p:timing>
-</p:sld>
-</file>
-
-<file path=ppt/slides/slide23.xml><?xml version="1.0" encoding="utf-8"?>
-<p:sld xmlns:a="http://schemas.openxmlformats.org/drawingml/2006/main" xmlns:r="http://schemas.openxmlformats.org/officeDocument/2006/relationships" xmlns:mc="http://schemas.openxmlformats.org/markup-compatibility/2006" xmlns:mv="urn:schemas-microsoft-com:mac:vml" xmlns:p="http://schemas.openxmlformats.org/presentationml/2006/main" mc:Ignorable="mv" mc:PreserveAttributes="mv:*">
-  <p:cSld>
-    <p:spTree>
-      <p:nvGrpSpPr>
-        <p:cNvPr id="1" name=""/>
-        <p:cNvGrpSpPr/>
-        <p:nvPr/>
-      </p:nvGrpSpPr>
-      <p:grpSpPr>
-        <a:xfrm>
-          <a:off x="0" y="0"/>
-          <a:ext cx="0" cy="0"/>
-          <a:chOff x="0" y="0"/>
-          <a:chExt cx="0" cy="0"/>
-        </a:xfrm>
-      </p:grpSpPr>
-      <p:sp>
-        <p:nvSpPr>
           <p:cNvPr id="35842" name="Title 1"/>
           <p:cNvSpPr>
             <a:spLocks noGrp="1"/>
@@ -8310,7 +8080,7 @@
             <a:fld id="{C819D0DE-97A2-C142-9B93-516E0974BCDA}" type="slidenum">
               <a:rPr lang="en-US"/>
               <a:pPr/>
-              <a:t>23</a:t>
+              <a:t>22</a:t>
             </a:fld>
             <a:endParaRPr lang="en-US"/>
           </a:p>
@@ -8599,30 +8369,6 @@
           </a:p>
         </p:txBody>
       </p:sp>
-      <p:pic>
-        <p:nvPicPr>
-          <p:cNvPr id="17411" name="Content Placeholder 4" descr="Vortex_initial.png"/>
-          <p:cNvPicPr>
-            <a:picLocks noGrp="1" noChangeAspect="1"/>
-          </p:cNvPicPr>
-          <p:nvPr>
-            <p:ph idx="1"/>
-          </p:nvPr>
-        </p:nvPicPr>
-        <p:blipFill>
-          <a:blip r:embed="rId2"/>
-          <a:srcRect l="-25211" r="-25211"/>
-          <a:stretch>
-            <a:fillRect/>
-          </a:stretch>
-        </p:blipFill>
-        <p:spPr>
-          <a:xfrm>
-            <a:off x="990600" y="1371600"/>
-            <a:ext cx="7196138" cy="3581400"/>
-          </a:xfrm>
-        </p:spPr>
-      </p:pic>
       <p:sp>
         <p:nvSpPr>
           <p:cNvPr id="17412" name="Slide Number Placeholder 3"/>
@@ -8752,6 +8498,30 @@
           </a:p>
         </p:txBody>
       </p:sp>
+      <p:pic>
+        <p:nvPicPr>
+          <p:cNvPr id="7" name="Pacific.avi">
+            <a:hlinkClick r:id="" action="ppaction://media"/>
+          </p:cNvPr>
+          <p:cNvPicPr/>
+          <p:nvPr>
+            <p:ph idx="1"/>
+            <a:videoFile r:link="rId1"/>
+          </p:nvPr>
+        </p:nvPicPr>
+        <p:blipFill>
+          <a:blip r:embed="rId3"/>
+          <a:stretch>
+            <a:fillRect/>
+          </a:stretch>
+        </p:blipFill>
+        <p:spPr>
+          <a:xfrm>
+            <a:off x="2347384" y="1417638"/>
+            <a:ext cx="5272616" cy="3954462"/>
+          </a:xfrm>
+        </p:spPr>
+      </p:pic>
     </p:spTree>
   </p:cSld>
   <p:clrMapOvr>
@@ -8760,7 +8530,150 @@
   <p:timing>
     <p:tnLst>
       <p:par>
-        <p:cTn id="1" dur="indefinite" restart="never" nodeType="tmRoot"/>
+        <p:cTn id="1" dur="indefinite" restart="never" nodeType="tmRoot">
+          <p:childTnLst>
+            <p:seq concurrent="1" nextAc="seek">
+              <p:cTn id="2" dur="indefinite" nodeType="mainSeq">
+                <p:childTnLst>
+                  <p:par>
+                    <p:cTn id="3" fill="hold">
+                      <p:stCondLst>
+                        <p:cond delay="indefinite"/>
+                        <p:cond evt="onBegin" delay="0">
+                          <p:tn val="2"/>
+                        </p:cond>
+                      </p:stCondLst>
+                      <p:childTnLst>
+                        <p:par>
+                          <p:cTn id="4" fill="hold">
+                            <p:stCondLst>
+                              <p:cond delay="0"/>
+                            </p:stCondLst>
+                            <p:childTnLst>
+                              <p:par>
+                                <p:cTn id="5" presetID="1" presetClass="mediacall" presetSubtype="0" fill="hold" nodeType="afterEffect">
+                                  <p:stCondLst>
+                                    <p:cond delay="0"/>
+                                  </p:stCondLst>
+                                  <p:childTnLst>
+                                    <p:cmd type="call" cmd="playFrom(0.0)">
+                                      <p:cBhvr>
+                                        <p:cTn id="6" dur="10400" fill="hold"/>
+                                        <p:tgtEl>
+                                          <p:spTgt spid="7"/>
+                                        </p:tgtEl>
+                                      </p:cBhvr>
+                                    </p:cmd>
+                                  </p:childTnLst>
+                                </p:cTn>
+                              </p:par>
+                            </p:childTnLst>
+                          </p:cTn>
+                        </p:par>
+                      </p:childTnLst>
+                    </p:cTn>
+                  </p:par>
+                </p:childTnLst>
+              </p:cTn>
+              <p:prevCondLst>
+                <p:cond evt="onPrev" delay="0">
+                  <p:tgtEl>
+                    <p:sldTgt/>
+                  </p:tgtEl>
+                </p:cond>
+              </p:prevCondLst>
+              <p:nextCondLst>
+                <p:cond evt="onNext" delay="0">
+                  <p:tgtEl>
+                    <p:sldTgt/>
+                  </p:tgtEl>
+                </p:cond>
+              </p:nextCondLst>
+            </p:seq>
+            <p:video>
+              <p:cMediaNode>
+                <p:cTn id="7" fill="hold" display="0">
+                  <p:stCondLst>
+                    <p:cond delay="indefinite"/>
+                  </p:stCondLst>
+                  <p:endCondLst>
+                    <p:cond evt="onNext" delay="0">
+                      <p:tgtEl>
+                        <p:sldTgt/>
+                      </p:tgtEl>
+                    </p:cond>
+                    <p:cond evt="onPrev" delay="0">
+                      <p:tgtEl>
+                        <p:sldTgt/>
+                      </p:tgtEl>
+                    </p:cond>
+                  </p:endCondLst>
+                </p:cTn>
+                <p:tgtEl>
+                  <p:spTgt spid="7"/>
+                </p:tgtEl>
+              </p:cMediaNode>
+            </p:video>
+            <p:seq concurrent="1" nextAc="seek">
+              <p:cTn id="8" restart="whenNotActive" fill="hold" evtFilter="cancelBubble" nodeType="interactiveSeq">
+                <p:stCondLst>
+                  <p:cond evt="onClick" delay="0">
+                    <p:tgtEl>
+                      <p:spTgt spid="7"/>
+                    </p:tgtEl>
+                  </p:cond>
+                </p:stCondLst>
+                <p:endSync evt="end" delay="0">
+                  <p:rtn val="all"/>
+                </p:endSync>
+                <p:childTnLst>
+                  <p:par>
+                    <p:cTn id="9" fill="hold">
+                      <p:stCondLst>
+                        <p:cond delay="0"/>
+                      </p:stCondLst>
+                      <p:childTnLst>
+                        <p:par>
+                          <p:cTn id="10" fill="hold">
+                            <p:stCondLst>
+                              <p:cond delay="0"/>
+                            </p:stCondLst>
+                            <p:childTnLst>
+                              <p:par>
+                                <p:cTn id="11" presetID="2" presetClass="mediacall" presetSubtype="0" fill="hold" nodeType="clickEffect">
+                                  <p:stCondLst>
+                                    <p:cond delay="0"/>
+                                  </p:stCondLst>
+                                  <p:childTnLst>
+                                    <p:cmd type="call" cmd="togglePause">
+                                      <p:cBhvr>
+                                        <p:cTn id="12" dur="1" fill="hold"/>
+                                        <p:tgtEl>
+                                          <p:spTgt spid="7"/>
+                                        </p:tgtEl>
+                                      </p:cBhvr>
+                                    </p:cmd>
+                                  </p:childTnLst>
+                                </p:cTn>
+                              </p:par>
+                            </p:childTnLst>
+                          </p:cTn>
+                        </p:par>
+                      </p:childTnLst>
+                    </p:cTn>
+                  </p:par>
+                </p:childTnLst>
+              </p:cTn>
+              <p:nextCondLst>
+                <p:cond evt="onClick" delay="0">
+                  <p:tgtEl>
+                    <p:spTgt spid="7"/>
+                  </p:tgtEl>
+                </p:cond>
+              </p:nextCondLst>
+            </p:seq>
+          </p:childTnLst>
+        </p:cTn>
       </p:par>
     </p:tnLst>
   </p:timing>
@@ -8786,224 +8699,6 @@
       </p:grpSpPr>
       <p:sp>
         <p:nvSpPr>
-          <p:cNvPr id="18434" name="Title 1"/>
-          <p:cNvSpPr>
-            <a:spLocks noGrp="1"/>
-          </p:cNvSpPr>
-          <p:nvPr>
-            <p:ph type="title"/>
-          </p:nvPr>
-        </p:nvSpPr>
-        <p:spPr/>
-        <p:txBody>
-          <a:bodyPr/>
-          <a:lstStyle/>
-          <a:p>
-            <a:r>
-              <a:rPr lang="en-US">
-                <a:ea typeface="ＭＳ Ｐゴシック" pitchFamily="-108" charset="-128"/>
-              </a:rPr>
-              <a:t>Contact discontinuities</a:t>
-            </a:r>
-          </a:p>
-        </p:txBody>
-      </p:sp>
-      <p:sp>
-        <p:nvSpPr>
-          <p:cNvPr id="18435" name="Content Placeholder 2"/>
-          <p:cNvSpPr>
-            <a:spLocks noGrp="1"/>
-          </p:cNvSpPr>
-          <p:nvPr>
-            <p:ph idx="1"/>
-          </p:nvPr>
-        </p:nvSpPr>
-        <p:spPr>
-          <a:xfrm>
-            <a:off x="1435608" y="1447800"/>
-            <a:ext cx="7498080" cy="685800"/>
-          </a:xfrm>
-        </p:spPr>
-        <p:txBody>
-          <a:bodyPr>
-            <a:normAutofit fontScale="62500" lnSpcReduction="20000"/>
-          </a:bodyPr>
-          <a:lstStyle/>
-          <a:p>
-            <a:r>
-              <a:rPr lang="en-US" dirty="0">
-                <a:ea typeface="ＭＳ Ｐゴシック" pitchFamily="-108" charset="-128"/>
-              </a:rPr>
-              <a:t>A discontinuity that occurs in density but other quantities like pressure, velocity, and specific internal energy are continuous.</a:t>
-            </a:r>
-          </a:p>
-        </p:txBody>
-      </p:sp>
-      <p:sp>
-        <p:nvSpPr>
-          <p:cNvPr id="18436" name="Slide Number Placeholder 3"/>
-          <p:cNvSpPr>
-            <a:spLocks noGrp="1"/>
-          </p:cNvSpPr>
-          <p:nvPr>
-            <p:ph type="sldNum" sz="quarter" idx="12"/>
-          </p:nvPr>
-        </p:nvSpPr>
-        <p:spPr>
-          <a:noFill/>
-        </p:spPr>
-        <p:txBody>
-          <a:bodyPr/>
-          <a:lstStyle/>
-          <a:p>
-            <a:r>
-              <a:rPr lang="en-US"/>
-              <a:t>Slide </a:t>
-            </a:r>
-            <a:fld id="{72AE0D7D-194E-4948-A8DB-205102AE649C}" type="slidenum">
-              <a:rPr lang="en-US"/>
-              <a:pPr/>
-              <a:t>5</a:t>
-            </a:fld>
-            <a:endParaRPr lang="en-US"/>
-          </a:p>
-        </p:txBody>
-      </p:sp>
-      <p:pic>
-        <p:nvPicPr>
-          <p:cNvPr id="18437" name="Picture 3"/>
-          <p:cNvPicPr>
-            <a:picLocks noChangeAspect="1" noChangeArrowheads="1"/>
-          </p:cNvPicPr>
-          <p:nvPr/>
-        </p:nvPicPr>
-        <p:blipFill>
-          <a:blip r:embed="rId2"/>
-          <a:srcRect/>
-          <a:stretch>
-            <a:fillRect/>
-          </a:stretch>
-        </p:blipFill>
-        <p:spPr bwMode="auto">
-          <a:xfrm>
-            <a:off x="990600" y="2133600"/>
-            <a:ext cx="2873375" cy="3492500"/>
-          </a:xfrm>
-          <a:prstGeom prst="rect">
-            <a:avLst/>
-          </a:prstGeom>
-          <a:noFill/>
-          <a:ln w="9525">
-            <a:noFill/>
-            <a:miter lim="800000"/>
-            <a:headEnd/>
-            <a:tailEnd/>
-          </a:ln>
-        </p:spPr>
-      </p:pic>
-      <p:sp>
-        <p:nvSpPr>
-          <p:cNvPr id="18438" name="TextBox 6"/>
-          <p:cNvSpPr txBox="1">
-            <a:spLocks noChangeArrowheads="1"/>
-          </p:cNvSpPr>
-          <p:nvPr/>
-        </p:nvSpPr>
-        <p:spPr bwMode="auto">
-          <a:xfrm>
-            <a:off x="1435608" y="6172200"/>
-            <a:ext cx="7022592" cy="338554"/>
-          </a:xfrm>
-          <a:prstGeom prst="rect">
-            <a:avLst/>
-          </a:prstGeom>
-          <a:noFill/>
-          <a:ln w="9525">
-            <a:noFill/>
-            <a:miter lim="800000"/>
-            <a:headEnd/>
-            <a:tailEnd/>
-          </a:ln>
-        </p:spPr>
-        <p:txBody>
-          <a:bodyPr wrap="square">
-            <a:prstTxWarp prst="textNoShape">
-              <a:avLst/>
-            </a:prstTxWarp>
-            <a:spAutoFit/>
-          </a:bodyPr>
-          <a:lstStyle/>
-          <a:p>
-            <a:pPr>
-              <a:spcBef>
-                <a:spcPct val="50000"/>
-              </a:spcBef>
-              <a:spcAft>
-                <a:spcPct val="50000"/>
-              </a:spcAft>
-              <a:buClr>
-                <a:srgbClr val="004080"/>
-              </a:buClr>
-              <a:buSzPct val="65000"/>
-            </a:pPr>
-            <a:r>
-              <a:rPr lang="en-US" sz="1600" dirty="0">
-                <a:ea typeface="ＭＳ Ｐゴシック" pitchFamily="-108" charset="-128"/>
-                <a:cs typeface="ＭＳ Ｐゴシック" pitchFamily="-108" charset="-128"/>
-              </a:rPr>
-              <a:t>From Harlow and </a:t>
-            </a:r>
-            <a:r>
-              <a:rPr lang="en-US" sz="1600" dirty="0" err="1">
-                <a:ea typeface="ＭＳ Ｐゴシック" pitchFamily="-108" charset="-128"/>
-                <a:cs typeface="ＭＳ Ｐゴシック" pitchFamily="-108" charset="-128"/>
-              </a:rPr>
-              <a:t>Amsden</a:t>
-            </a:r>
-            <a:r>
-              <a:rPr lang="en-US" sz="1600" dirty="0">
-                <a:ea typeface="ＭＳ Ｐゴシック" pitchFamily="-108" charset="-128"/>
-                <a:cs typeface="ＭＳ Ｐゴシック" pitchFamily="-108" charset="-128"/>
-              </a:rPr>
-              <a:t> - “Fluid Dynamics”</a:t>
-            </a:r>
-          </a:p>
-        </p:txBody>
-      </p:sp>
-    </p:spTree>
-  </p:cSld>
-  <p:clrMapOvr>
-    <a:masterClrMapping/>
-  </p:clrMapOvr>
-  <p:timing>
-    <p:tnLst>
-      <p:par>
-        <p:cTn id="1" dur="indefinite" restart="never" nodeType="tmRoot"/>
-      </p:par>
-    </p:tnLst>
-  </p:timing>
-</p:sld>
-</file>
-
-<file path=ppt/slides/slide6.xml><?xml version="1.0" encoding="utf-8"?>
-<p:sld xmlns:a="http://schemas.openxmlformats.org/drawingml/2006/main" xmlns:r="http://schemas.openxmlformats.org/officeDocument/2006/relationships" xmlns:mc="http://schemas.openxmlformats.org/markup-compatibility/2006" xmlns:mv="urn:schemas-microsoft-com:mac:vml" xmlns:p="http://schemas.openxmlformats.org/presentationml/2006/main" mc:Ignorable="mv" mc:PreserveAttributes="mv:*">
-  <p:cSld>
-    <p:spTree>
-      <p:nvGrpSpPr>
-        <p:cNvPr id="1" name=""/>
-        <p:cNvGrpSpPr/>
-        <p:nvPr/>
-      </p:nvGrpSpPr>
-      <p:grpSpPr>
-        <a:xfrm>
-          <a:off x="0" y="0"/>
-          <a:ext cx="0" cy="0"/>
-          <a:chOff x="0" y="0"/>
-          <a:chExt cx="0" cy="0"/>
-        </a:xfrm>
-      </p:grpSpPr>
-      <p:sp>
-        <p:nvSpPr>
           <p:cNvPr id="20482" name="Title 1"/>
           <p:cNvSpPr>
             <a:spLocks noGrp="1"/>
@@ -9121,7 +8816,7 @@
             <a:fld id="{D2F573F5-8635-F946-99FF-73D55A1DF9E7}" type="slidenum">
               <a:rPr lang="en-US"/>
               <a:pPr/>
-              <a:t>6</a:t>
+              <a:t>5</a:t>
             </a:fld>
             <a:endParaRPr lang="en-US"/>
           </a:p>
@@ -9319,7 +9014,7 @@
 </p:sld>
 </file>
 
-<file path=ppt/slides/slide7.xml><?xml version="1.0" encoding="utf-8"?>
+<file path=ppt/slides/slide6.xml><?xml version="1.0" encoding="utf-8"?>
 <p:sld xmlns:a="http://schemas.openxmlformats.org/drawingml/2006/main" xmlns:r="http://schemas.openxmlformats.org/officeDocument/2006/relationships" xmlns:mc="http://schemas.openxmlformats.org/markup-compatibility/2006" xmlns:mv="urn:schemas-microsoft-com:mac:vml" xmlns:p="http://schemas.openxmlformats.org/presentationml/2006/main" mc:Ignorable="mv" mc:PreserveAttributes="mv:*">
   <p:cSld>
     <p:spTree>
@@ -9518,7 +9213,7 @@
 </p:sld>
 </file>
 
-<file path=ppt/slides/slide8.xml><?xml version="1.0" encoding="utf-8"?>
+<file path=ppt/slides/slide7.xml><?xml version="1.0" encoding="utf-8"?>
 <p:sld xmlns:a="http://schemas.openxmlformats.org/drawingml/2006/main" xmlns:r="http://schemas.openxmlformats.org/officeDocument/2006/relationships" xmlns:mc="http://schemas.openxmlformats.org/markup-compatibility/2006" xmlns:mv="urn:schemas-microsoft-com:mac:vml" xmlns:p="http://schemas.openxmlformats.org/presentationml/2006/main" mc:Ignorable="mv" mc:PreserveAttributes="mv:*">
   <p:cSld>
     <p:spTree>
@@ -9670,7 +9365,7 @@
             <a:fld id="{F361AA44-26A1-D347-8145-603C7EBA69F0}" type="slidenum">
               <a:rPr lang="en-US"/>
               <a:pPr/>
-              <a:t>8</a:t>
+              <a:t>7</a:t>
             </a:fld>
             <a:endParaRPr lang="en-US"/>
           </a:p>
@@ -9868,7 +9563,7 @@
 </p:sld>
 </file>
 
-<file path=ppt/slides/slide9.xml><?xml version="1.0" encoding="utf-8"?>
+<file path=ppt/slides/slide8.xml><?xml version="1.0" encoding="utf-8"?>
 <p:sld xmlns:a="http://schemas.openxmlformats.org/drawingml/2006/main" xmlns:r="http://schemas.openxmlformats.org/officeDocument/2006/relationships" xmlns:mc="http://schemas.openxmlformats.org/markup-compatibility/2006" xmlns:mv="urn:schemas-microsoft-com:mac:vml" xmlns:p="http://schemas.openxmlformats.org/presentationml/2006/main" mc:Ignorable="mv" mc:PreserveAttributes="mv:*">
   <p:cSld>
     <p:spTree>
@@ -9971,7 +9666,7 @@
             <a:fld id="{F7F1AD6D-2FF6-C14C-BD1C-443FD5D06D86}" type="slidenum">
               <a:rPr lang="en-US"/>
               <a:pPr/>
-              <a:t>9</a:t>
+              <a:t>8</a:t>
             </a:fld>
             <a:endParaRPr lang="en-US"/>
           </a:p>
@@ -10166,6 +9861,235 @@
       </p:par>
     </p:tnLst>
   </p:timing>
+</p:sld>
+</file>
+
+<file path=ppt/slides/slide9.xml><?xml version="1.0" encoding="utf-8"?>
+<p:sld xmlns:a="http://schemas.openxmlformats.org/drawingml/2006/main" xmlns:r="http://schemas.openxmlformats.org/officeDocument/2006/relationships" xmlns:mc="http://schemas.openxmlformats.org/markup-compatibility/2006" xmlns:mv="urn:schemas-microsoft-com:mac:vml" xmlns:p="http://schemas.openxmlformats.org/presentationml/2006/main" mc:Ignorable="mv" mc:PreserveAttributes="mv:*">
+  <p:cSld>
+    <p:spTree>
+      <p:nvGrpSpPr>
+        <p:cNvPr id="1" name=""/>
+        <p:cNvGrpSpPr/>
+        <p:nvPr/>
+      </p:nvGrpSpPr>
+      <p:grpSpPr>
+        <a:xfrm>
+          <a:off x="0" y="0"/>
+          <a:ext cx="0" cy="0"/>
+          <a:chOff x="0" y="0"/>
+          <a:chExt cx="0" cy="0"/>
+        </a:xfrm>
+      </p:grpSpPr>
+      <p:sp>
+        <p:nvSpPr>
+          <p:cNvPr id="24578" name="Title 1"/>
+          <p:cNvSpPr>
+            <a:spLocks noGrp="1"/>
+          </p:cNvSpPr>
+          <p:nvPr>
+            <p:ph type="title"/>
+          </p:nvPr>
+        </p:nvSpPr>
+        <p:spPr/>
+        <p:txBody>
+          <a:bodyPr>
+            <a:normAutofit fontScale="90000"/>
+          </a:bodyPr>
+          <a:lstStyle/>
+          <a:p>
+            <a:r>
+              <a:rPr lang="en-US">
+                <a:ea typeface="ＭＳ Ｐゴシック" pitchFamily="-108" charset="-128"/>
+              </a:rPr>
+              <a:t>Theory of the Streamline Upwind Petrov-Galerkin (SUPG)</a:t>
+            </a:r>
+          </a:p>
+        </p:txBody>
+      </p:sp>
+      <p:sp>
+        <p:nvSpPr>
+          <p:cNvPr id="24579" name="Content Placeholder 2"/>
+          <p:cNvSpPr>
+            <a:spLocks noGrp="1"/>
+          </p:cNvSpPr>
+          <p:nvPr>
+            <p:ph idx="1"/>
+          </p:nvPr>
+        </p:nvSpPr>
+        <p:spPr/>
+        <p:txBody>
+          <a:bodyPr>
+            <a:normAutofit fontScale="77500" lnSpcReduction="20000"/>
+          </a:bodyPr>
+          <a:lstStyle/>
+          <a:p>
+            <a:r>
+              <a:rPr lang="en-US" u="sng">
+                <a:ea typeface="ＭＳ Ｐゴシック" pitchFamily="-108" charset="-128"/>
+              </a:rPr>
+              <a:t>Trial functions </a:t>
+            </a:r>
+            <a:r>
+              <a:rPr lang="en-US">
+                <a:ea typeface="ＭＳ Ｐゴシック" pitchFamily="-108" charset="-128"/>
+              </a:rPr>
+              <a:t>– a set of functions assumed to approximate the underlying solution. The trial functions have degrees of freedom that must be solved for.</a:t>
+            </a:r>
+          </a:p>
+          <a:p>
+            <a:r>
+              <a:rPr lang="en-US" u="sng">
+                <a:ea typeface="ＭＳ Ｐゴシック" pitchFamily="-108" charset="-128"/>
+              </a:rPr>
+              <a:t>Test functions </a:t>
+            </a:r>
+            <a:r>
+              <a:rPr lang="en-US">
+                <a:ea typeface="ＭＳ Ｐゴシック" pitchFamily="-108" charset="-128"/>
+              </a:rPr>
+              <a:t>– a set of functions used to solve for the degrees of freedom of the trial functions.  Uses the weak formulation of the governing equation.</a:t>
+            </a:r>
+          </a:p>
+          <a:p>
+            <a:r>
+              <a:rPr lang="en-US" u="sng">
+                <a:ea typeface="ＭＳ Ｐゴシック" pitchFamily="-108" charset="-128"/>
+              </a:rPr>
+              <a:t>Petrov-Galerkin</a:t>
+            </a:r>
+            <a:r>
+              <a:rPr lang="en-US">
+                <a:ea typeface="ＭＳ Ｐゴシック" pitchFamily="-108" charset="-128"/>
+              </a:rPr>
+              <a:t> – Test functions </a:t>
+            </a:r>
+            <a:r>
+              <a:rPr lang="en-US">
+                <a:ea typeface="Arial" pitchFamily="-108" charset="0"/>
+                <a:cs typeface="Arial" pitchFamily="-108" charset="0"/>
+              </a:rPr>
+              <a:t>≠ Trial functions</a:t>
+            </a:r>
+            <a:r>
+              <a:rPr lang="en-US">
+                <a:ea typeface="ＭＳ Ｐゴシック" pitchFamily="-108" charset="-128"/>
+              </a:rPr>
+              <a:t> </a:t>
+            </a:r>
+          </a:p>
+          <a:p>
+            <a:r>
+              <a:rPr lang="en-US" u="sng">
+                <a:ea typeface="ＭＳ Ｐゴシック" pitchFamily="-108" charset="-128"/>
+              </a:rPr>
+              <a:t>SUPG</a:t>
+            </a:r>
+            <a:r>
+              <a:rPr lang="en-US">
+                <a:ea typeface="ＭＳ Ｐゴシック" pitchFamily="-108" charset="-128"/>
+              </a:rPr>
+              <a:t> – Choose test functions to be:</a:t>
+            </a:r>
+          </a:p>
+          <a:p>
+            <a:endParaRPr lang="en-US">
+              <a:ea typeface="ＭＳ Ｐゴシック" pitchFamily="-108" charset="-128"/>
+            </a:endParaRPr>
+          </a:p>
+          <a:p>
+            <a:pPr>
+              <a:buFont typeface="Wingdings" pitchFamily="-108" charset="2"/>
+              <a:buNone/>
+            </a:pPr>
+            <a:r>
+              <a:rPr lang="en-US">
+                <a:ea typeface="ＭＳ Ｐゴシック" pitchFamily="-108" charset="-128"/>
+              </a:rPr>
+              <a:t>	</a:t>
+            </a:r>
+          </a:p>
+          <a:p>
+            <a:pPr>
+              <a:buFont typeface="Wingdings" pitchFamily="-108" charset="2"/>
+              <a:buNone/>
+            </a:pPr>
+            <a:r>
+              <a:rPr lang="en-US">
+                <a:ea typeface="ＭＳ Ｐゴシック" pitchFamily="-108" charset="-128"/>
+              </a:rPr>
+              <a:t>				where N is a trial function</a:t>
+            </a:r>
+          </a:p>
+        </p:txBody>
+      </p:sp>
+      <p:sp>
+        <p:nvSpPr>
+          <p:cNvPr id="24580" name="Slide Number Placeholder 3"/>
+          <p:cNvSpPr>
+            <a:spLocks noGrp="1"/>
+          </p:cNvSpPr>
+          <p:nvPr>
+            <p:ph type="sldNum" sz="quarter" idx="12"/>
+          </p:nvPr>
+        </p:nvSpPr>
+        <p:spPr>
+          <a:noFill/>
+        </p:spPr>
+        <p:txBody>
+          <a:bodyPr/>
+          <a:lstStyle/>
+          <a:p>
+            <a:r>
+              <a:rPr lang="en-US"/>
+              <a:t>Slide </a:t>
+            </a:r>
+            <a:fld id="{9C0C6800-C07A-B840-9F81-62616F777194}" type="slidenum">
+              <a:rPr lang="en-US"/>
+              <a:pPr/>
+              <a:t>9</a:t>
+            </a:fld>
+            <a:endParaRPr lang="en-US"/>
+          </a:p>
+        </p:txBody>
+      </p:sp>
+      <p:pic>
+        <p:nvPicPr>
+          <p:cNvPr id="24581" name="Picture 47"/>
+          <p:cNvPicPr>
+            <a:picLocks noChangeAspect="1" noChangeArrowheads="1"/>
+          </p:cNvPicPr>
+          <p:nvPr/>
+        </p:nvPicPr>
+        <p:blipFill>
+          <a:blip r:embed="rId2"/>
+          <a:srcRect/>
+          <a:stretch>
+            <a:fillRect/>
+          </a:stretch>
+        </p:blipFill>
+        <p:spPr bwMode="auto">
+          <a:xfrm>
+            <a:off x="2743200" y="4191000"/>
+            <a:ext cx="3960813" cy="919163"/>
+          </a:xfrm>
+          <a:prstGeom prst="rect">
+            <a:avLst/>
+          </a:prstGeom>
+          <a:noFill/>
+          <a:ln w="9525">
+            <a:noFill/>
+            <a:miter lim="800000"/>
+            <a:headEnd/>
+            <a:tailEnd/>
+          </a:ln>
+        </p:spPr>
+      </p:pic>
+    </p:spTree>
+  </p:cSld>
+  <p:clrMapOvr>
+    <a:masterClrMapping/>
+  </p:clrMapOvr>
 </p:sld>
 </file>
 

</xml_diff>

<commit_message>
Minor Modification to the presentation
</commit_message>
<xml_diff>
--- a/Final Research Presentation/Final_LongPres_Davis_Matern.pptx
+++ b/Final Research Presentation/Final_LongPres_Davis_Matern.pptx
@@ -214,7 +214,7 @@
             <a:fld id="{D454FE15-F6B3-874B-B378-F652C1F4788C}" type="datetimeFigureOut">
               <a:rPr lang="en-US" smtClean="0"/>
               <a:pPr/>
-              <a:t>8/14/12</a:t>
+              <a:t>8/15/12</a:t>
             </a:fld>
             <a:endParaRPr lang="en-US"/>
           </a:p>
@@ -1071,7 +1071,7 @@
             <a:fld id="{4BDB84C0-9A3A-884B-883E-F7760F12E0B8}" type="datetimeFigureOut">
               <a:rPr lang="en-US" smtClean="0"/>
               <a:pPr/>
-              <a:t>8/14/12</a:t>
+              <a:t>8/15/12</a:t>
             </a:fld>
             <a:endParaRPr lang="en-US"/>
           </a:p>
@@ -1372,7 +1372,7 @@
             <a:fld id="{4BDB84C0-9A3A-884B-883E-F7760F12E0B8}" type="datetimeFigureOut">
               <a:rPr lang="en-US" smtClean="0"/>
               <a:pPr/>
-              <a:t>8/14/12</a:t>
+              <a:t>8/15/12</a:t>
             </a:fld>
             <a:endParaRPr lang="en-US"/>
           </a:p>
@@ -1549,7 +1549,7 @@
             <a:fld id="{4BDB84C0-9A3A-884B-883E-F7760F12E0B8}" type="datetimeFigureOut">
               <a:rPr lang="en-US" smtClean="0"/>
               <a:pPr/>
-              <a:t>8/14/12</a:t>
+              <a:t>8/15/12</a:t>
             </a:fld>
             <a:endParaRPr lang="en-US"/>
           </a:p>
@@ -1716,7 +1716,7 @@
             <a:fld id="{4BDB84C0-9A3A-884B-883E-F7760F12E0B8}" type="datetimeFigureOut">
               <a:rPr lang="en-US" smtClean="0"/>
               <a:pPr/>
-              <a:t>8/14/12</a:t>
+              <a:t>8/15/12</a:t>
             </a:fld>
             <a:endParaRPr lang="en-US"/>
           </a:p>
@@ -1976,7 +1976,7 @@
             <a:fld id="{4BDB84C0-9A3A-884B-883E-F7760F12E0B8}" type="datetimeFigureOut">
               <a:rPr lang="en-US" smtClean="0"/>
               <a:pPr/>
-              <a:t>8/14/12</a:t>
+              <a:t>8/15/12</a:t>
             </a:fld>
             <a:endParaRPr lang="en-US"/>
           </a:p>
@@ -2430,7 +2430,7 @@
             <a:fld id="{4BDB84C0-9A3A-884B-883E-F7760F12E0B8}" type="datetimeFigureOut">
               <a:rPr lang="en-US" smtClean="0"/>
               <a:pPr/>
-              <a:t>8/14/12</a:t>
+              <a:t>8/15/12</a:t>
             </a:fld>
             <a:endParaRPr lang="en-US"/>
           </a:p>
@@ -2910,7 +2910,7 @@
             <a:fld id="{4BDB84C0-9A3A-884B-883E-F7760F12E0B8}" type="datetimeFigureOut">
               <a:rPr lang="en-US" smtClean="0"/>
               <a:pPr/>
-              <a:t>8/14/12</a:t>
+              <a:t>8/15/12</a:t>
             </a:fld>
             <a:endParaRPr lang="en-US"/>
           </a:p>
@@ -3030,7 +3030,7 @@
             <a:fld id="{4BDB84C0-9A3A-884B-883E-F7760F12E0B8}" type="datetimeFigureOut">
               <a:rPr lang="en-US" smtClean="0"/>
               <a:pPr/>
-              <a:t>8/14/12</a:t>
+              <a:t>8/15/12</a:t>
             </a:fld>
             <a:endParaRPr lang="en-US"/>
           </a:p>
@@ -3168,7 +3168,7 @@
             <a:fld id="{4BDB84C0-9A3A-884B-883E-F7760F12E0B8}" type="datetimeFigureOut">
               <a:rPr lang="en-US" smtClean="0"/>
               <a:pPr/>
-              <a:t>8/14/12</a:t>
+              <a:t>8/15/12</a:t>
             </a:fld>
             <a:endParaRPr lang="en-US"/>
           </a:p>
@@ -3481,7 +3481,7 @@
             <a:fld id="{4BDB84C0-9A3A-884B-883E-F7760F12E0B8}" type="datetimeFigureOut">
               <a:rPr lang="en-US" smtClean="0"/>
               <a:pPr/>
-              <a:t>8/14/12</a:t>
+              <a:t>8/15/12</a:t>
             </a:fld>
             <a:endParaRPr lang="en-US"/>
           </a:p>
@@ -3610,7 +3610,7 @@
             <a:fld id="{4BDB84C0-9A3A-884B-883E-F7760F12E0B8}" type="datetimeFigureOut">
               <a:rPr lang="en-US" smtClean="0"/>
               <a:pPr/>
-              <a:t>8/14/12</a:t>
+              <a:t>8/15/12</a:t>
             </a:fld>
             <a:endParaRPr lang="en-US"/>
           </a:p>
@@ -4368,7 +4368,7 @@
             <a:fld id="{4BDB84C0-9A3A-884B-883E-F7760F12E0B8}" type="datetimeFigureOut">
               <a:rPr lang="en-US" smtClean="0"/>
               <a:pPr/>
-              <a:t>8/14/12</a:t>
+              <a:t>8/15/12</a:t>
             </a:fld>
             <a:endParaRPr lang="en-US"/>
           </a:p>
@@ -6338,13 +6338,6 @@
               </a:rPr>
               <a:t>A donor-cell approximation is defined in terms of the local Courant number</a:t>
             </a:r>
-            <a:endParaRPr lang="en-US" dirty="0" smtClean="0">
-              <a:solidFill>
-                <a:srgbClr val="000000"/>
-              </a:solidFill>
-              <a:ea typeface="Arial" pitchFamily="-108" charset="0"/>
-              <a:cs typeface="Arial" pitchFamily="-108" charset="0"/>
-            </a:endParaRPr>
           </a:p>
           <a:p>
             <a:pPr algn="just"/>
@@ -6356,17 +6349,7 @@
                 <a:ea typeface="Arial" pitchFamily="-108" charset="0"/>
                 <a:cs typeface="Arial" pitchFamily="-108" charset="0"/>
               </a:rPr>
-              <a:t>Adds </a:t>
-            </a:r>
-            <a:r>
-              <a:rPr lang="en-US" dirty="0" smtClean="0">
-                <a:solidFill>
-                  <a:srgbClr val="000000"/>
-                </a:solidFill>
-                <a:ea typeface="Arial" pitchFamily="-108" charset="0"/>
-                <a:cs typeface="Arial" pitchFamily="-108" charset="0"/>
-              </a:rPr>
-              <a:t>a diffusive convective flux</a:t>
+              <a:t>Adds a diffusive convective flux</a:t>
             </a:r>
           </a:p>
           <a:p>
@@ -8571,19 +8554,7 @@
               <a:rPr lang="en-US" dirty="0" smtClean="0">
                 <a:ea typeface="ＭＳ Ｐゴシック" pitchFamily="-108" charset="-128"/>
               </a:rPr>
-              <a:t> more of these schemes </a:t>
-            </a:r>
-            <a:r>
-              <a:rPr lang="en-US" dirty="0" smtClean="0">
-                <a:ea typeface="ＭＳ Ｐゴシック" pitchFamily="-108" charset="-128"/>
-              </a:rPr>
-              <a:t>i</a:t>
-            </a:r>
-            <a:r>
-              <a:rPr lang="en-US" dirty="0" smtClean="0">
-                <a:ea typeface="ＭＳ Ｐゴシック" pitchFamily="-108" charset="-128"/>
-              </a:rPr>
-              <a:t>n </a:t>
+              <a:t> more of these schemes in </a:t>
             </a:r>
             <a:r>
               <a:rPr lang="en-US" dirty="0">
@@ -8615,17 +8586,8 @@
               <a:rPr lang="en-US" dirty="0" smtClean="0">
                 <a:ea typeface="ＭＳ Ｐゴシック" pitchFamily="-108" charset="-128"/>
               </a:rPr>
-              <a:t>Equation solvers with </a:t>
-            </a:r>
-            <a:r>
-              <a:rPr lang="en-US" dirty="0" smtClean="0">
-                <a:ea typeface="ＭＳ Ｐゴシック" pitchFamily="-108" charset="-128"/>
-              </a:rPr>
-              <a:t>some of these schemes</a:t>
-            </a:r>
-            <a:endParaRPr lang="en-US" dirty="0" smtClean="0">
-              <a:ea typeface="ＭＳ Ｐゴシック" pitchFamily="-108" charset="-128"/>
-            </a:endParaRPr>
+              <a:t>Equation solvers with some of these schemes</a:t>
+            </a:r>
           </a:p>
           <a:p>
             <a:r>
@@ -8876,9 +8838,6 @@
               </a:rPr>
               <a:t>Problems with capturing discontinuities</a:t>
             </a:r>
-            <a:endParaRPr lang="en-US" dirty="0" smtClean="0">
-              <a:ea typeface="ＭＳ Ｐゴシック" pitchFamily="-108" charset="-128"/>
-            </a:endParaRPr>
           </a:p>
           <a:p>
             <a:pPr eaLnBrk="1" hangingPunct="1"/>
@@ -8935,7 +8894,6 @@
               <a:rPr lang="en-US" dirty="0" smtClean="0"/>
               <a:t>Early MPDATA results</a:t>
             </a:r>
-            <a:endParaRPr lang="en-US" dirty="0" smtClean="0"/>
           </a:p>
           <a:p>
             <a:pPr eaLnBrk="1" hangingPunct="1"/>
@@ -8967,13 +8925,7 @@
               <a:rPr lang="en-US" dirty="0" smtClean="0">
                 <a:ea typeface="ＭＳ Ｐゴシック" pitchFamily="-108" charset="-128"/>
               </a:rPr>
-              <a:t>Results solving</a:t>
-            </a:r>
-            <a:r>
-              <a:rPr lang="en-US" dirty="0" smtClean="0">
-                <a:ea typeface="ＭＳ Ｐゴシック" pitchFamily="-108" charset="-128"/>
-              </a:rPr>
-              <a:t> the shallow water equations</a:t>
+              <a:t>Results solving the shallow water equations</a:t>
             </a:r>
           </a:p>
           <a:p>
@@ -10652,7 +10604,11 @@
             </a:r>
             <a:r>
               <a:rPr lang="en-US" dirty="0" smtClean="0"/>
-              <a:t> scheme [10]</a:t>
+              <a:t> </a:t>
+            </a:r>
+            <a:r>
+              <a:rPr lang="en-US" dirty="0" smtClean="0"/>
+              <a:t>scheme</a:t>
             </a:r>
           </a:p>
           <a:p>
@@ -10678,13 +10634,8 @@
             </a:r>
             <a:r>
               <a:rPr lang="en-US" dirty="0" smtClean="0"/>
-              <a:t> </a:t>
-            </a:r>
-            <a:r>
-              <a:rPr lang="en-US" dirty="0" smtClean="0"/>
-              <a:t>function</a:t>
-            </a:r>
-            <a:endParaRPr lang="en-US" dirty="0" smtClean="0"/>
+              <a:t> function</a:t>
+            </a:r>
           </a:p>
         </p:txBody>
       </p:sp>

</xml_diff>

<commit_message>
Final LongPres and added a ShortPres folder with my presentation in it
</commit_message>
<xml_diff>
--- a/Final Research Presentation/Final_LongPres_Davis_Matern.pptx
+++ b/Final Research Presentation/Final_LongPres_Davis_Matern.pptx
@@ -5,31 +5,32 @@
     <p:sldMasterId id="2147483660" r:id="rId1"/>
   </p:sldMasterIdLst>
   <p:notesMasterIdLst>
-    <p:notesMasterId r:id="rId24"/>
+    <p:notesMasterId r:id="rId25"/>
   </p:notesMasterIdLst>
   <p:sldIdLst>
     <p:sldId id="278" r:id="rId2"/>
     <p:sldId id="279" r:id="rId3"/>
     <p:sldId id="258" r:id="rId4"/>
     <p:sldId id="259" r:id="rId5"/>
-    <p:sldId id="286" r:id="rId6"/>
-    <p:sldId id="262" r:id="rId7"/>
-    <p:sldId id="283" r:id="rId8"/>
-    <p:sldId id="263" r:id="rId9"/>
-    <p:sldId id="264" r:id="rId10"/>
-    <p:sldId id="282" r:id="rId11"/>
-    <p:sldId id="289" r:id="rId12"/>
-    <p:sldId id="268" r:id="rId13"/>
-    <p:sldId id="280" r:id="rId14"/>
-    <p:sldId id="287" r:id="rId15"/>
-    <p:sldId id="288" r:id="rId16"/>
-    <p:sldId id="271" r:id="rId17"/>
-    <p:sldId id="272" r:id="rId18"/>
-    <p:sldId id="273" r:id="rId19"/>
-    <p:sldId id="281" r:id="rId20"/>
-    <p:sldId id="275" r:id="rId21"/>
-    <p:sldId id="276" r:id="rId22"/>
-    <p:sldId id="277" r:id="rId23"/>
+    <p:sldId id="292" r:id="rId6"/>
+    <p:sldId id="286" r:id="rId7"/>
+    <p:sldId id="262" r:id="rId8"/>
+    <p:sldId id="283" r:id="rId9"/>
+    <p:sldId id="263" r:id="rId10"/>
+    <p:sldId id="264" r:id="rId11"/>
+    <p:sldId id="282" r:id="rId12"/>
+    <p:sldId id="289" r:id="rId13"/>
+    <p:sldId id="268" r:id="rId14"/>
+    <p:sldId id="280" r:id="rId15"/>
+    <p:sldId id="287" r:id="rId16"/>
+    <p:sldId id="288" r:id="rId17"/>
+    <p:sldId id="271" r:id="rId18"/>
+    <p:sldId id="290" r:id="rId19"/>
+    <p:sldId id="291" r:id="rId20"/>
+    <p:sldId id="281" r:id="rId21"/>
+    <p:sldId id="275" r:id="rId22"/>
+    <p:sldId id="276" r:id="rId23"/>
+    <p:sldId id="277" r:id="rId24"/>
   </p:sldIdLst>
   <p:sldSz cx="9144000" cy="6858000" type="screen4x3"/>
   <p:notesSz cx="6858000" cy="9144000"/>
@@ -659,7 +660,7 @@
             <a:fld id="{0A180F3D-82C6-1B48-9FBF-2DBFC87DC5F9}" type="slidenum">
               <a:rPr lang="en-US" smtClean="0"/>
               <a:pPr/>
-              <a:t>7</a:t>
+              <a:t>8</a:t>
             </a:fld>
             <a:endParaRPr lang="en-US"/>
           </a:p>
@@ -750,7 +751,7 @@
               <a:pPr>
                 <a:defRPr/>
               </a:pPr>
-              <a:t>13</a:t>
+              <a:t>14</a:t>
             </a:fld>
             <a:endParaRPr lang="en-US"/>
           </a:p>
@@ -836,7 +837,7 @@
             <a:fld id="{0A180F3D-82C6-1B48-9FBF-2DBFC87DC5F9}" type="slidenum">
               <a:rPr lang="en-US" smtClean="0"/>
               <a:pPr/>
-              <a:t>14</a:t>
+              <a:t>15</a:t>
             </a:fld>
             <a:endParaRPr lang="en-US"/>
           </a:p>
@@ -926,7 +927,7 @@
             <a:fld id="{0A180F3D-82C6-1B48-9FBF-2DBFC87DC5F9}" type="slidenum">
               <a:rPr lang="en-US" smtClean="0"/>
               <a:pPr/>
-              <a:t>19</a:t>
+              <a:t>20</a:t>
             </a:fld>
             <a:endParaRPr lang="en-US"/>
           </a:p>
@@ -5044,6 +5045,343 @@
       </p:grpSpPr>
       <p:sp>
         <p:nvSpPr>
+          <p:cNvPr id="22530" name="Title 1"/>
+          <p:cNvSpPr>
+            <a:spLocks noGrp="1"/>
+          </p:cNvSpPr>
+          <p:nvPr>
+            <p:ph type="title"/>
+          </p:nvPr>
+        </p:nvSpPr>
+        <p:spPr/>
+        <p:txBody>
+          <a:bodyPr>
+            <a:normAutofit fontScale="90000"/>
+          </a:bodyPr>
+          <a:lstStyle/>
+          <a:p>
+            <a:r>
+              <a:rPr lang="en-US" dirty="0" smtClean="0"/>
+              <a:t>Monotone Upstream Scheme for Conservation Laws (MUSCL)</a:t>
+            </a:r>
+            <a:endParaRPr lang="en-US" dirty="0">
+              <a:ea typeface="ＭＳ Ｐゴシック" pitchFamily="-108" charset="-128"/>
+            </a:endParaRPr>
+          </a:p>
+        </p:txBody>
+      </p:sp>
+      <p:sp>
+        <p:nvSpPr>
+          <p:cNvPr id="22531" name="Content Placeholder 2"/>
+          <p:cNvSpPr>
+            <a:spLocks noGrp="1"/>
+          </p:cNvSpPr>
+          <p:nvPr>
+            <p:ph idx="1"/>
+          </p:nvPr>
+        </p:nvSpPr>
+        <p:spPr>
+          <a:xfrm>
+            <a:off x="1435608" y="1447800"/>
+            <a:ext cx="7498080" cy="1905000"/>
+          </a:xfrm>
+        </p:spPr>
+        <p:txBody>
+          <a:bodyPr>
+            <a:normAutofit fontScale="77500" lnSpcReduction="20000"/>
+          </a:bodyPr>
+          <a:lstStyle/>
+          <a:p>
+            <a:r>
+              <a:rPr lang="en-US" dirty="0" smtClean="0"/>
+              <a:t>Used a modified </a:t>
+            </a:r>
+            <a:r>
+              <a:rPr lang="en-US" dirty="0" err="1" smtClean="0"/>
+              <a:t>Osher-Chakravarthy</a:t>
+            </a:r>
+            <a:r>
+              <a:rPr lang="en-US" dirty="0" smtClean="0"/>
+              <a:t> </a:t>
+            </a:r>
+            <a:r>
+              <a:rPr lang="en-US" dirty="0" smtClean="0"/>
+              <a:t>scheme</a:t>
+            </a:r>
+          </a:p>
+          <a:p>
+            <a:r>
+              <a:rPr lang="en-US" dirty="0" smtClean="0"/>
+              <a:t>Upwind biased</a:t>
+            </a:r>
+          </a:p>
+          <a:p>
+            <a:r>
+              <a:rPr lang="en-US" dirty="0" smtClean="0"/>
+              <a:t>Second order TVD approximation</a:t>
+            </a:r>
+          </a:p>
+          <a:p>
+            <a:r>
+              <a:rPr lang="en-US" dirty="0" smtClean="0"/>
+              <a:t>Numerical </a:t>
+            </a:r>
+            <a:r>
+              <a:rPr lang="en-US" dirty="0" smtClean="0"/>
+              <a:t>oscillations avoided using a </a:t>
+            </a:r>
+            <a:r>
+              <a:rPr lang="en-US" dirty="0" err="1" smtClean="0"/>
+              <a:t>minmod</a:t>
+            </a:r>
+            <a:r>
+              <a:rPr lang="en-US" dirty="0" smtClean="0"/>
+              <a:t> function</a:t>
+            </a:r>
+          </a:p>
+        </p:txBody>
+      </p:sp>
+      <p:sp>
+        <p:nvSpPr>
+          <p:cNvPr id="22532" name="Slide Number Placeholder 3"/>
+          <p:cNvSpPr>
+            <a:spLocks noGrp="1"/>
+          </p:cNvSpPr>
+          <p:nvPr>
+            <p:ph type="sldNum" sz="quarter" idx="12"/>
+          </p:nvPr>
+        </p:nvSpPr>
+        <p:spPr>
+          <a:noFill/>
+        </p:spPr>
+        <p:txBody>
+          <a:bodyPr/>
+          <a:lstStyle/>
+          <a:p>
+            <a:r>
+              <a:rPr lang="en-US"/>
+              <a:t>Slide </a:t>
+            </a:r>
+            <a:fld id="{F7F1AD6D-2FF6-C14C-BD1C-443FD5D06D86}" type="slidenum">
+              <a:rPr lang="en-US"/>
+              <a:pPr/>
+              <a:t>10</a:t>
+            </a:fld>
+            <a:endParaRPr lang="en-US"/>
+          </a:p>
+        </p:txBody>
+      </p:sp>
+      <p:pic>
+        <p:nvPicPr>
+          <p:cNvPr id="22533" name="Picture 5" descr="/Users/Sean/Movies/Any Video Converter Ultimate/Common Used Video Formats/MUSCL.avi">
+            <a:hlinkClick r:id="" action="ppaction://media"/>
+          </p:cNvPr>
+          <p:cNvPicPr/>
+          <p:nvPr>
+            <a:videoFile r:link="rId1"/>
+          </p:nvPr>
+        </p:nvPicPr>
+        <p:blipFill>
+          <a:blip r:embed="rId3"/>
+          <a:srcRect/>
+          <a:stretch>
+            <a:fillRect/>
+          </a:stretch>
+        </p:blipFill>
+        <p:spPr bwMode="auto">
+          <a:xfrm>
+            <a:off x="2895600" y="3352800"/>
+            <a:ext cx="4064000" cy="3048000"/>
+          </a:xfrm>
+          <a:prstGeom prst="rect">
+            <a:avLst/>
+          </a:prstGeom>
+          <a:noFill/>
+          <a:ln w="9525">
+            <a:noFill/>
+            <a:miter lim="800000"/>
+            <a:headEnd/>
+            <a:tailEnd/>
+          </a:ln>
+        </p:spPr>
+      </p:pic>
+    </p:spTree>
+  </p:cSld>
+  <p:clrMapOvr>
+    <a:masterClrMapping/>
+  </p:clrMapOvr>
+  <p:timing>
+    <p:tnLst>
+      <p:par>
+        <p:cTn id="1" dur="indefinite" restart="never" nodeType="tmRoot">
+          <p:childTnLst>
+            <p:seq concurrent="1" nextAc="seek">
+              <p:cTn id="2" dur="indefinite" nodeType="mainSeq">
+                <p:childTnLst>
+                  <p:par>
+                    <p:cTn id="3" fill="hold">
+                      <p:stCondLst>
+                        <p:cond delay="indefinite"/>
+                        <p:cond evt="onBegin" delay="0">
+                          <p:tn val="2"/>
+                        </p:cond>
+                      </p:stCondLst>
+                      <p:childTnLst>
+                        <p:par>
+                          <p:cTn id="4" fill="hold">
+                            <p:stCondLst>
+                              <p:cond delay="0"/>
+                            </p:stCondLst>
+                            <p:childTnLst>
+                              <p:par>
+                                <p:cTn id="5" presetID="1" presetClass="mediacall" presetSubtype="0" fill="hold" nodeType="afterEffect">
+                                  <p:stCondLst>
+                                    <p:cond delay="0"/>
+                                  </p:stCondLst>
+                                  <p:childTnLst>
+                                    <p:cmd type="call" cmd="playFrom(0.0)">
+                                      <p:cBhvr>
+                                        <p:cTn id="6" dur="53320" fill="hold"/>
+                                        <p:tgtEl>
+                                          <p:spTgt spid="22533"/>
+                                        </p:tgtEl>
+                                      </p:cBhvr>
+                                    </p:cmd>
+                                  </p:childTnLst>
+                                </p:cTn>
+                              </p:par>
+                            </p:childTnLst>
+                          </p:cTn>
+                        </p:par>
+                      </p:childTnLst>
+                    </p:cTn>
+                  </p:par>
+                </p:childTnLst>
+              </p:cTn>
+              <p:prevCondLst>
+                <p:cond evt="onPrev" delay="0">
+                  <p:tgtEl>
+                    <p:sldTgt/>
+                  </p:tgtEl>
+                </p:cond>
+              </p:prevCondLst>
+              <p:nextCondLst>
+                <p:cond evt="onNext" delay="0">
+                  <p:tgtEl>
+                    <p:sldTgt/>
+                  </p:tgtEl>
+                </p:cond>
+              </p:nextCondLst>
+            </p:seq>
+            <p:video>
+              <p:cMediaNode>
+                <p:cTn id="7" fill="hold" display="0">
+                  <p:stCondLst>
+                    <p:cond delay="indefinite"/>
+                  </p:stCondLst>
+                  <p:endCondLst>
+                    <p:cond evt="onNext" delay="0">
+                      <p:tgtEl>
+                        <p:sldTgt/>
+                      </p:tgtEl>
+                    </p:cond>
+                    <p:cond evt="onPrev" delay="0">
+                      <p:tgtEl>
+                        <p:sldTgt/>
+                      </p:tgtEl>
+                    </p:cond>
+                  </p:endCondLst>
+                </p:cTn>
+                <p:tgtEl>
+                  <p:spTgt spid="22533"/>
+                </p:tgtEl>
+              </p:cMediaNode>
+            </p:video>
+            <p:seq concurrent="1" nextAc="seek">
+              <p:cTn id="8" restart="whenNotActive" fill="hold" evtFilter="cancelBubble" nodeType="interactiveSeq">
+                <p:stCondLst>
+                  <p:cond evt="onClick" delay="0">
+                    <p:tgtEl>
+                      <p:spTgt spid="22533"/>
+                    </p:tgtEl>
+                  </p:cond>
+                </p:stCondLst>
+                <p:endSync evt="end" delay="0">
+                  <p:rtn val="all"/>
+                </p:endSync>
+                <p:childTnLst>
+                  <p:par>
+                    <p:cTn id="9" fill="hold">
+                      <p:stCondLst>
+                        <p:cond delay="0"/>
+                      </p:stCondLst>
+                      <p:childTnLst>
+                        <p:par>
+                          <p:cTn id="10" fill="hold">
+                            <p:stCondLst>
+                              <p:cond delay="0"/>
+                            </p:stCondLst>
+                            <p:childTnLst>
+                              <p:par>
+                                <p:cTn id="11" presetID="2" presetClass="mediacall" presetSubtype="0" fill="hold" nodeType="clickEffect">
+                                  <p:stCondLst>
+                                    <p:cond delay="0"/>
+                                  </p:stCondLst>
+                                  <p:childTnLst>
+                                    <p:cmd type="call" cmd="togglePause">
+                                      <p:cBhvr>
+                                        <p:cTn id="12" dur="1" fill="hold"/>
+                                        <p:tgtEl>
+                                          <p:spTgt spid="22533"/>
+                                        </p:tgtEl>
+                                      </p:cBhvr>
+                                    </p:cmd>
+                                  </p:childTnLst>
+                                </p:cTn>
+                              </p:par>
+                            </p:childTnLst>
+                          </p:cTn>
+                        </p:par>
+                      </p:childTnLst>
+                    </p:cTn>
+                  </p:par>
+                </p:childTnLst>
+              </p:cTn>
+              <p:nextCondLst>
+                <p:cond evt="onClick" delay="0">
+                  <p:tgtEl>
+                    <p:spTgt spid="22533"/>
+                  </p:tgtEl>
+                </p:cond>
+              </p:nextCondLst>
+            </p:seq>
+          </p:childTnLst>
+        </p:cTn>
+      </p:par>
+    </p:tnLst>
+  </p:timing>
+</p:sld>
+</file>
+
+<file path=ppt/slides/slide11.xml><?xml version="1.0" encoding="utf-8"?>
+<p:sld xmlns:a="http://schemas.openxmlformats.org/drawingml/2006/main" xmlns:r="http://schemas.openxmlformats.org/officeDocument/2006/relationships" xmlns:mc="http://schemas.openxmlformats.org/markup-compatibility/2006" xmlns:mv="urn:schemas-microsoft-com:mac:vml" xmlns:p="http://schemas.openxmlformats.org/presentationml/2006/main" mc:Ignorable="mv" mc:PreserveAttributes="mv:*">
+  <p:cSld>
+    <p:spTree>
+      <p:nvGrpSpPr>
+        <p:cNvPr id="1" name=""/>
+        <p:cNvGrpSpPr/>
+        <p:nvPr/>
+      </p:nvGrpSpPr>
+      <p:grpSpPr>
+        <a:xfrm>
+          <a:off x="0" y="0"/>
+          <a:ext cx="0" cy="0"/>
+          <a:chOff x="0" y="0"/>
+          <a:chExt cx="0" cy="0"/>
+        </a:xfrm>
+      </p:grpSpPr>
+      <p:sp>
+        <p:nvSpPr>
           <p:cNvPr id="24578" name="Title 1"/>
           <p:cNvSpPr>
             <a:spLocks noGrp="1"/>
@@ -5237,7 +5575,7 @@
             <a:fld id="{9C0C6800-C07A-B840-9F81-62616F777194}" type="slidenum">
               <a:rPr lang="en-US"/>
               <a:pPr/>
-              <a:t>10</a:t>
+              <a:t>11</a:t>
             </a:fld>
             <a:endParaRPr lang="en-US"/>
           </a:p>
@@ -5290,7 +5628,7 @@
 </p:sld>
 </file>
 
-<file path=ppt/slides/slide11.xml><?xml version="1.0" encoding="utf-8"?>
+<file path=ppt/slides/slide12.xml><?xml version="1.0" encoding="utf-8"?>
 <p:sld xmlns:a="http://schemas.openxmlformats.org/drawingml/2006/main" xmlns:r="http://schemas.openxmlformats.org/officeDocument/2006/relationships" xmlns:mc="http://schemas.openxmlformats.org/markup-compatibility/2006" xmlns:mv="urn:schemas-microsoft-com:mac:vml" xmlns:p="http://schemas.openxmlformats.org/presentationml/2006/main" mc:Ignorable="mv" mc:PreserveAttributes="mv:*">
   <p:cSld>
     <p:spTree>
@@ -5354,23 +5692,17 @@
         </p:spPr>
         <p:txBody>
           <a:bodyPr>
-            <a:normAutofit fontScale="62500" lnSpcReduction="20000"/>
+            <a:normAutofit fontScale="70000" lnSpcReduction="20000"/>
           </a:bodyPr>
           <a:lstStyle/>
           <a:p>
             <a:r>
               <a:rPr lang="en-US" dirty="0" smtClean="0"/>
-              <a:t>Finite </a:t>
+              <a:t>Inspired </a:t>
             </a:r>
             <a:r>
               <a:rPr lang="en-US" dirty="0"/>
-              <a:t>Element approach</a:t>
-            </a:r>
-          </a:p>
-          <a:p>
-            <a:r>
-              <a:rPr lang="en-US" dirty="0"/>
-              <a:t>Inspired by finite difference methods (</a:t>
+              <a:t>by finite difference methods (</a:t>
             </a:r>
             <a:r>
               <a:rPr lang="en-US" dirty="0" err="1"/>
@@ -5434,7 +5766,7 @@
             <a:fld id="{450779B1-243C-204F-A46C-531D5C821050}" type="slidenum">
               <a:rPr lang="en-US"/>
               <a:pPr/>
-              <a:t>11</a:t>
+              <a:t>12</a:t>
             </a:fld>
             <a:endParaRPr lang="en-US"/>
           </a:p>
@@ -5632,7 +5964,7 @@
 </p:sld>
 </file>
 
-<file path=ppt/slides/slide12.xml><?xml version="1.0" encoding="utf-8"?>
+<file path=ppt/slides/slide13.xml><?xml version="1.0" encoding="utf-8"?>
 <p:sld xmlns:a="http://schemas.openxmlformats.org/drawingml/2006/main" xmlns:r="http://schemas.openxmlformats.org/officeDocument/2006/relationships" xmlns:mc="http://schemas.openxmlformats.org/markup-compatibility/2006" xmlns:mv="urn:schemas-microsoft-com:mac:vml" xmlns:p="http://schemas.openxmlformats.org/presentationml/2006/main" mc:Ignorable="mv" mc:PreserveAttributes="mv:*">
   <p:cSld>
     <p:spTree>
@@ -5845,7 +6177,7 @@
             <a:fld id="{E0B04660-0E7D-5547-AF9D-4047ABAD6874}" type="slidenum">
               <a:rPr lang="en-US"/>
               <a:pPr/>
-              <a:t>12</a:t>
+              <a:t>13</a:t>
             </a:fld>
             <a:endParaRPr lang="en-US"/>
           </a:p>
@@ -5866,7 +6198,7 @@
 </p:sld>
 </file>
 
-<file path=ppt/slides/slide13.xml><?xml version="1.0" encoding="utf-8"?>
+<file path=ppt/slides/slide14.xml><?xml version="1.0" encoding="utf-8"?>
 <p:sld xmlns:a="http://schemas.openxmlformats.org/drawingml/2006/main" xmlns:r="http://schemas.openxmlformats.org/officeDocument/2006/relationships" xmlns:mc="http://schemas.openxmlformats.org/markup-compatibility/2006" xmlns:mv="urn:schemas-microsoft-com:mac:vml" xmlns:p="http://schemas.openxmlformats.org/presentationml/2006/main" mc:Ignorable="mv" mc:PreserveAttributes="mv:*">
   <p:cSld>
     <p:spTree>
@@ -6038,7 +6370,7 @@
             <a:fld id="{2E8154CE-D821-A54C-9083-D8860CAA5A2D}" type="slidenum">
               <a:rPr lang="en-US"/>
               <a:pPr/>
-              <a:t>13</a:t>
+              <a:t>14</a:t>
             </a:fld>
             <a:endParaRPr lang="en-US"/>
           </a:p>
@@ -6259,7 +6591,7 @@
 </p:sld>
 </file>
 
-<file path=ppt/slides/slide14.xml><?xml version="1.0" encoding="utf-8"?>
+<file path=ppt/slides/slide15.xml><?xml version="1.0" encoding="utf-8"?>
 <p:sld xmlns:a="http://schemas.openxmlformats.org/drawingml/2006/main" xmlns:r="http://schemas.openxmlformats.org/officeDocument/2006/relationships" xmlns:mc="http://schemas.openxmlformats.org/markup-compatibility/2006" xmlns:mv="urn:schemas-microsoft-com:mac:vml" xmlns:p="http://schemas.openxmlformats.org/presentationml/2006/main" mc:Ignorable="mv" mc:PreserveAttributes="mv:*">
   <p:cSld>
     <p:spTree>
@@ -6457,7 +6789,7 @@
             <a:fld id="{93743CEC-D1E8-B549-A67D-414696CA6C77}" type="slidenum">
               <a:rPr lang="en-US"/>
               <a:pPr/>
-              <a:t>14</a:t>
+              <a:t>15</a:t>
             </a:fld>
             <a:endParaRPr lang="en-US"/>
           </a:p>
@@ -6542,329 +6874,6 @@
 </p:sld>
 </file>
 
-<file path=ppt/slides/slide15.xml><?xml version="1.0" encoding="utf-8"?>
-<p:sld xmlns:a="http://schemas.openxmlformats.org/drawingml/2006/main" xmlns:r="http://schemas.openxmlformats.org/officeDocument/2006/relationships" xmlns:mc="http://schemas.openxmlformats.org/markup-compatibility/2006" xmlns:mv="urn:schemas-microsoft-com:mac:vml" xmlns:p="http://schemas.openxmlformats.org/presentationml/2006/main" mc:Ignorable="mv" mc:PreserveAttributes="mv:*">
-  <p:cSld>
-    <p:spTree>
-      <p:nvGrpSpPr>
-        <p:cNvPr id="1" name=""/>
-        <p:cNvGrpSpPr/>
-        <p:nvPr/>
-      </p:nvGrpSpPr>
-      <p:grpSpPr>
-        <a:xfrm>
-          <a:off x="0" y="0"/>
-          <a:ext cx="0" cy="0"/>
-          <a:chOff x="0" y="0"/>
-          <a:chExt cx="0" cy="0"/>
-        </a:xfrm>
-      </p:grpSpPr>
-      <p:sp>
-        <p:nvSpPr>
-          <p:cNvPr id="29698" name="Title 1"/>
-          <p:cNvSpPr>
-            <a:spLocks noGrp="1"/>
-          </p:cNvSpPr>
-          <p:nvPr>
-            <p:ph type="title"/>
-          </p:nvPr>
-        </p:nvSpPr>
-        <p:spPr/>
-        <p:txBody>
-          <a:bodyPr/>
-          <a:lstStyle/>
-          <a:p>
-            <a:r>
-              <a:rPr lang="en-US" dirty="0" smtClean="0">
-                <a:ea typeface="ＭＳ Ｐゴシック" pitchFamily="-108" charset="-128"/>
-              </a:rPr>
-              <a:t>MPDATA</a:t>
-            </a:r>
-            <a:endParaRPr lang="en-US" dirty="0">
-              <a:ea typeface="ＭＳ Ｐゴシック" pitchFamily="-108" charset="-128"/>
-            </a:endParaRPr>
-          </a:p>
-        </p:txBody>
-      </p:sp>
-      <p:sp>
-        <p:nvSpPr>
-          <p:cNvPr id="29699" name="Content Placeholder 2"/>
-          <p:cNvSpPr>
-            <a:spLocks noGrp="1"/>
-          </p:cNvSpPr>
-          <p:nvPr>
-            <p:ph idx="1"/>
-          </p:nvPr>
-        </p:nvSpPr>
-        <p:spPr/>
-        <p:txBody>
-          <a:bodyPr/>
-          <a:lstStyle/>
-          <a:p>
-            <a:r>
-              <a:rPr lang="en-US" dirty="0" err="1" smtClean="0"/>
-              <a:t>Antidiffusive</a:t>
-            </a:r>
-            <a:r>
-              <a:rPr lang="en-US" dirty="0" smtClean="0"/>
-              <a:t> correction to the donor cell method causes oscillations</a:t>
-            </a:r>
-            <a:endParaRPr lang="en-US" dirty="0"/>
-          </a:p>
-        </p:txBody>
-      </p:sp>
-      <p:sp>
-        <p:nvSpPr>
-          <p:cNvPr id="29700" name="Slide Number Placeholder 3"/>
-          <p:cNvSpPr>
-            <a:spLocks noGrp="1"/>
-          </p:cNvSpPr>
-          <p:nvPr>
-            <p:ph type="sldNum" sz="quarter" idx="12"/>
-          </p:nvPr>
-        </p:nvSpPr>
-        <p:spPr>
-          <a:noFill/>
-        </p:spPr>
-        <p:txBody>
-          <a:bodyPr/>
-          <a:lstStyle/>
-          <a:p>
-            <a:r>
-              <a:rPr lang="en-US"/>
-              <a:t>Slide </a:t>
-            </a:r>
-            <a:fld id="{C283E170-554A-B642-8E58-DE38E4115297}" type="slidenum">
-              <a:rPr lang="en-US"/>
-              <a:pPr/>
-              <a:t>15</a:t>
-            </a:fld>
-            <a:endParaRPr lang="en-US"/>
-          </a:p>
-        </p:txBody>
-      </p:sp>
-      <p:sp>
-        <p:nvSpPr>
-          <p:cNvPr id="5" name="TextBox 4"/>
-          <p:cNvSpPr txBox="1"/>
-          <p:nvPr/>
-        </p:nvSpPr>
-        <p:spPr>
-          <a:xfrm>
-            <a:off x="4114800" y="6107668"/>
-            <a:ext cx="1600200" cy="369332"/>
-          </a:xfrm>
-          <a:prstGeom prst="rect">
-            <a:avLst/>
-          </a:prstGeom>
-          <a:noFill/>
-        </p:spPr>
-        <p:txBody>
-          <a:bodyPr wrap="square" rtlCol="0">
-            <a:spAutoFit/>
-          </a:bodyPr>
-          <a:lstStyle/>
-          <a:p>
-            <a:r>
-              <a:rPr lang="en-US" dirty="0" smtClean="0">
-                <a:solidFill>
-                  <a:srgbClr val="FF0000"/>
-                </a:solidFill>
-              </a:rPr>
-              <a:t>PRELIMINARY</a:t>
-            </a:r>
-            <a:endParaRPr lang="en-US" dirty="0">
-              <a:solidFill>
-                <a:srgbClr val="FF0000"/>
-              </a:solidFill>
-            </a:endParaRPr>
-          </a:p>
-        </p:txBody>
-      </p:sp>
-      <p:pic>
-        <p:nvPicPr>
-          <p:cNvPr id="6" name="MPDATA_noFCT.avi">
-            <a:hlinkClick r:id="" action="ppaction://media"/>
-          </p:cNvPr>
-          <p:cNvPicPr/>
-          <p:nvPr>
-            <a:videoFile r:link="rId1"/>
-          </p:nvPr>
-        </p:nvPicPr>
-        <p:blipFill>
-          <a:blip r:embed="rId3"/>
-          <a:stretch>
-            <a:fillRect/>
-          </a:stretch>
-        </p:blipFill>
-        <p:spPr>
-          <a:xfrm>
-            <a:off x="2946400" y="2971800"/>
-            <a:ext cx="4064000" cy="3048000"/>
-          </a:xfrm>
-          <a:prstGeom prst="rect">
-            <a:avLst/>
-          </a:prstGeom>
-        </p:spPr>
-      </p:pic>
-    </p:spTree>
-  </p:cSld>
-  <p:clrMapOvr>
-    <a:masterClrMapping/>
-  </p:clrMapOvr>
-  <p:timing>
-    <p:tnLst>
-      <p:par>
-        <p:cTn id="1" dur="indefinite" restart="never" nodeType="tmRoot">
-          <p:childTnLst>
-            <p:seq concurrent="1" nextAc="seek">
-              <p:cTn id="2" dur="indefinite" nodeType="mainSeq">
-                <p:childTnLst>
-                  <p:par>
-                    <p:cTn id="3" fill="hold">
-                      <p:stCondLst>
-                        <p:cond delay="indefinite"/>
-                        <p:cond evt="onBegin" delay="0">
-                          <p:tn val="2"/>
-                        </p:cond>
-                      </p:stCondLst>
-                      <p:childTnLst>
-                        <p:par>
-                          <p:cTn id="4" fill="hold">
-                            <p:stCondLst>
-                              <p:cond delay="0"/>
-                            </p:stCondLst>
-                            <p:childTnLst>
-                              <p:par>
-                                <p:cTn id="5" presetID="1" presetClass="mediacall" presetSubtype="0" fill="hold" nodeType="afterEffect">
-                                  <p:stCondLst>
-                                    <p:cond delay="0"/>
-                                  </p:stCondLst>
-                                  <p:childTnLst>
-                                    <p:cmd type="call" cmd="playFrom(0.0)">
-                                      <p:cBhvr>
-                                        <p:cTn id="6" dur="26640" fill="hold"/>
-                                        <p:tgtEl>
-                                          <p:spTgt spid="6"/>
-                                        </p:tgtEl>
-                                      </p:cBhvr>
-                                    </p:cmd>
-                                  </p:childTnLst>
-                                </p:cTn>
-                              </p:par>
-                            </p:childTnLst>
-                          </p:cTn>
-                        </p:par>
-                      </p:childTnLst>
-                    </p:cTn>
-                  </p:par>
-                </p:childTnLst>
-              </p:cTn>
-              <p:prevCondLst>
-                <p:cond evt="onPrev" delay="0">
-                  <p:tgtEl>
-                    <p:sldTgt/>
-                  </p:tgtEl>
-                </p:cond>
-              </p:prevCondLst>
-              <p:nextCondLst>
-                <p:cond evt="onNext" delay="0">
-                  <p:tgtEl>
-                    <p:sldTgt/>
-                  </p:tgtEl>
-                </p:cond>
-              </p:nextCondLst>
-            </p:seq>
-            <p:video>
-              <p:cMediaNode>
-                <p:cTn id="7" fill="hold" display="0">
-                  <p:stCondLst>
-                    <p:cond delay="indefinite"/>
-                  </p:stCondLst>
-                  <p:endCondLst>
-                    <p:cond evt="onNext" delay="0">
-                      <p:tgtEl>
-                        <p:sldTgt/>
-                      </p:tgtEl>
-                    </p:cond>
-                    <p:cond evt="onPrev" delay="0">
-                      <p:tgtEl>
-                        <p:sldTgt/>
-                      </p:tgtEl>
-                    </p:cond>
-                  </p:endCondLst>
-                </p:cTn>
-                <p:tgtEl>
-                  <p:spTgt spid="6"/>
-                </p:tgtEl>
-              </p:cMediaNode>
-            </p:video>
-            <p:seq concurrent="1" nextAc="seek">
-              <p:cTn id="8" restart="whenNotActive" fill="hold" evtFilter="cancelBubble" nodeType="interactiveSeq">
-                <p:stCondLst>
-                  <p:cond evt="onClick" delay="0">
-                    <p:tgtEl>
-                      <p:spTgt spid="6"/>
-                    </p:tgtEl>
-                  </p:cond>
-                </p:stCondLst>
-                <p:endSync evt="end" delay="0">
-                  <p:rtn val="all"/>
-                </p:endSync>
-                <p:childTnLst>
-                  <p:par>
-                    <p:cTn id="9" fill="hold">
-                      <p:stCondLst>
-                        <p:cond delay="0"/>
-                      </p:stCondLst>
-                      <p:childTnLst>
-                        <p:par>
-                          <p:cTn id="10" fill="hold">
-                            <p:stCondLst>
-                              <p:cond delay="0"/>
-                            </p:stCondLst>
-                            <p:childTnLst>
-                              <p:par>
-                                <p:cTn id="11" presetID="2" presetClass="mediacall" presetSubtype="0" fill="hold" nodeType="clickEffect">
-                                  <p:stCondLst>
-                                    <p:cond delay="0"/>
-                                  </p:stCondLst>
-                                  <p:childTnLst>
-                                    <p:cmd type="call" cmd="togglePause">
-                                      <p:cBhvr>
-                                        <p:cTn id="12" dur="1" fill="hold"/>
-                                        <p:tgtEl>
-                                          <p:spTgt spid="6"/>
-                                        </p:tgtEl>
-                                      </p:cBhvr>
-                                    </p:cmd>
-                                  </p:childTnLst>
-                                </p:cTn>
-                              </p:par>
-                            </p:childTnLst>
-                          </p:cTn>
-                        </p:par>
-                      </p:childTnLst>
-                    </p:cTn>
-                  </p:par>
-                </p:childTnLst>
-              </p:cTn>
-              <p:nextCondLst>
-                <p:cond evt="onClick" delay="0">
-                  <p:tgtEl>
-                    <p:spTgt spid="6"/>
-                  </p:tgtEl>
-                </p:cond>
-              </p:nextCondLst>
-            </p:seq>
-          </p:childTnLst>
-        </p:cTn>
-      </p:par>
-    </p:tnLst>
-  </p:timing>
-</p:sld>
-</file>
-
 <file path=ppt/slides/slide16.xml><?xml version="1.0" encoding="utf-8"?>
 <p:sld xmlns:a="http://schemas.openxmlformats.org/drawingml/2006/main" xmlns:r="http://schemas.openxmlformats.org/officeDocument/2006/relationships" xmlns:mc="http://schemas.openxmlformats.org/markup-compatibility/2006" xmlns:mv="urn:schemas-microsoft-com:mac:vml" xmlns:p="http://schemas.openxmlformats.org/presentationml/2006/main" mc:Ignorable="mv" mc:PreserveAttributes="mv:*">
   <p:cSld>
@@ -6919,27 +6928,18 @@
             <p:ph idx="1"/>
           </p:nvPr>
         </p:nvSpPr>
-        <p:spPr>
-          <a:xfrm>
-            <a:off x="1435608" y="1447800"/>
-            <a:ext cx="7498080" cy="1447800"/>
-          </a:xfrm>
-        </p:spPr>
-        <p:txBody>
-          <a:bodyPr>
-            <a:normAutofit fontScale="77500" lnSpcReduction="20000"/>
-          </a:bodyPr>
-          <a:lstStyle/>
-          <a:p>
+        <p:spPr/>
+        <p:txBody>
+          <a:bodyPr/>
+          <a:lstStyle/>
+          <a:p>
+            <a:r>
+              <a:rPr lang="en-US" dirty="0" err="1" smtClean="0"/>
+              <a:t>Antidiffusive</a:t>
+            </a:r>
             <a:r>
               <a:rPr lang="en-US" dirty="0" smtClean="0"/>
-              <a:t>A Flux Corrected Transport (FCT) algorithm can correct the oscillations</a:t>
-            </a:r>
-          </a:p>
-          <a:p>
-            <a:r>
-              <a:rPr lang="en-US" dirty="0" smtClean="0"/>
-              <a:t>Performing additional local corrective iterations increases the order of accuracy of the solution</a:t>
+              <a:t> correction to the donor cell method causes oscillations</a:t>
             </a:r>
             <a:endParaRPr lang="en-US" dirty="0"/>
           </a:p>
@@ -7015,7 +7015,7 @@
       </p:sp>
       <p:pic>
         <p:nvPicPr>
-          <p:cNvPr id="6" name="MPDATA_FCT.avi">
+          <p:cNvPr id="6" name="MPDATA_noFCT.avi">
             <a:hlinkClick r:id="" action="ppaction://media"/>
           </p:cNvPr>
           <p:cNvPicPr/>
@@ -7216,7 +7216,7 @@
       </p:grpSpPr>
       <p:sp>
         <p:nvSpPr>
-          <p:cNvPr id="30722" name="Title 1"/>
+          <p:cNvPr id="29698" name="Title 1"/>
           <p:cNvSpPr>
             <a:spLocks noGrp="1"/>
           </p:cNvSpPr>
@@ -7230,91 +7230,12 @@
           <a:lstStyle/>
           <a:p>
             <a:r>
-              <a:rPr lang="en-US">
+              <a:rPr lang="en-US" dirty="0" smtClean="0">
                 <a:ea typeface="ＭＳ Ｐゴシック" pitchFamily="-108" charset="-128"/>
               </a:rPr>
-              <a:t>GPUs at a glance</a:t>
-            </a:r>
-          </a:p>
-        </p:txBody>
-      </p:sp>
-      <p:sp>
-        <p:nvSpPr>
-          <p:cNvPr id="30723" name="Content Placeholder 2"/>
-          <p:cNvSpPr>
-            <a:spLocks noGrp="1"/>
-          </p:cNvSpPr>
-          <p:nvPr>
-            <p:ph idx="1"/>
-          </p:nvPr>
-        </p:nvSpPr>
-        <p:spPr/>
-        <p:txBody>
-          <a:bodyPr>
-            <a:normAutofit fontScale="92500" lnSpcReduction="20000"/>
-          </a:bodyPr>
-          <a:lstStyle/>
-          <a:p>
-            <a:r>
-              <a:rPr lang="en-US">
-                <a:ea typeface="ＭＳ Ｐゴシック" pitchFamily="-108" charset="-128"/>
-              </a:rPr>
-              <a:t>Different architecture from a CPU.</a:t>
-            </a:r>
-          </a:p>
-          <a:p>
-            <a:pPr lvl="1"/>
-            <a:r>
-              <a:rPr lang="en-US"/>
-              <a:t>Many low throughput processing units</a:t>
-            </a:r>
-          </a:p>
-          <a:p>
-            <a:pPr lvl="1"/>
-            <a:r>
-              <a:rPr lang="en-US"/>
-              <a:t>Cores all share memory</a:t>
-            </a:r>
-          </a:p>
-          <a:p>
-            <a:pPr lvl="1"/>
-            <a:r>
-              <a:rPr lang="en-US"/>
-              <a:t>Workgroups</a:t>
-            </a:r>
-          </a:p>
-          <a:p>
-            <a:r>
-              <a:rPr lang="en-US">
-                <a:ea typeface="ＭＳ Ｐゴシック" pitchFamily="-108" charset="-128"/>
-              </a:rPr>
-              <a:t>Higher FLOPS (floating points operations per second) per dollar than CPUs.</a:t>
-            </a:r>
-          </a:p>
-          <a:p>
-            <a:r>
-              <a:rPr lang="en-US">
-                <a:ea typeface="ＭＳ Ｐゴシック" pitchFamily="-108" charset="-128"/>
-              </a:rPr>
-              <a:t>Must use a language compiled for GPU</a:t>
-            </a:r>
-          </a:p>
-          <a:p>
-            <a:pPr lvl="1"/>
-            <a:r>
-              <a:rPr lang="en-US"/>
-              <a:t>OpenCL – Open programming language that can make use of multiple CPUs (on the same node) and a GPU. Can combine with MPI for multiple nodes.</a:t>
-            </a:r>
-          </a:p>
-          <a:p>
-            <a:pPr lvl="1"/>
-            <a:r>
-              <a:rPr lang="en-US"/>
-              <a:t>CUDA – Nvidia only.</a:t>
-            </a:r>
-          </a:p>
-          <a:p>
-            <a:endParaRPr lang="en-US">
+              <a:t>MPDATA</a:t>
+            </a:r>
+            <a:endParaRPr lang="en-US" dirty="0">
               <a:ea typeface="ＭＳ Ｐゴシック" pitchFamily="-108" charset="-128"/>
             </a:endParaRPr>
           </a:p>
@@ -7322,7 +7243,43 @@
       </p:sp>
       <p:sp>
         <p:nvSpPr>
-          <p:cNvPr id="30724" name="Slide Number Placeholder 3"/>
+          <p:cNvPr id="29699" name="Content Placeholder 2"/>
+          <p:cNvSpPr>
+            <a:spLocks noGrp="1"/>
+          </p:cNvSpPr>
+          <p:nvPr>
+            <p:ph idx="1"/>
+          </p:nvPr>
+        </p:nvSpPr>
+        <p:spPr>
+          <a:xfrm>
+            <a:off x="1435608" y="1447800"/>
+            <a:ext cx="7498080" cy="1447800"/>
+          </a:xfrm>
+        </p:spPr>
+        <p:txBody>
+          <a:bodyPr>
+            <a:normAutofit fontScale="77500" lnSpcReduction="20000"/>
+          </a:bodyPr>
+          <a:lstStyle/>
+          <a:p>
+            <a:r>
+              <a:rPr lang="en-US" dirty="0" smtClean="0"/>
+              <a:t>A Flux Corrected Transport (FCT) algorithm can correct the oscillations</a:t>
+            </a:r>
+          </a:p>
+          <a:p>
+            <a:r>
+              <a:rPr lang="en-US" dirty="0" smtClean="0"/>
+              <a:t>Performing additional local corrective iterations increases the order of accuracy of the solution</a:t>
+            </a:r>
+            <a:endParaRPr lang="en-US" dirty="0"/>
+          </a:p>
+        </p:txBody>
+      </p:sp>
+      <p:sp>
+        <p:nvSpPr>
+          <p:cNvPr id="29700" name="Slide Number Placeholder 3"/>
           <p:cNvSpPr>
             <a:spLocks noGrp="1"/>
           </p:cNvSpPr>
@@ -7341,7 +7298,7 @@
               <a:rPr lang="en-US"/>
               <a:t>Slide </a:t>
             </a:r>
-            <a:fld id="{C0B27578-E324-3D4A-8A83-77F3CC1E892B}" type="slidenum">
+            <a:fld id="{C283E170-554A-B642-8E58-DE38E4115297}" type="slidenum">
               <a:rPr lang="en-US"/>
               <a:pPr/>
               <a:t>17</a:t>
@@ -7350,6 +7307,70 @@
           </a:p>
         </p:txBody>
       </p:sp>
+      <p:sp>
+        <p:nvSpPr>
+          <p:cNvPr id="5" name="TextBox 4"/>
+          <p:cNvSpPr txBox="1"/>
+          <p:nvPr/>
+        </p:nvSpPr>
+        <p:spPr>
+          <a:xfrm>
+            <a:off x="4114800" y="6107668"/>
+            <a:ext cx="1600200" cy="369332"/>
+          </a:xfrm>
+          <a:prstGeom prst="rect">
+            <a:avLst/>
+          </a:prstGeom>
+          <a:noFill/>
+        </p:spPr>
+        <p:txBody>
+          <a:bodyPr wrap="square" rtlCol="0">
+            <a:spAutoFit/>
+          </a:bodyPr>
+          <a:lstStyle/>
+          <a:p>
+            <a:r>
+              <a:rPr lang="en-US" dirty="0" smtClean="0">
+                <a:solidFill>
+                  <a:srgbClr val="FF0000"/>
+                </a:solidFill>
+              </a:rPr>
+              <a:t>PRELIMINARY</a:t>
+            </a:r>
+            <a:endParaRPr lang="en-US" dirty="0">
+              <a:solidFill>
+                <a:srgbClr val="FF0000"/>
+              </a:solidFill>
+            </a:endParaRPr>
+          </a:p>
+        </p:txBody>
+      </p:sp>
+      <p:pic>
+        <p:nvPicPr>
+          <p:cNvPr id="6" name="MPDATA_FCT.avi">
+            <a:hlinkClick r:id="" action="ppaction://media"/>
+          </p:cNvPr>
+          <p:cNvPicPr/>
+          <p:nvPr>
+            <a:videoFile r:link="rId1"/>
+          </p:nvPr>
+        </p:nvPicPr>
+        <p:blipFill>
+          <a:blip r:embed="rId3"/>
+          <a:stretch>
+            <a:fillRect/>
+          </a:stretch>
+        </p:blipFill>
+        <p:spPr>
+          <a:xfrm>
+            <a:off x="2946400" y="2971800"/>
+            <a:ext cx="4064000" cy="3048000"/>
+          </a:xfrm>
+          <a:prstGeom prst="rect">
+            <a:avLst/>
+          </a:prstGeom>
+        </p:spPr>
+      </p:pic>
     </p:spTree>
   </p:cSld>
   <p:clrMapOvr>
@@ -7358,7 +7379,150 @@
   <p:timing>
     <p:tnLst>
       <p:par>
-        <p:cTn id="1" dur="indefinite" restart="never" nodeType="tmRoot"/>
+        <p:cTn id="1" dur="indefinite" restart="never" nodeType="tmRoot">
+          <p:childTnLst>
+            <p:seq concurrent="1" nextAc="seek">
+              <p:cTn id="2" dur="indefinite" nodeType="mainSeq">
+                <p:childTnLst>
+                  <p:par>
+                    <p:cTn id="3" fill="hold">
+                      <p:stCondLst>
+                        <p:cond delay="indefinite"/>
+                        <p:cond evt="onBegin" delay="0">
+                          <p:tn val="2"/>
+                        </p:cond>
+                      </p:stCondLst>
+                      <p:childTnLst>
+                        <p:par>
+                          <p:cTn id="4" fill="hold">
+                            <p:stCondLst>
+                              <p:cond delay="0"/>
+                            </p:stCondLst>
+                            <p:childTnLst>
+                              <p:par>
+                                <p:cTn id="5" presetID="1" presetClass="mediacall" presetSubtype="0" fill="hold" nodeType="afterEffect">
+                                  <p:stCondLst>
+                                    <p:cond delay="0"/>
+                                  </p:stCondLst>
+                                  <p:childTnLst>
+                                    <p:cmd type="call" cmd="playFrom(0.0)">
+                                      <p:cBhvr>
+                                        <p:cTn id="6" dur="26640" fill="hold"/>
+                                        <p:tgtEl>
+                                          <p:spTgt spid="6"/>
+                                        </p:tgtEl>
+                                      </p:cBhvr>
+                                    </p:cmd>
+                                  </p:childTnLst>
+                                </p:cTn>
+                              </p:par>
+                            </p:childTnLst>
+                          </p:cTn>
+                        </p:par>
+                      </p:childTnLst>
+                    </p:cTn>
+                  </p:par>
+                </p:childTnLst>
+              </p:cTn>
+              <p:prevCondLst>
+                <p:cond evt="onPrev" delay="0">
+                  <p:tgtEl>
+                    <p:sldTgt/>
+                  </p:tgtEl>
+                </p:cond>
+              </p:prevCondLst>
+              <p:nextCondLst>
+                <p:cond evt="onNext" delay="0">
+                  <p:tgtEl>
+                    <p:sldTgt/>
+                  </p:tgtEl>
+                </p:cond>
+              </p:nextCondLst>
+            </p:seq>
+            <p:video>
+              <p:cMediaNode>
+                <p:cTn id="7" fill="hold" display="0">
+                  <p:stCondLst>
+                    <p:cond delay="indefinite"/>
+                  </p:stCondLst>
+                  <p:endCondLst>
+                    <p:cond evt="onNext" delay="0">
+                      <p:tgtEl>
+                        <p:sldTgt/>
+                      </p:tgtEl>
+                    </p:cond>
+                    <p:cond evt="onPrev" delay="0">
+                      <p:tgtEl>
+                        <p:sldTgt/>
+                      </p:tgtEl>
+                    </p:cond>
+                  </p:endCondLst>
+                </p:cTn>
+                <p:tgtEl>
+                  <p:spTgt spid="6"/>
+                </p:tgtEl>
+              </p:cMediaNode>
+            </p:video>
+            <p:seq concurrent="1" nextAc="seek">
+              <p:cTn id="8" restart="whenNotActive" fill="hold" evtFilter="cancelBubble" nodeType="interactiveSeq">
+                <p:stCondLst>
+                  <p:cond evt="onClick" delay="0">
+                    <p:tgtEl>
+                      <p:spTgt spid="6"/>
+                    </p:tgtEl>
+                  </p:cond>
+                </p:stCondLst>
+                <p:endSync evt="end" delay="0">
+                  <p:rtn val="all"/>
+                </p:endSync>
+                <p:childTnLst>
+                  <p:par>
+                    <p:cTn id="9" fill="hold">
+                      <p:stCondLst>
+                        <p:cond delay="0"/>
+                      </p:stCondLst>
+                      <p:childTnLst>
+                        <p:par>
+                          <p:cTn id="10" fill="hold">
+                            <p:stCondLst>
+                              <p:cond delay="0"/>
+                            </p:stCondLst>
+                            <p:childTnLst>
+                              <p:par>
+                                <p:cTn id="11" presetID="2" presetClass="mediacall" presetSubtype="0" fill="hold" nodeType="clickEffect">
+                                  <p:stCondLst>
+                                    <p:cond delay="0"/>
+                                  </p:stCondLst>
+                                  <p:childTnLst>
+                                    <p:cmd type="call" cmd="togglePause">
+                                      <p:cBhvr>
+                                        <p:cTn id="12" dur="1" fill="hold"/>
+                                        <p:tgtEl>
+                                          <p:spTgt spid="6"/>
+                                        </p:tgtEl>
+                                      </p:cBhvr>
+                                    </p:cmd>
+                                  </p:childTnLst>
+                                </p:cTn>
+                              </p:par>
+                            </p:childTnLst>
+                          </p:cTn>
+                        </p:par>
+                      </p:childTnLst>
+                    </p:cTn>
+                  </p:par>
+                </p:childTnLst>
+              </p:cTn>
+              <p:nextCondLst>
+                <p:cond evt="onClick" delay="0">
+                  <p:tgtEl>
+                    <p:spTgt spid="6"/>
+                  </p:tgtEl>
+                </p:cond>
+              </p:nextCondLst>
+            </p:seq>
+          </p:childTnLst>
+        </p:cTn>
       </p:par>
     </p:tnLst>
   </p:timing>
@@ -7384,7 +7548,7 @@
       </p:grpSpPr>
       <p:sp>
         <p:nvSpPr>
-          <p:cNvPr id="31746" name="Title 1"/>
+          <p:cNvPr id="30722" name="Title 1"/>
           <p:cNvSpPr>
             <a:spLocks noGrp="1"/>
           </p:cNvSpPr>
@@ -7401,128 +7565,14 @@
               <a:rPr lang="en-US">
                 <a:ea typeface="ＭＳ Ｐゴシック" pitchFamily="-108" charset="-128"/>
               </a:rPr>
-              <a:t>GPU architecture</a:t>
-            </a:r>
-          </a:p>
-        </p:txBody>
-      </p:sp>
-      <p:sp>
-        <p:nvSpPr>
-          <p:cNvPr id="31747" name="Content Placeholder 2"/>
-          <p:cNvSpPr>
-            <a:spLocks noGrp="1"/>
-          </p:cNvSpPr>
-          <p:nvPr>
-            <p:ph idx="1"/>
-          </p:nvPr>
-        </p:nvSpPr>
-        <p:spPr/>
-        <p:txBody>
-          <a:bodyPr>
-            <a:normAutofit fontScale="70000" lnSpcReduction="20000"/>
-          </a:bodyPr>
-          <a:lstStyle/>
-          <a:p>
-            <a:r>
-              <a:rPr lang="en-US">
-                <a:ea typeface="ＭＳ Ｐゴシック" pitchFamily="-108" charset="-128"/>
-              </a:rPr>
-              <a:t>Global Memory</a:t>
-            </a:r>
-          </a:p>
-          <a:p>
-            <a:pPr lvl="1"/>
-            <a:r>
-              <a:rPr lang="en-US"/>
-              <a:t>Available to entire device</a:t>
-            </a:r>
-          </a:p>
-          <a:p>
-            <a:r>
-              <a:rPr lang="en-US">
-                <a:ea typeface="ＭＳ Ｐゴシック" pitchFamily="-108" charset="-128"/>
-              </a:rPr>
-              <a:t>Local Memory</a:t>
-            </a:r>
-          </a:p>
-          <a:p>
-            <a:pPr lvl="1"/>
-            <a:r>
-              <a:rPr lang="en-US"/>
-              <a:t>Available to the work group only</a:t>
-            </a:r>
-          </a:p>
-          <a:p>
-            <a:pPr lvl="1"/>
-            <a:r>
-              <a:rPr lang="en-US"/>
-              <a:t>***I think this isn’t well defined in OpenCL and can spill over to Global without warning</a:t>
-            </a:r>
-          </a:p>
-          <a:p>
-            <a:r>
-              <a:rPr lang="en-US">
-                <a:ea typeface="ＭＳ Ｐゴシック" pitchFamily="-108" charset="-128"/>
-              </a:rPr>
-              <a:t>Private Memory</a:t>
-            </a:r>
-          </a:p>
-          <a:p>
-            <a:pPr lvl="1"/>
-            <a:r>
-              <a:rPr lang="en-US"/>
-              <a:t>Available to work item only</a:t>
-            </a:r>
-          </a:p>
-          <a:p>
-            <a:r>
-              <a:rPr lang="en-US">
-                <a:ea typeface="ＭＳ Ｐゴシック" pitchFamily="-108" charset="-128"/>
-              </a:rPr>
-              <a:t>Constant Memory</a:t>
-            </a:r>
-          </a:p>
-          <a:p>
-            <a:pPr lvl="1"/>
-            <a:r>
-              <a:rPr lang="en-US"/>
-              <a:t>Read only, can be faster than global</a:t>
-            </a:r>
-          </a:p>
-          <a:p>
-            <a:r>
-              <a:rPr lang="en-US">
-                <a:ea typeface="ＭＳ Ｐゴシック" pitchFamily="-108" charset="-128"/>
-              </a:rPr>
-              <a:t>SIMD group size – efficient code is a multiple of this</a:t>
-            </a:r>
-          </a:p>
-          <a:p>
-            <a:pPr lvl="1"/>
-            <a:r>
-              <a:rPr lang="en-US"/>
-              <a:t>Nvidia – Warp size is 32</a:t>
-            </a:r>
-          </a:p>
-          <a:p>
-            <a:pPr lvl="1"/>
-            <a:r>
-              <a:rPr lang="en-US"/>
-              <a:t>ATI – Workgroup size is 64</a:t>
-            </a:r>
-          </a:p>
-          <a:p>
-            <a:pPr lvl="1"/>
-            <a:r>
-              <a:rPr lang="en-US"/>
-              <a:t>http://stackoverflow.com/questions/7093488/opencl-how-to-i-query-for-a-devices-simd-width</a:t>
-            </a:r>
-          </a:p>
-        </p:txBody>
-      </p:sp>
-      <p:sp>
-        <p:nvSpPr>
-          <p:cNvPr id="31748" name="Slide Number Placeholder 3"/>
+              <a:t>GPUs at a glance</a:t>
+            </a:r>
+          </a:p>
+        </p:txBody>
+      </p:sp>
+      <p:sp>
+        <p:nvSpPr>
+          <p:cNvPr id="30724" name="Slide Number Placeholder 3"/>
           <p:cNvSpPr>
             <a:spLocks noGrp="1"/>
           </p:cNvSpPr>
@@ -7541,12 +7591,621 @@
               <a:rPr lang="en-US"/>
               <a:t>Slide </a:t>
             </a:r>
-            <a:fld id="{0032BADB-F48D-AE49-BA14-9EC1C0190D97}" type="slidenum">
+            <a:fld id="{C0B27578-E324-3D4A-8A83-77F3CC1E892B}" type="slidenum">
               <a:rPr lang="en-US"/>
               <a:pPr/>
               <a:t>18</a:t>
             </a:fld>
             <a:endParaRPr lang="en-US"/>
+          </a:p>
+        </p:txBody>
+      </p:sp>
+      <p:sp>
+        <p:nvSpPr>
+          <p:cNvPr id="7" name="Content Placeholder 2"/>
+          <p:cNvSpPr txBox="1">
+            <a:spLocks noGrp="1"/>
+          </p:cNvSpPr>
+          <p:nvPr>
+            <p:ph idx="1"/>
+          </p:nvPr>
+        </p:nvSpPr>
+        <p:spPr>
+          <a:prstGeom prst="rect">
+            <a:avLst/>
+          </a:prstGeom>
+        </p:spPr>
+        <p:txBody>
+          <a:bodyPr>
+            <a:normAutofit fontScale="85000" lnSpcReduction="10000"/>
+          </a:bodyPr>
+          <a:lstStyle/>
+          <a:p>
+            <a:pPr marL="365760" marR="0" lvl="0" indent="-283464" algn="l" defTabSz="914400" rtl="0" eaLnBrk="1" fontAlgn="auto" latinLnBrk="0" hangingPunct="1">
+              <a:lnSpc>
+                <a:spcPct val="100000"/>
+              </a:lnSpc>
+              <a:spcBef>
+                <a:spcPts val="600"/>
+              </a:spcBef>
+              <a:spcAft>
+                <a:spcPts val="0"/>
+              </a:spcAft>
+              <a:buClr>
+                <a:schemeClr val="accent1"/>
+              </a:buClr>
+              <a:buSzPct val="80000"/>
+              <a:buFont typeface="Wingdings 2"/>
+              <a:buChar char=""/>
+              <a:tabLst/>
+              <a:defRPr/>
+            </a:pPr>
+            <a:r>
+              <a:rPr kumimoji="0" lang="en-US" sz="3200" b="0" i="0" u="none" strike="noStrike" kern="1200" cap="none" spc="0" normalizeH="0" baseline="0" noProof="0" dirty="0" smtClean="0">
+                <a:ln>
+                  <a:noFill/>
+                </a:ln>
+                <a:solidFill>
+                  <a:schemeClr val="tx1"/>
+                </a:solidFill>
+                <a:effectLst/>
+                <a:uLnTx/>
+                <a:uFillTx/>
+                <a:latin typeface="+mn-lt"/>
+                <a:ea typeface="+mn-ea"/>
+                <a:cs typeface="+mn-cs"/>
+              </a:rPr>
+              <a:t>Much higher FLOPS (floating points operations per second) per dollar than CPUs.</a:t>
+            </a:r>
+          </a:p>
+          <a:p>
+            <a:pPr marL="365760" marR="0" lvl="0" indent="-283464" algn="l" defTabSz="914400" rtl="0" eaLnBrk="1" fontAlgn="auto" latinLnBrk="0" hangingPunct="1">
+              <a:lnSpc>
+                <a:spcPct val="100000"/>
+              </a:lnSpc>
+              <a:spcBef>
+                <a:spcPts val="600"/>
+              </a:spcBef>
+              <a:spcAft>
+                <a:spcPts val="0"/>
+              </a:spcAft>
+              <a:buClr>
+                <a:schemeClr val="accent1"/>
+              </a:buClr>
+              <a:buSzPct val="80000"/>
+              <a:buFont typeface="Wingdings 2"/>
+              <a:buChar char=""/>
+              <a:tabLst/>
+              <a:defRPr/>
+            </a:pPr>
+            <a:r>
+              <a:rPr kumimoji="0" lang="en-US" sz="3200" b="0" i="0" u="none" strike="noStrike" kern="1200" cap="none" spc="0" normalizeH="0" baseline="0" noProof="0" dirty="0" smtClean="0">
+                <a:ln>
+                  <a:noFill/>
+                </a:ln>
+                <a:solidFill>
+                  <a:schemeClr val="tx1"/>
+                </a:solidFill>
+                <a:effectLst/>
+                <a:uLnTx/>
+                <a:uFillTx/>
+                <a:latin typeface="+mn-lt"/>
+                <a:ea typeface="+mn-ea"/>
+                <a:cs typeface="+mn-cs"/>
+              </a:rPr>
+              <a:t>Different architecture from a CPU.</a:t>
+            </a:r>
+          </a:p>
+          <a:p>
+            <a:pPr marL="640080" marR="0" lvl="1" indent="-237744" algn="l" defTabSz="914400" rtl="0" eaLnBrk="1" fontAlgn="auto" latinLnBrk="0" hangingPunct="1">
+              <a:lnSpc>
+                <a:spcPct val="100000"/>
+              </a:lnSpc>
+              <a:spcBef>
+                <a:spcPts val="550"/>
+              </a:spcBef>
+              <a:spcAft>
+                <a:spcPts val="0"/>
+              </a:spcAft>
+              <a:buClr>
+                <a:schemeClr val="accent1"/>
+              </a:buClr>
+              <a:buSzTx/>
+              <a:buFont typeface="Verdana"/>
+              <a:buChar char="◦"/>
+              <a:tabLst/>
+              <a:defRPr/>
+            </a:pPr>
+            <a:r>
+              <a:rPr kumimoji="0" lang="en-US" sz="2800" b="0" i="0" u="none" strike="noStrike" kern="1200" cap="none" spc="0" normalizeH="0" baseline="0" noProof="0" dirty="0" smtClean="0">
+                <a:ln>
+                  <a:noFill/>
+                </a:ln>
+                <a:solidFill>
+                  <a:schemeClr val="tx1"/>
+                </a:solidFill>
+                <a:effectLst/>
+                <a:uLnTx/>
+                <a:uFillTx/>
+                <a:latin typeface="+mn-lt"/>
+                <a:ea typeface="+mn-ea"/>
+                <a:cs typeface="+mn-cs"/>
+              </a:rPr>
+              <a:t>Many low throughput processing units</a:t>
+            </a:r>
+          </a:p>
+          <a:p>
+            <a:pPr marL="640080" marR="0" lvl="1" indent="-237744" algn="l" defTabSz="914400" rtl="0" eaLnBrk="1" fontAlgn="auto" latinLnBrk="0" hangingPunct="1">
+              <a:lnSpc>
+                <a:spcPct val="100000"/>
+              </a:lnSpc>
+              <a:spcBef>
+                <a:spcPts val="550"/>
+              </a:spcBef>
+              <a:spcAft>
+                <a:spcPts val="0"/>
+              </a:spcAft>
+              <a:buClr>
+                <a:schemeClr val="accent1"/>
+              </a:buClr>
+              <a:buSzTx/>
+              <a:buFont typeface="Verdana"/>
+              <a:buChar char="◦"/>
+              <a:tabLst/>
+              <a:defRPr/>
+            </a:pPr>
+            <a:r>
+              <a:rPr kumimoji="0" lang="en-US" sz="2800" b="0" i="0" u="none" strike="noStrike" kern="1200" cap="none" spc="0" normalizeH="0" baseline="0" noProof="0" dirty="0" smtClean="0">
+                <a:ln>
+                  <a:noFill/>
+                </a:ln>
+                <a:solidFill>
+                  <a:schemeClr val="tx1"/>
+                </a:solidFill>
+                <a:effectLst/>
+                <a:uLnTx/>
+                <a:uFillTx/>
+                <a:latin typeface="+mn-lt"/>
+                <a:ea typeface="+mn-ea"/>
+                <a:cs typeface="+mn-cs"/>
+              </a:rPr>
+              <a:t>Cores share</a:t>
+            </a:r>
+            <a:r>
+              <a:rPr kumimoji="0" lang="en-US" sz="2800" b="0" i="0" u="none" strike="noStrike" kern="1200" cap="none" spc="0" normalizeH="0" noProof="0" dirty="0" smtClean="0">
+                <a:ln>
+                  <a:noFill/>
+                </a:ln>
+                <a:solidFill>
+                  <a:schemeClr val="tx1"/>
+                </a:solidFill>
+                <a:effectLst/>
+                <a:uLnTx/>
+                <a:uFillTx/>
+                <a:latin typeface="+mn-lt"/>
+                <a:ea typeface="+mn-ea"/>
+                <a:cs typeface="+mn-cs"/>
+              </a:rPr>
+              <a:t> </a:t>
+            </a:r>
+            <a:r>
+              <a:rPr kumimoji="0" lang="en-US" sz="2800" b="0" i="0" u="none" strike="noStrike" kern="1200" cap="none" spc="0" normalizeH="0" baseline="0" noProof="0" dirty="0" smtClean="0">
+                <a:ln>
+                  <a:noFill/>
+                </a:ln>
+                <a:solidFill>
+                  <a:schemeClr val="tx1"/>
+                </a:solidFill>
+                <a:effectLst/>
+                <a:uLnTx/>
+                <a:uFillTx/>
+                <a:latin typeface="+mn-lt"/>
+                <a:ea typeface="+mn-ea"/>
+                <a:cs typeface="+mn-cs"/>
+              </a:rPr>
+              <a:t>global memory</a:t>
+            </a:r>
+          </a:p>
+          <a:p>
+            <a:pPr marL="640080" marR="0" lvl="1" indent="-237744" algn="l" defTabSz="914400" rtl="0" eaLnBrk="1" fontAlgn="auto" latinLnBrk="0" hangingPunct="1">
+              <a:lnSpc>
+                <a:spcPct val="100000"/>
+              </a:lnSpc>
+              <a:spcBef>
+                <a:spcPts val="550"/>
+              </a:spcBef>
+              <a:spcAft>
+                <a:spcPts val="0"/>
+              </a:spcAft>
+              <a:buClr>
+                <a:schemeClr val="accent1"/>
+              </a:buClr>
+              <a:buSzTx/>
+              <a:buFont typeface="Verdana"/>
+              <a:buChar char="◦"/>
+              <a:tabLst/>
+              <a:defRPr/>
+            </a:pPr>
+            <a:r>
+              <a:rPr lang="en-US" noProof="0" dirty="0" smtClean="0"/>
+              <a:t>Warps/</a:t>
+            </a:r>
+            <a:r>
+              <a:rPr lang="en-US" noProof="0" dirty="0" err="1" smtClean="0"/>
+              <a:t>Wavefronts</a:t>
+            </a:r>
+            <a:r>
+              <a:rPr lang="en-US" noProof="0" dirty="0" smtClean="0"/>
+              <a:t> – groups of cores run same code. </a:t>
+            </a:r>
+            <a:endParaRPr kumimoji="0" lang="en-US" sz="2800" b="0" i="0" u="none" strike="noStrike" kern="1200" cap="none" spc="0" normalizeH="0" baseline="0" noProof="0" dirty="0" smtClean="0">
+              <a:ln>
+                <a:noFill/>
+              </a:ln>
+              <a:solidFill>
+                <a:schemeClr val="tx1"/>
+              </a:solidFill>
+              <a:effectLst/>
+              <a:uLnTx/>
+              <a:uFillTx/>
+              <a:latin typeface="+mn-lt"/>
+              <a:ea typeface="+mn-ea"/>
+              <a:cs typeface="+mn-cs"/>
+            </a:endParaRPr>
+          </a:p>
+          <a:p>
+            <a:pPr marL="365760" marR="0" lvl="0" indent="-283464" algn="l" defTabSz="914400" rtl="0" eaLnBrk="1" fontAlgn="auto" latinLnBrk="0" hangingPunct="1">
+              <a:lnSpc>
+                <a:spcPct val="100000"/>
+              </a:lnSpc>
+              <a:spcBef>
+                <a:spcPts val="600"/>
+              </a:spcBef>
+              <a:spcAft>
+                <a:spcPts val="0"/>
+              </a:spcAft>
+              <a:buClr>
+                <a:schemeClr val="accent1"/>
+              </a:buClr>
+              <a:buSzPct val="80000"/>
+              <a:buFont typeface="Wingdings 2"/>
+              <a:buChar char=""/>
+              <a:tabLst/>
+              <a:defRPr/>
+            </a:pPr>
+            <a:r>
+              <a:rPr kumimoji="0" lang="en-US" sz="3200" b="0" i="0" u="none" strike="noStrike" kern="1200" cap="none" spc="0" normalizeH="0" baseline="0" noProof="0" dirty="0" smtClean="0">
+                <a:ln>
+                  <a:noFill/>
+                </a:ln>
+                <a:solidFill>
+                  <a:schemeClr val="tx1"/>
+                </a:solidFill>
+                <a:effectLst/>
+                <a:uLnTx/>
+                <a:uFillTx/>
+                <a:latin typeface="+mn-lt"/>
+                <a:ea typeface="+mn-ea"/>
+                <a:cs typeface="+mn-cs"/>
+              </a:rPr>
+              <a:t>Must use a language compiled for GPU</a:t>
+            </a:r>
+          </a:p>
+          <a:p>
+            <a:pPr marL="640080" marR="0" lvl="1" indent="-237744" algn="l" defTabSz="914400" rtl="0" eaLnBrk="1" fontAlgn="auto" latinLnBrk="0" hangingPunct="1">
+              <a:lnSpc>
+                <a:spcPct val="100000"/>
+              </a:lnSpc>
+              <a:spcBef>
+                <a:spcPts val="550"/>
+              </a:spcBef>
+              <a:spcAft>
+                <a:spcPts val="0"/>
+              </a:spcAft>
+              <a:buClr>
+                <a:schemeClr val="accent1"/>
+              </a:buClr>
+              <a:buSzTx/>
+              <a:buFont typeface="Verdana"/>
+              <a:buChar char="◦"/>
+              <a:tabLst/>
+              <a:defRPr/>
+            </a:pPr>
+            <a:r>
+              <a:rPr kumimoji="0" lang="en-US" sz="2800" b="0" i="0" strike="noStrike" kern="1200" cap="none" spc="0" normalizeH="0" baseline="0" noProof="0" dirty="0" err="1" smtClean="0">
+                <a:ln>
+                  <a:noFill/>
+                </a:ln>
+                <a:solidFill>
+                  <a:schemeClr val="tx1"/>
+                </a:solidFill>
+                <a:effectLst/>
+                <a:uLnTx/>
+                <a:uFillTx/>
+                <a:latin typeface="+mn-lt"/>
+                <a:ea typeface="+mn-ea"/>
+                <a:cs typeface="+mn-cs"/>
+              </a:rPr>
+              <a:t>OpenCL</a:t>
+            </a:r>
+            <a:r>
+              <a:rPr kumimoji="0" lang="en-US" sz="2800" b="0" i="0" u="none" strike="noStrike" kern="1200" cap="none" spc="0" normalizeH="0" baseline="0" noProof="0" dirty="0" smtClean="0">
+                <a:ln>
+                  <a:noFill/>
+                </a:ln>
+                <a:solidFill>
+                  <a:schemeClr val="tx1"/>
+                </a:solidFill>
+                <a:effectLst/>
+                <a:uLnTx/>
+                <a:uFillTx/>
+                <a:latin typeface="+mn-lt"/>
+                <a:ea typeface="+mn-ea"/>
+                <a:cs typeface="+mn-cs"/>
+              </a:rPr>
+              <a:t> – Open programming language for multiple CPUs (on</a:t>
+            </a:r>
+            <a:r>
+              <a:rPr kumimoji="0" lang="en-US" sz="2800" b="0" i="0" u="none" strike="noStrike" kern="1200" cap="none" spc="0" normalizeH="0" noProof="0" dirty="0" smtClean="0">
+                <a:ln>
+                  <a:noFill/>
+                </a:ln>
+                <a:solidFill>
+                  <a:schemeClr val="tx1"/>
+                </a:solidFill>
+                <a:effectLst/>
+                <a:uLnTx/>
+                <a:uFillTx/>
+                <a:latin typeface="+mn-lt"/>
+                <a:ea typeface="+mn-ea"/>
+                <a:cs typeface="+mn-cs"/>
+              </a:rPr>
+              <a:t> </a:t>
+            </a:r>
+            <a:r>
+              <a:rPr kumimoji="0" lang="en-US" sz="2800" b="0" i="0" u="none" strike="noStrike" kern="1200" cap="none" spc="0" normalizeH="0" baseline="0" noProof="0" dirty="0" smtClean="0">
+                <a:ln>
+                  <a:noFill/>
+                </a:ln>
+                <a:solidFill>
+                  <a:schemeClr val="tx1"/>
+                </a:solidFill>
+                <a:effectLst/>
+                <a:uLnTx/>
+                <a:uFillTx/>
+                <a:latin typeface="+mn-lt"/>
+                <a:ea typeface="+mn-ea"/>
+                <a:cs typeface="+mn-cs"/>
+              </a:rPr>
+              <a:t>same node) and</a:t>
+            </a:r>
+            <a:r>
+              <a:rPr kumimoji="0" lang="en-US" sz="2800" b="0" i="0" u="none" strike="noStrike" kern="1200" cap="none" spc="0" normalizeH="0" noProof="0" dirty="0" smtClean="0">
+                <a:ln>
+                  <a:noFill/>
+                </a:ln>
+                <a:solidFill>
+                  <a:schemeClr val="tx1"/>
+                </a:solidFill>
+                <a:effectLst/>
+                <a:uLnTx/>
+                <a:uFillTx/>
+                <a:latin typeface="+mn-lt"/>
+                <a:ea typeface="+mn-ea"/>
+                <a:cs typeface="+mn-cs"/>
+              </a:rPr>
+              <a:t> </a:t>
+            </a:r>
+            <a:r>
+              <a:rPr kumimoji="0" lang="en-US" sz="2800" b="0" i="0" u="none" strike="noStrike" kern="1200" cap="none" spc="0" normalizeH="0" baseline="0" noProof="0" dirty="0" smtClean="0">
+                <a:ln>
+                  <a:noFill/>
+                </a:ln>
+                <a:solidFill>
+                  <a:schemeClr val="tx1"/>
+                </a:solidFill>
+                <a:effectLst/>
+                <a:uLnTx/>
+                <a:uFillTx/>
+                <a:latin typeface="+mn-lt"/>
+                <a:ea typeface="+mn-ea"/>
+                <a:cs typeface="+mn-cs"/>
+              </a:rPr>
+              <a:t>GPU. </a:t>
+            </a:r>
+          </a:p>
+          <a:p>
+            <a:pPr marL="640080" marR="0" lvl="1" indent="-237744" algn="l" defTabSz="914400" rtl="0" eaLnBrk="1" fontAlgn="auto" latinLnBrk="0" hangingPunct="1">
+              <a:lnSpc>
+                <a:spcPct val="100000"/>
+              </a:lnSpc>
+              <a:spcBef>
+                <a:spcPts val="550"/>
+              </a:spcBef>
+              <a:spcAft>
+                <a:spcPts val="0"/>
+              </a:spcAft>
+              <a:buClr>
+                <a:schemeClr val="accent1"/>
+              </a:buClr>
+              <a:buSzTx/>
+              <a:buFont typeface="Verdana"/>
+              <a:buChar char="◦"/>
+              <a:tabLst/>
+              <a:defRPr/>
+            </a:pPr>
+            <a:r>
+              <a:rPr kumimoji="0" lang="en-US" sz="2800" b="0" i="0" strike="noStrike" kern="1200" cap="none" spc="0" normalizeH="0" baseline="0" noProof="0" dirty="0" smtClean="0">
+                <a:ln>
+                  <a:noFill/>
+                </a:ln>
+                <a:solidFill>
+                  <a:schemeClr val="tx1"/>
+                </a:solidFill>
+                <a:effectLst/>
+                <a:uLnTx/>
+                <a:uFillTx/>
+                <a:latin typeface="+mn-lt"/>
+                <a:ea typeface="+mn-ea"/>
+                <a:cs typeface="+mn-cs"/>
+              </a:rPr>
+              <a:t>CUDA</a:t>
+            </a:r>
+            <a:r>
+              <a:rPr kumimoji="0" lang="en-US" sz="2800" b="0" i="0" u="none" strike="noStrike" kern="1200" cap="none" spc="0" normalizeH="0" baseline="0" noProof="0" dirty="0" smtClean="0">
+                <a:ln>
+                  <a:noFill/>
+                </a:ln>
+                <a:solidFill>
+                  <a:schemeClr val="tx1"/>
+                </a:solidFill>
+                <a:effectLst/>
+                <a:uLnTx/>
+                <a:uFillTx/>
+                <a:latin typeface="+mn-lt"/>
+                <a:ea typeface="+mn-ea"/>
+                <a:cs typeface="+mn-cs"/>
+              </a:rPr>
+              <a:t> – </a:t>
+            </a:r>
+            <a:r>
+              <a:rPr kumimoji="0" lang="en-US" sz="2800" b="0" i="0" u="none" strike="noStrike" kern="1200" cap="none" spc="0" normalizeH="0" baseline="0" noProof="0" dirty="0" err="1" smtClean="0">
+                <a:ln>
+                  <a:noFill/>
+                </a:ln>
+                <a:solidFill>
+                  <a:schemeClr val="tx1"/>
+                </a:solidFill>
+                <a:effectLst/>
+                <a:uLnTx/>
+                <a:uFillTx/>
+                <a:latin typeface="+mn-lt"/>
+                <a:ea typeface="+mn-ea"/>
+                <a:cs typeface="+mn-cs"/>
+              </a:rPr>
+              <a:t>Nvidia</a:t>
+            </a:r>
+            <a:r>
+              <a:rPr kumimoji="0" lang="en-US" sz="2800" b="0" i="0" u="none" strike="noStrike" kern="1200" cap="none" spc="0" normalizeH="0" baseline="0" noProof="0" dirty="0" smtClean="0">
+                <a:ln>
+                  <a:noFill/>
+                </a:ln>
+                <a:solidFill>
+                  <a:schemeClr val="tx1"/>
+                </a:solidFill>
+                <a:effectLst/>
+                <a:uLnTx/>
+                <a:uFillTx/>
+                <a:latin typeface="+mn-lt"/>
+                <a:ea typeface="+mn-ea"/>
+                <a:cs typeface="+mn-cs"/>
+              </a:rPr>
+              <a:t> only.</a:t>
+            </a:r>
+          </a:p>
+          <a:p>
+            <a:pPr marL="365760" marR="0" lvl="0" indent="-283464" algn="l" defTabSz="914400" rtl="0" eaLnBrk="1" fontAlgn="auto" latinLnBrk="0" hangingPunct="1">
+              <a:lnSpc>
+                <a:spcPct val="100000"/>
+              </a:lnSpc>
+              <a:spcBef>
+                <a:spcPts val="600"/>
+              </a:spcBef>
+              <a:spcAft>
+                <a:spcPts val="0"/>
+              </a:spcAft>
+              <a:buClr>
+                <a:schemeClr val="accent1"/>
+              </a:buClr>
+              <a:buSzPct val="80000"/>
+              <a:buFont typeface="Wingdings 2"/>
+              <a:buChar char=""/>
+              <a:tabLst/>
+              <a:defRPr/>
+            </a:pPr>
+            <a:r>
+              <a:rPr kumimoji="0" lang="en-US" sz="3200" b="0" i="0" u="none" strike="noStrike" kern="1200" cap="none" spc="0" normalizeH="0" baseline="0" noProof="0" dirty="0" smtClean="0">
+                <a:ln>
+                  <a:noFill/>
+                </a:ln>
+                <a:solidFill>
+                  <a:schemeClr val="tx1"/>
+                </a:solidFill>
+                <a:effectLst/>
+                <a:uLnTx/>
+                <a:uFillTx/>
+                <a:latin typeface="+mn-lt"/>
+                <a:ea typeface="+mn-ea"/>
+                <a:cs typeface="+mn-cs"/>
+              </a:rPr>
+              <a:t>This Project: </a:t>
+            </a:r>
+            <a:r>
+              <a:rPr kumimoji="0" lang="en-US" sz="3200" b="0" i="0" u="none" strike="noStrike" kern="1200" cap="none" spc="0" normalizeH="0" baseline="0" noProof="0" dirty="0" err="1" smtClean="0">
+                <a:ln>
+                  <a:noFill/>
+                </a:ln>
+                <a:solidFill>
+                  <a:schemeClr val="tx1"/>
+                </a:solidFill>
+                <a:effectLst/>
+                <a:uLnTx/>
+                <a:uFillTx/>
+                <a:latin typeface="+mn-lt"/>
+                <a:ea typeface="+mn-ea"/>
+                <a:cs typeface="+mn-cs"/>
+              </a:rPr>
+              <a:t>OpenCL</a:t>
+            </a:r>
+            <a:endParaRPr kumimoji="0" lang="en-US" sz="3200" b="0" i="0" u="none" strike="noStrike" kern="1200" cap="none" spc="0" normalizeH="0" baseline="0" noProof="0" dirty="0" smtClean="0">
+              <a:ln>
+                <a:noFill/>
+              </a:ln>
+              <a:solidFill>
+                <a:schemeClr val="tx1"/>
+              </a:solidFill>
+              <a:effectLst/>
+              <a:uLnTx/>
+              <a:uFillTx/>
+              <a:latin typeface="+mn-lt"/>
+              <a:ea typeface="+mn-ea"/>
+              <a:cs typeface="+mn-cs"/>
+            </a:endParaRPr>
+          </a:p>
+          <a:p>
+            <a:pPr marL="365760" marR="0" lvl="0" indent="-283464" algn="l" defTabSz="914400" rtl="0" eaLnBrk="1" fontAlgn="auto" latinLnBrk="0" hangingPunct="1">
+              <a:lnSpc>
+                <a:spcPct val="100000"/>
+              </a:lnSpc>
+              <a:spcBef>
+                <a:spcPts val="600"/>
+              </a:spcBef>
+              <a:spcAft>
+                <a:spcPts val="0"/>
+              </a:spcAft>
+              <a:buClr>
+                <a:schemeClr val="accent1"/>
+              </a:buClr>
+              <a:buSzPct val="80000"/>
+              <a:buFont typeface="Wingdings 2"/>
+              <a:buChar char=""/>
+              <a:tabLst/>
+              <a:defRPr/>
+            </a:pPr>
+            <a:endParaRPr kumimoji="0" lang="en-US" sz="3200" b="0" i="0" u="none" strike="noStrike" kern="1200" cap="none" spc="0" normalizeH="0" baseline="0" noProof="0" dirty="0" smtClean="0">
+              <a:ln>
+                <a:noFill/>
+              </a:ln>
+              <a:solidFill>
+                <a:schemeClr val="tx1"/>
+              </a:solidFill>
+              <a:effectLst/>
+              <a:uLnTx/>
+              <a:uFillTx/>
+              <a:latin typeface="+mn-lt"/>
+              <a:ea typeface="+mn-ea"/>
+              <a:cs typeface="+mn-cs"/>
+            </a:endParaRPr>
           </a:p>
         </p:txBody>
       </p:sp>
@@ -7584,6 +8243,325 @@
       </p:grpSpPr>
       <p:sp>
         <p:nvSpPr>
+          <p:cNvPr id="31746" name="Title 1"/>
+          <p:cNvSpPr>
+            <a:spLocks noGrp="1"/>
+          </p:cNvSpPr>
+          <p:nvPr>
+            <p:ph type="title"/>
+          </p:nvPr>
+        </p:nvSpPr>
+        <p:spPr/>
+        <p:txBody>
+          <a:bodyPr/>
+          <a:lstStyle/>
+          <a:p>
+            <a:r>
+              <a:rPr lang="en-US" dirty="0">
+                <a:ea typeface="ＭＳ Ｐゴシック" pitchFamily="-108" charset="-128"/>
+              </a:rPr>
+              <a:t>GPU architecture</a:t>
+            </a:r>
+          </a:p>
+        </p:txBody>
+      </p:sp>
+      <p:sp>
+        <p:nvSpPr>
+          <p:cNvPr id="31748" name="Slide Number Placeholder 3"/>
+          <p:cNvSpPr>
+            <a:spLocks noGrp="1"/>
+          </p:cNvSpPr>
+          <p:nvPr>
+            <p:ph type="sldNum" sz="quarter" idx="12"/>
+          </p:nvPr>
+        </p:nvSpPr>
+        <p:spPr>
+          <a:noFill/>
+        </p:spPr>
+        <p:txBody>
+          <a:bodyPr/>
+          <a:lstStyle/>
+          <a:p>
+            <a:r>
+              <a:rPr lang="en-US"/>
+              <a:t>Slide </a:t>
+            </a:r>
+            <a:fld id="{0032BADB-F48D-AE49-BA14-9EC1C0190D97}" type="slidenum">
+              <a:rPr lang="en-US"/>
+              <a:pPr/>
+              <a:t>19</a:t>
+            </a:fld>
+            <a:endParaRPr lang="en-US"/>
+          </a:p>
+        </p:txBody>
+      </p:sp>
+      <p:pic>
+        <p:nvPicPr>
+          <p:cNvPr id="1026" name="Picture 2" descr="http://www.realworldtech.com/includes/images/articles/g100-2.gif"/>
+          <p:cNvPicPr>
+            <a:picLocks noChangeAspect="1" noChangeArrowheads="1"/>
+          </p:cNvPicPr>
+          <p:nvPr/>
+        </p:nvPicPr>
+        <p:blipFill>
+          <a:blip r:embed="rId2"/>
+          <a:srcRect/>
+          <a:stretch>
+            <a:fillRect/>
+          </a:stretch>
+        </p:blipFill>
+        <p:spPr bwMode="auto">
+          <a:xfrm>
+            <a:off x="2362200" y="1417637"/>
+            <a:ext cx="4191000" cy="4639779"/>
+          </a:xfrm>
+          <a:prstGeom prst="rect">
+            <a:avLst/>
+          </a:prstGeom>
+          <a:noFill/>
+        </p:spPr>
+      </p:pic>
+      <p:sp>
+        <p:nvSpPr>
+          <p:cNvPr id="6" name="TextBox 5"/>
+          <p:cNvSpPr txBox="1"/>
+          <p:nvPr/>
+        </p:nvSpPr>
+        <p:spPr>
+          <a:xfrm>
+            <a:off x="3273552" y="6031468"/>
+            <a:ext cx="3127248" cy="369332"/>
+          </a:xfrm>
+          <a:prstGeom prst="rect">
+            <a:avLst/>
+          </a:prstGeom>
+          <a:noFill/>
+        </p:spPr>
+        <p:txBody>
+          <a:bodyPr wrap="square" rtlCol="0">
+            <a:spAutoFit/>
+          </a:bodyPr>
+          <a:lstStyle/>
+          <a:p>
+            <a:r>
+              <a:rPr lang="en-US" sz="1400" dirty="0" smtClean="0"/>
+              <a:t>http://www.realworldtech.com/gt200/3</a:t>
+            </a:r>
+            <a:r>
+              <a:rPr lang="en-US" dirty="0" smtClean="0"/>
+              <a:t>/</a:t>
+            </a:r>
+            <a:endParaRPr lang="en-US" dirty="0"/>
+          </a:p>
+        </p:txBody>
+      </p:sp>
+    </p:spTree>
+  </p:cSld>
+  <p:clrMapOvr>
+    <a:masterClrMapping/>
+  </p:clrMapOvr>
+  <p:timing>
+    <p:tnLst>
+      <p:par>
+        <p:cTn id="1" dur="indefinite" restart="never" nodeType="tmRoot"/>
+      </p:par>
+    </p:tnLst>
+  </p:timing>
+</p:sld>
+</file>
+
+<file path=ppt/slides/slide2.xml><?xml version="1.0" encoding="utf-8"?>
+<p:sld xmlns:a="http://schemas.openxmlformats.org/drawingml/2006/main" xmlns:r="http://schemas.openxmlformats.org/officeDocument/2006/relationships" xmlns:mc="http://schemas.openxmlformats.org/markup-compatibility/2006" xmlns:mv="urn:schemas-microsoft-com:mac:vml" xmlns:p="http://schemas.openxmlformats.org/presentationml/2006/main" mc:Ignorable="mv" mc:PreserveAttributes="mv:*">
+  <p:cSld>
+    <p:spTree>
+      <p:nvGrpSpPr>
+        <p:cNvPr id="1" name=""/>
+        <p:cNvGrpSpPr/>
+        <p:nvPr/>
+      </p:nvGrpSpPr>
+      <p:grpSpPr>
+        <a:xfrm>
+          <a:off x="0" y="0"/>
+          <a:ext cx="0" cy="0"/>
+          <a:chOff x="0" y="0"/>
+          <a:chExt cx="0" cy="0"/>
+        </a:xfrm>
+      </p:grpSpPr>
+      <p:sp>
+        <p:nvSpPr>
+          <p:cNvPr id="2" name="Title 1"/>
+          <p:cNvSpPr>
+            <a:spLocks noGrp="1"/>
+          </p:cNvSpPr>
+          <p:nvPr>
+            <p:ph type="title"/>
+          </p:nvPr>
+        </p:nvSpPr>
+        <p:spPr/>
+        <p:txBody>
+          <a:bodyPr/>
+          <a:lstStyle/>
+          <a:p>
+            <a:r>
+              <a:rPr lang="en-US" dirty="0" smtClean="0"/>
+              <a:t>Acknowledgements</a:t>
+            </a:r>
+            <a:endParaRPr lang="en-US" dirty="0"/>
+          </a:p>
+        </p:txBody>
+      </p:sp>
+      <p:sp>
+        <p:nvSpPr>
+          <p:cNvPr id="3" name="Content Placeholder 2"/>
+          <p:cNvSpPr>
+            <a:spLocks noGrp="1"/>
+          </p:cNvSpPr>
+          <p:nvPr>
+            <p:ph idx="1"/>
+          </p:nvPr>
+        </p:nvSpPr>
+        <p:spPr/>
+        <p:txBody>
+          <a:bodyPr/>
+          <a:lstStyle/>
+          <a:p>
+            <a:r>
+              <a:rPr lang="en-US" dirty="0" smtClean="0"/>
+              <a:t>Mentor: Dr. Bob </a:t>
+            </a:r>
+            <a:r>
+              <a:rPr lang="en-US" dirty="0" err="1" smtClean="0"/>
+              <a:t>Robey</a:t>
+            </a:r>
+            <a:endParaRPr lang="en-US" dirty="0" smtClean="0"/>
+          </a:p>
+          <a:p>
+            <a:r>
+              <a:rPr lang="en-US" dirty="0" smtClean="0"/>
+              <a:t>Workshop Coordinator: Dr. Scott Runnels</a:t>
+            </a:r>
+          </a:p>
+          <a:p>
+            <a:r>
+              <a:rPr lang="en-US" dirty="0" smtClean="0"/>
+              <a:t>Collaborator: David </a:t>
+            </a:r>
+            <a:r>
+              <a:rPr lang="en-US" dirty="0" err="1" smtClean="0"/>
+              <a:t>Nicholaeff</a:t>
+            </a:r>
+            <a:endParaRPr lang="en-US" dirty="0"/>
+          </a:p>
+        </p:txBody>
+      </p:sp>
+      <p:sp>
+        <p:nvSpPr>
+          <p:cNvPr id="4" name="Slide Number Placeholder 3"/>
+          <p:cNvSpPr>
+            <a:spLocks noGrp="1"/>
+          </p:cNvSpPr>
+          <p:nvPr>
+            <p:ph type="sldNum" sz="quarter" idx="12"/>
+          </p:nvPr>
+        </p:nvSpPr>
+        <p:spPr/>
+        <p:txBody>
+          <a:bodyPr/>
+          <a:lstStyle/>
+          <a:p>
+            <a:pPr>
+              <a:defRPr/>
+            </a:pPr>
+            <a:r>
+              <a:rPr lang="en-US" smtClean="0"/>
+              <a:t>Slide </a:t>
+            </a:r>
+            <a:fld id="{A68412BC-A268-D946-A5C9-977AF5753747}" type="slidenum">
+              <a:rPr lang="en-US" smtClean="0"/>
+              <a:pPr>
+                <a:defRPr/>
+              </a:pPr>
+              <a:t>2</a:t>
+            </a:fld>
+            <a:endParaRPr lang="en-US"/>
+          </a:p>
+        </p:txBody>
+      </p:sp>
+      <p:sp>
+        <p:nvSpPr>
+          <p:cNvPr id="5" name="TextBox 4"/>
+          <p:cNvSpPr txBox="1"/>
+          <p:nvPr/>
+        </p:nvSpPr>
+        <p:spPr>
+          <a:xfrm>
+            <a:off x="4191000" y="4093458"/>
+            <a:ext cx="3810000" cy="630942"/>
+          </a:xfrm>
+          <a:prstGeom prst="rect">
+            <a:avLst/>
+          </a:prstGeom>
+          <a:noFill/>
+        </p:spPr>
+        <p:txBody>
+          <a:bodyPr wrap="square" rtlCol="0">
+            <a:spAutoFit/>
+          </a:bodyPr>
+          <a:lstStyle/>
+          <a:p>
+            <a:pPr>
+              <a:buNone/>
+            </a:pPr>
+            <a:r>
+              <a:rPr lang="en-US" sz="3500" dirty="0" smtClean="0">
+                <a:solidFill>
+                  <a:srgbClr val="FF0000"/>
+                </a:solidFill>
+              </a:rPr>
+              <a:t>Thank you!</a:t>
+            </a:r>
+            <a:endParaRPr lang="en-US" sz="3500" dirty="0">
+              <a:solidFill>
+                <a:srgbClr val="FF0000"/>
+              </a:solidFill>
+            </a:endParaRPr>
+          </a:p>
+        </p:txBody>
+      </p:sp>
+    </p:spTree>
+  </p:cSld>
+  <p:clrMapOvr>
+    <a:masterClrMapping/>
+  </p:clrMapOvr>
+  <p:timing>
+    <p:tnLst>
+      <p:par>
+        <p:cTn id="1" dur="indefinite" restart="never" nodeType="tmRoot"/>
+      </p:par>
+    </p:tnLst>
+  </p:timing>
+</p:sld>
+</file>
+
+<file path=ppt/slides/slide20.xml><?xml version="1.0" encoding="utf-8"?>
+<p:sld xmlns:a="http://schemas.openxmlformats.org/drawingml/2006/main" xmlns:r="http://schemas.openxmlformats.org/officeDocument/2006/relationships" xmlns:mc="http://schemas.openxmlformats.org/markup-compatibility/2006" xmlns:mv="urn:schemas-microsoft-com:mac:vml" xmlns:p="http://schemas.openxmlformats.org/presentationml/2006/main" mc:Ignorable="mv" mc:PreserveAttributes="mv:*">
+  <p:cSld>
+    <p:spTree>
+      <p:nvGrpSpPr>
+        <p:cNvPr id="1" name=""/>
+        <p:cNvGrpSpPr/>
+        <p:nvPr/>
+      </p:nvGrpSpPr>
+      <p:grpSpPr>
+        <a:xfrm>
+          <a:off x="0" y="0"/>
+          <a:ext cx="0" cy="0"/>
+          <a:chOff x="0" y="0"/>
+          <a:chExt cx="0" cy="0"/>
+        </a:xfrm>
+      </p:grpSpPr>
+      <p:sp>
+        <p:nvSpPr>
           <p:cNvPr id="32770" name="Title 1"/>
           <p:cNvSpPr>
             <a:spLocks noGrp="1"/>
@@ -7710,7 +8688,7 @@
             <a:fld id="{DC1526B5-889A-3640-A8B5-3DF29F19965A}" type="slidenum">
               <a:rPr lang="en-US"/>
               <a:pPr/>
-              <a:t>19</a:t>
+              <a:t>20</a:t>
             </a:fld>
             <a:endParaRPr lang="en-US"/>
           </a:p>
@@ -7795,7 +8773,7 @@
 </p:sld>
 </file>
 
-<file path=ppt/slides/slide2.xml><?xml version="1.0" encoding="utf-8"?>
+<file path=ppt/slides/slide21.xml><?xml version="1.0" encoding="utf-8"?>
 <p:sld xmlns:a="http://schemas.openxmlformats.org/drawingml/2006/main" xmlns:r="http://schemas.openxmlformats.org/officeDocument/2006/relationships" xmlns:mc="http://schemas.openxmlformats.org/markup-compatibility/2006" xmlns:mv="urn:schemas-microsoft-com:mac:vml" xmlns:p="http://schemas.openxmlformats.org/presentationml/2006/main" mc:Ignorable="mv" mc:PreserveAttributes="mv:*">
   <p:cSld>
     <p:spTree>
@@ -7814,179 +8792,6 @@
       </p:grpSpPr>
       <p:sp>
         <p:nvSpPr>
-          <p:cNvPr id="2" name="Title 1"/>
-          <p:cNvSpPr>
-            <a:spLocks noGrp="1"/>
-          </p:cNvSpPr>
-          <p:nvPr>
-            <p:ph type="title"/>
-          </p:nvPr>
-        </p:nvSpPr>
-        <p:spPr/>
-        <p:txBody>
-          <a:bodyPr/>
-          <a:lstStyle/>
-          <a:p>
-            <a:r>
-              <a:rPr lang="en-US" dirty="0" smtClean="0"/>
-              <a:t>Acknowledgements</a:t>
-            </a:r>
-            <a:endParaRPr lang="en-US" dirty="0"/>
-          </a:p>
-        </p:txBody>
-      </p:sp>
-      <p:sp>
-        <p:nvSpPr>
-          <p:cNvPr id="3" name="Content Placeholder 2"/>
-          <p:cNvSpPr>
-            <a:spLocks noGrp="1"/>
-          </p:cNvSpPr>
-          <p:nvPr>
-            <p:ph idx="1"/>
-          </p:nvPr>
-        </p:nvSpPr>
-        <p:spPr/>
-        <p:txBody>
-          <a:bodyPr/>
-          <a:lstStyle/>
-          <a:p>
-            <a:r>
-              <a:rPr lang="en-US" dirty="0" smtClean="0"/>
-              <a:t>Mentor: Dr. Bob </a:t>
-            </a:r>
-            <a:r>
-              <a:rPr lang="en-US" dirty="0" err="1" smtClean="0"/>
-              <a:t>Robey</a:t>
-            </a:r>
-            <a:endParaRPr lang="en-US" dirty="0" smtClean="0"/>
-          </a:p>
-          <a:p>
-            <a:r>
-              <a:rPr lang="en-US" dirty="0" smtClean="0"/>
-              <a:t>Workshop Coordinator: Dr. Scott Runnels</a:t>
-            </a:r>
-          </a:p>
-          <a:p>
-            <a:r>
-              <a:rPr lang="en-US" dirty="0" smtClean="0"/>
-              <a:t>Collaborator: David </a:t>
-            </a:r>
-            <a:r>
-              <a:rPr lang="en-US" dirty="0" err="1" smtClean="0"/>
-              <a:t>Nicholaeff</a:t>
-            </a:r>
-            <a:endParaRPr lang="en-US" dirty="0"/>
-          </a:p>
-        </p:txBody>
-      </p:sp>
-      <p:sp>
-        <p:nvSpPr>
-          <p:cNvPr id="4" name="Slide Number Placeholder 3"/>
-          <p:cNvSpPr>
-            <a:spLocks noGrp="1"/>
-          </p:cNvSpPr>
-          <p:nvPr>
-            <p:ph type="sldNum" sz="quarter" idx="12"/>
-          </p:nvPr>
-        </p:nvSpPr>
-        <p:spPr/>
-        <p:txBody>
-          <a:bodyPr/>
-          <a:lstStyle/>
-          <a:p>
-            <a:pPr>
-              <a:defRPr/>
-            </a:pPr>
-            <a:r>
-              <a:rPr lang="en-US" smtClean="0"/>
-              <a:t>Slide </a:t>
-            </a:r>
-            <a:fld id="{A68412BC-A268-D946-A5C9-977AF5753747}" type="slidenum">
-              <a:rPr lang="en-US" smtClean="0"/>
-              <a:pPr>
-                <a:defRPr/>
-              </a:pPr>
-              <a:t>2</a:t>
-            </a:fld>
-            <a:endParaRPr lang="en-US"/>
-          </a:p>
-        </p:txBody>
-      </p:sp>
-      <p:sp>
-        <p:nvSpPr>
-          <p:cNvPr id="5" name="TextBox 4"/>
-          <p:cNvSpPr txBox="1"/>
-          <p:nvPr/>
-        </p:nvSpPr>
-        <p:spPr>
-          <a:xfrm>
-            <a:off x="4191000" y="4093458"/>
-            <a:ext cx="3810000" cy="630942"/>
-          </a:xfrm>
-          <a:prstGeom prst="rect">
-            <a:avLst/>
-          </a:prstGeom>
-          <a:noFill/>
-        </p:spPr>
-        <p:txBody>
-          <a:bodyPr wrap="square" rtlCol="0">
-            <a:spAutoFit/>
-          </a:bodyPr>
-          <a:lstStyle/>
-          <a:p>
-            <a:pPr>
-              <a:buNone/>
-            </a:pPr>
-            <a:r>
-              <a:rPr lang="en-US" sz="3500" dirty="0" smtClean="0">
-                <a:solidFill>
-                  <a:srgbClr val="FF0000"/>
-                </a:solidFill>
-              </a:rPr>
-              <a:t>Thank you!</a:t>
-            </a:r>
-            <a:endParaRPr lang="en-US" sz="3500" dirty="0">
-              <a:solidFill>
-                <a:srgbClr val="FF0000"/>
-              </a:solidFill>
-            </a:endParaRPr>
-          </a:p>
-        </p:txBody>
-      </p:sp>
-    </p:spTree>
-  </p:cSld>
-  <p:clrMapOvr>
-    <a:masterClrMapping/>
-  </p:clrMapOvr>
-  <p:timing>
-    <p:tnLst>
-      <p:par>
-        <p:cTn id="1" dur="indefinite" restart="never" nodeType="tmRoot"/>
-      </p:par>
-    </p:tnLst>
-  </p:timing>
-</p:sld>
-</file>
-
-<file path=ppt/slides/slide20.xml><?xml version="1.0" encoding="utf-8"?>
-<p:sld xmlns:a="http://schemas.openxmlformats.org/drawingml/2006/main" xmlns:r="http://schemas.openxmlformats.org/officeDocument/2006/relationships" xmlns:mc="http://schemas.openxmlformats.org/markup-compatibility/2006" xmlns:mv="urn:schemas-microsoft-com:mac:vml" xmlns:p="http://schemas.openxmlformats.org/presentationml/2006/main" mc:Ignorable="mv" mc:PreserveAttributes="mv:*">
-  <p:cSld>
-    <p:spTree>
-      <p:nvGrpSpPr>
-        <p:cNvPr id="1" name=""/>
-        <p:cNvGrpSpPr/>
-        <p:nvPr/>
-      </p:nvGrpSpPr>
-      <p:grpSpPr>
-        <a:xfrm>
-          <a:off x="0" y="0"/>
-          <a:ext cx="0" cy="0"/>
-          <a:chOff x="0" y="0"/>
-          <a:chExt cx="0" cy="0"/>
-        </a:xfrm>
-      </p:grpSpPr>
-      <p:sp>
-        <p:nvSpPr>
           <p:cNvPr id="33794" name="Title 1"/>
           <p:cNvSpPr>
             <a:spLocks noGrp="1"/>
@@ -8060,7 +8865,7 @@
             <a:fld id="{8408E1E3-6392-834E-A657-F96134CD74C6}" type="slidenum">
               <a:rPr lang="en-US"/>
               <a:pPr/>
-              <a:t>20</a:t>
+              <a:t>21</a:t>
             </a:fld>
             <a:endParaRPr lang="en-US"/>
           </a:p>
@@ -8480,193 +9285,6 @@
 </p:sld>
 </file>
 
-<file path=ppt/slides/slide21.xml><?xml version="1.0" encoding="utf-8"?>
-<p:sld xmlns:a="http://schemas.openxmlformats.org/drawingml/2006/main" xmlns:r="http://schemas.openxmlformats.org/officeDocument/2006/relationships" xmlns:mc="http://schemas.openxmlformats.org/markup-compatibility/2006" xmlns:mv="urn:schemas-microsoft-com:mac:vml" xmlns:p="http://schemas.openxmlformats.org/presentationml/2006/main" mc:Ignorable="mv" mc:PreserveAttributes="mv:*">
-  <p:cSld>
-    <p:spTree>
-      <p:nvGrpSpPr>
-        <p:cNvPr id="1" name=""/>
-        <p:cNvGrpSpPr/>
-        <p:nvPr/>
-      </p:nvGrpSpPr>
-      <p:grpSpPr>
-        <a:xfrm>
-          <a:off x="0" y="0"/>
-          <a:ext cx="0" cy="0"/>
-          <a:chOff x="0" y="0"/>
-          <a:chExt cx="0" cy="0"/>
-        </a:xfrm>
-      </p:grpSpPr>
-      <p:sp>
-        <p:nvSpPr>
-          <p:cNvPr id="34818" name="Title 1"/>
-          <p:cNvSpPr>
-            <a:spLocks noGrp="1"/>
-          </p:cNvSpPr>
-          <p:nvPr>
-            <p:ph type="title"/>
-          </p:nvPr>
-        </p:nvSpPr>
-        <p:spPr/>
-        <p:txBody>
-          <a:bodyPr/>
-          <a:lstStyle/>
-          <a:p>
-            <a:r>
-              <a:rPr lang="en-US">
-                <a:ea typeface="ＭＳ Ｐゴシック" pitchFamily="-108" charset="-128"/>
-              </a:rPr>
-              <a:t>Future Directions</a:t>
-            </a:r>
-          </a:p>
-        </p:txBody>
-      </p:sp>
-      <p:sp>
-        <p:nvSpPr>
-          <p:cNvPr id="34819" name="Content Placeholder 2"/>
-          <p:cNvSpPr>
-            <a:spLocks noGrp="1"/>
-          </p:cNvSpPr>
-          <p:nvPr>
-            <p:ph idx="1"/>
-          </p:nvPr>
-        </p:nvSpPr>
-        <p:spPr/>
-        <p:txBody>
-          <a:bodyPr/>
-          <a:lstStyle/>
-          <a:p>
-            <a:r>
-              <a:rPr lang="en-US" dirty="0">
-                <a:ea typeface="ＭＳ Ｐゴシック" pitchFamily="-108" charset="-128"/>
-              </a:rPr>
-              <a:t>FEM approach for full Euler equations</a:t>
-            </a:r>
-          </a:p>
-          <a:p>
-            <a:r>
-              <a:rPr lang="en-US" dirty="0">
-                <a:ea typeface="ＭＳ Ｐゴシック" pitchFamily="-108" charset="-128"/>
-              </a:rPr>
-              <a:t>Implement</a:t>
-            </a:r>
-            <a:r>
-              <a:rPr lang="en-US" dirty="0" smtClean="0">
-                <a:ea typeface="ＭＳ Ｐゴシック" pitchFamily="-108" charset="-128"/>
-              </a:rPr>
-              <a:t> more of these schemes in </a:t>
-            </a:r>
-            <a:r>
-              <a:rPr lang="en-US" dirty="0">
-                <a:ea typeface="ＭＳ Ｐゴシック" pitchFamily="-108" charset="-128"/>
-              </a:rPr>
-              <a:t>the </a:t>
-            </a:r>
-            <a:r>
-              <a:rPr lang="en-US" dirty="0" smtClean="0">
-                <a:ea typeface="ＭＳ Ｐゴシック" pitchFamily="-108" charset="-128"/>
-              </a:rPr>
-              <a:t>GPU code</a:t>
-            </a:r>
-          </a:p>
-          <a:p>
-            <a:r>
-              <a:rPr lang="en-US" dirty="0" smtClean="0">
-                <a:ea typeface="ＭＳ Ｐゴシック" pitchFamily="-108" charset="-128"/>
-              </a:rPr>
-              <a:t>Develop full </a:t>
-            </a:r>
-            <a:r>
-              <a:rPr lang="en-US" dirty="0">
-                <a:ea typeface="ＭＳ Ｐゴシック" pitchFamily="-108" charset="-128"/>
-              </a:rPr>
-              <a:t>Euler </a:t>
-            </a:r>
-            <a:r>
-              <a:rPr lang="en-US" dirty="0" smtClean="0">
-                <a:ea typeface="ＭＳ Ｐゴシック" pitchFamily="-108" charset="-128"/>
-              </a:rPr>
-              <a:t>Equation solvers with some of these schemes</a:t>
-            </a:r>
-          </a:p>
-          <a:p>
-            <a:r>
-              <a:rPr lang="en-US" dirty="0">
-                <a:ea typeface="ＭＳ Ｐゴシック" pitchFamily="-108" charset="-128"/>
-              </a:rPr>
-              <a:t>Alternative numerical </a:t>
-            </a:r>
-            <a:r>
-              <a:rPr lang="en-US" dirty="0" smtClean="0">
-                <a:ea typeface="ＭＳ Ｐゴシック" pitchFamily="-108" charset="-128"/>
-              </a:rPr>
-              <a:t>methods (WENO, Discontinuous </a:t>
-            </a:r>
-            <a:r>
-              <a:rPr lang="en-US" dirty="0" err="1" smtClean="0">
-                <a:ea typeface="ＭＳ Ｐゴシック" pitchFamily="-108" charset="-128"/>
-              </a:rPr>
-              <a:t>Galerkin</a:t>
-            </a:r>
-            <a:r>
-              <a:rPr lang="en-US" dirty="0" smtClean="0">
-                <a:ea typeface="ＭＳ Ｐゴシック" pitchFamily="-108" charset="-128"/>
-              </a:rPr>
-              <a:t>, etc.)</a:t>
-            </a:r>
-          </a:p>
-          <a:p>
-            <a:endParaRPr lang="en-US" dirty="0">
-              <a:ea typeface="ＭＳ Ｐゴシック" pitchFamily="-108" charset="-128"/>
-            </a:endParaRPr>
-          </a:p>
-        </p:txBody>
-      </p:sp>
-      <p:sp>
-        <p:nvSpPr>
-          <p:cNvPr id="34820" name="Slide Number Placeholder 3"/>
-          <p:cNvSpPr>
-            <a:spLocks noGrp="1"/>
-          </p:cNvSpPr>
-          <p:nvPr>
-            <p:ph type="sldNum" sz="quarter" idx="12"/>
-          </p:nvPr>
-        </p:nvSpPr>
-        <p:spPr>
-          <a:noFill/>
-        </p:spPr>
-        <p:txBody>
-          <a:bodyPr/>
-          <a:lstStyle/>
-          <a:p>
-            <a:r>
-              <a:rPr lang="en-US"/>
-              <a:t>Slide </a:t>
-            </a:r>
-            <a:fld id="{642E7553-A61F-9A41-A7A2-954D1F757C3A}" type="slidenum">
-              <a:rPr lang="en-US"/>
-              <a:pPr/>
-              <a:t>21</a:t>
-            </a:fld>
-            <a:endParaRPr lang="en-US"/>
-          </a:p>
-        </p:txBody>
-      </p:sp>
-    </p:spTree>
-  </p:cSld>
-  <p:clrMapOvr>
-    <a:masterClrMapping/>
-  </p:clrMapOvr>
-  <p:timing>
-    <p:tnLst>
-      <p:par>
-        <p:cTn id="1" dur="indefinite" restart="never" nodeType="tmRoot"/>
-      </p:par>
-    </p:tnLst>
-  </p:timing>
-</p:sld>
-</file>
-
 <file path=ppt/slides/slide22.xml><?xml version="1.0" encoding="utf-8"?>
 <p:sld xmlns:a="http://schemas.openxmlformats.org/drawingml/2006/main" xmlns:r="http://schemas.openxmlformats.org/officeDocument/2006/relationships" xmlns:mc="http://schemas.openxmlformats.org/markup-compatibility/2006" xmlns:mv="urn:schemas-microsoft-com:mac:vml" xmlns:p="http://schemas.openxmlformats.org/presentationml/2006/main" mc:Ignorable="mv" mc:PreserveAttributes="mv:*">
   <p:cSld>
@@ -8686,6 +9304,193 @@
       </p:grpSpPr>
       <p:sp>
         <p:nvSpPr>
+          <p:cNvPr id="34818" name="Title 1"/>
+          <p:cNvSpPr>
+            <a:spLocks noGrp="1"/>
+          </p:cNvSpPr>
+          <p:nvPr>
+            <p:ph type="title"/>
+          </p:nvPr>
+        </p:nvSpPr>
+        <p:spPr/>
+        <p:txBody>
+          <a:bodyPr/>
+          <a:lstStyle/>
+          <a:p>
+            <a:r>
+              <a:rPr lang="en-US">
+                <a:ea typeface="ＭＳ Ｐゴシック" pitchFamily="-108" charset="-128"/>
+              </a:rPr>
+              <a:t>Future Directions</a:t>
+            </a:r>
+          </a:p>
+        </p:txBody>
+      </p:sp>
+      <p:sp>
+        <p:nvSpPr>
+          <p:cNvPr id="34819" name="Content Placeholder 2"/>
+          <p:cNvSpPr>
+            <a:spLocks noGrp="1"/>
+          </p:cNvSpPr>
+          <p:nvPr>
+            <p:ph idx="1"/>
+          </p:nvPr>
+        </p:nvSpPr>
+        <p:spPr/>
+        <p:txBody>
+          <a:bodyPr/>
+          <a:lstStyle/>
+          <a:p>
+            <a:r>
+              <a:rPr lang="en-US" dirty="0">
+                <a:ea typeface="ＭＳ Ｐゴシック" pitchFamily="-108" charset="-128"/>
+              </a:rPr>
+              <a:t>FEM approach for full Euler equations</a:t>
+            </a:r>
+          </a:p>
+          <a:p>
+            <a:r>
+              <a:rPr lang="en-US" dirty="0">
+                <a:ea typeface="ＭＳ Ｐゴシック" pitchFamily="-108" charset="-128"/>
+              </a:rPr>
+              <a:t>Implement</a:t>
+            </a:r>
+            <a:r>
+              <a:rPr lang="en-US" dirty="0" smtClean="0">
+                <a:ea typeface="ＭＳ Ｐゴシック" pitchFamily="-108" charset="-128"/>
+              </a:rPr>
+              <a:t> more of these schemes in </a:t>
+            </a:r>
+            <a:r>
+              <a:rPr lang="en-US" dirty="0">
+                <a:ea typeface="ＭＳ Ｐゴシック" pitchFamily="-108" charset="-128"/>
+              </a:rPr>
+              <a:t>the </a:t>
+            </a:r>
+            <a:r>
+              <a:rPr lang="en-US" dirty="0" smtClean="0">
+                <a:ea typeface="ＭＳ Ｐゴシック" pitchFamily="-108" charset="-128"/>
+              </a:rPr>
+              <a:t>GPU code</a:t>
+            </a:r>
+          </a:p>
+          <a:p>
+            <a:r>
+              <a:rPr lang="en-US" dirty="0" smtClean="0">
+                <a:ea typeface="ＭＳ Ｐゴシック" pitchFamily="-108" charset="-128"/>
+              </a:rPr>
+              <a:t>Develop full </a:t>
+            </a:r>
+            <a:r>
+              <a:rPr lang="en-US" dirty="0">
+                <a:ea typeface="ＭＳ Ｐゴシック" pitchFamily="-108" charset="-128"/>
+              </a:rPr>
+              <a:t>Euler </a:t>
+            </a:r>
+            <a:r>
+              <a:rPr lang="en-US" dirty="0" smtClean="0">
+                <a:ea typeface="ＭＳ Ｐゴシック" pitchFamily="-108" charset="-128"/>
+              </a:rPr>
+              <a:t>Equation solvers with some of these schemes</a:t>
+            </a:r>
+          </a:p>
+          <a:p>
+            <a:r>
+              <a:rPr lang="en-US" dirty="0">
+                <a:ea typeface="ＭＳ Ｐゴシック" pitchFamily="-108" charset="-128"/>
+              </a:rPr>
+              <a:t>Alternative numerical </a:t>
+            </a:r>
+            <a:r>
+              <a:rPr lang="en-US" dirty="0" smtClean="0">
+                <a:ea typeface="ＭＳ Ｐゴシック" pitchFamily="-108" charset="-128"/>
+              </a:rPr>
+              <a:t>methods (WENO, Discontinuous </a:t>
+            </a:r>
+            <a:r>
+              <a:rPr lang="en-US" dirty="0" err="1" smtClean="0">
+                <a:ea typeface="ＭＳ Ｐゴシック" pitchFamily="-108" charset="-128"/>
+              </a:rPr>
+              <a:t>Galerkin</a:t>
+            </a:r>
+            <a:r>
+              <a:rPr lang="en-US" dirty="0" smtClean="0">
+                <a:ea typeface="ＭＳ Ｐゴシック" pitchFamily="-108" charset="-128"/>
+              </a:rPr>
+              <a:t>, etc.)</a:t>
+            </a:r>
+          </a:p>
+          <a:p>
+            <a:endParaRPr lang="en-US" dirty="0">
+              <a:ea typeface="ＭＳ Ｐゴシック" pitchFamily="-108" charset="-128"/>
+            </a:endParaRPr>
+          </a:p>
+        </p:txBody>
+      </p:sp>
+      <p:sp>
+        <p:nvSpPr>
+          <p:cNvPr id="34820" name="Slide Number Placeholder 3"/>
+          <p:cNvSpPr>
+            <a:spLocks noGrp="1"/>
+          </p:cNvSpPr>
+          <p:nvPr>
+            <p:ph type="sldNum" sz="quarter" idx="12"/>
+          </p:nvPr>
+        </p:nvSpPr>
+        <p:spPr>
+          <a:noFill/>
+        </p:spPr>
+        <p:txBody>
+          <a:bodyPr/>
+          <a:lstStyle/>
+          <a:p>
+            <a:r>
+              <a:rPr lang="en-US"/>
+              <a:t>Slide </a:t>
+            </a:r>
+            <a:fld id="{642E7553-A61F-9A41-A7A2-954D1F757C3A}" type="slidenum">
+              <a:rPr lang="en-US"/>
+              <a:pPr/>
+              <a:t>22</a:t>
+            </a:fld>
+            <a:endParaRPr lang="en-US"/>
+          </a:p>
+        </p:txBody>
+      </p:sp>
+    </p:spTree>
+  </p:cSld>
+  <p:clrMapOvr>
+    <a:masterClrMapping/>
+  </p:clrMapOvr>
+  <p:timing>
+    <p:tnLst>
+      <p:par>
+        <p:cTn id="1" dur="indefinite" restart="never" nodeType="tmRoot"/>
+      </p:par>
+    </p:tnLst>
+  </p:timing>
+</p:sld>
+</file>
+
+<file path=ppt/slides/slide23.xml><?xml version="1.0" encoding="utf-8"?>
+<p:sld xmlns:a="http://schemas.openxmlformats.org/drawingml/2006/main" xmlns:r="http://schemas.openxmlformats.org/officeDocument/2006/relationships" xmlns:mc="http://schemas.openxmlformats.org/markup-compatibility/2006" xmlns:mv="urn:schemas-microsoft-com:mac:vml" xmlns:p="http://schemas.openxmlformats.org/presentationml/2006/main" mc:Ignorable="mv" mc:PreserveAttributes="mv:*">
+  <p:cSld>
+    <p:spTree>
+      <p:nvGrpSpPr>
+        <p:cNvPr id="1" name=""/>
+        <p:cNvGrpSpPr/>
+        <p:nvPr/>
+      </p:nvGrpSpPr>
+      <p:grpSpPr>
+        <a:xfrm>
+          <a:off x="0" y="0"/>
+          <a:ext cx="0" cy="0"/>
+          <a:chOff x="0" y="0"/>
+          <a:chExt cx="0" cy="0"/>
+        </a:xfrm>
+      </p:grpSpPr>
+      <p:sp>
+        <p:nvSpPr>
           <p:cNvPr id="35842" name="Title 1"/>
           <p:cNvSpPr>
             <a:spLocks noGrp="1"/>
@@ -8739,7 +9544,7 @@
             <a:fld id="{C819D0DE-97A2-C142-9B93-516E0974BCDA}" type="slidenum">
               <a:rPr lang="en-US"/>
               <a:pPr/>
-              <a:t>22</a:t>
+              <a:t>23</a:t>
             </a:fld>
             <a:endParaRPr lang="en-US"/>
           </a:p>
@@ -8815,7 +9620,7 @@
         <p:spPr/>
         <p:txBody>
           <a:bodyPr>
-            <a:normAutofit fontScale="85000" lnSpcReduction="20000"/>
+            <a:normAutofit fontScale="77500" lnSpcReduction="20000"/>
           </a:bodyPr>
           <a:lstStyle/>
           <a:p>
@@ -8864,12 +9669,16 @@
               <a:t>Lax-</a:t>
             </a:r>
             <a:r>
-              <a:rPr lang="en-US" dirty="0" err="1"/>
+              <a:rPr lang="en-US" dirty="0" err="1" smtClean="0"/>
               <a:t>Wendroff</a:t>
             </a:r>
-            <a:r>
-              <a:rPr lang="en-US" dirty="0"/>
-              <a:t> with limiters</a:t>
+            <a:endParaRPr lang="en-US" dirty="0" smtClean="0"/>
+          </a:p>
+          <a:p>
+            <a:pPr lvl="1" eaLnBrk="1" hangingPunct="1"/>
+            <a:r>
+              <a:rPr lang="en-US" dirty="0" smtClean="0"/>
+              <a:t>Limiters</a:t>
             </a:r>
             <a:endParaRPr lang="en-US" dirty="0" smtClean="0"/>
           </a:p>
@@ -9336,6 +10145,150 @@
           <a:p>
             <a:r>
               <a:rPr lang="en-US" dirty="0" smtClean="0"/>
+              <a:t>1D Advection</a:t>
+            </a:r>
+            <a:endParaRPr lang="en-US" dirty="0"/>
+          </a:p>
+        </p:txBody>
+      </p:sp>
+      <p:sp>
+        <p:nvSpPr>
+          <p:cNvPr id="5" name="Content Placeholder 4"/>
+          <p:cNvSpPr>
+            <a:spLocks noGrp="1"/>
+          </p:cNvSpPr>
+          <p:nvPr>
+            <p:ph idx="1"/>
+          </p:nvPr>
+        </p:nvSpPr>
+        <p:spPr/>
+        <p:txBody>
+          <a:bodyPr>
+            <a:normAutofit lnSpcReduction="10000"/>
+          </a:bodyPr>
+          <a:lstStyle/>
+          <a:p>
+            <a:r>
+              <a:rPr lang="en-US" dirty="0" smtClean="0"/>
+              <a:t>We are using the 1D advection equation (in our 2D codes) to test various methods:</a:t>
+            </a:r>
+          </a:p>
+          <a:p>
+            <a:endParaRPr lang="en-US" dirty="0" smtClean="0"/>
+          </a:p>
+          <a:p>
+            <a:endParaRPr lang="en-US" dirty="0" smtClean="0"/>
+          </a:p>
+          <a:p>
+            <a:r>
+              <a:rPr lang="en-US" dirty="0" smtClean="0"/>
+              <a:t>We are looking at the advection of 3 different types of waves</a:t>
+            </a:r>
+          </a:p>
+          <a:p>
+            <a:pPr lvl="1"/>
+            <a:r>
+              <a:rPr lang="en-US" dirty="0" smtClean="0"/>
+              <a:t>Square Wave</a:t>
+            </a:r>
+          </a:p>
+          <a:p>
+            <a:pPr lvl="1"/>
+            <a:r>
+              <a:rPr lang="en-US" dirty="0" smtClean="0"/>
+              <a:t>Triangular Wave</a:t>
+            </a:r>
+          </a:p>
+          <a:p>
+            <a:pPr lvl="1"/>
+            <a:r>
+              <a:rPr lang="en-US" dirty="0" smtClean="0"/>
+              <a:t>Exponential Smooth Wave</a:t>
+            </a:r>
+            <a:endParaRPr lang="en-US" dirty="0"/>
+          </a:p>
+        </p:txBody>
+      </p:sp>
+      <p:pic>
+        <p:nvPicPr>
+          <p:cNvPr id="6" name="Content Placeholder 3" descr="Latex_Formulas.pdf"/>
+          <p:cNvPicPr>
+            <a:picLocks noChangeAspect="1"/>
+          </p:cNvPicPr>
+          <p:nvPr/>
+        </p:nvPicPr>
+        <mc:AlternateContent>
+          <mc:Choice xmlns:ma="http://schemas.microsoft.com/office/mac/drawingml/2008/main" Requires="ma">
+            <p:blipFill>
+              <a:blip r:embed="rId2"/>
+              <a:srcRect t="-33218" b="-33218"/>
+              <a:stretch>
+                <a:fillRect/>
+              </a:stretch>
+            </p:blipFill>
+          </mc:Choice>
+          <mc:Fallback>
+            <p:blipFill>
+              <a:blip r:embed="rId3"/>
+              <a:srcRect t="-33218" b="-33218"/>
+              <a:stretch>
+                <a:fillRect/>
+              </a:stretch>
+            </p:blipFill>
+          </mc:Fallback>
+        </mc:AlternateContent>
+        <p:spPr>
+          <a:xfrm>
+            <a:off x="3810000" y="2286000"/>
+            <a:ext cx="2743200" cy="1756317"/>
+          </a:xfrm>
+          <a:prstGeom prst="rect">
+            <a:avLst/>
+          </a:prstGeom>
+        </p:spPr>
+      </p:pic>
+    </p:spTree>
+  </p:cSld>
+  <p:clrMapOvr>
+    <a:masterClrMapping/>
+  </p:clrMapOvr>
+</p:sld>
+</file>
+
+<file path=ppt/slides/slide6.xml><?xml version="1.0" encoding="utf-8"?>
+<p:sld xmlns:a="http://schemas.openxmlformats.org/drawingml/2006/main" xmlns:r="http://schemas.openxmlformats.org/officeDocument/2006/relationships" xmlns:mc="http://schemas.openxmlformats.org/markup-compatibility/2006" xmlns:mv="urn:schemas-microsoft-com:mac:vml" xmlns:p="http://schemas.openxmlformats.org/presentationml/2006/main" mc:Ignorable="mv" mc:PreserveAttributes="mv:*">
+  <p:cSld>
+    <p:spTree>
+      <p:nvGrpSpPr>
+        <p:cNvPr id="1" name=""/>
+        <p:cNvGrpSpPr/>
+        <p:nvPr/>
+      </p:nvGrpSpPr>
+      <p:grpSpPr>
+        <a:xfrm>
+          <a:off x="0" y="0"/>
+          <a:ext cx="0" cy="0"/>
+          <a:chOff x="0" y="0"/>
+          <a:chExt cx="0" cy="0"/>
+        </a:xfrm>
+      </p:grpSpPr>
+      <p:sp>
+        <p:nvSpPr>
+          <p:cNvPr id="2" name="Title 1"/>
+          <p:cNvSpPr>
+            <a:spLocks noGrp="1"/>
+          </p:cNvSpPr>
+          <p:nvPr>
+            <p:ph type="title"/>
+          </p:nvPr>
+        </p:nvSpPr>
+        <p:spPr/>
+        <p:txBody>
+          <a:bodyPr/>
+          <a:lstStyle/>
+          <a:p>
+            <a:r>
+              <a:rPr lang="en-US" dirty="0" smtClean="0"/>
               <a:t>First Order Upwind Scheme</a:t>
             </a:r>
             <a:endParaRPr lang="en-US" dirty="0"/>
@@ -9632,7 +10585,7 @@
 </p:sld>
 </file>
 
-<file path=ppt/slides/slide6.xml><?xml version="1.0" encoding="utf-8"?>
+<file path=ppt/slides/slide7.xml><?xml version="1.0" encoding="utf-8"?>
 <p:sld xmlns:a="http://schemas.openxmlformats.org/drawingml/2006/main" xmlns:r="http://schemas.openxmlformats.org/officeDocument/2006/relationships" xmlns:mc="http://schemas.openxmlformats.org/markup-compatibility/2006" xmlns:mv="urn:schemas-microsoft-com:mac:vml" xmlns:p="http://schemas.openxmlformats.org/presentationml/2006/main" mc:Ignorable="mv" mc:PreserveAttributes="mv:*">
   <p:cSld>
     <p:spTree>
@@ -9678,12 +10631,6 @@
               </a:rPr>
               <a:t>Wendroff</a:t>
             </a:r>
-            <a:r>
-              <a:rPr lang="en-US" dirty="0" smtClean="0">
-                <a:ea typeface="ＭＳ Ｐゴシック" pitchFamily="-108" charset="-128"/>
-              </a:rPr>
-              <a:t> w/o Limiters</a:t>
-            </a:r>
             <a:endParaRPr lang="en-US" dirty="0">
               <a:ea typeface="ＭＳ Ｐゴシック" pitchFamily="-108" charset="-128"/>
             </a:endParaRPr>
@@ -9765,7 +10712,7 @@
             <a:fld id="{D2F573F5-8635-F946-99FF-73D55A1DF9E7}" type="slidenum">
               <a:rPr lang="en-US"/>
               <a:pPr/>
-              <a:t>6</a:t>
+              <a:t>7</a:t>
             </a:fld>
             <a:endParaRPr lang="en-US"/>
           </a:p>
@@ -9963,7 +10910,7 @@
 </p:sld>
 </file>
 
-<file path=ppt/slides/slide7.xml><?xml version="1.0" encoding="utf-8"?>
+<file path=ppt/slides/slide8.xml><?xml version="1.0" encoding="utf-8"?>
 <p:sld xmlns:a="http://schemas.openxmlformats.org/drawingml/2006/main" xmlns:r="http://schemas.openxmlformats.org/officeDocument/2006/relationships" xmlns:mc="http://schemas.openxmlformats.org/markup-compatibility/2006" xmlns:mv="urn:schemas-microsoft-com:mac:vml" xmlns:p="http://schemas.openxmlformats.org/presentationml/2006/main" mc:Ignorable="mv" mc:PreserveAttributes="mv:*">
   <p:cSld>
     <p:spTree>
@@ -10169,7 +11116,7 @@
 </p:sld>
 </file>
 
-<file path=ppt/slides/slide8.xml><?xml version="1.0" encoding="utf-8"?>
+<file path=ppt/slides/slide9.xml><?xml version="1.0" encoding="utf-8"?>
 <p:sld xmlns:a="http://schemas.openxmlformats.org/drawingml/2006/main" xmlns:r="http://schemas.openxmlformats.org/officeDocument/2006/relationships" xmlns:mc="http://schemas.openxmlformats.org/markup-compatibility/2006" xmlns:mv="urn:schemas-microsoft-com:mac:vml" xmlns:p="http://schemas.openxmlformats.org/presentationml/2006/main" mc:Ignorable="mv" mc:PreserveAttributes="mv:*">
   <p:cSld>
     <p:spTree>
@@ -10330,7 +11277,7 @@
             <a:fld id="{F361AA44-26A1-D347-8145-603C7EBA69F0}" type="slidenum">
               <a:rPr lang="en-US"/>
               <a:pPr/>
-              <a:t>8</a:t>
+              <a:t>9</a:t>
             </a:fld>
             <a:endParaRPr lang="en-US"/>
           </a:p>
@@ -10516,339 +11463,6 @@
                 <p:cond evt="onClick" delay="0">
                   <p:tgtEl>
                     <p:spTgt spid="21509"/>
-                  </p:tgtEl>
-                </p:cond>
-              </p:nextCondLst>
-            </p:seq>
-          </p:childTnLst>
-        </p:cTn>
-      </p:par>
-    </p:tnLst>
-  </p:timing>
-</p:sld>
-</file>
-
-<file path=ppt/slides/slide9.xml><?xml version="1.0" encoding="utf-8"?>
-<p:sld xmlns:a="http://schemas.openxmlformats.org/drawingml/2006/main" xmlns:r="http://schemas.openxmlformats.org/officeDocument/2006/relationships" xmlns:mc="http://schemas.openxmlformats.org/markup-compatibility/2006" xmlns:mv="urn:schemas-microsoft-com:mac:vml" xmlns:p="http://schemas.openxmlformats.org/presentationml/2006/main" mc:Ignorable="mv" mc:PreserveAttributes="mv:*">
-  <p:cSld>
-    <p:spTree>
-      <p:nvGrpSpPr>
-        <p:cNvPr id="1" name=""/>
-        <p:cNvGrpSpPr/>
-        <p:nvPr/>
-      </p:nvGrpSpPr>
-      <p:grpSpPr>
-        <a:xfrm>
-          <a:off x="0" y="0"/>
-          <a:ext cx="0" cy="0"/>
-          <a:chOff x="0" y="0"/>
-          <a:chExt cx="0" cy="0"/>
-        </a:xfrm>
-      </p:grpSpPr>
-      <p:sp>
-        <p:nvSpPr>
-          <p:cNvPr id="22530" name="Title 1"/>
-          <p:cNvSpPr>
-            <a:spLocks noGrp="1"/>
-          </p:cNvSpPr>
-          <p:nvPr>
-            <p:ph type="title"/>
-          </p:nvPr>
-        </p:nvSpPr>
-        <p:spPr/>
-        <p:txBody>
-          <a:bodyPr>
-            <a:normAutofit fontScale="90000"/>
-          </a:bodyPr>
-          <a:lstStyle/>
-          <a:p>
-            <a:r>
-              <a:rPr lang="en-US" dirty="0" smtClean="0"/>
-              <a:t>Monotone Upstream Scheme for Conservation Laws (MUSCL)</a:t>
-            </a:r>
-            <a:endParaRPr lang="en-US" dirty="0">
-              <a:ea typeface="ＭＳ Ｐゴシック" pitchFamily="-108" charset="-128"/>
-            </a:endParaRPr>
-          </a:p>
-        </p:txBody>
-      </p:sp>
-      <p:sp>
-        <p:nvSpPr>
-          <p:cNvPr id="22531" name="Content Placeholder 2"/>
-          <p:cNvSpPr>
-            <a:spLocks noGrp="1"/>
-          </p:cNvSpPr>
-          <p:nvPr>
-            <p:ph idx="1"/>
-          </p:nvPr>
-        </p:nvSpPr>
-        <p:spPr>
-          <a:xfrm>
-            <a:off x="1435608" y="1447800"/>
-            <a:ext cx="7498080" cy="1905000"/>
-          </a:xfrm>
-        </p:spPr>
-        <p:txBody>
-          <a:bodyPr>
-            <a:normAutofit fontScale="77500" lnSpcReduction="20000"/>
-          </a:bodyPr>
-          <a:lstStyle/>
-          <a:p>
-            <a:r>
-              <a:rPr lang="en-US" dirty="0" smtClean="0"/>
-              <a:t>Used a modified </a:t>
-            </a:r>
-            <a:r>
-              <a:rPr lang="en-US" dirty="0" err="1" smtClean="0"/>
-              <a:t>Osher-Chakravarthy</a:t>
-            </a:r>
-            <a:r>
-              <a:rPr lang="en-US" dirty="0" smtClean="0"/>
-              <a:t> </a:t>
-            </a:r>
-            <a:r>
-              <a:rPr lang="en-US" dirty="0" smtClean="0"/>
-              <a:t>scheme</a:t>
-            </a:r>
-          </a:p>
-          <a:p>
-            <a:r>
-              <a:rPr lang="en-US" dirty="0" smtClean="0"/>
-              <a:t>Second order TVD approximation</a:t>
-            </a:r>
-          </a:p>
-          <a:p>
-            <a:r>
-              <a:rPr lang="en-US" dirty="0" smtClean="0"/>
-              <a:t>Upwind biased </a:t>
-            </a:r>
-          </a:p>
-          <a:p>
-            <a:r>
-              <a:rPr lang="en-US" dirty="0" smtClean="0"/>
-              <a:t>Numerical oscillations avoided using a </a:t>
-            </a:r>
-            <a:r>
-              <a:rPr lang="en-US" dirty="0" err="1" smtClean="0"/>
-              <a:t>minmod</a:t>
-            </a:r>
-            <a:r>
-              <a:rPr lang="en-US" dirty="0" smtClean="0"/>
-              <a:t> function</a:t>
-            </a:r>
-          </a:p>
-        </p:txBody>
-      </p:sp>
-      <p:sp>
-        <p:nvSpPr>
-          <p:cNvPr id="22532" name="Slide Number Placeholder 3"/>
-          <p:cNvSpPr>
-            <a:spLocks noGrp="1"/>
-          </p:cNvSpPr>
-          <p:nvPr>
-            <p:ph type="sldNum" sz="quarter" idx="12"/>
-          </p:nvPr>
-        </p:nvSpPr>
-        <p:spPr>
-          <a:noFill/>
-        </p:spPr>
-        <p:txBody>
-          <a:bodyPr/>
-          <a:lstStyle/>
-          <a:p>
-            <a:r>
-              <a:rPr lang="en-US"/>
-              <a:t>Slide </a:t>
-            </a:r>
-            <a:fld id="{F7F1AD6D-2FF6-C14C-BD1C-443FD5D06D86}" type="slidenum">
-              <a:rPr lang="en-US"/>
-              <a:pPr/>
-              <a:t>9</a:t>
-            </a:fld>
-            <a:endParaRPr lang="en-US"/>
-          </a:p>
-        </p:txBody>
-      </p:sp>
-      <p:pic>
-        <p:nvPicPr>
-          <p:cNvPr id="22533" name="Picture 5" descr="/Users/Sean/Movies/Any Video Converter Ultimate/Common Used Video Formats/MUSCL.avi">
-            <a:hlinkClick r:id="" action="ppaction://media"/>
-          </p:cNvPr>
-          <p:cNvPicPr/>
-          <p:nvPr>
-            <a:videoFile r:link="rId1"/>
-          </p:nvPr>
-        </p:nvPicPr>
-        <p:blipFill>
-          <a:blip r:embed="rId3"/>
-          <a:srcRect/>
-          <a:stretch>
-            <a:fillRect/>
-          </a:stretch>
-        </p:blipFill>
-        <p:spPr bwMode="auto">
-          <a:xfrm>
-            <a:off x="2895600" y="3352800"/>
-            <a:ext cx="4064000" cy="3048000"/>
-          </a:xfrm>
-          <a:prstGeom prst="rect">
-            <a:avLst/>
-          </a:prstGeom>
-          <a:noFill/>
-          <a:ln w="9525">
-            <a:noFill/>
-            <a:miter lim="800000"/>
-            <a:headEnd/>
-            <a:tailEnd/>
-          </a:ln>
-        </p:spPr>
-      </p:pic>
-    </p:spTree>
-  </p:cSld>
-  <p:clrMapOvr>
-    <a:masterClrMapping/>
-  </p:clrMapOvr>
-  <p:timing>
-    <p:tnLst>
-      <p:par>
-        <p:cTn id="1" dur="indefinite" restart="never" nodeType="tmRoot">
-          <p:childTnLst>
-            <p:seq concurrent="1" nextAc="seek">
-              <p:cTn id="2" dur="indefinite" nodeType="mainSeq">
-                <p:childTnLst>
-                  <p:par>
-                    <p:cTn id="3" fill="hold">
-                      <p:stCondLst>
-                        <p:cond delay="indefinite"/>
-                        <p:cond evt="onBegin" delay="0">
-                          <p:tn val="2"/>
-                        </p:cond>
-                      </p:stCondLst>
-                      <p:childTnLst>
-                        <p:par>
-                          <p:cTn id="4" fill="hold">
-                            <p:stCondLst>
-                              <p:cond delay="0"/>
-                            </p:stCondLst>
-                            <p:childTnLst>
-                              <p:par>
-                                <p:cTn id="5" presetID="1" presetClass="mediacall" presetSubtype="0" fill="hold" nodeType="afterEffect">
-                                  <p:stCondLst>
-                                    <p:cond delay="0"/>
-                                  </p:stCondLst>
-                                  <p:childTnLst>
-                                    <p:cmd type="call" cmd="playFrom(0.0)">
-                                      <p:cBhvr>
-                                        <p:cTn id="6" dur="53320" fill="hold"/>
-                                        <p:tgtEl>
-                                          <p:spTgt spid="22533"/>
-                                        </p:tgtEl>
-                                      </p:cBhvr>
-                                    </p:cmd>
-                                  </p:childTnLst>
-                                </p:cTn>
-                              </p:par>
-                            </p:childTnLst>
-                          </p:cTn>
-                        </p:par>
-                      </p:childTnLst>
-                    </p:cTn>
-                  </p:par>
-                </p:childTnLst>
-              </p:cTn>
-              <p:prevCondLst>
-                <p:cond evt="onPrev" delay="0">
-                  <p:tgtEl>
-                    <p:sldTgt/>
-                  </p:tgtEl>
-                </p:cond>
-              </p:prevCondLst>
-              <p:nextCondLst>
-                <p:cond evt="onNext" delay="0">
-                  <p:tgtEl>
-                    <p:sldTgt/>
-                  </p:tgtEl>
-                </p:cond>
-              </p:nextCondLst>
-            </p:seq>
-            <p:video>
-              <p:cMediaNode>
-                <p:cTn id="7" fill="hold" display="0">
-                  <p:stCondLst>
-                    <p:cond delay="indefinite"/>
-                  </p:stCondLst>
-                  <p:endCondLst>
-                    <p:cond evt="onNext" delay="0">
-                      <p:tgtEl>
-                        <p:sldTgt/>
-                      </p:tgtEl>
-                    </p:cond>
-                    <p:cond evt="onPrev" delay="0">
-                      <p:tgtEl>
-                        <p:sldTgt/>
-                      </p:tgtEl>
-                    </p:cond>
-                  </p:endCondLst>
-                </p:cTn>
-                <p:tgtEl>
-                  <p:spTgt spid="22533"/>
-                </p:tgtEl>
-              </p:cMediaNode>
-            </p:video>
-            <p:seq concurrent="1" nextAc="seek">
-              <p:cTn id="8" restart="whenNotActive" fill="hold" evtFilter="cancelBubble" nodeType="interactiveSeq">
-                <p:stCondLst>
-                  <p:cond evt="onClick" delay="0">
-                    <p:tgtEl>
-                      <p:spTgt spid="22533"/>
-                    </p:tgtEl>
-                  </p:cond>
-                </p:stCondLst>
-                <p:endSync evt="end" delay="0">
-                  <p:rtn val="all"/>
-                </p:endSync>
-                <p:childTnLst>
-                  <p:par>
-                    <p:cTn id="9" fill="hold">
-                      <p:stCondLst>
-                        <p:cond delay="0"/>
-                      </p:stCondLst>
-                      <p:childTnLst>
-                        <p:par>
-                          <p:cTn id="10" fill="hold">
-                            <p:stCondLst>
-                              <p:cond delay="0"/>
-                            </p:stCondLst>
-                            <p:childTnLst>
-                              <p:par>
-                                <p:cTn id="11" presetID="2" presetClass="mediacall" presetSubtype="0" fill="hold" nodeType="clickEffect">
-                                  <p:stCondLst>
-                                    <p:cond delay="0"/>
-                                  </p:stCondLst>
-                                  <p:childTnLst>
-                                    <p:cmd type="call" cmd="togglePause">
-                                      <p:cBhvr>
-                                        <p:cTn id="12" dur="1" fill="hold"/>
-                                        <p:tgtEl>
-                                          <p:spTgt spid="22533"/>
-                                        </p:tgtEl>
-                                      </p:cBhvr>
-                                    </p:cmd>
-                                  </p:childTnLst>
-                                </p:cTn>
-                              </p:par>
-                            </p:childTnLst>
-                          </p:cTn>
-                        </p:par>
-                      </p:childTnLst>
-                    </p:cTn>
-                  </p:par>
-                </p:childTnLst>
-              </p:cTn>
-              <p:nextCondLst>
-                <p:cond evt="onClick" delay="0">
-                  <p:tgtEl>
-                    <p:spTgt spid="22533"/>
                   </p:tgtEl>
                 </p:cond>
               </p:nextCondLst>

</xml_diff>